<commit_message>
Chaos Toolkit - Validando Melhorias
</commit_message>
<xml_diff>
--- a/docs/Chaos Engineering - Das Hipoteses aos Testes.pptx
+++ b/docs/Chaos Engineering - Das Hipoteses aos Testes.pptx
@@ -76,6 +76,35 @@
     <p:sldId id="325" r:id="rId70"/>
     <p:sldId id="326" r:id="rId71"/>
     <p:sldId id="327" r:id="rId72"/>
+    <p:sldId id="328" r:id="rId73"/>
+    <p:sldId id="329" r:id="rId74"/>
+    <p:sldId id="330" r:id="rId75"/>
+    <p:sldId id="331" r:id="rId76"/>
+    <p:sldId id="332" r:id="rId77"/>
+    <p:sldId id="333" r:id="rId78"/>
+    <p:sldId id="334" r:id="rId79"/>
+    <p:sldId id="335" r:id="rId80"/>
+    <p:sldId id="336" r:id="rId81"/>
+    <p:sldId id="337" r:id="rId82"/>
+    <p:sldId id="338" r:id="rId83"/>
+    <p:sldId id="339" r:id="rId84"/>
+    <p:sldId id="340" r:id="rId85"/>
+    <p:sldId id="341" r:id="rId86"/>
+    <p:sldId id="342" r:id="rId87"/>
+    <p:sldId id="343" r:id="rId88"/>
+    <p:sldId id="344" r:id="rId89"/>
+    <p:sldId id="345" r:id="rId90"/>
+    <p:sldId id="346" r:id="rId91"/>
+    <p:sldId id="347" r:id="rId92"/>
+    <p:sldId id="348" r:id="rId93"/>
+    <p:sldId id="349" r:id="rId94"/>
+    <p:sldId id="350" r:id="rId95"/>
+    <p:sldId id="351" r:id="rId96"/>
+    <p:sldId id="352" r:id="rId97"/>
+    <p:sldId id="353" r:id="rId98"/>
+    <p:sldId id="354" r:id="rId99"/>
+    <p:sldId id="355" r:id="rId100"/>
+    <p:sldId id="356" r:id="rId101"/>
   </p:sldIdLst>
   <p:sldSz cx="12192000" cy="6858000"/>
   <p:notesSz cx="6858000" cy="9144000"/>
@@ -456,7 +485,7 @@
           <a:p>
             <a:fld id="{4AAD347D-5ACD-4C99-B74B-A9C85AD731AF}" type="datetimeFigureOut">
               <a:rPr lang="en-US" smtClean="0"/>
-              <a:t>9/29/2019</a:t>
+              <a:t>10/1/2019</a:t>
             </a:fld>
             <a:endParaRPr lang="en-US" dirty="0"/>
           </a:p>
@@ -871,7 +900,7 @@
           <a:p>
             <a:fld id="{4509A250-FF31-4206-8172-F9D3106AACB1}" type="datetimeFigureOut">
               <a:rPr lang="en-US" smtClean="0"/>
-              <a:t>9/29/2019</a:t>
+              <a:t>10/1/2019</a:t>
             </a:fld>
             <a:endParaRPr lang="en-US" dirty="0"/>
           </a:p>
@@ -1207,7 +1236,7 @@
           <a:p>
             <a:fld id="{4509A250-FF31-4206-8172-F9D3106AACB1}" type="datetimeFigureOut">
               <a:rPr lang="en-US" smtClean="0"/>
-              <a:t>9/29/2019</a:t>
+              <a:t>10/1/2019</a:t>
             </a:fld>
             <a:endParaRPr lang="en-US" dirty="0"/>
           </a:p>
@@ -1612,7 +1641,7 @@
           <a:p>
             <a:fld id="{4AAD347D-5ACD-4C99-B74B-A9C85AD731AF}" type="datetimeFigureOut">
               <a:rPr lang="en-US" smtClean="0"/>
-              <a:t>9/29/2019</a:t>
+              <a:t>10/1/2019</a:t>
             </a:fld>
             <a:endParaRPr lang="en-US" dirty="0"/>
           </a:p>
@@ -2181,7 +2210,7 @@
           <a:p>
             <a:fld id="{4AAD347D-5ACD-4C99-B74B-A9C85AD731AF}" type="datetimeFigureOut">
               <a:rPr lang="en-US" smtClean="0"/>
-              <a:t>9/29/2019</a:t>
+              <a:t>10/1/2019</a:t>
             </a:fld>
             <a:endParaRPr lang="en-US" dirty="0"/>
           </a:p>
@@ -2863,7 +2892,7 @@
           <a:p>
             <a:fld id="{4509A250-FF31-4206-8172-F9D3106AACB1}" type="datetimeFigureOut">
               <a:rPr lang="en-US" smtClean="0"/>
-              <a:t>9/29/2019</a:t>
+              <a:t>10/1/2019</a:t>
             </a:fld>
             <a:endParaRPr lang="en-US" dirty="0"/>
           </a:p>
@@ -3776,7 +3805,7 @@
           <a:p>
             <a:fld id="{4509A250-FF31-4206-8172-F9D3106AACB1}" type="datetimeFigureOut">
               <a:rPr lang="en-US" smtClean="0"/>
-              <a:t>9/29/2019</a:t>
+              <a:t>10/1/2019</a:t>
             </a:fld>
             <a:endParaRPr lang="en-US" dirty="0"/>
           </a:p>
@@ -4089,7 +4118,7 @@
           <a:p>
             <a:fld id="{4AAD347D-5ACD-4C99-B74B-A9C85AD731AF}" type="datetimeFigureOut">
               <a:rPr lang="en-US" smtClean="0"/>
-              <a:t>9/29/2019</a:t>
+              <a:t>10/1/2019</a:t>
             </a:fld>
             <a:endParaRPr lang="en-US" dirty="0"/>
           </a:p>
@@ -4354,7 +4383,7 @@
           <a:p>
             <a:fld id="{4AAD347D-5ACD-4C99-B74B-A9C85AD731AF}" type="datetimeFigureOut">
               <a:rPr lang="en-US" smtClean="0"/>
-              <a:t>9/29/2019</a:t>
+              <a:t>10/1/2019</a:t>
             </a:fld>
             <a:endParaRPr lang="en-US" dirty="0"/>
           </a:p>
@@ -4678,7 +4707,7 @@
           <a:p>
             <a:fld id="{4AAD347D-5ACD-4C99-B74B-A9C85AD731AF}" type="datetimeFigureOut">
               <a:rPr lang="en-US" smtClean="0"/>
-              <a:t>9/29/2019</a:t>
+              <a:t>10/1/2019</a:t>
             </a:fld>
             <a:endParaRPr lang="en-US" dirty="0"/>
           </a:p>
@@ -5068,7 +5097,7 @@
           <a:p>
             <a:fld id="{9796027F-7875-4030-9381-8BD8C4F21935}" type="datetimeFigureOut">
               <a:rPr lang="en-US" smtClean="0"/>
-              <a:t>9/29/2019</a:t>
+              <a:t>10/1/2019</a:t>
             </a:fld>
             <a:endParaRPr lang="en-US" dirty="0"/>
           </a:p>
@@ -5444,7 +5473,7 @@
           <a:p>
             <a:fld id="{9796027F-7875-4030-9381-8BD8C4F21935}" type="datetimeFigureOut">
               <a:rPr lang="en-US" smtClean="0"/>
-              <a:t>9/29/2019</a:t>
+              <a:t>10/1/2019</a:t>
             </a:fld>
             <a:endParaRPr lang="en-US" dirty="0"/>
           </a:p>
@@ -5950,7 +5979,7 @@
           <a:p>
             <a:fld id="{9796027F-7875-4030-9381-8BD8C4F21935}" type="datetimeFigureOut">
               <a:rPr lang="en-US" smtClean="0"/>
-              <a:t>9/29/2019</a:t>
+              <a:t>10/1/2019</a:t>
             </a:fld>
             <a:endParaRPr lang="en-US" dirty="0"/>
           </a:p>
@@ -6207,7 +6236,7 @@
           <a:p>
             <a:fld id="{4AAD347D-5ACD-4C99-B74B-A9C85AD731AF}" type="datetimeFigureOut">
               <a:rPr lang="en-US" smtClean="0"/>
-              <a:t>9/29/2019</a:t>
+              <a:t>10/1/2019</a:t>
             </a:fld>
             <a:endParaRPr lang="en-US" dirty="0"/>
           </a:p>
@@ -6371,7 +6400,7 @@
           <a:p>
             <a:fld id="{4509A250-FF31-4206-8172-F9D3106AACB1}" type="datetimeFigureOut">
               <a:rPr lang="en-US" smtClean="0"/>
-              <a:t>9/29/2019</a:t>
+              <a:t>10/1/2019</a:t>
             </a:fld>
             <a:endParaRPr lang="en-US" dirty="0"/>
           </a:p>
@@ -6761,7 +6790,7 @@
           <a:p>
             <a:fld id="{4509A250-FF31-4206-8172-F9D3106AACB1}" type="datetimeFigureOut">
               <a:rPr lang="en-US" smtClean="0"/>
-              <a:t>9/29/2019</a:t>
+              <a:t>10/1/2019</a:t>
             </a:fld>
             <a:endParaRPr lang="en-US" dirty="0"/>
           </a:p>
@@ -7170,7 +7199,7 @@
           <a:p>
             <a:fld id="{4509A250-FF31-4206-8172-F9D3106AACB1}" type="datetimeFigureOut">
               <a:rPr lang="en-US" smtClean="0"/>
-              <a:t>9/29/2019</a:t>
+              <a:t>10/1/2019</a:t>
             </a:fld>
             <a:endParaRPr lang="en-US" dirty="0"/>
           </a:p>
@@ -7414,7 +7443,7 @@
           <a:p>
             <a:fld id="{4AAD347D-5ACD-4C99-B74B-A9C85AD731AF}" type="datetimeFigureOut">
               <a:rPr lang="en-US" smtClean="0"/>
-              <a:t>9/29/2019</a:t>
+              <a:t>10/1/2019</a:t>
             </a:fld>
             <a:endParaRPr lang="en-US" dirty="0"/>
           </a:p>
@@ -7996,6 +8025,125 @@
 </p:sld>
 </file>
 
+<file path=ppt/slides/slide100.xml><?xml version="1.0" encoding="utf-8"?>
+<p:sld xmlns:a="http://schemas.openxmlformats.org/drawingml/2006/main" xmlns:r="http://schemas.openxmlformats.org/officeDocument/2006/relationships" xmlns:p="http://schemas.openxmlformats.org/presentationml/2006/main">
+  <p:cSld>
+    <p:spTree>
+      <p:nvGrpSpPr>
+        <p:cNvPr id="1" name=""/>
+        <p:cNvGrpSpPr/>
+        <p:nvPr/>
+      </p:nvGrpSpPr>
+      <p:grpSpPr>
+        <a:xfrm>
+          <a:off x="0" y="0"/>
+          <a:ext cx="0" cy="0"/>
+          <a:chOff x="0" y="0"/>
+          <a:chExt cx="0" cy="0"/>
+        </a:xfrm>
+      </p:grpSpPr>
+      <p:sp>
+        <p:nvSpPr>
+          <p:cNvPr id="4" name="Título 1">
+            <a:extLst>
+              <a:ext uri="{FF2B5EF4-FFF2-40B4-BE49-F238E27FC236}">
+                <a16:creationId xmlns:a16="http://schemas.microsoft.com/office/drawing/2014/main" id="{9CA53688-E304-4704-85E6-8432DC608B05}"/>
+              </a:ext>
+            </a:extLst>
+          </p:cNvPr>
+          <p:cNvSpPr>
+            <a:spLocks noGrp="1"/>
+          </p:cNvSpPr>
+          <p:nvPr>
+            <p:ph type="title"/>
+          </p:nvPr>
+        </p:nvSpPr>
+        <p:spPr>
+          <a:xfrm>
+            <a:off x="680321" y="753228"/>
+            <a:ext cx="9613861" cy="1080938"/>
+          </a:xfrm>
+        </p:spPr>
+        <p:txBody>
+          <a:bodyPr/>
+          <a:lstStyle/>
+          <a:p>
+            <a:r>
+              <a:rPr lang="pt-BR" dirty="0"/>
+              <a:t>Experimento com </a:t>
+            </a:r>
+            <a:r>
+              <a:rPr lang="pt-BR" dirty="0" err="1"/>
+              <a:t>Chaos</a:t>
+            </a:r>
+            <a:r>
+              <a:rPr lang="pt-BR" dirty="0"/>
+              <a:t> Toolkit:</a:t>
+            </a:r>
+            <a:br>
+              <a:rPr lang="pt-BR" dirty="0"/>
+            </a:br>
+            <a:r>
+              <a:rPr lang="pt-BR" dirty="0"/>
+              <a:t>Implementando as Melhorias</a:t>
+            </a:r>
+            <a:endParaRPr lang="pt-BR" dirty="0"/>
+          </a:p>
+        </p:txBody>
+      </p:sp>
+      <p:sp>
+        <p:nvSpPr>
+          <p:cNvPr id="5" name="Espaço Reservado para Conteúdo 2">
+            <a:extLst>
+              <a:ext uri="{FF2B5EF4-FFF2-40B4-BE49-F238E27FC236}">
+                <a16:creationId xmlns:a16="http://schemas.microsoft.com/office/drawing/2014/main" id="{C5B8AB74-06FA-413C-BD74-462D1F01C8FF}"/>
+              </a:ext>
+            </a:extLst>
+          </p:cNvPr>
+          <p:cNvSpPr>
+            <a:spLocks noGrp="1"/>
+          </p:cNvSpPr>
+          <p:nvPr>
+            <p:ph idx="1"/>
+          </p:nvPr>
+        </p:nvSpPr>
+        <p:spPr>
+          <a:xfrm>
+            <a:off x="680321" y="2505456"/>
+            <a:ext cx="9484759" cy="3599316"/>
+          </a:xfrm>
+        </p:spPr>
+        <p:txBody>
+          <a:bodyPr>
+            <a:noAutofit/>
+          </a:bodyPr>
+          <a:lstStyle/>
+          <a:p>
+            <a:pPr>
+              <a:spcAft>
+                <a:spcPts val="1000"/>
+              </a:spcAft>
+            </a:pPr>
+            <a:r>
+              <a:rPr lang="pt-BR" dirty="0"/>
+              <a:t>I</a:t>
+            </a:r>
+          </a:p>
+        </p:txBody>
+      </p:sp>
+    </p:spTree>
+    <p:extLst>
+      <p:ext uri="{BB962C8B-B14F-4D97-AF65-F5344CB8AC3E}">
+        <p14:creationId xmlns:p14="http://schemas.microsoft.com/office/powerpoint/2010/main" val="922689365"/>
+      </p:ext>
+    </p:extLst>
+  </p:cSld>
+  <p:clrMapOvr>
+    <a:masterClrMapping/>
+  </p:clrMapOvr>
+</p:sld>
+</file>
+
 <file path=ppt/slides/slide11.xml><?xml version="1.0" encoding="utf-8"?>
 <p:sld xmlns:a="http://schemas.openxmlformats.org/drawingml/2006/main" xmlns:r="http://schemas.openxmlformats.org/officeDocument/2006/relationships" xmlns:p="http://schemas.openxmlformats.org/presentationml/2006/main">
   <p:cSld>
@@ -11913,6 +12061,10 @@
             <a:br>
               <a:rPr lang="pt-BR" sz="2200" dirty="0"/>
             </a:br>
+            <a:r>
+              <a:rPr lang="pt-BR" sz="2200" dirty="0"/>
+              <a:t/>
+            </a:r>
             <a:br>
               <a:rPr lang="pt-BR" sz="2200" dirty="0"/>
             </a:br>
@@ -12197,6 +12349,10 @@
               <a:rPr lang="pt-BR" sz="2200" dirty="0" err="1"/>
               <a:t>Steady-State</a:t>
             </a:r>
+            <a:r>
+              <a:rPr lang="pt-BR" sz="2200" dirty="0"/>
+              <a:t/>
+            </a:r>
             <a:br>
               <a:rPr lang="pt-BR" sz="2200" dirty="0"/>
             </a:br>
@@ -12232,6 +12388,10 @@
             <a:r>
               <a:rPr lang="pt-BR" sz="2200" dirty="0" err="1"/>
               <a:t>Rollbacks</a:t>
+            </a:r>
+            <a:r>
+              <a:rPr lang="pt-BR" sz="2200" dirty="0"/>
+              <a:t/>
             </a:r>
             <a:br>
               <a:rPr lang="pt-BR" sz="2200" dirty="0"/>
@@ -15196,7 +15356,7 @@
                 <a16:creationId xmlns:a16="http://schemas.microsoft.com/office/drawing/2014/main" id="{AC3E6C53-102E-4ACA-BCBB-3CC973B99486}"/>
               </a:ext>
               <a:ext uri="{C183D7F6-B498-43B3-948B-1728B52AA6E4}">
-                <adec:decorative xmlns:adec="http://schemas.microsoft.com/office/drawing/2017/decorative" val="1"/>
+                <adec:decorative xmlns:adec="http://schemas.microsoft.com/office/drawing/2017/decorative" xmlns="" val="1"/>
               </a:ext>
             </a:extLst>
           </p:cNvPr>
@@ -15242,7 +15402,7 @@
                 <a16:creationId xmlns:a16="http://schemas.microsoft.com/office/drawing/2014/main" id="{17B2B42C-0777-4D6E-9432-535281803A88}"/>
               </a:ext>
               <a:ext uri="{C183D7F6-B498-43B3-948B-1728B52AA6E4}">
-                <adec:decorative xmlns:adec="http://schemas.microsoft.com/office/drawing/2017/decorative" val="1"/>
+                <adec:decorative xmlns:adec="http://schemas.microsoft.com/office/drawing/2017/decorative" xmlns="" val="1"/>
               </a:ext>
             </a:extLst>
           </p:cNvPr>
@@ -15287,7 +15447,7 @@
                 <a16:creationId xmlns:a16="http://schemas.microsoft.com/office/drawing/2014/main" id="{EFEAAB60-93E2-4DC6-99AC-939637BCE864}"/>
               </a:ext>
               <a:ext uri="{C183D7F6-B498-43B3-948B-1728B52AA6E4}">
-                <adec:decorative xmlns:adec="http://schemas.microsoft.com/office/drawing/2017/decorative" val="1"/>
+                <adec:decorative xmlns:adec="http://schemas.microsoft.com/office/drawing/2017/decorative" xmlns="" val="1"/>
               </a:ext>
             </a:extLst>
           </p:cNvPr>
@@ -15332,7 +15492,7 @@
                 <a16:creationId xmlns:a16="http://schemas.microsoft.com/office/drawing/2014/main" id="{7EF5ECB8-D49C-48FB-A93E-88EB2FFDFD42}"/>
               </a:ext>
               <a:ext uri="{C183D7F6-B498-43B3-948B-1728B52AA6E4}">
-                <adec:decorative xmlns:adec="http://schemas.microsoft.com/office/drawing/2017/decorative" val="1"/>
+                <adec:decorative xmlns:adec="http://schemas.microsoft.com/office/drawing/2017/decorative" xmlns="" val="1"/>
               </a:ext>
             </a:extLst>
           </p:cNvPr>
@@ -15390,7 +15550,7 @@
                 <a16:creationId xmlns:a16="http://schemas.microsoft.com/office/drawing/2014/main" id="{411B77A2-BD5C-432D-B52E-C12612C74C17}"/>
               </a:ext>
               <a:ext uri="{C183D7F6-B498-43B3-948B-1728B52AA6E4}">
-                <adec:decorative xmlns:adec="http://schemas.microsoft.com/office/drawing/2017/decorative" val="1"/>
+                <adec:decorative xmlns:adec="http://schemas.microsoft.com/office/drawing/2017/decorative" xmlns="" val="1"/>
               </a:ext>
             </a:extLst>
           </p:cNvPr>
@@ -15445,7 +15605,7 @@
                 <a16:creationId xmlns:a16="http://schemas.microsoft.com/office/drawing/2014/main" id="{B5C18694-F55B-41C0-ABF3-C1D971F99ADB}"/>
               </a:ext>
               <a:ext uri="{C183D7F6-B498-43B3-948B-1728B52AA6E4}">
-                <adec:decorative xmlns:adec="http://schemas.microsoft.com/office/drawing/2017/decorative" val="1"/>
+                <adec:decorative xmlns:adec="http://schemas.microsoft.com/office/drawing/2017/decorative" xmlns="" val="1"/>
               </a:ext>
             </a:extLst>
           </p:cNvPr>
@@ -15505,7 +15665,7 @@
                 <a16:creationId xmlns:a16="http://schemas.microsoft.com/office/drawing/2014/main" id="{E3E46CA8-7278-4BA3-AACE-235B5B3B53E0}"/>
               </a:ext>
               <a:ext uri="{C183D7F6-B498-43B3-948B-1728B52AA6E4}">
-                <adec:decorative xmlns:adec="http://schemas.microsoft.com/office/drawing/2017/decorative" val="1"/>
+                <adec:decorative xmlns:adec="http://schemas.microsoft.com/office/drawing/2017/decorative" xmlns="" val="1"/>
               </a:ext>
             </a:extLst>
           </p:cNvPr>
@@ -17885,6 +18045,10 @@
               </a:spcAft>
               <a:buNone/>
             </a:pPr>
+            <a:r>
+              <a:rPr lang="pt-BR" dirty="0"/>
+              <a:t/>
+            </a:r>
             <a:br>
               <a:rPr lang="pt-BR" dirty="0"/>
             </a:br>
@@ -18078,15 +18242,31 @@
             <a:br>
               <a:rPr lang="pt-BR" dirty="0"/>
             </a:br>
+            <a:r>
+              <a:rPr lang="pt-BR" dirty="0"/>
+              <a:t/>
+            </a:r>
             <a:br>
               <a:rPr lang="pt-BR" dirty="0"/>
             </a:br>
+            <a:r>
+              <a:rPr lang="pt-BR" dirty="0"/>
+              <a:t/>
+            </a:r>
             <a:br>
               <a:rPr lang="pt-BR" dirty="0"/>
             </a:br>
+            <a:r>
+              <a:rPr lang="pt-BR" dirty="0"/>
+              <a:t/>
+            </a:r>
             <a:br>
               <a:rPr lang="pt-BR" dirty="0"/>
             </a:br>
+            <a:r>
+              <a:rPr lang="pt-BR" dirty="0"/>
+              <a:t/>
+            </a:r>
             <a:br>
               <a:rPr lang="pt-BR" dirty="0"/>
             </a:br>
@@ -18410,8 +18590,12 @@
               </a:spcAft>
             </a:pPr>
             <a:r>
-              <a:rPr lang="pt-BR" dirty="0"/>
-              <a:t>Por debaixo dos panos da execução do comando </a:t>
+              <a:rPr lang="pt-BR" dirty="0" smtClean="0"/>
+              <a:t>Por dentro </a:t>
+            </a:r>
+            <a:r>
+              <a:rPr lang="pt-BR" dirty="0"/>
+              <a:t>da execução do comando </a:t>
             </a:r>
             <a:r>
               <a:rPr lang="pt-BR" i="1" dirty="0" err="1"/>
@@ -18444,13 +18628,56 @@
               <a:t>Esse passo também pode ser executado com o comando </a:t>
             </a:r>
             <a:r>
-              <a:rPr lang="pt-BR" i="1" dirty="0" err="1">
+              <a:rPr lang="pt-BR" i="1" dirty="0" err="1" smtClean="0">
                 <a:highlight>
                   <a:srgbClr val="000000"/>
                 </a:highlight>
               </a:rPr>
               <a:t>validate</a:t>
             </a:r>
+            <a:endParaRPr lang="pt-BR" i="1" dirty="0" smtClean="0">
+              <a:highlight>
+                <a:srgbClr val="000000"/>
+              </a:highlight>
+            </a:endParaRPr>
+          </a:p>
+          <a:p>
+            <a:pPr>
+              <a:spcAft>
+                <a:spcPts val="1000"/>
+              </a:spcAft>
+            </a:pPr>
+            <a:r>
+              <a:rPr lang="pt-BR" dirty="0" smtClean="0"/>
+              <a:t>Uma vez que o experimento seja válido o </a:t>
+            </a:r>
+            <a:r>
+              <a:rPr lang="pt-BR" dirty="0" err="1" smtClean="0"/>
+              <a:t>Chaos</a:t>
+            </a:r>
+            <a:r>
+              <a:rPr lang="pt-BR" dirty="0" smtClean="0"/>
+              <a:t> Toolkit orquestra a sua execução.</a:t>
+            </a:r>
+          </a:p>
+          <a:p>
+            <a:pPr>
+              <a:spcAft>
+                <a:spcPts val="1000"/>
+              </a:spcAft>
+            </a:pPr>
+            <a:r>
+              <a:rPr lang="pt-BR" dirty="0" smtClean="0"/>
+              <a:t>A execução é baseada nas definições do experimento.</a:t>
+            </a:r>
+            <a:endParaRPr lang="pt-BR" dirty="0"/>
+          </a:p>
+          <a:p>
+            <a:pPr>
+              <a:spcAft>
+                <a:spcPts val="1000"/>
+              </a:spcAft>
+            </a:pPr>
             <a:endParaRPr lang="pt-BR" i="1" dirty="0">
               <a:highlight>
                 <a:srgbClr val="000000"/>
@@ -18571,12 +18798,58 @@
               </a:spcAft>
             </a:pPr>
             <a:r>
-              <a:rPr lang="pt-BR" dirty="0"/>
-              <a:t>I</a:t>
-            </a:r>
-          </a:p>
-        </p:txBody>
-      </p:sp>
+              <a:rPr lang="pt-BR" dirty="0" smtClean="0"/>
+              <a:t>Processo de execução de experimento do </a:t>
+            </a:r>
+            <a:r>
+              <a:rPr lang="pt-BR" dirty="0" err="1" smtClean="0"/>
+              <a:t>Chaos</a:t>
+            </a:r>
+            <a:r>
+              <a:rPr lang="pt-BR" dirty="0" smtClean="0"/>
+              <a:t> Toolkit:</a:t>
+            </a:r>
+          </a:p>
+          <a:p>
+            <a:pPr>
+              <a:spcAft>
+                <a:spcPts val="1000"/>
+              </a:spcAft>
+            </a:pPr>
+            <a:endParaRPr lang="pt-BR" dirty="0"/>
+          </a:p>
+        </p:txBody>
+      </p:sp>
+      <p:pic>
+        <p:nvPicPr>
+          <p:cNvPr id="2" name="Imagem 1"/>
+          <p:cNvPicPr>
+            <a:picLocks noChangeAspect="1"/>
+          </p:cNvPicPr>
+          <p:nvPr/>
+        </p:nvPicPr>
+        <p:blipFill>
+          <a:blip r:embed="rId2">
+            <a:extLst>
+              <a:ext uri="{28A0092B-C50C-407E-A947-70E740481C1C}">
+                <a14:useLocalDpi xmlns:a14="http://schemas.microsoft.com/office/drawing/2010/main" val="0"/>
+              </a:ext>
+            </a:extLst>
+          </a:blip>
+          <a:stretch>
+            <a:fillRect/>
+          </a:stretch>
+        </p:blipFill>
+        <p:spPr>
+          <a:xfrm>
+            <a:off x="2903935" y="3098406"/>
+            <a:ext cx="5166632" cy="3370822"/>
+          </a:xfrm>
+          <a:prstGeom prst="rect">
+            <a:avLst/>
+          </a:prstGeom>
+        </p:spPr>
+      </p:pic>
     </p:spTree>
     <p:extLst>
       <p:ext uri="{BB962C8B-B14F-4D97-AF65-F5344CB8AC3E}">
@@ -18665,8 +18938,8 @@
         </p:nvSpPr>
         <p:spPr>
           <a:xfrm>
-            <a:off x="680321" y="2505456"/>
-            <a:ext cx="9484759" cy="3599316"/>
+            <a:off x="680323" y="2505456"/>
+            <a:ext cx="9355500" cy="3599316"/>
           </a:xfrm>
         </p:spPr>
         <p:txBody>
@@ -18681,9 +18954,58 @@
               </a:spcAft>
             </a:pPr>
             <a:r>
-              <a:rPr lang="pt-BR" dirty="0"/>
-              <a:t>I</a:t>
-            </a:r>
+              <a:rPr lang="pt-BR" dirty="0" smtClean="0"/>
+              <a:t>Com o diagrama podemos observar que:</a:t>
+            </a:r>
+          </a:p>
+          <a:p>
+            <a:pPr>
+              <a:spcAft>
+                <a:spcPts val="1000"/>
+              </a:spcAft>
+            </a:pPr>
+            <a:r>
+              <a:rPr lang="pt-BR" dirty="0" smtClean="0"/>
+              <a:t>A hipótese de estado do sistema é usada dua</a:t>
+            </a:r>
+            <a:r>
+              <a:rPr lang="pt-BR" dirty="0" smtClean="0"/>
+              <a:t>s vezes no processo.</a:t>
+            </a:r>
+          </a:p>
+          <a:p>
+            <a:pPr>
+              <a:spcAft>
+                <a:spcPts val="1000"/>
+              </a:spcAft>
+            </a:pPr>
+            <a:r>
+              <a:rPr lang="pt-BR" dirty="0" smtClean="0"/>
+              <a:t>A hipótese de estado é usada para verificar se o sistema se encontra em seu estado normal.</a:t>
+            </a:r>
+          </a:p>
+          <a:p>
+            <a:pPr>
+              <a:spcAft>
+                <a:spcPts val="1000"/>
+              </a:spcAft>
+            </a:pPr>
+            <a:r>
+              <a:rPr lang="pt-BR" dirty="0" smtClean="0"/>
+              <a:t>E também para verificar se o sistema irá se comportar como o esperado de acordo com as condições previamente definidas.</a:t>
+            </a:r>
+          </a:p>
+          <a:p>
+            <a:pPr>
+              <a:spcAft>
+                <a:spcPts val="1000"/>
+              </a:spcAft>
+            </a:pPr>
+            <a:r>
+              <a:rPr lang="pt-BR" dirty="0" smtClean="0"/>
+              <a:t>Qualquer comportamento fora do esperado pode indicar um ponto fraco em questão.</a:t>
+            </a:r>
+            <a:endParaRPr lang="pt-BR" dirty="0"/>
           </a:p>
         </p:txBody>
       </p:sp>
@@ -18791,9 +19113,59 @@
               </a:spcAft>
             </a:pPr>
             <a:r>
-              <a:rPr lang="pt-BR" sz="2600" dirty="0"/>
-              <a:t>I</a:t>
-            </a:r>
+              <a:rPr lang="pt-BR" dirty="0" smtClean="0"/>
+              <a:t>Os comportamentos inesperados durante a execução de um experimento indicam uma oportunidade para melhorias.</a:t>
+            </a:r>
+          </a:p>
+          <a:p>
+            <a:pPr>
+              <a:spcAft>
+                <a:spcPts val="1000"/>
+              </a:spcAft>
+            </a:pPr>
+            <a:r>
+              <a:rPr lang="pt-BR" dirty="0" smtClean="0"/>
+              <a:t>Mais ainda, encontrar uma falha </a:t>
+            </a:r>
+            <a:r>
+              <a:rPr lang="pt-BR" dirty="0" smtClean="0"/>
+              <a:t>durante</a:t>
+            </a:r>
+            <a:r>
+              <a:rPr lang="pt-BR" dirty="0" smtClean="0"/>
+              <a:t> um experimento significa encontrá-la antes do usuário final.</a:t>
+            </a:r>
+          </a:p>
+          <a:p>
+            <a:pPr>
+              <a:spcAft>
+                <a:spcPts val="1000"/>
+              </a:spcAft>
+            </a:pPr>
+            <a:r>
+              <a:rPr lang="pt-BR" dirty="0" smtClean="0"/>
+              <a:t>Voltando ao nosso experimento, uma olhada no arquivo </a:t>
+            </a:r>
+            <a:r>
+              <a:rPr lang="pt-BR" i="1" dirty="0" smtClean="0"/>
+              <a:t>service.py</a:t>
+            </a:r>
+            <a:r>
+              <a:rPr lang="pt-BR" dirty="0" smtClean="0"/>
+              <a:t> indicará a falha.</a:t>
+            </a:r>
+          </a:p>
+          <a:p>
+            <a:pPr>
+              <a:spcAft>
+                <a:spcPts val="1000"/>
+              </a:spcAft>
+            </a:pPr>
+            <a:r>
+              <a:rPr lang="pt-BR" dirty="0" smtClean="0"/>
+              <a:t>Ao assumir que o arquivo Exchange.dat sempre estará presente o serviço irá falhar se o mesmo não estará presente.</a:t>
+            </a:r>
+            <a:endParaRPr lang="pt-BR" dirty="0"/>
           </a:p>
         </p:txBody>
       </p:sp>
@@ -18855,15 +19227,24 @@
           <a:p>
             <a:r>
               <a:rPr lang="pt-BR" dirty="0"/>
-              <a:t>Experimento com Chaos Toolkit:</a:t>
+              <a:t>Experimento com </a:t>
+            </a:r>
+            <a:r>
+              <a:rPr lang="pt-BR" dirty="0" err="1"/>
+              <a:t>Chaos</a:t>
+            </a:r>
+            <a:r>
+              <a:rPr lang="pt-BR" dirty="0"/>
+              <a:t> Toolkit:</a:t>
             </a:r>
             <a:br>
               <a:rPr lang="pt-BR" dirty="0"/>
             </a:br>
             <a:r>
-              <a:rPr lang="pt-BR" dirty="0"/>
-              <a:t>Por dentro do experimento</a:t>
-            </a:r>
+              <a:rPr lang="pt-BR" dirty="0" smtClean="0"/>
+              <a:t>Implementando Melhorias</a:t>
+            </a:r>
+            <a:endParaRPr lang="pt-BR" dirty="0"/>
           </a:p>
         </p:txBody>
       </p:sp>
@@ -18885,8 +19266,8 @@
         </p:nvSpPr>
         <p:spPr>
           <a:xfrm>
-            <a:off x="680321" y="2505456"/>
-            <a:ext cx="9484759" cy="3599316"/>
+            <a:off x="680322" y="2505456"/>
+            <a:ext cx="9186168" cy="3599316"/>
           </a:xfrm>
         </p:spPr>
         <p:txBody>
@@ -18901,8 +19282,42 @@
               </a:spcAft>
             </a:pPr>
             <a:r>
-              <a:rPr lang="pt-BR" sz="2600" dirty="0"/>
-              <a:t>I</a:t>
+              <a:rPr lang="pt-BR" dirty="0" smtClean="0"/>
+              <a:t>Em nossa hipótese indicamos que o serviço deveria ter resiliência a essa falha.</a:t>
+            </a:r>
+          </a:p>
+          <a:p>
+            <a:pPr>
+              <a:spcAft>
+                <a:spcPts val="1000"/>
+              </a:spcAft>
+            </a:pPr>
+            <a:r>
+              <a:rPr lang="pt-BR" dirty="0" smtClean="0"/>
+              <a:t>Em alguns casos a fase da análise por si só exigirá um certo esforço.</a:t>
+            </a:r>
+            <a:endParaRPr lang="pt-BR" dirty="0" smtClean="0"/>
+          </a:p>
+          <a:p>
+            <a:pPr>
+              <a:spcAft>
+                <a:spcPts val="1000"/>
+              </a:spcAft>
+            </a:pPr>
+            <a:r>
+              <a:rPr lang="pt-BR" dirty="0" smtClean="0"/>
+              <a:t>Depois da descoberta de uma possível falha, os esforços devem ser direcionados a correção da mesma.</a:t>
+            </a:r>
+          </a:p>
+          <a:p>
+            <a:pPr>
+              <a:spcAft>
+                <a:spcPts val="1000"/>
+              </a:spcAft>
+            </a:pPr>
+            <a:r>
+              <a:rPr lang="pt-BR" dirty="0" smtClean="0"/>
+              <a:t>Os pontos críticos devem ser priorizados.</a:t>
             </a:r>
           </a:p>
         </p:txBody>
@@ -19135,15 +19550,24 @@
           <a:p>
             <a:r>
               <a:rPr lang="pt-BR" dirty="0"/>
-              <a:t>Experimento com Chaos Toolkit:</a:t>
+              <a:t>Experimento com </a:t>
+            </a:r>
+            <a:r>
+              <a:rPr lang="pt-BR" dirty="0" err="1"/>
+              <a:t>Chaos</a:t>
+            </a:r>
+            <a:r>
+              <a:rPr lang="pt-BR" dirty="0"/>
+              <a:t> Toolkit:</a:t>
             </a:r>
             <a:br>
               <a:rPr lang="pt-BR" dirty="0"/>
             </a:br>
             <a:r>
               <a:rPr lang="pt-BR" dirty="0"/>
-              <a:t>Por dentro do experimento</a:t>
-            </a:r>
+              <a:t>Implementando Melhorias</a:t>
+            </a:r>
+            <a:endParaRPr lang="pt-BR" dirty="0"/>
           </a:p>
         </p:txBody>
       </p:sp>
@@ -19165,8 +19589,8 @@
         </p:nvSpPr>
         <p:spPr>
           <a:xfrm>
-            <a:off x="680321" y="2505456"/>
-            <a:ext cx="9484759" cy="3599316"/>
+            <a:off x="680322" y="2505456"/>
+            <a:ext cx="7075146" cy="3599316"/>
           </a:xfrm>
         </p:spPr>
         <p:txBody>
@@ -19181,12 +19605,88 @@
               </a:spcAft>
             </a:pPr>
             <a:r>
-              <a:rPr lang="pt-BR" sz="2600" dirty="0"/>
-              <a:t>I</a:t>
-            </a:r>
-          </a:p>
-        </p:txBody>
-      </p:sp>
+              <a:rPr lang="pt-BR" dirty="0" smtClean="0"/>
+              <a:t>Como temos um serviço muito simples a resolução é fácil.</a:t>
+            </a:r>
+          </a:p>
+          <a:p>
+            <a:pPr>
+              <a:spcAft>
+                <a:spcPts val="1000"/>
+              </a:spcAft>
+            </a:pPr>
+            <a:r>
+              <a:rPr lang="pt-BR" dirty="0" smtClean="0"/>
+              <a:t>A implementação resiliente se encontra no arquivo </a:t>
+            </a:r>
+            <a:r>
+              <a:rPr lang="pt-BR" i="1" dirty="0" smtClean="0"/>
+              <a:t>resilient-service.py</a:t>
+            </a:r>
+          </a:p>
+          <a:p>
+            <a:pPr>
+              <a:spcAft>
+                <a:spcPts val="1000"/>
+              </a:spcAft>
+            </a:pPr>
+            <a:r>
+              <a:rPr lang="pt-BR" dirty="0" smtClean="0"/>
+              <a:t>O mesmo checa a existência do arquivo </a:t>
+            </a:r>
+            <a:r>
+              <a:rPr lang="pt-BR" i="1" dirty="0" smtClean="0"/>
+              <a:t>exchange.dat </a:t>
+            </a:r>
+            <a:r>
+              <a:rPr lang="pt-BR" dirty="0" smtClean="0"/>
+              <a:t>e caso não encontre o mesmo retorna uma mensagem de erro.</a:t>
+            </a:r>
+          </a:p>
+          <a:p>
+            <a:pPr>
+              <a:spcAft>
+                <a:spcPts val="1000"/>
+              </a:spcAft>
+            </a:pPr>
+            <a:r>
+              <a:rPr lang="pt-BR" dirty="0" smtClean="0"/>
+              <a:t> </a:t>
+            </a:r>
+            <a:endParaRPr lang="pt-BR" dirty="0"/>
+          </a:p>
+        </p:txBody>
+      </p:sp>
+      <p:pic>
+        <p:nvPicPr>
+          <p:cNvPr id="6" name="Imagem 5"/>
+          <p:cNvPicPr>
+            <a:picLocks noChangeAspect="1"/>
+          </p:cNvPicPr>
+          <p:nvPr/>
+        </p:nvPicPr>
+        <p:blipFill>
+          <a:blip r:embed="rId2">
+            <a:extLst>
+              <a:ext uri="{28A0092B-C50C-407E-A947-70E740481C1C}">
+                <a14:useLocalDpi xmlns:a14="http://schemas.microsoft.com/office/drawing/2010/main" val="0"/>
+              </a:ext>
+            </a:extLst>
+          </a:blip>
+          <a:stretch>
+            <a:fillRect/>
+          </a:stretch>
+        </p:blipFill>
+        <p:spPr>
+          <a:xfrm>
+            <a:off x="7968149" y="2976731"/>
+            <a:ext cx="3803451" cy="2667927"/>
+          </a:xfrm>
+          <a:prstGeom prst="rect">
+            <a:avLst/>
+          </a:prstGeom>
+        </p:spPr>
+      </p:pic>
     </p:spTree>
     <p:extLst>
       <p:ext uri="{BB962C8B-B14F-4D97-AF65-F5344CB8AC3E}">
@@ -19245,15 +19745,28 @@
           <a:p>
             <a:r>
               <a:rPr lang="pt-BR" dirty="0"/>
-              <a:t>Experimento com Chaos Toolkit:</a:t>
+              <a:t>Experimento com </a:t>
+            </a:r>
+            <a:r>
+              <a:rPr lang="pt-BR" dirty="0" err="1"/>
+              <a:t>Chaos</a:t>
+            </a:r>
+            <a:r>
+              <a:rPr lang="pt-BR" dirty="0"/>
+              <a:t> Toolkit:</a:t>
             </a:r>
             <a:br>
               <a:rPr lang="pt-BR" dirty="0"/>
             </a:br>
             <a:r>
-              <a:rPr lang="pt-BR" dirty="0"/>
-              <a:t>Por dentro do experimento</a:t>
-            </a:r>
+              <a:rPr lang="pt-BR" dirty="0" smtClean="0"/>
+              <a:t>Validando </a:t>
+            </a:r>
+            <a:r>
+              <a:rPr lang="pt-BR" dirty="0"/>
+              <a:t>Melhorias</a:t>
+            </a:r>
+            <a:endParaRPr lang="pt-BR" dirty="0"/>
           </a:p>
         </p:txBody>
       </p:sp>
@@ -19275,8 +19788,8 @@
         </p:nvSpPr>
         <p:spPr>
           <a:xfrm>
-            <a:off x="680321" y="2505456"/>
-            <a:ext cx="9484759" cy="3599316"/>
+            <a:off x="680322" y="2505456"/>
+            <a:ext cx="7075146" cy="3599316"/>
           </a:xfrm>
         </p:spPr>
         <p:txBody>
@@ -19291,16 +19804,1078 @@
               </a:spcAft>
             </a:pPr>
             <a:r>
-              <a:rPr lang="pt-BR" sz="2600" dirty="0"/>
-              <a:t>I</a:t>
-            </a:r>
-          </a:p>
-        </p:txBody>
-      </p:sp>
+              <a:rPr lang="pt-BR" dirty="0" smtClean="0"/>
+              <a:t>Agora executamos o experimento de novo para validar a melhoria implementada.</a:t>
+            </a:r>
+          </a:p>
+          <a:p>
+            <a:pPr>
+              <a:spcBef>
+                <a:spcPts val="0"/>
+              </a:spcBef>
+              <a:spcAft>
+                <a:spcPts val="1000"/>
+              </a:spcAft>
+            </a:pPr>
+            <a:r>
+              <a:rPr lang="pt-BR" dirty="0" smtClean="0"/>
+              <a:t>Primeiro devemos parar a instância do serviço antigo e rodar a do novo serviço resiliente.</a:t>
+            </a:r>
+            <a:br>
+              <a:rPr lang="pt-BR" dirty="0" smtClean="0"/>
+            </a:br>
+            <a:r>
+              <a:rPr lang="pt-BR" dirty="0" smtClean="0"/>
+              <a:t/>
+            </a:r>
+            <a:br>
+              <a:rPr lang="pt-BR" dirty="0" smtClean="0"/>
+            </a:br>
+            <a:r>
+              <a:rPr lang="pt-BR" dirty="0">
+                <a:highlight>
+                  <a:srgbClr val="000000"/>
+                </a:highlight>
+              </a:rPr>
+              <a:t>$ python3 resilient-service.py</a:t>
+            </a:r>
+            <a:endParaRPr lang="pt-BR" dirty="0">
+              <a:highlight>
+                <a:srgbClr val="000000"/>
+              </a:highlight>
+            </a:endParaRPr>
+          </a:p>
+          <a:p>
+            <a:pPr>
+              <a:spcAft>
+                <a:spcPts val="1000"/>
+              </a:spcAft>
+            </a:pPr>
+            <a:r>
+              <a:rPr lang="pt-BR" dirty="0" smtClean="0"/>
+              <a:t>Ao rodarmos o experimento de novo no terminal vemos que a falha foi corrigida.</a:t>
+            </a:r>
+            <a:endParaRPr lang="pt-BR" dirty="0"/>
+          </a:p>
+        </p:txBody>
+      </p:sp>
+      <p:pic>
+        <p:nvPicPr>
+          <p:cNvPr id="6" name="Imagem 5"/>
+          <p:cNvPicPr>
+            <a:picLocks noChangeAspect="1"/>
+          </p:cNvPicPr>
+          <p:nvPr/>
+        </p:nvPicPr>
+        <p:blipFill>
+          <a:blip r:embed="rId2">
+            <a:extLst>
+              <a:ext uri="{28A0092B-C50C-407E-A947-70E740481C1C}">
+                <a14:useLocalDpi xmlns:a14="http://schemas.microsoft.com/office/drawing/2010/main" val="0"/>
+              </a:ext>
+            </a:extLst>
+          </a:blip>
+          <a:stretch>
+            <a:fillRect/>
+          </a:stretch>
+        </p:blipFill>
+        <p:spPr>
+          <a:xfrm>
+            <a:off x="7961867" y="2976731"/>
+            <a:ext cx="3809733" cy="2667927"/>
+          </a:xfrm>
+          <a:prstGeom prst="rect">
+            <a:avLst/>
+          </a:prstGeom>
+        </p:spPr>
+      </p:pic>
     </p:spTree>
     <p:extLst>
       <p:ext uri="{BB962C8B-B14F-4D97-AF65-F5344CB8AC3E}">
         <p14:creationId xmlns:p14="http://schemas.microsoft.com/office/powerpoint/2010/main" val="1752052799"/>
+      </p:ext>
+    </p:extLst>
+  </p:cSld>
+  <p:clrMapOvr>
+    <a:masterClrMapping/>
+  </p:clrMapOvr>
+</p:sld>
+</file>
+
+<file path=ppt/slides/slide72.xml><?xml version="1.0" encoding="utf-8"?>
+<p:sld xmlns:a="http://schemas.openxmlformats.org/drawingml/2006/main" xmlns:r="http://schemas.openxmlformats.org/officeDocument/2006/relationships" xmlns:p="http://schemas.openxmlformats.org/presentationml/2006/main">
+  <p:cSld>
+    <p:spTree>
+      <p:nvGrpSpPr>
+        <p:cNvPr id="1" name=""/>
+        <p:cNvGrpSpPr/>
+        <p:nvPr/>
+      </p:nvGrpSpPr>
+      <p:grpSpPr>
+        <a:xfrm>
+          <a:off x="0" y="0"/>
+          <a:ext cx="0" cy="0"/>
+          <a:chOff x="0" y="0"/>
+          <a:chExt cx="0" cy="0"/>
+        </a:xfrm>
+      </p:grpSpPr>
+      <p:sp>
+        <p:nvSpPr>
+          <p:cNvPr id="4" name="Título 1">
+            <a:extLst>
+              <a:ext uri="{FF2B5EF4-FFF2-40B4-BE49-F238E27FC236}">
+                <a16:creationId xmlns:a16="http://schemas.microsoft.com/office/drawing/2014/main" id="{9CA53688-E304-4704-85E6-8432DC608B05}"/>
+              </a:ext>
+            </a:extLst>
+          </p:cNvPr>
+          <p:cNvSpPr>
+            <a:spLocks noGrp="1"/>
+          </p:cNvSpPr>
+          <p:nvPr>
+            <p:ph type="title"/>
+          </p:nvPr>
+        </p:nvSpPr>
+        <p:spPr>
+          <a:xfrm>
+            <a:off x="680321" y="753228"/>
+            <a:ext cx="9613861" cy="1080938"/>
+          </a:xfrm>
+        </p:spPr>
+        <p:txBody>
+          <a:bodyPr/>
+          <a:lstStyle/>
+          <a:p>
+            <a:r>
+              <a:rPr lang="pt-BR" dirty="0"/>
+              <a:t>Experimento com </a:t>
+            </a:r>
+            <a:r>
+              <a:rPr lang="pt-BR" dirty="0" err="1"/>
+              <a:t>Chaos</a:t>
+            </a:r>
+            <a:r>
+              <a:rPr lang="pt-BR"/>
+              <a:t> Toolkit:</a:t>
+            </a:r>
+            <a:br>
+              <a:rPr lang="pt-BR"/>
+            </a:br>
+            <a:r>
+              <a:rPr lang="pt-BR"/>
+              <a:t>Validando Melhorias</a:t>
+            </a:r>
+            <a:endParaRPr lang="pt-BR" dirty="0"/>
+          </a:p>
+        </p:txBody>
+      </p:sp>
+      <p:sp>
+        <p:nvSpPr>
+          <p:cNvPr id="5" name="Espaço Reservado para Conteúdo 2">
+            <a:extLst>
+              <a:ext uri="{FF2B5EF4-FFF2-40B4-BE49-F238E27FC236}">
+                <a16:creationId xmlns:a16="http://schemas.microsoft.com/office/drawing/2014/main" id="{C5B8AB74-06FA-413C-BD74-462D1F01C8FF}"/>
+              </a:ext>
+            </a:extLst>
+          </p:cNvPr>
+          <p:cNvSpPr>
+            <a:spLocks noGrp="1"/>
+          </p:cNvSpPr>
+          <p:nvPr>
+            <p:ph idx="1"/>
+          </p:nvPr>
+        </p:nvSpPr>
+        <p:spPr>
+          <a:xfrm>
+            <a:off x="680321" y="2505456"/>
+            <a:ext cx="9484759" cy="3599316"/>
+          </a:xfrm>
+        </p:spPr>
+        <p:txBody>
+          <a:bodyPr>
+            <a:noAutofit/>
+          </a:bodyPr>
+          <a:lstStyle/>
+          <a:p>
+            <a:pPr>
+              <a:spcAft>
+                <a:spcPts val="1000"/>
+              </a:spcAft>
+            </a:pPr>
+            <a:r>
+              <a:rPr lang="pt-BR" dirty="0" smtClean="0"/>
+              <a:t>Falha corrigida:</a:t>
+            </a:r>
+            <a:endParaRPr lang="pt-BR" dirty="0"/>
+          </a:p>
+        </p:txBody>
+      </p:sp>
+      <p:pic>
+        <p:nvPicPr>
+          <p:cNvPr id="2" name="Imagem 1"/>
+          <p:cNvPicPr>
+            <a:picLocks noChangeAspect="1"/>
+          </p:cNvPicPr>
+          <p:nvPr/>
+        </p:nvPicPr>
+        <p:blipFill>
+          <a:blip r:embed="rId2">
+            <a:extLst>
+              <a:ext uri="{28A0092B-C50C-407E-A947-70E740481C1C}">
+                <a14:useLocalDpi xmlns:a14="http://schemas.microsoft.com/office/drawing/2010/main" val="0"/>
+              </a:ext>
+            </a:extLst>
+          </a:blip>
+          <a:stretch>
+            <a:fillRect/>
+          </a:stretch>
+        </p:blipFill>
+        <p:spPr>
+          <a:xfrm>
+            <a:off x="2136985" y="3224758"/>
+            <a:ext cx="6571429" cy="3095238"/>
+          </a:xfrm>
+          <a:prstGeom prst="rect">
+            <a:avLst/>
+          </a:prstGeom>
+        </p:spPr>
+      </p:pic>
+    </p:spTree>
+    <p:extLst>
+      <p:ext uri="{BB962C8B-B14F-4D97-AF65-F5344CB8AC3E}">
+        <p14:creationId xmlns:p14="http://schemas.microsoft.com/office/powerpoint/2010/main" val="2410244470"/>
+      </p:ext>
+    </p:extLst>
+  </p:cSld>
+  <p:clrMapOvr>
+    <a:masterClrMapping/>
+  </p:clrMapOvr>
+</p:sld>
+</file>
+
+<file path=ppt/slides/slide73.xml><?xml version="1.0" encoding="utf-8"?>
+<p:sld xmlns:a="http://schemas.openxmlformats.org/drawingml/2006/main" xmlns:r="http://schemas.openxmlformats.org/officeDocument/2006/relationships" xmlns:p="http://schemas.openxmlformats.org/presentationml/2006/main">
+  <p:cSld>
+    <p:spTree>
+      <p:nvGrpSpPr>
+        <p:cNvPr id="1" name=""/>
+        <p:cNvGrpSpPr/>
+        <p:nvPr/>
+      </p:nvGrpSpPr>
+      <p:grpSpPr>
+        <a:xfrm>
+          <a:off x="0" y="0"/>
+          <a:ext cx="0" cy="0"/>
+          <a:chOff x="0" y="0"/>
+          <a:chExt cx="0" cy="0"/>
+        </a:xfrm>
+      </p:grpSpPr>
+      <p:sp>
+        <p:nvSpPr>
+          <p:cNvPr id="4" name="Título 1">
+            <a:extLst>
+              <a:ext uri="{FF2B5EF4-FFF2-40B4-BE49-F238E27FC236}">
+                <a16:creationId xmlns:a16="http://schemas.microsoft.com/office/drawing/2014/main" id="{9CA53688-E304-4704-85E6-8432DC608B05}"/>
+              </a:ext>
+            </a:extLst>
+          </p:cNvPr>
+          <p:cNvSpPr>
+            <a:spLocks noGrp="1"/>
+          </p:cNvSpPr>
+          <p:nvPr>
+            <p:ph type="title"/>
+          </p:nvPr>
+        </p:nvSpPr>
+        <p:spPr>
+          <a:xfrm>
+            <a:off x="680321" y="753228"/>
+            <a:ext cx="9613861" cy="1080938"/>
+          </a:xfrm>
+        </p:spPr>
+        <p:txBody>
+          <a:bodyPr/>
+          <a:lstStyle/>
+          <a:p>
+            <a:r>
+              <a:rPr lang="pt-BR" dirty="0"/>
+              <a:t>Experimento com </a:t>
+            </a:r>
+            <a:r>
+              <a:rPr lang="pt-BR" dirty="0" err="1"/>
+              <a:t>Chaos</a:t>
+            </a:r>
+            <a:r>
+              <a:rPr lang="pt-BR" dirty="0"/>
+              <a:t> Toolkit:</a:t>
+            </a:r>
+            <a:br>
+              <a:rPr lang="pt-BR" dirty="0"/>
+            </a:br>
+            <a:r>
+              <a:rPr lang="pt-BR" dirty="0"/>
+              <a:t>Implementando Melhorias</a:t>
+            </a:r>
+            <a:endParaRPr lang="pt-BR" dirty="0"/>
+          </a:p>
+        </p:txBody>
+      </p:sp>
+      <p:sp>
+        <p:nvSpPr>
+          <p:cNvPr id="5" name="Espaço Reservado para Conteúdo 2">
+            <a:extLst>
+              <a:ext uri="{FF2B5EF4-FFF2-40B4-BE49-F238E27FC236}">
+                <a16:creationId xmlns:a16="http://schemas.microsoft.com/office/drawing/2014/main" id="{C5B8AB74-06FA-413C-BD74-462D1F01C8FF}"/>
+              </a:ext>
+            </a:extLst>
+          </p:cNvPr>
+          <p:cNvSpPr>
+            <a:spLocks noGrp="1"/>
+          </p:cNvSpPr>
+          <p:nvPr>
+            <p:ph idx="1"/>
+          </p:nvPr>
+        </p:nvSpPr>
+        <p:spPr>
+          <a:xfrm>
+            <a:off x="680321" y="2505456"/>
+            <a:ext cx="9484759" cy="3599316"/>
+          </a:xfrm>
+        </p:spPr>
+        <p:txBody>
+          <a:bodyPr>
+            <a:noAutofit/>
+          </a:bodyPr>
+          <a:lstStyle/>
+          <a:p>
+            <a:pPr>
+              <a:spcAft>
+                <a:spcPts val="1000"/>
+              </a:spcAft>
+            </a:pPr>
+            <a:r>
+              <a:rPr lang="pt-BR" dirty="0"/>
+              <a:t>I</a:t>
+            </a:r>
+          </a:p>
+        </p:txBody>
+      </p:sp>
+    </p:spTree>
+    <p:extLst>
+      <p:ext uri="{BB962C8B-B14F-4D97-AF65-F5344CB8AC3E}">
+        <p14:creationId xmlns:p14="http://schemas.microsoft.com/office/powerpoint/2010/main" val="2104157786"/>
+      </p:ext>
+    </p:extLst>
+  </p:cSld>
+  <p:clrMapOvr>
+    <a:masterClrMapping/>
+  </p:clrMapOvr>
+</p:sld>
+</file>
+
+<file path=ppt/slides/slide74.xml><?xml version="1.0" encoding="utf-8"?>
+<p:sld xmlns:a="http://schemas.openxmlformats.org/drawingml/2006/main" xmlns:r="http://schemas.openxmlformats.org/officeDocument/2006/relationships" xmlns:p="http://schemas.openxmlformats.org/presentationml/2006/main">
+  <p:cSld>
+    <p:spTree>
+      <p:nvGrpSpPr>
+        <p:cNvPr id="1" name=""/>
+        <p:cNvGrpSpPr/>
+        <p:nvPr/>
+      </p:nvGrpSpPr>
+      <p:grpSpPr>
+        <a:xfrm>
+          <a:off x="0" y="0"/>
+          <a:ext cx="0" cy="0"/>
+          <a:chOff x="0" y="0"/>
+          <a:chExt cx="0" cy="0"/>
+        </a:xfrm>
+      </p:grpSpPr>
+      <p:sp>
+        <p:nvSpPr>
+          <p:cNvPr id="4" name="Título 1">
+            <a:extLst>
+              <a:ext uri="{FF2B5EF4-FFF2-40B4-BE49-F238E27FC236}">
+                <a16:creationId xmlns:a16="http://schemas.microsoft.com/office/drawing/2014/main" id="{9CA53688-E304-4704-85E6-8432DC608B05}"/>
+              </a:ext>
+            </a:extLst>
+          </p:cNvPr>
+          <p:cNvSpPr>
+            <a:spLocks noGrp="1"/>
+          </p:cNvSpPr>
+          <p:nvPr>
+            <p:ph type="title"/>
+          </p:nvPr>
+        </p:nvSpPr>
+        <p:spPr>
+          <a:xfrm>
+            <a:off x="680321" y="753228"/>
+            <a:ext cx="9613861" cy="1080938"/>
+          </a:xfrm>
+        </p:spPr>
+        <p:txBody>
+          <a:bodyPr/>
+          <a:lstStyle/>
+          <a:p>
+            <a:r>
+              <a:rPr lang="pt-BR" dirty="0"/>
+              <a:t>Experimento com </a:t>
+            </a:r>
+            <a:r>
+              <a:rPr lang="pt-BR" dirty="0" err="1"/>
+              <a:t>Chaos</a:t>
+            </a:r>
+            <a:r>
+              <a:rPr lang="pt-BR" dirty="0"/>
+              <a:t> Toolkit:</a:t>
+            </a:r>
+            <a:br>
+              <a:rPr lang="pt-BR" dirty="0"/>
+            </a:br>
+            <a:r>
+              <a:rPr lang="pt-BR" dirty="0"/>
+              <a:t>Implementando as Melhorias</a:t>
+            </a:r>
+            <a:endParaRPr lang="pt-BR" dirty="0"/>
+          </a:p>
+        </p:txBody>
+      </p:sp>
+      <p:sp>
+        <p:nvSpPr>
+          <p:cNvPr id="5" name="Espaço Reservado para Conteúdo 2">
+            <a:extLst>
+              <a:ext uri="{FF2B5EF4-FFF2-40B4-BE49-F238E27FC236}">
+                <a16:creationId xmlns:a16="http://schemas.microsoft.com/office/drawing/2014/main" id="{C5B8AB74-06FA-413C-BD74-462D1F01C8FF}"/>
+              </a:ext>
+            </a:extLst>
+          </p:cNvPr>
+          <p:cNvSpPr>
+            <a:spLocks noGrp="1"/>
+          </p:cNvSpPr>
+          <p:nvPr>
+            <p:ph idx="1"/>
+          </p:nvPr>
+        </p:nvSpPr>
+        <p:spPr>
+          <a:xfrm>
+            <a:off x="680321" y="2505456"/>
+            <a:ext cx="9484759" cy="3599316"/>
+          </a:xfrm>
+        </p:spPr>
+        <p:txBody>
+          <a:bodyPr>
+            <a:noAutofit/>
+          </a:bodyPr>
+          <a:lstStyle/>
+          <a:p>
+            <a:pPr>
+              <a:spcAft>
+                <a:spcPts val="1000"/>
+              </a:spcAft>
+            </a:pPr>
+            <a:r>
+              <a:rPr lang="pt-BR" dirty="0"/>
+              <a:t>I</a:t>
+            </a:r>
+          </a:p>
+        </p:txBody>
+      </p:sp>
+    </p:spTree>
+    <p:extLst>
+      <p:ext uri="{BB962C8B-B14F-4D97-AF65-F5344CB8AC3E}">
+        <p14:creationId xmlns:p14="http://schemas.microsoft.com/office/powerpoint/2010/main" val="4006977507"/>
+      </p:ext>
+    </p:extLst>
+  </p:cSld>
+  <p:clrMapOvr>
+    <a:masterClrMapping/>
+  </p:clrMapOvr>
+</p:sld>
+</file>
+
+<file path=ppt/slides/slide75.xml><?xml version="1.0" encoding="utf-8"?>
+<p:sld xmlns:a="http://schemas.openxmlformats.org/drawingml/2006/main" xmlns:r="http://schemas.openxmlformats.org/officeDocument/2006/relationships" xmlns:p="http://schemas.openxmlformats.org/presentationml/2006/main">
+  <p:cSld>
+    <p:spTree>
+      <p:nvGrpSpPr>
+        <p:cNvPr id="1" name=""/>
+        <p:cNvGrpSpPr/>
+        <p:nvPr/>
+      </p:nvGrpSpPr>
+      <p:grpSpPr>
+        <a:xfrm>
+          <a:off x="0" y="0"/>
+          <a:ext cx="0" cy="0"/>
+          <a:chOff x="0" y="0"/>
+          <a:chExt cx="0" cy="0"/>
+        </a:xfrm>
+      </p:grpSpPr>
+      <p:sp>
+        <p:nvSpPr>
+          <p:cNvPr id="4" name="Título 1">
+            <a:extLst>
+              <a:ext uri="{FF2B5EF4-FFF2-40B4-BE49-F238E27FC236}">
+                <a16:creationId xmlns:a16="http://schemas.microsoft.com/office/drawing/2014/main" id="{9CA53688-E304-4704-85E6-8432DC608B05}"/>
+              </a:ext>
+            </a:extLst>
+          </p:cNvPr>
+          <p:cNvSpPr>
+            <a:spLocks noGrp="1"/>
+          </p:cNvSpPr>
+          <p:nvPr>
+            <p:ph type="title"/>
+          </p:nvPr>
+        </p:nvSpPr>
+        <p:spPr>
+          <a:xfrm>
+            <a:off x="680321" y="753228"/>
+            <a:ext cx="9613861" cy="1080938"/>
+          </a:xfrm>
+        </p:spPr>
+        <p:txBody>
+          <a:bodyPr/>
+          <a:lstStyle/>
+          <a:p>
+            <a:r>
+              <a:rPr lang="pt-BR" dirty="0"/>
+              <a:t>Experimento com </a:t>
+            </a:r>
+            <a:r>
+              <a:rPr lang="pt-BR" dirty="0" err="1"/>
+              <a:t>Chaos</a:t>
+            </a:r>
+            <a:r>
+              <a:rPr lang="pt-BR" dirty="0"/>
+              <a:t> Toolkit:</a:t>
+            </a:r>
+            <a:br>
+              <a:rPr lang="pt-BR" dirty="0"/>
+            </a:br>
+            <a:r>
+              <a:rPr lang="pt-BR" dirty="0"/>
+              <a:t>Implementando as Melhorias</a:t>
+            </a:r>
+            <a:endParaRPr lang="pt-BR" dirty="0"/>
+          </a:p>
+        </p:txBody>
+      </p:sp>
+      <p:sp>
+        <p:nvSpPr>
+          <p:cNvPr id="5" name="Espaço Reservado para Conteúdo 2">
+            <a:extLst>
+              <a:ext uri="{FF2B5EF4-FFF2-40B4-BE49-F238E27FC236}">
+                <a16:creationId xmlns:a16="http://schemas.microsoft.com/office/drawing/2014/main" id="{C5B8AB74-06FA-413C-BD74-462D1F01C8FF}"/>
+              </a:ext>
+            </a:extLst>
+          </p:cNvPr>
+          <p:cNvSpPr>
+            <a:spLocks noGrp="1"/>
+          </p:cNvSpPr>
+          <p:nvPr>
+            <p:ph idx="1"/>
+          </p:nvPr>
+        </p:nvSpPr>
+        <p:spPr>
+          <a:xfrm>
+            <a:off x="680321" y="2505456"/>
+            <a:ext cx="9484759" cy="3599316"/>
+          </a:xfrm>
+        </p:spPr>
+        <p:txBody>
+          <a:bodyPr>
+            <a:noAutofit/>
+          </a:bodyPr>
+          <a:lstStyle/>
+          <a:p>
+            <a:pPr>
+              <a:spcAft>
+                <a:spcPts val="1000"/>
+              </a:spcAft>
+            </a:pPr>
+            <a:r>
+              <a:rPr lang="pt-BR" dirty="0"/>
+              <a:t>I</a:t>
+            </a:r>
+          </a:p>
+        </p:txBody>
+      </p:sp>
+    </p:spTree>
+    <p:extLst>
+      <p:ext uri="{BB962C8B-B14F-4D97-AF65-F5344CB8AC3E}">
+        <p14:creationId xmlns:p14="http://schemas.microsoft.com/office/powerpoint/2010/main" val="832317490"/>
+      </p:ext>
+    </p:extLst>
+  </p:cSld>
+  <p:clrMapOvr>
+    <a:masterClrMapping/>
+  </p:clrMapOvr>
+</p:sld>
+</file>
+
+<file path=ppt/slides/slide76.xml><?xml version="1.0" encoding="utf-8"?>
+<p:sld xmlns:a="http://schemas.openxmlformats.org/drawingml/2006/main" xmlns:r="http://schemas.openxmlformats.org/officeDocument/2006/relationships" xmlns:p="http://schemas.openxmlformats.org/presentationml/2006/main">
+  <p:cSld>
+    <p:spTree>
+      <p:nvGrpSpPr>
+        <p:cNvPr id="1" name=""/>
+        <p:cNvGrpSpPr/>
+        <p:nvPr/>
+      </p:nvGrpSpPr>
+      <p:grpSpPr>
+        <a:xfrm>
+          <a:off x="0" y="0"/>
+          <a:ext cx="0" cy="0"/>
+          <a:chOff x="0" y="0"/>
+          <a:chExt cx="0" cy="0"/>
+        </a:xfrm>
+      </p:grpSpPr>
+      <p:sp>
+        <p:nvSpPr>
+          <p:cNvPr id="4" name="Título 1">
+            <a:extLst>
+              <a:ext uri="{FF2B5EF4-FFF2-40B4-BE49-F238E27FC236}">
+                <a16:creationId xmlns:a16="http://schemas.microsoft.com/office/drawing/2014/main" id="{9CA53688-E304-4704-85E6-8432DC608B05}"/>
+              </a:ext>
+            </a:extLst>
+          </p:cNvPr>
+          <p:cNvSpPr>
+            <a:spLocks noGrp="1"/>
+          </p:cNvSpPr>
+          <p:nvPr>
+            <p:ph type="title"/>
+          </p:nvPr>
+        </p:nvSpPr>
+        <p:spPr>
+          <a:xfrm>
+            <a:off x="680321" y="753228"/>
+            <a:ext cx="9613861" cy="1080938"/>
+          </a:xfrm>
+        </p:spPr>
+        <p:txBody>
+          <a:bodyPr/>
+          <a:lstStyle/>
+          <a:p>
+            <a:r>
+              <a:rPr lang="pt-BR" dirty="0"/>
+              <a:t>Experimento com </a:t>
+            </a:r>
+            <a:r>
+              <a:rPr lang="pt-BR" dirty="0" err="1"/>
+              <a:t>Chaos</a:t>
+            </a:r>
+            <a:r>
+              <a:rPr lang="pt-BR" dirty="0"/>
+              <a:t> Toolkit:</a:t>
+            </a:r>
+            <a:br>
+              <a:rPr lang="pt-BR" dirty="0"/>
+            </a:br>
+            <a:r>
+              <a:rPr lang="pt-BR" dirty="0"/>
+              <a:t>Implementando as Melhorias</a:t>
+            </a:r>
+            <a:endParaRPr lang="pt-BR" dirty="0"/>
+          </a:p>
+        </p:txBody>
+      </p:sp>
+      <p:sp>
+        <p:nvSpPr>
+          <p:cNvPr id="5" name="Espaço Reservado para Conteúdo 2">
+            <a:extLst>
+              <a:ext uri="{FF2B5EF4-FFF2-40B4-BE49-F238E27FC236}">
+                <a16:creationId xmlns:a16="http://schemas.microsoft.com/office/drawing/2014/main" id="{C5B8AB74-06FA-413C-BD74-462D1F01C8FF}"/>
+              </a:ext>
+            </a:extLst>
+          </p:cNvPr>
+          <p:cNvSpPr>
+            <a:spLocks noGrp="1"/>
+          </p:cNvSpPr>
+          <p:nvPr>
+            <p:ph idx="1"/>
+          </p:nvPr>
+        </p:nvSpPr>
+        <p:spPr>
+          <a:xfrm>
+            <a:off x="680321" y="2505456"/>
+            <a:ext cx="9484759" cy="3599316"/>
+          </a:xfrm>
+        </p:spPr>
+        <p:txBody>
+          <a:bodyPr>
+            <a:noAutofit/>
+          </a:bodyPr>
+          <a:lstStyle/>
+          <a:p>
+            <a:pPr>
+              <a:spcAft>
+                <a:spcPts val="1000"/>
+              </a:spcAft>
+            </a:pPr>
+            <a:r>
+              <a:rPr lang="pt-BR" dirty="0"/>
+              <a:t>I</a:t>
+            </a:r>
+          </a:p>
+        </p:txBody>
+      </p:sp>
+    </p:spTree>
+    <p:extLst>
+      <p:ext uri="{BB962C8B-B14F-4D97-AF65-F5344CB8AC3E}">
+        <p14:creationId xmlns:p14="http://schemas.microsoft.com/office/powerpoint/2010/main" val="2988246251"/>
+      </p:ext>
+    </p:extLst>
+  </p:cSld>
+  <p:clrMapOvr>
+    <a:masterClrMapping/>
+  </p:clrMapOvr>
+</p:sld>
+</file>
+
+<file path=ppt/slides/slide77.xml><?xml version="1.0" encoding="utf-8"?>
+<p:sld xmlns:a="http://schemas.openxmlformats.org/drawingml/2006/main" xmlns:r="http://schemas.openxmlformats.org/officeDocument/2006/relationships" xmlns:p="http://schemas.openxmlformats.org/presentationml/2006/main">
+  <p:cSld>
+    <p:spTree>
+      <p:nvGrpSpPr>
+        <p:cNvPr id="1" name=""/>
+        <p:cNvGrpSpPr/>
+        <p:nvPr/>
+      </p:nvGrpSpPr>
+      <p:grpSpPr>
+        <a:xfrm>
+          <a:off x="0" y="0"/>
+          <a:ext cx="0" cy="0"/>
+          <a:chOff x="0" y="0"/>
+          <a:chExt cx="0" cy="0"/>
+        </a:xfrm>
+      </p:grpSpPr>
+      <p:sp>
+        <p:nvSpPr>
+          <p:cNvPr id="4" name="Título 1">
+            <a:extLst>
+              <a:ext uri="{FF2B5EF4-FFF2-40B4-BE49-F238E27FC236}">
+                <a16:creationId xmlns:a16="http://schemas.microsoft.com/office/drawing/2014/main" id="{9CA53688-E304-4704-85E6-8432DC608B05}"/>
+              </a:ext>
+            </a:extLst>
+          </p:cNvPr>
+          <p:cNvSpPr>
+            <a:spLocks noGrp="1"/>
+          </p:cNvSpPr>
+          <p:nvPr>
+            <p:ph type="title"/>
+          </p:nvPr>
+        </p:nvSpPr>
+        <p:spPr>
+          <a:xfrm>
+            <a:off x="680321" y="753228"/>
+            <a:ext cx="9613861" cy="1080938"/>
+          </a:xfrm>
+        </p:spPr>
+        <p:txBody>
+          <a:bodyPr/>
+          <a:lstStyle/>
+          <a:p>
+            <a:r>
+              <a:rPr lang="pt-BR" dirty="0"/>
+              <a:t>Experimento com </a:t>
+            </a:r>
+            <a:r>
+              <a:rPr lang="pt-BR" dirty="0" err="1"/>
+              <a:t>Chaos</a:t>
+            </a:r>
+            <a:r>
+              <a:rPr lang="pt-BR" dirty="0"/>
+              <a:t> Toolkit:</a:t>
+            </a:r>
+            <a:br>
+              <a:rPr lang="pt-BR" dirty="0"/>
+            </a:br>
+            <a:r>
+              <a:rPr lang="pt-BR" dirty="0"/>
+              <a:t>Implementando as Melhorias</a:t>
+            </a:r>
+            <a:endParaRPr lang="pt-BR" dirty="0"/>
+          </a:p>
+        </p:txBody>
+      </p:sp>
+      <p:sp>
+        <p:nvSpPr>
+          <p:cNvPr id="5" name="Espaço Reservado para Conteúdo 2">
+            <a:extLst>
+              <a:ext uri="{FF2B5EF4-FFF2-40B4-BE49-F238E27FC236}">
+                <a16:creationId xmlns:a16="http://schemas.microsoft.com/office/drawing/2014/main" id="{C5B8AB74-06FA-413C-BD74-462D1F01C8FF}"/>
+              </a:ext>
+            </a:extLst>
+          </p:cNvPr>
+          <p:cNvSpPr>
+            <a:spLocks noGrp="1"/>
+          </p:cNvSpPr>
+          <p:nvPr>
+            <p:ph idx="1"/>
+          </p:nvPr>
+        </p:nvSpPr>
+        <p:spPr>
+          <a:xfrm>
+            <a:off x="680321" y="2505456"/>
+            <a:ext cx="9484759" cy="3599316"/>
+          </a:xfrm>
+        </p:spPr>
+        <p:txBody>
+          <a:bodyPr>
+            <a:noAutofit/>
+          </a:bodyPr>
+          <a:lstStyle/>
+          <a:p>
+            <a:pPr>
+              <a:spcAft>
+                <a:spcPts val="1000"/>
+              </a:spcAft>
+            </a:pPr>
+            <a:r>
+              <a:rPr lang="pt-BR" dirty="0"/>
+              <a:t>I</a:t>
+            </a:r>
+          </a:p>
+        </p:txBody>
+      </p:sp>
+    </p:spTree>
+    <p:extLst>
+      <p:ext uri="{BB962C8B-B14F-4D97-AF65-F5344CB8AC3E}">
+        <p14:creationId xmlns:p14="http://schemas.microsoft.com/office/powerpoint/2010/main" val="1980136933"/>
+      </p:ext>
+    </p:extLst>
+  </p:cSld>
+  <p:clrMapOvr>
+    <a:masterClrMapping/>
+  </p:clrMapOvr>
+</p:sld>
+</file>
+
+<file path=ppt/slides/slide78.xml><?xml version="1.0" encoding="utf-8"?>
+<p:sld xmlns:a="http://schemas.openxmlformats.org/drawingml/2006/main" xmlns:r="http://schemas.openxmlformats.org/officeDocument/2006/relationships" xmlns:p="http://schemas.openxmlformats.org/presentationml/2006/main">
+  <p:cSld>
+    <p:spTree>
+      <p:nvGrpSpPr>
+        <p:cNvPr id="1" name=""/>
+        <p:cNvGrpSpPr/>
+        <p:nvPr/>
+      </p:nvGrpSpPr>
+      <p:grpSpPr>
+        <a:xfrm>
+          <a:off x="0" y="0"/>
+          <a:ext cx="0" cy="0"/>
+          <a:chOff x="0" y="0"/>
+          <a:chExt cx="0" cy="0"/>
+        </a:xfrm>
+      </p:grpSpPr>
+      <p:sp>
+        <p:nvSpPr>
+          <p:cNvPr id="4" name="Título 1">
+            <a:extLst>
+              <a:ext uri="{FF2B5EF4-FFF2-40B4-BE49-F238E27FC236}">
+                <a16:creationId xmlns:a16="http://schemas.microsoft.com/office/drawing/2014/main" id="{9CA53688-E304-4704-85E6-8432DC608B05}"/>
+              </a:ext>
+            </a:extLst>
+          </p:cNvPr>
+          <p:cNvSpPr>
+            <a:spLocks noGrp="1"/>
+          </p:cNvSpPr>
+          <p:nvPr>
+            <p:ph type="title"/>
+          </p:nvPr>
+        </p:nvSpPr>
+        <p:spPr>
+          <a:xfrm>
+            <a:off x="680321" y="753228"/>
+            <a:ext cx="9613861" cy="1080938"/>
+          </a:xfrm>
+        </p:spPr>
+        <p:txBody>
+          <a:bodyPr/>
+          <a:lstStyle/>
+          <a:p>
+            <a:r>
+              <a:rPr lang="pt-BR" dirty="0"/>
+              <a:t>Experimento com </a:t>
+            </a:r>
+            <a:r>
+              <a:rPr lang="pt-BR" dirty="0" err="1"/>
+              <a:t>Chaos</a:t>
+            </a:r>
+            <a:r>
+              <a:rPr lang="pt-BR" dirty="0"/>
+              <a:t> Toolkit:</a:t>
+            </a:r>
+            <a:br>
+              <a:rPr lang="pt-BR" dirty="0"/>
+            </a:br>
+            <a:r>
+              <a:rPr lang="pt-BR" dirty="0"/>
+              <a:t>Implementando as Melhorias</a:t>
+            </a:r>
+            <a:endParaRPr lang="pt-BR" dirty="0"/>
+          </a:p>
+        </p:txBody>
+      </p:sp>
+      <p:sp>
+        <p:nvSpPr>
+          <p:cNvPr id="5" name="Espaço Reservado para Conteúdo 2">
+            <a:extLst>
+              <a:ext uri="{FF2B5EF4-FFF2-40B4-BE49-F238E27FC236}">
+                <a16:creationId xmlns:a16="http://schemas.microsoft.com/office/drawing/2014/main" id="{C5B8AB74-06FA-413C-BD74-462D1F01C8FF}"/>
+              </a:ext>
+            </a:extLst>
+          </p:cNvPr>
+          <p:cNvSpPr>
+            <a:spLocks noGrp="1"/>
+          </p:cNvSpPr>
+          <p:nvPr>
+            <p:ph idx="1"/>
+          </p:nvPr>
+        </p:nvSpPr>
+        <p:spPr>
+          <a:xfrm>
+            <a:off x="680321" y="2505456"/>
+            <a:ext cx="9484759" cy="3599316"/>
+          </a:xfrm>
+        </p:spPr>
+        <p:txBody>
+          <a:bodyPr>
+            <a:noAutofit/>
+          </a:bodyPr>
+          <a:lstStyle/>
+          <a:p>
+            <a:pPr>
+              <a:spcAft>
+                <a:spcPts val="1000"/>
+              </a:spcAft>
+            </a:pPr>
+            <a:r>
+              <a:rPr lang="pt-BR" dirty="0"/>
+              <a:t>I</a:t>
+            </a:r>
+          </a:p>
+        </p:txBody>
+      </p:sp>
+    </p:spTree>
+    <p:extLst>
+      <p:ext uri="{BB962C8B-B14F-4D97-AF65-F5344CB8AC3E}">
+        <p14:creationId xmlns:p14="http://schemas.microsoft.com/office/powerpoint/2010/main" val="712599509"/>
+      </p:ext>
+    </p:extLst>
+  </p:cSld>
+  <p:clrMapOvr>
+    <a:masterClrMapping/>
+  </p:clrMapOvr>
+</p:sld>
+</file>
+
+<file path=ppt/slides/slide79.xml><?xml version="1.0" encoding="utf-8"?>
+<p:sld xmlns:a="http://schemas.openxmlformats.org/drawingml/2006/main" xmlns:r="http://schemas.openxmlformats.org/officeDocument/2006/relationships" xmlns:p="http://schemas.openxmlformats.org/presentationml/2006/main">
+  <p:cSld>
+    <p:spTree>
+      <p:nvGrpSpPr>
+        <p:cNvPr id="1" name=""/>
+        <p:cNvGrpSpPr/>
+        <p:nvPr/>
+      </p:nvGrpSpPr>
+      <p:grpSpPr>
+        <a:xfrm>
+          <a:off x="0" y="0"/>
+          <a:ext cx="0" cy="0"/>
+          <a:chOff x="0" y="0"/>
+          <a:chExt cx="0" cy="0"/>
+        </a:xfrm>
+      </p:grpSpPr>
+      <p:sp>
+        <p:nvSpPr>
+          <p:cNvPr id="4" name="Título 1">
+            <a:extLst>
+              <a:ext uri="{FF2B5EF4-FFF2-40B4-BE49-F238E27FC236}">
+                <a16:creationId xmlns:a16="http://schemas.microsoft.com/office/drawing/2014/main" id="{9CA53688-E304-4704-85E6-8432DC608B05}"/>
+              </a:ext>
+            </a:extLst>
+          </p:cNvPr>
+          <p:cNvSpPr>
+            <a:spLocks noGrp="1"/>
+          </p:cNvSpPr>
+          <p:nvPr>
+            <p:ph type="title"/>
+          </p:nvPr>
+        </p:nvSpPr>
+        <p:spPr>
+          <a:xfrm>
+            <a:off x="680321" y="753228"/>
+            <a:ext cx="9613861" cy="1080938"/>
+          </a:xfrm>
+        </p:spPr>
+        <p:txBody>
+          <a:bodyPr/>
+          <a:lstStyle/>
+          <a:p>
+            <a:r>
+              <a:rPr lang="pt-BR" dirty="0"/>
+              <a:t>Experimento com </a:t>
+            </a:r>
+            <a:r>
+              <a:rPr lang="pt-BR" dirty="0" err="1"/>
+              <a:t>Chaos</a:t>
+            </a:r>
+            <a:r>
+              <a:rPr lang="pt-BR" dirty="0"/>
+              <a:t> Toolkit:</a:t>
+            </a:r>
+            <a:br>
+              <a:rPr lang="pt-BR" dirty="0"/>
+            </a:br>
+            <a:r>
+              <a:rPr lang="pt-BR" dirty="0"/>
+              <a:t>Implementando as Melhorias</a:t>
+            </a:r>
+            <a:endParaRPr lang="pt-BR" dirty="0"/>
+          </a:p>
+        </p:txBody>
+      </p:sp>
+      <p:sp>
+        <p:nvSpPr>
+          <p:cNvPr id="5" name="Espaço Reservado para Conteúdo 2">
+            <a:extLst>
+              <a:ext uri="{FF2B5EF4-FFF2-40B4-BE49-F238E27FC236}">
+                <a16:creationId xmlns:a16="http://schemas.microsoft.com/office/drawing/2014/main" id="{C5B8AB74-06FA-413C-BD74-462D1F01C8FF}"/>
+              </a:ext>
+            </a:extLst>
+          </p:cNvPr>
+          <p:cNvSpPr>
+            <a:spLocks noGrp="1"/>
+          </p:cNvSpPr>
+          <p:nvPr>
+            <p:ph idx="1"/>
+          </p:nvPr>
+        </p:nvSpPr>
+        <p:spPr>
+          <a:xfrm>
+            <a:off x="680321" y="2505456"/>
+            <a:ext cx="9484759" cy="3599316"/>
+          </a:xfrm>
+        </p:spPr>
+        <p:txBody>
+          <a:bodyPr>
+            <a:noAutofit/>
+          </a:bodyPr>
+          <a:lstStyle/>
+          <a:p>
+            <a:pPr>
+              <a:spcAft>
+                <a:spcPts val="1000"/>
+              </a:spcAft>
+            </a:pPr>
+            <a:r>
+              <a:rPr lang="pt-BR" dirty="0"/>
+              <a:t>I</a:t>
+            </a:r>
+          </a:p>
+        </p:txBody>
+      </p:sp>
+    </p:spTree>
+    <p:extLst>
+      <p:ext uri="{BB962C8B-B14F-4D97-AF65-F5344CB8AC3E}">
+        <p14:creationId xmlns:p14="http://schemas.microsoft.com/office/powerpoint/2010/main" val="1245950099"/>
       </p:ext>
     </p:extLst>
   </p:cSld>
@@ -19432,6 +21007,1196 @@
 </p:sld>
 </file>
 
+<file path=ppt/slides/slide80.xml><?xml version="1.0" encoding="utf-8"?>
+<p:sld xmlns:a="http://schemas.openxmlformats.org/drawingml/2006/main" xmlns:r="http://schemas.openxmlformats.org/officeDocument/2006/relationships" xmlns:p="http://schemas.openxmlformats.org/presentationml/2006/main">
+  <p:cSld>
+    <p:spTree>
+      <p:nvGrpSpPr>
+        <p:cNvPr id="1" name=""/>
+        <p:cNvGrpSpPr/>
+        <p:nvPr/>
+      </p:nvGrpSpPr>
+      <p:grpSpPr>
+        <a:xfrm>
+          <a:off x="0" y="0"/>
+          <a:ext cx="0" cy="0"/>
+          <a:chOff x="0" y="0"/>
+          <a:chExt cx="0" cy="0"/>
+        </a:xfrm>
+      </p:grpSpPr>
+      <p:sp>
+        <p:nvSpPr>
+          <p:cNvPr id="4" name="Título 1">
+            <a:extLst>
+              <a:ext uri="{FF2B5EF4-FFF2-40B4-BE49-F238E27FC236}">
+                <a16:creationId xmlns:a16="http://schemas.microsoft.com/office/drawing/2014/main" id="{9CA53688-E304-4704-85E6-8432DC608B05}"/>
+              </a:ext>
+            </a:extLst>
+          </p:cNvPr>
+          <p:cNvSpPr>
+            <a:spLocks noGrp="1"/>
+          </p:cNvSpPr>
+          <p:nvPr>
+            <p:ph type="title"/>
+          </p:nvPr>
+        </p:nvSpPr>
+        <p:spPr>
+          <a:xfrm>
+            <a:off x="680321" y="753228"/>
+            <a:ext cx="9613861" cy="1080938"/>
+          </a:xfrm>
+        </p:spPr>
+        <p:txBody>
+          <a:bodyPr/>
+          <a:lstStyle/>
+          <a:p>
+            <a:r>
+              <a:rPr lang="pt-BR" dirty="0"/>
+              <a:t>Experimento com </a:t>
+            </a:r>
+            <a:r>
+              <a:rPr lang="pt-BR" dirty="0" err="1"/>
+              <a:t>Chaos</a:t>
+            </a:r>
+            <a:r>
+              <a:rPr lang="pt-BR" dirty="0"/>
+              <a:t> Toolkit:</a:t>
+            </a:r>
+            <a:br>
+              <a:rPr lang="pt-BR" dirty="0"/>
+            </a:br>
+            <a:r>
+              <a:rPr lang="pt-BR" dirty="0"/>
+              <a:t>Implementando as Melhorias</a:t>
+            </a:r>
+            <a:endParaRPr lang="pt-BR" dirty="0"/>
+          </a:p>
+        </p:txBody>
+      </p:sp>
+      <p:sp>
+        <p:nvSpPr>
+          <p:cNvPr id="5" name="Espaço Reservado para Conteúdo 2">
+            <a:extLst>
+              <a:ext uri="{FF2B5EF4-FFF2-40B4-BE49-F238E27FC236}">
+                <a16:creationId xmlns:a16="http://schemas.microsoft.com/office/drawing/2014/main" id="{C5B8AB74-06FA-413C-BD74-462D1F01C8FF}"/>
+              </a:ext>
+            </a:extLst>
+          </p:cNvPr>
+          <p:cNvSpPr>
+            <a:spLocks noGrp="1"/>
+          </p:cNvSpPr>
+          <p:nvPr>
+            <p:ph idx="1"/>
+          </p:nvPr>
+        </p:nvSpPr>
+        <p:spPr>
+          <a:xfrm>
+            <a:off x="680321" y="2505456"/>
+            <a:ext cx="9484759" cy="3599316"/>
+          </a:xfrm>
+        </p:spPr>
+        <p:txBody>
+          <a:bodyPr>
+            <a:noAutofit/>
+          </a:bodyPr>
+          <a:lstStyle/>
+          <a:p>
+            <a:pPr>
+              <a:spcAft>
+                <a:spcPts val="1000"/>
+              </a:spcAft>
+            </a:pPr>
+            <a:r>
+              <a:rPr lang="pt-BR" dirty="0"/>
+              <a:t>I</a:t>
+            </a:r>
+          </a:p>
+        </p:txBody>
+      </p:sp>
+    </p:spTree>
+    <p:extLst>
+      <p:ext uri="{BB962C8B-B14F-4D97-AF65-F5344CB8AC3E}">
+        <p14:creationId xmlns:p14="http://schemas.microsoft.com/office/powerpoint/2010/main" val="3947057208"/>
+      </p:ext>
+    </p:extLst>
+  </p:cSld>
+  <p:clrMapOvr>
+    <a:masterClrMapping/>
+  </p:clrMapOvr>
+</p:sld>
+</file>
+
+<file path=ppt/slides/slide81.xml><?xml version="1.0" encoding="utf-8"?>
+<p:sld xmlns:a="http://schemas.openxmlformats.org/drawingml/2006/main" xmlns:r="http://schemas.openxmlformats.org/officeDocument/2006/relationships" xmlns:p="http://schemas.openxmlformats.org/presentationml/2006/main">
+  <p:cSld>
+    <p:spTree>
+      <p:nvGrpSpPr>
+        <p:cNvPr id="1" name=""/>
+        <p:cNvGrpSpPr/>
+        <p:nvPr/>
+      </p:nvGrpSpPr>
+      <p:grpSpPr>
+        <a:xfrm>
+          <a:off x="0" y="0"/>
+          <a:ext cx="0" cy="0"/>
+          <a:chOff x="0" y="0"/>
+          <a:chExt cx="0" cy="0"/>
+        </a:xfrm>
+      </p:grpSpPr>
+      <p:sp>
+        <p:nvSpPr>
+          <p:cNvPr id="4" name="Título 1">
+            <a:extLst>
+              <a:ext uri="{FF2B5EF4-FFF2-40B4-BE49-F238E27FC236}">
+                <a16:creationId xmlns:a16="http://schemas.microsoft.com/office/drawing/2014/main" id="{9CA53688-E304-4704-85E6-8432DC608B05}"/>
+              </a:ext>
+            </a:extLst>
+          </p:cNvPr>
+          <p:cNvSpPr>
+            <a:spLocks noGrp="1"/>
+          </p:cNvSpPr>
+          <p:nvPr>
+            <p:ph type="title"/>
+          </p:nvPr>
+        </p:nvSpPr>
+        <p:spPr>
+          <a:xfrm>
+            <a:off x="680321" y="753228"/>
+            <a:ext cx="9613861" cy="1080938"/>
+          </a:xfrm>
+        </p:spPr>
+        <p:txBody>
+          <a:bodyPr/>
+          <a:lstStyle/>
+          <a:p>
+            <a:r>
+              <a:rPr lang="pt-BR" dirty="0"/>
+              <a:t>Experimento com </a:t>
+            </a:r>
+            <a:r>
+              <a:rPr lang="pt-BR" dirty="0" err="1"/>
+              <a:t>Chaos</a:t>
+            </a:r>
+            <a:r>
+              <a:rPr lang="pt-BR" dirty="0"/>
+              <a:t> Toolkit:</a:t>
+            </a:r>
+            <a:br>
+              <a:rPr lang="pt-BR" dirty="0"/>
+            </a:br>
+            <a:r>
+              <a:rPr lang="pt-BR" dirty="0"/>
+              <a:t>Implementando as Melhorias</a:t>
+            </a:r>
+            <a:endParaRPr lang="pt-BR" dirty="0"/>
+          </a:p>
+        </p:txBody>
+      </p:sp>
+      <p:sp>
+        <p:nvSpPr>
+          <p:cNvPr id="5" name="Espaço Reservado para Conteúdo 2">
+            <a:extLst>
+              <a:ext uri="{FF2B5EF4-FFF2-40B4-BE49-F238E27FC236}">
+                <a16:creationId xmlns:a16="http://schemas.microsoft.com/office/drawing/2014/main" id="{C5B8AB74-06FA-413C-BD74-462D1F01C8FF}"/>
+              </a:ext>
+            </a:extLst>
+          </p:cNvPr>
+          <p:cNvSpPr>
+            <a:spLocks noGrp="1"/>
+          </p:cNvSpPr>
+          <p:nvPr>
+            <p:ph idx="1"/>
+          </p:nvPr>
+        </p:nvSpPr>
+        <p:spPr>
+          <a:xfrm>
+            <a:off x="680321" y="2505456"/>
+            <a:ext cx="9484759" cy="3599316"/>
+          </a:xfrm>
+        </p:spPr>
+        <p:txBody>
+          <a:bodyPr>
+            <a:noAutofit/>
+          </a:bodyPr>
+          <a:lstStyle/>
+          <a:p>
+            <a:pPr>
+              <a:spcAft>
+                <a:spcPts val="1000"/>
+              </a:spcAft>
+            </a:pPr>
+            <a:r>
+              <a:rPr lang="pt-BR" dirty="0"/>
+              <a:t>I</a:t>
+            </a:r>
+          </a:p>
+        </p:txBody>
+      </p:sp>
+    </p:spTree>
+    <p:extLst>
+      <p:ext uri="{BB962C8B-B14F-4D97-AF65-F5344CB8AC3E}">
+        <p14:creationId xmlns:p14="http://schemas.microsoft.com/office/powerpoint/2010/main" val="548608083"/>
+      </p:ext>
+    </p:extLst>
+  </p:cSld>
+  <p:clrMapOvr>
+    <a:masterClrMapping/>
+  </p:clrMapOvr>
+</p:sld>
+</file>
+
+<file path=ppt/slides/slide82.xml><?xml version="1.0" encoding="utf-8"?>
+<p:sld xmlns:a="http://schemas.openxmlformats.org/drawingml/2006/main" xmlns:r="http://schemas.openxmlformats.org/officeDocument/2006/relationships" xmlns:p="http://schemas.openxmlformats.org/presentationml/2006/main">
+  <p:cSld>
+    <p:spTree>
+      <p:nvGrpSpPr>
+        <p:cNvPr id="1" name=""/>
+        <p:cNvGrpSpPr/>
+        <p:nvPr/>
+      </p:nvGrpSpPr>
+      <p:grpSpPr>
+        <a:xfrm>
+          <a:off x="0" y="0"/>
+          <a:ext cx="0" cy="0"/>
+          <a:chOff x="0" y="0"/>
+          <a:chExt cx="0" cy="0"/>
+        </a:xfrm>
+      </p:grpSpPr>
+      <p:sp>
+        <p:nvSpPr>
+          <p:cNvPr id="4" name="Título 1">
+            <a:extLst>
+              <a:ext uri="{FF2B5EF4-FFF2-40B4-BE49-F238E27FC236}">
+                <a16:creationId xmlns:a16="http://schemas.microsoft.com/office/drawing/2014/main" id="{9CA53688-E304-4704-85E6-8432DC608B05}"/>
+              </a:ext>
+            </a:extLst>
+          </p:cNvPr>
+          <p:cNvSpPr>
+            <a:spLocks noGrp="1"/>
+          </p:cNvSpPr>
+          <p:nvPr>
+            <p:ph type="title"/>
+          </p:nvPr>
+        </p:nvSpPr>
+        <p:spPr>
+          <a:xfrm>
+            <a:off x="680321" y="753228"/>
+            <a:ext cx="9613861" cy="1080938"/>
+          </a:xfrm>
+        </p:spPr>
+        <p:txBody>
+          <a:bodyPr/>
+          <a:lstStyle/>
+          <a:p>
+            <a:r>
+              <a:rPr lang="pt-BR" dirty="0"/>
+              <a:t>Experimento com </a:t>
+            </a:r>
+            <a:r>
+              <a:rPr lang="pt-BR" dirty="0" err="1"/>
+              <a:t>Chaos</a:t>
+            </a:r>
+            <a:r>
+              <a:rPr lang="pt-BR" dirty="0"/>
+              <a:t> Toolkit:</a:t>
+            </a:r>
+            <a:br>
+              <a:rPr lang="pt-BR" dirty="0"/>
+            </a:br>
+            <a:r>
+              <a:rPr lang="pt-BR" dirty="0"/>
+              <a:t>Implementando as Melhorias</a:t>
+            </a:r>
+            <a:endParaRPr lang="pt-BR" dirty="0"/>
+          </a:p>
+        </p:txBody>
+      </p:sp>
+      <p:sp>
+        <p:nvSpPr>
+          <p:cNvPr id="5" name="Espaço Reservado para Conteúdo 2">
+            <a:extLst>
+              <a:ext uri="{FF2B5EF4-FFF2-40B4-BE49-F238E27FC236}">
+                <a16:creationId xmlns:a16="http://schemas.microsoft.com/office/drawing/2014/main" id="{C5B8AB74-06FA-413C-BD74-462D1F01C8FF}"/>
+              </a:ext>
+            </a:extLst>
+          </p:cNvPr>
+          <p:cNvSpPr>
+            <a:spLocks noGrp="1"/>
+          </p:cNvSpPr>
+          <p:nvPr>
+            <p:ph idx="1"/>
+          </p:nvPr>
+        </p:nvSpPr>
+        <p:spPr>
+          <a:xfrm>
+            <a:off x="680321" y="2505456"/>
+            <a:ext cx="9484759" cy="3599316"/>
+          </a:xfrm>
+        </p:spPr>
+        <p:txBody>
+          <a:bodyPr>
+            <a:noAutofit/>
+          </a:bodyPr>
+          <a:lstStyle/>
+          <a:p>
+            <a:pPr>
+              <a:spcAft>
+                <a:spcPts val="1000"/>
+              </a:spcAft>
+            </a:pPr>
+            <a:r>
+              <a:rPr lang="pt-BR" dirty="0"/>
+              <a:t>I</a:t>
+            </a:r>
+          </a:p>
+        </p:txBody>
+      </p:sp>
+    </p:spTree>
+    <p:extLst>
+      <p:ext uri="{BB962C8B-B14F-4D97-AF65-F5344CB8AC3E}">
+        <p14:creationId xmlns:p14="http://schemas.microsoft.com/office/powerpoint/2010/main" val="2536589371"/>
+      </p:ext>
+    </p:extLst>
+  </p:cSld>
+  <p:clrMapOvr>
+    <a:masterClrMapping/>
+  </p:clrMapOvr>
+</p:sld>
+</file>
+
+<file path=ppt/slides/slide83.xml><?xml version="1.0" encoding="utf-8"?>
+<p:sld xmlns:a="http://schemas.openxmlformats.org/drawingml/2006/main" xmlns:r="http://schemas.openxmlformats.org/officeDocument/2006/relationships" xmlns:p="http://schemas.openxmlformats.org/presentationml/2006/main">
+  <p:cSld>
+    <p:spTree>
+      <p:nvGrpSpPr>
+        <p:cNvPr id="1" name=""/>
+        <p:cNvGrpSpPr/>
+        <p:nvPr/>
+      </p:nvGrpSpPr>
+      <p:grpSpPr>
+        <a:xfrm>
+          <a:off x="0" y="0"/>
+          <a:ext cx="0" cy="0"/>
+          <a:chOff x="0" y="0"/>
+          <a:chExt cx="0" cy="0"/>
+        </a:xfrm>
+      </p:grpSpPr>
+      <p:sp>
+        <p:nvSpPr>
+          <p:cNvPr id="4" name="Título 1">
+            <a:extLst>
+              <a:ext uri="{FF2B5EF4-FFF2-40B4-BE49-F238E27FC236}">
+                <a16:creationId xmlns:a16="http://schemas.microsoft.com/office/drawing/2014/main" id="{9CA53688-E304-4704-85E6-8432DC608B05}"/>
+              </a:ext>
+            </a:extLst>
+          </p:cNvPr>
+          <p:cNvSpPr>
+            <a:spLocks noGrp="1"/>
+          </p:cNvSpPr>
+          <p:nvPr>
+            <p:ph type="title"/>
+          </p:nvPr>
+        </p:nvSpPr>
+        <p:spPr>
+          <a:xfrm>
+            <a:off x="680321" y="753228"/>
+            <a:ext cx="9613861" cy="1080938"/>
+          </a:xfrm>
+        </p:spPr>
+        <p:txBody>
+          <a:bodyPr/>
+          <a:lstStyle/>
+          <a:p>
+            <a:r>
+              <a:rPr lang="pt-BR" dirty="0"/>
+              <a:t>Experimento com </a:t>
+            </a:r>
+            <a:r>
+              <a:rPr lang="pt-BR" dirty="0" err="1"/>
+              <a:t>Chaos</a:t>
+            </a:r>
+            <a:r>
+              <a:rPr lang="pt-BR" dirty="0"/>
+              <a:t> Toolkit:</a:t>
+            </a:r>
+            <a:br>
+              <a:rPr lang="pt-BR" dirty="0"/>
+            </a:br>
+            <a:r>
+              <a:rPr lang="pt-BR" dirty="0"/>
+              <a:t>Implementando as Melhorias</a:t>
+            </a:r>
+            <a:endParaRPr lang="pt-BR" dirty="0"/>
+          </a:p>
+        </p:txBody>
+      </p:sp>
+      <p:sp>
+        <p:nvSpPr>
+          <p:cNvPr id="5" name="Espaço Reservado para Conteúdo 2">
+            <a:extLst>
+              <a:ext uri="{FF2B5EF4-FFF2-40B4-BE49-F238E27FC236}">
+                <a16:creationId xmlns:a16="http://schemas.microsoft.com/office/drawing/2014/main" id="{C5B8AB74-06FA-413C-BD74-462D1F01C8FF}"/>
+              </a:ext>
+            </a:extLst>
+          </p:cNvPr>
+          <p:cNvSpPr>
+            <a:spLocks noGrp="1"/>
+          </p:cNvSpPr>
+          <p:nvPr>
+            <p:ph idx="1"/>
+          </p:nvPr>
+        </p:nvSpPr>
+        <p:spPr>
+          <a:xfrm>
+            <a:off x="680321" y="2505456"/>
+            <a:ext cx="9484759" cy="3599316"/>
+          </a:xfrm>
+        </p:spPr>
+        <p:txBody>
+          <a:bodyPr>
+            <a:noAutofit/>
+          </a:bodyPr>
+          <a:lstStyle/>
+          <a:p>
+            <a:pPr>
+              <a:spcAft>
+                <a:spcPts val="1000"/>
+              </a:spcAft>
+            </a:pPr>
+            <a:r>
+              <a:rPr lang="pt-BR" dirty="0"/>
+              <a:t>I</a:t>
+            </a:r>
+          </a:p>
+        </p:txBody>
+      </p:sp>
+    </p:spTree>
+    <p:extLst>
+      <p:ext uri="{BB962C8B-B14F-4D97-AF65-F5344CB8AC3E}">
+        <p14:creationId xmlns:p14="http://schemas.microsoft.com/office/powerpoint/2010/main" val="3690110089"/>
+      </p:ext>
+    </p:extLst>
+  </p:cSld>
+  <p:clrMapOvr>
+    <a:masterClrMapping/>
+  </p:clrMapOvr>
+</p:sld>
+</file>
+
+<file path=ppt/slides/slide84.xml><?xml version="1.0" encoding="utf-8"?>
+<p:sld xmlns:a="http://schemas.openxmlformats.org/drawingml/2006/main" xmlns:r="http://schemas.openxmlformats.org/officeDocument/2006/relationships" xmlns:p="http://schemas.openxmlformats.org/presentationml/2006/main">
+  <p:cSld>
+    <p:spTree>
+      <p:nvGrpSpPr>
+        <p:cNvPr id="1" name=""/>
+        <p:cNvGrpSpPr/>
+        <p:nvPr/>
+      </p:nvGrpSpPr>
+      <p:grpSpPr>
+        <a:xfrm>
+          <a:off x="0" y="0"/>
+          <a:ext cx="0" cy="0"/>
+          <a:chOff x="0" y="0"/>
+          <a:chExt cx="0" cy="0"/>
+        </a:xfrm>
+      </p:grpSpPr>
+      <p:sp>
+        <p:nvSpPr>
+          <p:cNvPr id="4" name="Título 1">
+            <a:extLst>
+              <a:ext uri="{FF2B5EF4-FFF2-40B4-BE49-F238E27FC236}">
+                <a16:creationId xmlns:a16="http://schemas.microsoft.com/office/drawing/2014/main" id="{9CA53688-E304-4704-85E6-8432DC608B05}"/>
+              </a:ext>
+            </a:extLst>
+          </p:cNvPr>
+          <p:cNvSpPr>
+            <a:spLocks noGrp="1"/>
+          </p:cNvSpPr>
+          <p:nvPr>
+            <p:ph type="title"/>
+          </p:nvPr>
+        </p:nvSpPr>
+        <p:spPr>
+          <a:xfrm>
+            <a:off x="680321" y="753228"/>
+            <a:ext cx="9613861" cy="1080938"/>
+          </a:xfrm>
+        </p:spPr>
+        <p:txBody>
+          <a:bodyPr/>
+          <a:lstStyle/>
+          <a:p>
+            <a:r>
+              <a:rPr lang="pt-BR" dirty="0"/>
+              <a:t>Experimento com </a:t>
+            </a:r>
+            <a:r>
+              <a:rPr lang="pt-BR" dirty="0" err="1"/>
+              <a:t>Chaos</a:t>
+            </a:r>
+            <a:r>
+              <a:rPr lang="pt-BR" dirty="0"/>
+              <a:t> Toolkit:</a:t>
+            </a:r>
+            <a:br>
+              <a:rPr lang="pt-BR" dirty="0"/>
+            </a:br>
+            <a:r>
+              <a:rPr lang="pt-BR" dirty="0"/>
+              <a:t>Implementando as Melhorias</a:t>
+            </a:r>
+            <a:endParaRPr lang="pt-BR" dirty="0"/>
+          </a:p>
+        </p:txBody>
+      </p:sp>
+      <p:sp>
+        <p:nvSpPr>
+          <p:cNvPr id="5" name="Espaço Reservado para Conteúdo 2">
+            <a:extLst>
+              <a:ext uri="{FF2B5EF4-FFF2-40B4-BE49-F238E27FC236}">
+                <a16:creationId xmlns:a16="http://schemas.microsoft.com/office/drawing/2014/main" id="{C5B8AB74-06FA-413C-BD74-462D1F01C8FF}"/>
+              </a:ext>
+            </a:extLst>
+          </p:cNvPr>
+          <p:cNvSpPr>
+            <a:spLocks noGrp="1"/>
+          </p:cNvSpPr>
+          <p:nvPr>
+            <p:ph idx="1"/>
+          </p:nvPr>
+        </p:nvSpPr>
+        <p:spPr>
+          <a:xfrm>
+            <a:off x="680321" y="2505456"/>
+            <a:ext cx="9484759" cy="3599316"/>
+          </a:xfrm>
+        </p:spPr>
+        <p:txBody>
+          <a:bodyPr>
+            <a:noAutofit/>
+          </a:bodyPr>
+          <a:lstStyle/>
+          <a:p>
+            <a:pPr>
+              <a:spcAft>
+                <a:spcPts val="1000"/>
+              </a:spcAft>
+            </a:pPr>
+            <a:r>
+              <a:rPr lang="pt-BR" dirty="0"/>
+              <a:t>I</a:t>
+            </a:r>
+          </a:p>
+        </p:txBody>
+      </p:sp>
+    </p:spTree>
+    <p:extLst>
+      <p:ext uri="{BB962C8B-B14F-4D97-AF65-F5344CB8AC3E}">
+        <p14:creationId xmlns:p14="http://schemas.microsoft.com/office/powerpoint/2010/main" val="493742300"/>
+      </p:ext>
+    </p:extLst>
+  </p:cSld>
+  <p:clrMapOvr>
+    <a:masterClrMapping/>
+  </p:clrMapOvr>
+</p:sld>
+</file>
+
+<file path=ppt/slides/slide85.xml><?xml version="1.0" encoding="utf-8"?>
+<p:sld xmlns:a="http://schemas.openxmlformats.org/drawingml/2006/main" xmlns:r="http://schemas.openxmlformats.org/officeDocument/2006/relationships" xmlns:p="http://schemas.openxmlformats.org/presentationml/2006/main">
+  <p:cSld>
+    <p:spTree>
+      <p:nvGrpSpPr>
+        <p:cNvPr id="1" name=""/>
+        <p:cNvGrpSpPr/>
+        <p:nvPr/>
+      </p:nvGrpSpPr>
+      <p:grpSpPr>
+        <a:xfrm>
+          <a:off x="0" y="0"/>
+          <a:ext cx="0" cy="0"/>
+          <a:chOff x="0" y="0"/>
+          <a:chExt cx="0" cy="0"/>
+        </a:xfrm>
+      </p:grpSpPr>
+      <p:sp>
+        <p:nvSpPr>
+          <p:cNvPr id="4" name="Título 1">
+            <a:extLst>
+              <a:ext uri="{FF2B5EF4-FFF2-40B4-BE49-F238E27FC236}">
+                <a16:creationId xmlns:a16="http://schemas.microsoft.com/office/drawing/2014/main" id="{9CA53688-E304-4704-85E6-8432DC608B05}"/>
+              </a:ext>
+            </a:extLst>
+          </p:cNvPr>
+          <p:cNvSpPr>
+            <a:spLocks noGrp="1"/>
+          </p:cNvSpPr>
+          <p:nvPr>
+            <p:ph type="title"/>
+          </p:nvPr>
+        </p:nvSpPr>
+        <p:spPr>
+          <a:xfrm>
+            <a:off x="680321" y="753228"/>
+            <a:ext cx="9613861" cy="1080938"/>
+          </a:xfrm>
+        </p:spPr>
+        <p:txBody>
+          <a:bodyPr/>
+          <a:lstStyle/>
+          <a:p>
+            <a:r>
+              <a:rPr lang="pt-BR" dirty="0"/>
+              <a:t>Experimento com </a:t>
+            </a:r>
+            <a:r>
+              <a:rPr lang="pt-BR" dirty="0" err="1"/>
+              <a:t>Chaos</a:t>
+            </a:r>
+            <a:r>
+              <a:rPr lang="pt-BR" dirty="0"/>
+              <a:t> Toolkit:</a:t>
+            </a:r>
+            <a:br>
+              <a:rPr lang="pt-BR" dirty="0"/>
+            </a:br>
+            <a:r>
+              <a:rPr lang="pt-BR" dirty="0"/>
+              <a:t>Implementando as Melhorias</a:t>
+            </a:r>
+            <a:endParaRPr lang="pt-BR" dirty="0"/>
+          </a:p>
+        </p:txBody>
+      </p:sp>
+      <p:sp>
+        <p:nvSpPr>
+          <p:cNvPr id="5" name="Espaço Reservado para Conteúdo 2">
+            <a:extLst>
+              <a:ext uri="{FF2B5EF4-FFF2-40B4-BE49-F238E27FC236}">
+                <a16:creationId xmlns:a16="http://schemas.microsoft.com/office/drawing/2014/main" id="{C5B8AB74-06FA-413C-BD74-462D1F01C8FF}"/>
+              </a:ext>
+            </a:extLst>
+          </p:cNvPr>
+          <p:cNvSpPr>
+            <a:spLocks noGrp="1"/>
+          </p:cNvSpPr>
+          <p:nvPr>
+            <p:ph idx="1"/>
+          </p:nvPr>
+        </p:nvSpPr>
+        <p:spPr>
+          <a:xfrm>
+            <a:off x="680321" y="2505456"/>
+            <a:ext cx="9484759" cy="3599316"/>
+          </a:xfrm>
+        </p:spPr>
+        <p:txBody>
+          <a:bodyPr>
+            <a:noAutofit/>
+          </a:bodyPr>
+          <a:lstStyle/>
+          <a:p>
+            <a:pPr>
+              <a:spcAft>
+                <a:spcPts val="1000"/>
+              </a:spcAft>
+            </a:pPr>
+            <a:r>
+              <a:rPr lang="pt-BR" dirty="0"/>
+              <a:t>I</a:t>
+            </a:r>
+          </a:p>
+        </p:txBody>
+      </p:sp>
+    </p:spTree>
+    <p:extLst>
+      <p:ext uri="{BB962C8B-B14F-4D97-AF65-F5344CB8AC3E}">
+        <p14:creationId xmlns:p14="http://schemas.microsoft.com/office/powerpoint/2010/main" val="1942654230"/>
+      </p:ext>
+    </p:extLst>
+  </p:cSld>
+  <p:clrMapOvr>
+    <a:masterClrMapping/>
+  </p:clrMapOvr>
+</p:sld>
+</file>
+
+<file path=ppt/slides/slide86.xml><?xml version="1.0" encoding="utf-8"?>
+<p:sld xmlns:a="http://schemas.openxmlformats.org/drawingml/2006/main" xmlns:r="http://schemas.openxmlformats.org/officeDocument/2006/relationships" xmlns:p="http://schemas.openxmlformats.org/presentationml/2006/main">
+  <p:cSld>
+    <p:spTree>
+      <p:nvGrpSpPr>
+        <p:cNvPr id="1" name=""/>
+        <p:cNvGrpSpPr/>
+        <p:nvPr/>
+      </p:nvGrpSpPr>
+      <p:grpSpPr>
+        <a:xfrm>
+          <a:off x="0" y="0"/>
+          <a:ext cx="0" cy="0"/>
+          <a:chOff x="0" y="0"/>
+          <a:chExt cx="0" cy="0"/>
+        </a:xfrm>
+      </p:grpSpPr>
+      <p:sp>
+        <p:nvSpPr>
+          <p:cNvPr id="4" name="Título 1">
+            <a:extLst>
+              <a:ext uri="{FF2B5EF4-FFF2-40B4-BE49-F238E27FC236}">
+                <a16:creationId xmlns:a16="http://schemas.microsoft.com/office/drawing/2014/main" id="{9CA53688-E304-4704-85E6-8432DC608B05}"/>
+              </a:ext>
+            </a:extLst>
+          </p:cNvPr>
+          <p:cNvSpPr>
+            <a:spLocks noGrp="1"/>
+          </p:cNvSpPr>
+          <p:nvPr>
+            <p:ph type="title"/>
+          </p:nvPr>
+        </p:nvSpPr>
+        <p:spPr>
+          <a:xfrm>
+            <a:off x="680321" y="753228"/>
+            <a:ext cx="9613861" cy="1080938"/>
+          </a:xfrm>
+        </p:spPr>
+        <p:txBody>
+          <a:bodyPr/>
+          <a:lstStyle/>
+          <a:p>
+            <a:r>
+              <a:rPr lang="pt-BR" dirty="0"/>
+              <a:t>Experimento com </a:t>
+            </a:r>
+            <a:r>
+              <a:rPr lang="pt-BR" dirty="0" err="1"/>
+              <a:t>Chaos</a:t>
+            </a:r>
+            <a:r>
+              <a:rPr lang="pt-BR" dirty="0"/>
+              <a:t> Toolkit:</a:t>
+            </a:r>
+            <a:br>
+              <a:rPr lang="pt-BR" dirty="0"/>
+            </a:br>
+            <a:r>
+              <a:rPr lang="pt-BR" dirty="0"/>
+              <a:t>Implementando as Melhorias</a:t>
+            </a:r>
+            <a:endParaRPr lang="pt-BR" dirty="0"/>
+          </a:p>
+        </p:txBody>
+      </p:sp>
+      <p:sp>
+        <p:nvSpPr>
+          <p:cNvPr id="5" name="Espaço Reservado para Conteúdo 2">
+            <a:extLst>
+              <a:ext uri="{FF2B5EF4-FFF2-40B4-BE49-F238E27FC236}">
+                <a16:creationId xmlns:a16="http://schemas.microsoft.com/office/drawing/2014/main" id="{C5B8AB74-06FA-413C-BD74-462D1F01C8FF}"/>
+              </a:ext>
+            </a:extLst>
+          </p:cNvPr>
+          <p:cNvSpPr>
+            <a:spLocks noGrp="1"/>
+          </p:cNvSpPr>
+          <p:nvPr>
+            <p:ph idx="1"/>
+          </p:nvPr>
+        </p:nvSpPr>
+        <p:spPr>
+          <a:xfrm>
+            <a:off x="680321" y="2505456"/>
+            <a:ext cx="9484759" cy="3599316"/>
+          </a:xfrm>
+        </p:spPr>
+        <p:txBody>
+          <a:bodyPr>
+            <a:noAutofit/>
+          </a:bodyPr>
+          <a:lstStyle/>
+          <a:p>
+            <a:pPr>
+              <a:spcAft>
+                <a:spcPts val="1000"/>
+              </a:spcAft>
+            </a:pPr>
+            <a:r>
+              <a:rPr lang="pt-BR" dirty="0"/>
+              <a:t>I</a:t>
+            </a:r>
+          </a:p>
+        </p:txBody>
+      </p:sp>
+    </p:spTree>
+    <p:extLst>
+      <p:ext uri="{BB962C8B-B14F-4D97-AF65-F5344CB8AC3E}">
+        <p14:creationId xmlns:p14="http://schemas.microsoft.com/office/powerpoint/2010/main" val="1629469719"/>
+      </p:ext>
+    </p:extLst>
+  </p:cSld>
+  <p:clrMapOvr>
+    <a:masterClrMapping/>
+  </p:clrMapOvr>
+</p:sld>
+</file>
+
+<file path=ppt/slides/slide87.xml><?xml version="1.0" encoding="utf-8"?>
+<p:sld xmlns:a="http://schemas.openxmlformats.org/drawingml/2006/main" xmlns:r="http://schemas.openxmlformats.org/officeDocument/2006/relationships" xmlns:p="http://schemas.openxmlformats.org/presentationml/2006/main">
+  <p:cSld>
+    <p:spTree>
+      <p:nvGrpSpPr>
+        <p:cNvPr id="1" name=""/>
+        <p:cNvGrpSpPr/>
+        <p:nvPr/>
+      </p:nvGrpSpPr>
+      <p:grpSpPr>
+        <a:xfrm>
+          <a:off x="0" y="0"/>
+          <a:ext cx="0" cy="0"/>
+          <a:chOff x="0" y="0"/>
+          <a:chExt cx="0" cy="0"/>
+        </a:xfrm>
+      </p:grpSpPr>
+      <p:sp>
+        <p:nvSpPr>
+          <p:cNvPr id="4" name="Título 1">
+            <a:extLst>
+              <a:ext uri="{FF2B5EF4-FFF2-40B4-BE49-F238E27FC236}">
+                <a16:creationId xmlns:a16="http://schemas.microsoft.com/office/drawing/2014/main" id="{9CA53688-E304-4704-85E6-8432DC608B05}"/>
+              </a:ext>
+            </a:extLst>
+          </p:cNvPr>
+          <p:cNvSpPr>
+            <a:spLocks noGrp="1"/>
+          </p:cNvSpPr>
+          <p:nvPr>
+            <p:ph type="title"/>
+          </p:nvPr>
+        </p:nvSpPr>
+        <p:spPr>
+          <a:xfrm>
+            <a:off x="680321" y="753228"/>
+            <a:ext cx="9613861" cy="1080938"/>
+          </a:xfrm>
+        </p:spPr>
+        <p:txBody>
+          <a:bodyPr/>
+          <a:lstStyle/>
+          <a:p>
+            <a:r>
+              <a:rPr lang="pt-BR" dirty="0"/>
+              <a:t>Experimento com </a:t>
+            </a:r>
+            <a:r>
+              <a:rPr lang="pt-BR" dirty="0" err="1"/>
+              <a:t>Chaos</a:t>
+            </a:r>
+            <a:r>
+              <a:rPr lang="pt-BR" dirty="0"/>
+              <a:t> Toolkit:</a:t>
+            </a:r>
+            <a:br>
+              <a:rPr lang="pt-BR" dirty="0"/>
+            </a:br>
+            <a:r>
+              <a:rPr lang="pt-BR" dirty="0"/>
+              <a:t>Implementando as Melhorias</a:t>
+            </a:r>
+            <a:endParaRPr lang="pt-BR" dirty="0"/>
+          </a:p>
+        </p:txBody>
+      </p:sp>
+      <p:sp>
+        <p:nvSpPr>
+          <p:cNvPr id="5" name="Espaço Reservado para Conteúdo 2">
+            <a:extLst>
+              <a:ext uri="{FF2B5EF4-FFF2-40B4-BE49-F238E27FC236}">
+                <a16:creationId xmlns:a16="http://schemas.microsoft.com/office/drawing/2014/main" id="{C5B8AB74-06FA-413C-BD74-462D1F01C8FF}"/>
+              </a:ext>
+            </a:extLst>
+          </p:cNvPr>
+          <p:cNvSpPr>
+            <a:spLocks noGrp="1"/>
+          </p:cNvSpPr>
+          <p:nvPr>
+            <p:ph idx="1"/>
+          </p:nvPr>
+        </p:nvSpPr>
+        <p:spPr>
+          <a:xfrm>
+            <a:off x="680321" y="2505456"/>
+            <a:ext cx="9484759" cy="3599316"/>
+          </a:xfrm>
+        </p:spPr>
+        <p:txBody>
+          <a:bodyPr>
+            <a:noAutofit/>
+          </a:bodyPr>
+          <a:lstStyle/>
+          <a:p>
+            <a:pPr>
+              <a:spcAft>
+                <a:spcPts val="1000"/>
+              </a:spcAft>
+            </a:pPr>
+            <a:r>
+              <a:rPr lang="pt-BR" dirty="0"/>
+              <a:t>I</a:t>
+            </a:r>
+          </a:p>
+        </p:txBody>
+      </p:sp>
+    </p:spTree>
+    <p:extLst>
+      <p:ext uri="{BB962C8B-B14F-4D97-AF65-F5344CB8AC3E}">
+        <p14:creationId xmlns:p14="http://schemas.microsoft.com/office/powerpoint/2010/main" val="1928828955"/>
+      </p:ext>
+    </p:extLst>
+  </p:cSld>
+  <p:clrMapOvr>
+    <a:masterClrMapping/>
+  </p:clrMapOvr>
+</p:sld>
+</file>
+
+<file path=ppt/slides/slide88.xml><?xml version="1.0" encoding="utf-8"?>
+<p:sld xmlns:a="http://schemas.openxmlformats.org/drawingml/2006/main" xmlns:r="http://schemas.openxmlformats.org/officeDocument/2006/relationships" xmlns:p="http://schemas.openxmlformats.org/presentationml/2006/main">
+  <p:cSld>
+    <p:spTree>
+      <p:nvGrpSpPr>
+        <p:cNvPr id="1" name=""/>
+        <p:cNvGrpSpPr/>
+        <p:nvPr/>
+      </p:nvGrpSpPr>
+      <p:grpSpPr>
+        <a:xfrm>
+          <a:off x="0" y="0"/>
+          <a:ext cx="0" cy="0"/>
+          <a:chOff x="0" y="0"/>
+          <a:chExt cx="0" cy="0"/>
+        </a:xfrm>
+      </p:grpSpPr>
+      <p:sp>
+        <p:nvSpPr>
+          <p:cNvPr id="4" name="Título 1">
+            <a:extLst>
+              <a:ext uri="{FF2B5EF4-FFF2-40B4-BE49-F238E27FC236}">
+                <a16:creationId xmlns:a16="http://schemas.microsoft.com/office/drawing/2014/main" id="{9CA53688-E304-4704-85E6-8432DC608B05}"/>
+              </a:ext>
+            </a:extLst>
+          </p:cNvPr>
+          <p:cNvSpPr>
+            <a:spLocks noGrp="1"/>
+          </p:cNvSpPr>
+          <p:nvPr>
+            <p:ph type="title"/>
+          </p:nvPr>
+        </p:nvSpPr>
+        <p:spPr>
+          <a:xfrm>
+            <a:off x="680321" y="753228"/>
+            <a:ext cx="9613861" cy="1080938"/>
+          </a:xfrm>
+        </p:spPr>
+        <p:txBody>
+          <a:bodyPr/>
+          <a:lstStyle/>
+          <a:p>
+            <a:r>
+              <a:rPr lang="pt-BR" dirty="0"/>
+              <a:t>Experimento com </a:t>
+            </a:r>
+            <a:r>
+              <a:rPr lang="pt-BR" dirty="0" err="1"/>
+              <a:t>Chaos</a:t>
+            </a:r>
+            <a:r>
+              <a:rPr lang="pt-BR" dirty="0"/>
+              <a:t> Toolkit:</a:t>
+            </a:r>
+            <a:br>
+              <a:rPr lang="pt-BR" dirty="0"/>
+            </a:br>
+            <a:r>
+              <a:rPr lang="pt-BR" dirty="0"/>
+              <a:t>Implementando as Melhorias</a:t>
+            </a:r>
+            <a:endParaRPr lang="pt-BR" dirty="0"/>
+          </a:p>
+        </p:txBody>
+      </p:sp>
+      <p:sp>
+        <p:nvSpPr>
+          <p:cNvPr id="5" name="Espaço Reservado para Conteúdo 2">
+            <a:extLst>
+              <a:ext uri="{FF2B5EF4-FFF2-40B4-BE49-F238E27FC236}">
+                <a16:creationId xmlns:a16="http://schemas.microsoft.com/office/drawing/2014/main" id="{C5B8AB74-06FA-413C-BD74-462D1F01C8FF}"/>
+              </a:ext>
+            </a:extLst>
+          </p:cNvPr>
+          <p:cNvSpPr>
+            <a:spLocks noGrp="1"/>
+          </p:cNvSpPr>
+          <p:nvPr>
+            <p:ph idx="1"/>
+          </p:nvPr>
+        </p:nvSpPr>
+        <p:spPr>
+          <a:xfrm>
+            <a:off x="680321" y="2505456"/>
+            <a:ext cx="9484759" cy="3599316"/>
+          </a:xfrm>
+        </p:spPr>
+        <p:txBody>
+          <a:bodyPr>
+            <a:noAutofit/>
+          </a:bodyPr>
+          <a:lstStyle/>
+          <a:p>
+            <a:pPr>
+              <a:spcAft>
+                <a:spcPts val="1000"/>
+              </a:spcAft>
+            </a:pPr>
+            <a:r>
+              <a:rPr lang="pt-BR" dirty="0"/>
+              <a:t>I</a:t>
+            </a:r>
+          </a:p>
+        </p:txBody>
+      </p:sp>
+    </p:spTree>
+    <p:extLst>
+      <p:ext uri="{BB962C8B-B14F-4D97-AF65-F5344CB8AC3E}">
+        <p14:creationId xmlns:p14="http://schemas.microsoft.com/office/powerpoint/2010/main" val="3336876521"/>
+      </p:ext>
+    </p:extLst>
+  </p:cSld>
+  <p:clrMapOvr>
+    <a:masterClrMapping/>
+  </p:clrMapOvr>
+</p:sld>
+</file>
+
+<file path=ppt/slides/slide89.xml><?xml version="1.0" encoding="utf-8"?>
+<p:sld xmlns:a="http://schemas.openxmlformats.org/drawingml/2006/main" xmlns:r="http://schemas.openxmlformats.org/officeDocument/2006/relationships" xmlns:p="http://schemas.openxmlformats.org/presentationml/2006/main">
+  <p:cSld>
+    <p:spTree>
+      <p:nvGrpSpPr>
+        <p:cNvPr id="1" name=""/>
+        <p:cNvGrpSpPr/>
+        <p:nvPr/>
+      </p:nvGrpSpPr>
+      <p:grpSpPr>
+        <a:xfrm>
+          <a:off x="0" y="0"/>
+          <a:ext cx="0" cy="0"/>
+          <a:chOff x="0" y="0"/>
+          <a:chExt cx="0" cy="0"/>
+        </a:xfrm>
+      </p:grpSpPr>
+      <p:sp>
+        <p:nvSpPr>
+          <p:cNvPr id="4" name="Título 1">
+            <a:extLst>
+              <a:ext uri="{FF2B5EF4-FFF2-40B4-BE49-F238E27FC236}">
+                <a16:creationId xmlns:a16="http://schemas.microsoft.com/office/drawing/2014/main" id="{9CA53688-E304-4704-85E6-8432DC608B05}"/>
+              </a:ext>
+            </a:extLst>
+          </p:cNvPr>
+          <p:cNvSpPr>
+            <a:spLocks noGrp="1"/>
+          </p:cNvSpPr>
+          <p:nvPr>
+            <p:ph type="title"/>
+          </p:nvPr>
+        </p:nvSpPr>
+        <p:spPr>
+          <a:xfrm>
+            <a:off x="680321" y="753228"/>
+            <a:ext cx="9613861" cy="1080938"/>
+          </a:xfrm>
+        </p:spPr>
+        <p:txBody>
+          <a:bodyPr/>
+          <a:lstStyle/>
+          <a:p>
+            <a:r>
+              <a:rPr lang="pt-BR" dirty="0"/>
+              <a:t>Experimento com </a:t>
+            </a:r>
+            <a:r>
+              <a:rPr lang="pt-BR" dirty="0" err="1"/>
+              <a:t>Chaos</a:t>
+            </a:r>
+            <a:r>
+              <a:rPr lang="pt-BR" dirty="0"/>
+              <a:t> Toolkit:</a:t>
+            </a:r>
+            <a:br>
+              <a:rPr lang="pt-BR" dirty="0"/>
+            </a:br>
+            <a:r>
+              <a:rPr lang="pt-BR" dirty="0"/>
+              <a:t>Implementando as Melhorias</a:t>
+            </a:r>
+            <a:endParaRPr lang="pt-BR" dirty="0"/>
+          </a:p>
+        </p:txBody>
+      </p:sp>
+      <p:sp>
+        <p:nvSpPr>
+          <p:cNvPr id="5" name="Espaço Reservado para Conteúdo 2">
+            <a:extLst>
+              <a:ext uri="{FF2B5EF4-FFF2-40B4-BE49-F238E27FC236}">
+                <a16:creationId xmlns:a16="http://schemas.microsoft.com/office/drawing/2014/main" id="{C5B8AB74-06FA-413C-BD74-462D1F01C8FF}"/>
+              </a:ext>
+            </a:extLst>
+          </p:cNvPr>
+          <p:cNvSpPr>
+            <a:spLocks noGrp="1"/>
+          </p:cNvSpPr>
+          <p:nvPr>
+            <p:ph idx="1"/>
+          </p:nvPr>
+        </p:nvSpPr>
+        <p:spPr>
+          <a:xfrm>
+            <a:off x="680321" y="2505456"/>
+            <a:ext cx="9484759" cy="3599316"/>
+          </a:xfrm>
+        </p:spPr>
+        <p:txBody>
+          <a:bodyPr>
+            <a:noAutofit/>
+          </a:bodyPr>
+          <a:lstStyle/>
+          <a:p>
+            <a:pPr>
+              <a:spcAft>
+                <a:spcPts val="1000"/>
+              </a:spcAft>
+            </a:pPr>
+            <a:r>
+              <a:rPr lang="pt-BR" dirty="0"/>
+              <a:t>I</a:t>
+            </a:r>
+          </a:p>
+        </p:txBody>
+      </p:sp>
+    </p:spTree>
+    <p:extLst>
+      <p:ext uri="{BB962C8B-B14F-4D97-AF65-F5344CB8AC3E}">
+        <p14:creationId xmlns:p14="http://schemas.microsoft.com/office/powerpoint/2010/main" val="4257787573"/>
+      </p:ext>
+    </p:extLst>
+  </p:cSld>
+  <p:clrMapOvr>
+    <a:masterClrMapping/>
+  </p:clrMapOvr>
+</p:sld>
+</file>
+
 <file path=ppt/slides/slide9.xml><?xml version="1.0" encoding="utf-8"?>
 <p:sld xmlns:a="http://schemas.openxmlformats.org/drawingml/2006/main" xmlns:r="http://schemas.openxmlformats.org/officeDocument/2006/relationships" xmlns:p="http://schemas.openxmlformats.org/presentationml/2006/main">
   <p:cSld>
@@ -19544,6 +22309,10 @@
               <a:rPr lang="pt-BR" sz="2800" dirty="0"/>
               <a:t>Entretanto outras áreas que podem apresentar falhas devem ser levadas em consideração.</a:t>
             </a:r>
+            <a:r>
+              <a:rPr lang="pt-BR" sz="2400" dirty="0"/>
+              <a:t/>
+            </a:r>
             <a:br>
               <a:rPr lang="pt-BR" sz="2400" dirty="0"/>
             </a:br>
@@ -19585,6 +22354,1196 @@
     <p:extLst>
       <p:ext uri="{BB962C8B-B14F-4D97-AF65-F5344CB8AC3E}">
         <p14:creationId xmlns:p14="http://schemas.microsoft.com/office/powerpoint/2010/main" val="79961702"/>
+      </p:ext>
+    </p:extLst>
+  </p:cSld>
+  <p:clrMapOvr>
+    <a:masterClrMapping/>
+  </p:clrMapOvr>
+</p:sld>
+</file>
+
+<file path=ppt/slides/slide90.xml><?xml version="1.0" encoding="utf-8"?>
+<p:sld xmlns:a="http://schemas.openxmlformats.org/drawingml/2006/main" xmlns:r="http://schemas.openxmlformats.org/officeDocument/2006/relationships" xmlns:p="http://schemas.openxmlformats.org/presentationml/2006/main">
+  <p:cSld>
+    <p:spTree>
+      <p:nvGrpSpPr>
+        <p:cNvPr id="1" name=""/>
+        <p:cNvGrpSpPr/>
+        <p:nvPr/>
+      </p:nvGrpSpPr>
+      <p:grpSpPr>
+        <a:xfrm>
+          <a:off x="0" y="0"/>
+          <a:ext cx="0" cy="0"/>
+          <a:chOff x="0" y="0"/>
+          <a:chExt cx="0" cy="0"/>
+        </a:xfrm>
+      </p:grpSpPr>
+      <p:sp>
+        <p:nvSpPr>
+          <p:cNvPr id="4" name="Título 1">
+            <a:extLst>
+              <a:ext uri="{FF2B5EF4-FFF2-40B4-BE49-F238E27FC236}">
+                <a16:creationId xmlns:a16="http://schemas.microsoft.com/office/drawing/2014/main" id="{9CA53688-E304-4704-85E6-8432DC608B05}"/>
+              </a:ext>
+            </a:extLst>
+          </p:cNvPr>
+          <p:cNvSpPr>
+            <a:spLocks noGrp="1"/>
+          </p:cNvSpPr>
+          <p:nvPr>
+            <p:ph type="title"/>
+          </p:nvPr>
+        </p:nvSpPr>
+        <p:spPr>
+          <a:xfrm>
+            <a:off x="680321" y="753228"/>
+            <a:ext cx="9613861" cy="1080938"/>
+          </a:xfrm>
+        </p:spPr>
+        <p:txBody>
+          <a:bodyPr/>
+          <a:lstStyle/>
+          <a:p>
+            <a:r>
+              <a:rPr lang="pt-BR" dirty="0"/>
+              <a:t>Experimento com </a:t>
+            </a:r>
+            <a:r>
+              <a:rPr lang="pt-BR" dirty="0" err="1"/>
+              <a:t>Chaos</a:t>
+            </a:r>
+            <a:r>
+              <a:rPr lang="pt-BR" dirty="0"/>
+              <a:t> Toolkit:</a:t>
+            </a:r>
+            <a:br>
+              <a:rPr lang="pt-BR" dirty="0"/>
+            </a:br>
+            <a:r>
+              <a:rPr lang="pt-BR" dirty="0"/>
+              <a:t>Implementando as Melhorias</a:t>
+            </a:r>
+            <a:endParaRPr lang="pt-BR" dirty="0"/>
+          </a:p>
+        </p:txBody>
+      </p:sp>
+      <p:sp>
+        <p:nvSpPr>
+          <p:cNvPr id="5" name="Espaço Reservado para Conteúdo 2">
+            <a:extLst>
+              <a:ext uri="{FF2B5EF4-FFF2-40B4-BE49-F238E27FC236}">
+                <a16:creationId xmlns:a16="http://schemas.microsoft.com/office/drawing/2014/main" id="{C5B8AB74-06FA-413C-BD74-462D1F01C8FF}"/>
+              </a:ext>
+            </a:extLst>
+          </p:cNvPr>
+          <p:cNvSpPr>
+            <a:spLocks noGrp="1"/>
+          </p:cNvSpPr>
+          <p:nvPr>
+            <p:ph idx="1"/>
+          </p:nvPr>
+        </p:nvSpPr>
+        <p:spPr>
+          <a:xfrm>
+            <a:off x="680321" y="2505456"/>
+            <a:ext cx="9484759" cy="3599316"/>
+          </a:xfrm>
+        </p:spPr>
+        <p:txBody>
+          <a:bodyPr>
+            <a:noAutofit/>
+          </a:bodyPr>
+          <a:lstStyle/>
+          <a:p>
+            <a:pPr>
+              <a:spcAft>
+                <a:spcPts val="1000"/>
+              </a:spcAft>
+            </a:pPr>
+            <a:r>
+              <a:rPr lang="pt-BR" dirty="0"/>
+              <a:t>I</a:t>
+            </a:r>
+          </a:p>
+        </p:txBody>
+      </p:sp>
+    </p:spTree>
+    <p:extLst>
+      <p:ext uri="{BB962C8B-B14F-4D97-AF65-F5344CB8AC3E}">
+        <p14:creationId xmlns:p14="http://schemas.microsoft.com/office/powerpoint/2010/main" val="506737807"/>
+      </p:ext>
+    </p:extLst>
+  </p:cSld>
+  <p:clrMapOvr>
+    <a:masterClrMapping/>
+  </p:clrMapOvr>
+</p:sld>
+</file>
+
+<file path=ppt/slides/slide91.xml><?xml version="1.0" encoding="utf-8"?>
+<p:sld xmlns:a="http://schemas.openxmlformats.org/drawingml/2006/main" xmlns:r="http://schemas.openxmlformats.org/officeDocument/2006/relationships" xmlns:p="http://schemas.openxmlformats.org/presentationml/2006/main">
+  <p:cSld>
+    <p:spTree>
+      <p:nvGrpSpPr>
+        <p:cNvPr id="1" name=""/>
+        <p:cNvGrpSpPr/>
+        <p:nvPr/>
+      </p:nvGrpSpPr>
+      <p:grpSpPr>
+        <a:xfrm>
+          <a:off x="0" y="0"/>
+          <a:ext cx="0" cy="0"/>
+          <a:chOff x="0" y="0"/>
+          <a:chExt cx="0" cy="0"/>
+        </a:xfrm>
+      </p:grpSpPr>
+      <p:sp>
+        <p:nvSpPr>
+          <p:cNvPr id="4" name="Título 1">
+            <a:extLst>
+              <a:ext uri="{FF2B5EF4-FFF2-40B4-BE49-F238E27FC236}">
+                <a16:creationId xmlns:a16="http://schemas.microsoft.com/office/drawing/2014/main" id="{9CA53688-E304-4704-85E6-8432DC608B05}"/>
+              </a:ext>
+            </a:extLst>
+          </p:cNvPr>
+          <p:cNvSpPr>
+            <a:spLocks noGrp="1"/>
+          </p:cNvSpPr>
+          <p:nvPr>
+            <p:ph type="title"/>
+          </p:nvPr>
+        </p:nvSpPr>
+        <p:spPr>
+          <a:xfrm>
+            <a:off x="680321" y="753228"/>
+            <a:ext cx="9613861" cy="1080938"/>
+          </a:xfrm>
+        </p:spPr>
+        <p:txBody>
+          <a:bodyPr/>
+          <a:lstStyle/>
+          <a:p>
+            <a:r>
+              <a:rPr lang="pt-BR" dirty="0"/>
+              <a:t>Experimento com </a:t>
+            </a:r>
+            <a:r>
+              <a:rPr lang="pt-BR" dirty="0" err="1"/>
+              <a:t>Chaos</a:t>
+            </a:r>
+            <a:r>
+              <a:rPr lang="pt-BR" dirty="0"/>
+              <a:t> Toolkit:</a:t>
+            </a:r>
+            <a:br>
+              <a:rPr lang="pt-BR" dirty="0"/>
+            </a:br>
+            <a:r>
+              <a:rPr lang="pt-BR" dirty="0"/>
+              <a:t>Implementando as Melhorias</a:t>
+            </a:r>
+            <a:endParaRPr lang="pt-BR" dirty="0"/>
+          </a:p>
+        </p:txBody>
+      </p:sp>
+      <p:sp>
+        <p:nvSpPr>
+          <p:cNvPr id="5" name="Espaço Reservado para Conteúdo 2">
+            <a:extLst>
+              <a:ext uri="{FF2B5EF4-FFF2-40B4-BE49-F238E27FC236}">
+                <a16:creationId xmlns:a16="http://schemas.microsoft.com/office/drawing/2014/main" id="{C5B8AB74-06FA-413C-BD74-462D1F01C8FF}"/>
+              </a:ext>
+            </a:extLst>
+          </p:cNvPr>
+          <p:cNvSpPr>
+            <a:spLocks noGrp="1"/>
+          </p:cNvSpPr>
+          <p:nvPr>
+            <p:ph idx="1"/>
+          </p:nvPr>
+        </p:nvSpPr>
+        <p:spPr>
+          <a:xfrm>
+            <a:off x="680321" y="2505456"/>
+            <a:ext cx="9484759" cy="3599316"/>
+          </a:xfrm>
+        </p:spPr>
+        <p:txBody>
+          <a:bodyPr>
+            <a:noAutofit/>
+          </a:bodyPr>
+          <a:lstStyle/>
+          <a:p>
+            <a:pPr>
+              <a:spcAft>
+                <a:spcPts val="1000"/>
+              </a:spcAft>
+            </a:pPr>
+            <a:r>
+              <a:rPr lang="pt-BR" dirty="0"/>
+              <a:t>I</a:t>
+            </a:r>
+          </a:p>
+        </p:txBody>
+      </p:sp>
+    </p:spTree>
+    <p:extLst>
+      <p:ext uri="{BB962C8B-B14F-4D97-AF65-F5344CB8AC3E}">
+        <p14:creationId xmlns:p14="http://schemas.microsoft.com/office/powerpoint/2010/main" val="895753721"/>
+      </p:ext>
+    </p:extLst>
+  </p:cSld>
+  <p:clrMapOvr>
+    <a:masterClrMapping/>
+  </p:clrMapOvr>
+</p:sld>
+</file>
+
+<file path=ppt/slides/slide92.xml><?xml version="1.0" encoding="utf-8"?>
+<p:sld xmlns:a="http://schemas.openxmlformats.org/drawingml/2006/main" xmlns:r="http://schemas.openxmlformats.org/officeDocument/2006/relationships" xmlns:p="http://schemas.openxmlformats.org/presentationml/2006/main">
+  <p:cSld>
+    <p:spTree>
+      <p:nvGrpSpPr>
+        <p:cNvPr id="1" name=""/>
+        <p:cNvGrpSpPr/>
+        <p:nvPr/>
+      </p:nvGrpSpPr>
+      <p:grpSpPr>
+        <a:xfrm>
+          <a:off x="0" y="0"/>
+          <a:ext cx="0" cy="0"/>
+          <a:chOff x="0" y="0"/>
+          <a:chExt cx="0" cy="0"/>
+        </a:xfrm>
+      </p:grpSpPr>
+      <p:sp>
+        <p:nvSpPr>
+          <p:cNvPr id="4" name="Título 1">
+            <a:extLst>
+              <a:ext uri="{FF2B5EF4-FFF2-40B4-BE49-F238E27FC236}">
+                <a16:creationId xmlns:a16="http://schemas.microsoft.com/office/drawing/2014/main" id="{9CA53688-E304-4704-85E6-8432DC608B05}"/>
+              </a:ext>
+            </a:extLst>
+          </p:cNvPr>
+          <p:cNvSpPr>
+            <a:spLocks noGrp="1"/>
+          </p:cNvSpPr>
+          <p:nvPr>
+            <p:ph type="title"/>
+          </p:nvPr>
+        </p:nvSpPr>
+        <p:spPr>
+          <a:xfrm>
+            <a:off x="680321" y="753228"/>
+            <a:ext cx="9613861" cy="1080938"/>
+          </a:xfrm>
+        </p:spPr>
+        <p:txBody>
+          <a:bodyPr/>
+          <a:lstStyle/>
+          <a:p>
+            <a:r>
+              <a:rPr lang="pt-BR" dirty="0"/>
+              <a:t>Experimento com </a:t>
+            </a:r>
+            <a:r>
+              <a:rPr lang="pt-BR" dirty="0" err="1"/>
+              <a:t>Chaos</a:t>
+            </a:r>
+            <a:r>
+              <a:rPr lang="pt-BR" dirty="0"/>
+              <a:t> Toolkit:</a:t>
+            </a:r>
+            <a:br>
+              <a:rPr lang="pt-BR" dirty="0"/>
+            </a:br>
+            <a:r>
+              <a:rPr lang="pt-BR" dirty="0"/>
+              <a:t>Implementando as Melhorias</a:t>
+            </a:r>
+            <a:endParaRPr lang="pt-BR" dirty="0"/>
+          </a:p>
+        </p:txBody>
+      </p:sp>
+      <p:sp>
+        <p:nvSpPr>
+          <p:cNvPr id="5" name="Espaço Reservado para Conteúdo 2">
+            <a:extLst>
+              <a:ext uri="{FF2B5EF4-FFF2-40B4-BE49-F238E27FC236}">
+                <a16:creationId xmlns:a16="http://schemas.microsoft.com/office/drawing/2014/main" id="{C5B8AB74-06FA-413C-BD74-462D1F01C8FF}"/>
+              </a:ext>
+            </a:extLst>
+          </p:cNvPr>
+          <p:cNvSpPr>
+            <a:spLocks noGrp="1"/>
+          </p:cNvSpPr>
+          <p:nvPr>
+            <p:ph idx="1"/>
+          </p:nvPr>
+        </p:nvSpPr>
+        <p:spPr>
+          <a:xfrm>
+            <a:off x="680321" y="2505456"/>
+            <a:ext cx="9484759" cy="3599316"/>
+          </a:xfrm>
+        </p:spPr>
+        <p:txBody>
+          <a:bodyPr>
+            <a:noAutofit/>
+          </a:bodyPr>
+          <a:lstStyle/>
+          <a:p>
+            <a:pPr>
+              <a:spcAft>
+                <a:spcPts val="1000"/>
+              </a:spcAft>
+            </a:pPr>
+            <a:r>
+              <a:rPr lang="pt-BR" dirty="0"/>
+              <a:t>I</a:t>
+            </a:r>
+          </a:p>
+        </p:txBody>
+      </p:sp>
+    </p:spTree>
+    <p:extLst>
+      <p:ext uri="{BB962C8B-B14F-4D97-AF65-F5344CB8AC3E}">
+        <p14:creationId xmlns:p14="http://schemas.microsoft.com/office/powerpoint/2010/main" val="2350357056"/>
+      </p:ext>
+    </p:extLst>
+  </p:cSld>
+  <p:clrMapOvr>
+    <a:masterClrMapping/>
+  </p:clrMapOvr>
+</p:sld>
+</file>
+
+<file path=ppt/slides/slide93.xml><?xml version="1.0" encoding="utf-8"?>
+<p:sld xmlns:a="http://schemas.openxmlformats.org/drawingml/2006/main" xmlns:r="http://schemas.openxmlformats.org/officeDocument/2006/relationships" xmlns:p="http://schemas.openxmlformats.org/presentationml/2006/main">
+  <p:cSld>
+    <p:spTree>
+      <p:nvGrpSpPr>
+        <p:cNvPr id="1" name=""/>
+        <p:cNvGrpSpPr/>
+        <p:nvPr/>
+      </p:nvGrpSpPr>
+      <p:grpSpPr>
+        <a:xfrm>
+          <a:off x="0" y="0"/>
+          <a:ext cx="0" cy="0"/>
+          <a:chOff x="0" y="0"/>
+          <a:chExt cx="0" cy="0"/>
+        </a:xfrm>
+      </p:grpSpPr>
+      <p:sp>
+        <p:nvSpPr>
+          <p:cNvPr id="4" name="Título 1">
+            <a:extLst>
+              <a:ext uri="{FF2B5EF4-FFF2-40B4-BE49-F238E27FC236}">
+                <a16:creationId xmlns:a16="http://schemas.microsoft.com/office/drawing/2014/main" id="{9CA53688-E304-4704-85E6-8432DC608B05}"/>
+              </a:ext>
+            </a:extLst>
+          </p:cNvPr>
+          <p:cNvSpPr>
+            <a:spLocks noGrp="1"/>
+          </p:cNvSpPr>
+          <p:nvPr>
+            <p:ph type="title"/>
+          </p:nvPr>
+        </p:nvSpPr>
+        <p:spPr>
+          <a:xfrm>
+            <a:off x="680321" y="753228"/>
+            <a:ext cx="9613861" cy="1080938"/>
+          </a:xfrm>
+        </p:spPr>
+        <p:txBody>
+          <a:bodyPr/>
+          <a:lstStyle/>
+          <a:p>
+            <a:r>
+              <a:rPr lang="pt-BR" dirty="0"/>
+              <a:t>Experimento com </a:t>
+            </a:r>
+            <a:r>
+              <a:rPr lang="pt-BR" dirty="0" err="1"/>
+              <a:t>Chaos</a:t>
+            </a:r>
+            <a:r>
+              <a:rPr lang="pt-BR" dirty="0"/>
+              <a:t> Toolkit:</a:t>
+            </a:r>
+            <a:br>
+              <a:rPr lang="pt-BR" dirty="0"/>
+            </a:br>
+            <a:r>
+              <a:rPr lang="pt-BR" dirty="0"/>
+              <a:t>Implementando as Melhorias</a:t>
+            </a:r>
+            <a:endParaRPr lang="pt-BR" dirty="0"/>
+          </a:p>
+        </p:txBody>
+      </p:sp>
+      <p:sp>
+        <p:nvSpPr>
+          <p:cNvPr id="5" name="Espaço Reservado para Conteúdo 2">
+            <a:extLst>
+              <a:ext uri="{FF2B5EF4-FFF2-40B4-BE49-F238E27FC236}">
+                <a16:creationId xmlns:a16="http://schemas.microsoft.com/office/drawing/2014/main" id="{C5B8AB74-06FA-413C-BD74-462D1F01C8FF}"/>
+              </a:ext>
+            </a:extLst>
+          </p:cNvPr>
+          <p:cNvSpPr>
+            <a:spLocks noGrp="1"/>
+          </p:cNvSpPr>
+          <p:nvPr>
+            <p:ph idx="1"/>
+          </p:nvPr>
+        </p:nvSpPr>
+        <p:spPr>
+          <a:xfrm>
+            <a:off x="680321" y="2505456"/>
+            <a:ext cx="9484759" cy="3599316"/>
+          </a:xfrm>
+        </p:spPr>
+        <p:txBody>
+          <a:bodyPr>
+            <a:noAutofit/>
+          </a:bodyPr>
+          <a:lstStyle/>
+          <a:p>
+            <a:pPr>
+              <a:spcAft>
+                <a:spcPts val="1000"/>
+              </a:spcAft>
+            </a:pPr>
+            <a:r>
+              <a:rPr lang="pt-BR" dirty="0"/>
+              <a:t>I</a:t>
+            </a:r>
+          </a:p>
+        </p:txBody>
+      </p:sp>
+    </p:spTree>
+    <p:extLst>
+      <p:ext uri="{BB962C8B-B14F-4D97-AF65-F5344CB8AC3E}">
+        <p14:creationId xmlns:p14="http://schemas.microsoft.com/office/powerpoint/2010/main" val="3878320112"/>
+      </p:ext>
+    </p:extLst>
+  </p:cSld>
+  <p:clrMapOvr>
+    <a:masterClrMapping/>
+  </p:clrMapOvr>
+</p:sld>
+</file>
+
+<file path=ppt/slides/slide94.xml><?xml version="1.0" encoding="utf-8"?>
+<p:sld xmlns:a="http://schemas.openxmlformats.org/drawingml/2006/main" xmlns:r="http://schemas.openxmlformats.org/officeDocument/2006/relationships" xmlns:p="http://schemas.openxmlformats.org/presentationml/2006/main">
+  <p:cSld>
+    <p:spTree>
+      <p:nvGrpSpPr>
+        <p:cNvPr id="1" name=""/>
+        <p:cNvGrpSpPr/>
+        <p:nvPr/>
+      </p:nvGrpSpPr>
+      <p:grpSpPr>
+        <a:xfrm>
+          <a:off x="0" y="0"/>
+          <a:ext cx="0" cy="0"/>
+          <a:chOff x="0" y="0"/>
+          <a:chExt cx="0" cy="0"/>
+        </a:xfrm>
+      </p:grpSpPr>
+      <p:sp>
+        <p:nvSpPr>
+          <p:cNvPr id="4" name="Título 1">
+            <a:extLst>
+              <a:ext uri="{FF2B5EF4-FFF2-40B4-BE49-F238E27FC236}">
+                <a16:creationId xmlns:a16="http://schemas.microsoft.com/office/drawing/2014/main" id="{9CA53688-E304-4704-85E6-8432DC608B05}"/>
+              </a:ext>
+            </a:extLst>
+          </p:cNvPr>
+          <p:cNvSpPr>
+            <a:spLocks noGrp="1"/>
+          </p:cNvSpPr>
+          <p:nvPr>
+            <p:ph type="title"/>
+          </p:nvPr>
+        </p:nvSpPr>
+        <p:spPr>
+          <a:xfrm>
+            <a:off x="680321" y="753228"/>
+            <a:ext cx="9613861" cy="1080938"/>
+          </a:xfrm>
+        </p:spPr>
+        <p:txBody>
+          <a:bodyPr/>
+          <a:lstStyle/>
+          <a:p>
+            <a:r>
+              <a:rPr lang="pt-BR" dirty="0"/>
+              <a:t>Experimento com </a:t>
+            </a:r>
+            <a:r>
+              <a:rPr lang="pt-BR" dirty="0" err="1"/>
+              <a:t>Chaos</a:t>
+            </a:r>
+            <a:r>
+              <a:rPr lang="pt-BR" dirty="0"/>
+              <a:t> Toolkit:</a:t>
+            </a:r>
+            <a:br>
+              <a:rPr lang="pt-BR" dirty="0"/>
+            </a:br>
+            <a:r>
+              <a:rPr lang="pt-BR" dirty="0"/>
+              <a:t>Implementando as Melhorias</a:t>
+            </a:r>
+            <a:endParaRPr lang="pt-BR" dirty="0"/>
+          </a:p>
+        </p:txBody>
+      </p:sp>
+      <p:sp>
+        <p:nvSpPr>
+          <p:cNvPr id="5" name="Espaço Reservado para Conteúdo 2">
+            <a:extLst>
+              <a:ext uri="{FF2B5EF4-FFF2-40B4-BE49-F238E27FC236}">
+                <a16:creationId xmlns:a16="http://schemas.microsoft.com/office/drawing/2014/main" id="{C5B8AB74-06FA-413C-BD74-462D1F01C8FF}"/>
+              </a:ext>
+            </a:extLst>
+          </p:cNvPr>
+          <p:cNvSpPr>
+            <a:spLocks noGrp="1"/>
+          </p:cNvSpPr>
+          <p:nvPr>
+            <p:ph idx="1"/>
+          </p:nvPr>
+        </p:nvSpPr>
+        <p:spPr>
+          <a:xfrm>
+            <a:off x="680321" y="2505456"/>
+            <a:ext cx="9484759" cy="3599316"/>
+          </a:xfrm>
+        </p:spPr>
+        <p:txBody>
+          <a:bodyPr>
+            <a:noAutofit/>
+          </a:bodyPr>
+          <a:lstStyle/>
+          <a:p>
+            <a:pPr>
+              <a:spcAft>
+                <a:spcPts val="1000"/>
+              </a:spcAft>
+            </a:pPr>
+            <a:r>
+              <a:rPr lang="pt-BR" dirty="0"/>
+              <a:t>I</a:t>
+            </a:r>
+          </a:p>
+        </p:txBody>
+      </p:sp>
+    </p:spTree>
+    <p:extLst>
+      <p:ext uri="{BB962C8B-B14F-4D97-AF65-F5344CB8AC3E}">
+        <p14:creationId xmlns:p14="http://schemas.microsoft.com/office/powerpoint/2010/main" val="2141744937"/>
+      </p:ext>
+    </p:extLst>
+  </p:cSld>
+  <p:clrMapOvr>
+    <a:masterClrMapping/>
+  </p:clrMapOvr>
+</p:sld>
+</file>
+
+<file path=ppt/slides/slide95.xml><?xml version="1.0" encoding="utf-8"?>
+<p:sld xmlns:a="http://schemas.openxmlformats.org/drawingml/2006/main" xmlns:r="http://schemas.openxmlformats.org/officeDocument/2006/relationships" xmlns:p="http://schemas.openxmlformats.org/presentationml/2006/main">
+  <p:cSld>
+    <p:spTree>
+      <p:nvGrpSpPr>
+        <p:cNvPr id="1" name=""/>
+        <p:cNvGrpSpPr/>
+        <p:nvPr/>
+      </p:nvGrpSpPr>
+      <p:grpSpPr>
+        <a:xfrm>
+          <a:off x="0" y="0"/>
+          <a:ext cx="0" cy="0"/>
+          <a:chOff x="0" y="0"/>
+          <a:chExt cx="0" cy="0"/>
+        </a:xfrm>
+      </p:grpSpPr>
+      <p:sp>
+        <p:nvSpPr>
+          <p:cNvPr id="4" name="Título 1">
+            <a:extLst>
+              <a:ext uri="{FF2B5EF4-FFF2-40B4-BE49-F238E27FC236}">
+                <a16:creationId xmlns:a16="http://schemas.microsoft.com/office/drawing/2014/main" id="{9CA53688-E304-4704-85E6-8432DC608B05}"/>
+              </a:ext>
+            </a:extLst>
+          </p:cNvPr>
+          <p:cNvSpPr>
+            <a:spLocks noGrp="1"/>
+          </p:cNvSpPr>
+          <p:nvPr>
+            <p:ph type="title"/>
+          </p:nvPr>
+        </p:nvSpPr>
+        <p:spPr>
+          <a:xfrm>
+            <a:off x="680321" y="753228"/>
+            <a:ext cx="9613861" cy="1080938"/>
+          </a:xfrm>
+        </p:spPr>
+        <p:txBody>
+          <a:bodyPr/>
+          <a:lstStyle/>
+          <a:p>
+            <a:r>
+              <a:rPr lang="pt-BR" dirty="0"/>
+              <a:t>Experimento com </a:t>
+            </a:r>
+            <a:r>
+              <a:rPr lang="pt-BR" dirty="0" err="1"/>
+              <a:t>Chaos</a:t>
+            </a:r>
+            <a:r>
+              <a:rPr lang="pt-BR" dirty="0"/>
+              <a:t> Toolkit:</a:t>
+            </a:r>
+            <a:br>
+              <a:rPr lang="pt-BR" dirty="0"/>
+            </a:br>
+            <a:r>
+              <a:rPr lang="pt-BR" dirty="0"/>
+              <a:t>Implementando as Melhorias</a:t>
+            </a:r>
+            <a:endParaRPr lang="pt-BR" dirty="0"/>
+          </a:p>
+        </p:txBody>
+      </p:sp>
+      <p:sp>
+        <p:nvSpPr>
+          <p:cNvPr id="5" name="Espaço Reservado para Conteúdo 2">
+            <a:extLst>
+              <a:ext uri="{FF2B5EF4-FFF2-40B4-BE49-F238E27FC236}">
+                <a16:creationId xmlns:a16="http://schemas.microsoft.com/office/drawing/2014/main" id="{C5B8AB74-06FA-413C-BD74-462D1F01C8FF}"/>
+              </a:ext>
+            </a:extLst>
+          </p:cNvPr>
+          <p:cNvSpPr>
+            <a:spLocks noGrp="1"/>
+          </p:cNvSpPr>
+          <p:nvPr>
+            <p:ph idx="1"/>
+          </p:nvPr>
+        </p:nvSpPr>
+        <p:spPr>
+          <a:xfrm>
+            <a:off x="680321" y="2505456"/>
+            <a:ext cx="9484759" cy="3599316"/>
+          </a:xfrm>
+        </p:spPr>
+        <p:txBody>
+          <a:bodyPr>
+            <a:noAutofit/>
+          </a:bodyPr>
+          <a:lstStyle/>
+          <a:p>
+            <a:pPr>
+              <a:spcAft>
+                <a:spcPts val="1000"/>
+              </a:spcAft>
+            </a:pPr>
+            <a:r>
+              <a:rPr lang="pt-BR" dirty="0"/>
+              <a:t>I</a:t>
+            </a:r>
+          </a:p>
+        </p:txBody>
+      </p:sp>
+    </p:spTree>
+    <p:extLst>
+      <p:ext uri="{BB962C8B-B14F-4D97-AF65-F5344CB8AC3E}">
+        <p14:creationId xmlns:p14="http://schemas.microsoft.com/office/powerpoint/2010/main" val="1012399773"/>
+      </p:ext>
+    </p:extLst>
+  </p:cSld>
+  <p:clrMapOvr>
+    <a:masterClrMapping/>
+  </p:clrMapOvr>
+</p:sld>
+</file>
+
+<file path=ppt/slides/slide96.xml><?xml version="1.0" encoding="utf-8"?>
+<p:sld xmlns:a="http://schemas.openxmlformats.org/drawingml/2006/main" xmlns:r="http://schemas.openxmlformats.org/officeDocument/2006/relationships" xmlns:p="http://schemas.openxmlformats.org/presentationml/2006/main">
+  <p:cSld>
+    <p:spTree>
+      <p:nvGrpSpPr>
+        <p:cNvPr id="1" name=""/>
+        <p:cNvGrpSpPr/>
+        <p:nvPr/>
+      </p:nvGrpSpPr>
+      <p:grpSpPr>
+        <a:xfrm>
+          <a:off x="0" y="0"/>
+          <a:ext cx="0" cy="0"/>
+          <a:chOff x="0" y="0"/>
+          <a:chExt cx="0" cy="0"/>
+        </a:xfrm>
+      </p:grpSpPr>
+      <p:sp>
+        <p:nvSpPr>
+          <p:cNvPr id="4" name="Título 1">
+            <a:extLst>
+              <a:ext uri="{FF2B5EF4-FFF2-40B4-BE49-F238E27FC236}">
+                <a16:creationId xmlns:a16="http://schemas.microsoft.com/office/drawing/2014/main" id="{9CA53688-E304-4704-85E6-8432DC608B05}"/>
+              </a:ext>
+            </a:extLst>
+          </p:cNvPr>
+          <p:cNvSpPr>
+            <a:spLocks noGrp="1"/>
+          </p:cNvSpPr>
+          <p:nvPr>
+            <p:ph type="title"/>
+          </p:nvPr>
+        </p:nvSpPr>
+        <p:spPr>
+          <a:xfrm>
+            <a:off x="680321" y="753228"/>
+            <a:ext cx="9613861" cy="1080938"/>
+          </a:xfrm>
+        </p:spPr>
+        <p:txBody>
+          <a:bodyPr/>
+          <a:lstStyle/>
+          <a:p>
+            <a:r>
+              <a:rPr lang="pt-BR" dirty="0"/>
+              <a:t>Experimento com </a:t>
+            </a:r>
+            <a:r>
+              <a:rPr lang="pt-BR" dirty="0" err="1"/>
+              <a:t>Chaos</a:t>
+            </a:r>
+            <a:r>
+              <a:rPr lang="pt-BR" dirty="0"/>
+              <a:t> Toolkit:</a:t>
+            </a:r>
+            <a:br>
+              <a:rPr lang="pt-BR" dirty="0"/>
+            </a:br>
+            <a:r>
+              <a:rPr lang="pt-BR" dirty="0"/>
+              <a:t>Implementando as Melhorias</a:t>
+            </a:r>
+            <a:endParaRPr lang="pt-BR" dirty="0"/>
+          </a:p>
+        </p:txBody>
+      </p:sp>
+      <p:sp>
+        <p:nvSpPr>
+          <p:cNvPr id="5" name="Espaço Reservado para Conteúdo 2">
+            <a:extLst>
+              <a:ext uri="{FF2B5EF4-FFF2-40B4-BE49-F238E27FC236}">
+                <a16:creationId xmlns:a16="http://schemas.microsoft.com/office/drawing/2014/main" id="{C5B8AB74-06FA-413C-BD74-462D1F01C8FF}"/>
+              </a:ext>
+            </a:extLst>
+          </p:cNvPr>
+          <p:cNvSpPr>
+            <a:spLocks noGrp="1"/>
+          </p:cNvSpPr>
+          <p:nvPr>
+            <p:ph idx="1"/>
+          </p:nvPr>
+        </p:nvSpPr>
+        <p:spPr>
+          <a:xfrm>
+            <a:off x="680321" y="2505456"/>
+            <a:ext cx="9484759" cy="3599316"/>
+          </a:xfrm>
+        </p:spPr>
+        <p:txBody>
+          <a:bodyPr>
+            <a:noAutofit/>
+          </a:bodyPr>
+          <a:lstStyle/>
+          <a:p>
+            <a:pPr>
+              <a:spcAft>
+                <a:spcPts val="1000"/>
+              </a:spcAft>
+            </a:pPr>
+            <a:r>
+              <a:rPr lang="pt-BR" dirty="0"/>
+              <a:t>I</a:t>
+            </a:r>
+          </a:p>
+        </p:txBody>
+      </p:sp>
+    </p:spTree>
+    <p:extLst>
+      <p:ext uri="{BB962C8B-B14F-4D97-AF65-F5344CB8AC3E}">
+        <p14:creationId xmlns:p14="http://schemas.microsoft.com/office/powerpoint/2010/main" val="3182877706"/>
+      </p:ext>
+    </p:extLst>
+  </p:cSld>
+  <p:clrMapOvr>
+    <a:masterClrMapping/>
+  </p:clrMapOvr>
+</p:sld>
+</file>
+
+<file path=ppt/slides/slide97.xml><?xml version="1.0" encoding="utf-8"?>
+<p:sld xmlns:a="http://schemas.openxmlformats.org/drawingml/2006/main" xmlns:r="http://schemas.openxmlformats.org/officeDocument/2006/relationships" xmlns:p="http://schemas.openxmlformats.org/presentationml/2006/main">
+  <p:cSld>
+    <p:spTree>
+      <p:nvGrpSpPr>
+        <p:cNvPr id="1" name=""/>
+        <p:cNvGrpSpPr/>
+        <p:nvPr/>
+      </p:nvGrpSpPr>
+      <p:grpSpPr>
+        <a:xfrm>
+          <a:off x="0" y="0"/>
+          <a:ext cx="0" cy="0"/>
+          <a:chOff x="0" y="0"/>
+          <a:chExt cx="0" cy="0"/>
+        </a:xfrm>
+      </p:grpSpPr>
+      <p:sp>
+        <p:nvSpPr>
+          <p:cNvPr id="4" name="Título 1">
+            <a:extLst>
+              <a:ext uri="{FF2B5EF4-FFF2-40B4-BE49-F238E27FC236}">
+                <a16:creationId xmlns:a16="http://schemas.microsoft.com/office/drawing/2014/main" id="{9CA53688-E304-4704-85E6-8432DC608B05}"/>
+              </a:ext>
+            </a:extLst>
+          </p:cNvPr>
+          <p:cNvSpPr>
+            <a:spLocks noGrp="1"/>
+          </p:cNvSpPr>
+          <p:nvPr>
+            <p:ph type="title"/>
+          </p:nvPr>
+        </p:nvSpPr>
+        <p:spPr>
+          <a:xfrm>
+            <a:off x="680321" y="753228"/>
+            <a:ext cx="9613861" cy="1080938"/>
+          </a:xfrm>
+        </p:spPr>
+        <p:txBody>
+          <a:bodyPr/>
+          <a:lstStyle/>
+          <a:p>
+            <a:r>
+              <a:rPr lang="pt-BR" dirty="0"/>
+              <a:t>Experimento com </a:t>
+            </a:r>
+            <a:r>
+              <a:rPr lang="pt-BR" dirty="0" err="1"/>
+              <a:t>Chaos</a:t>
+            </a:r>
+            <a:r>
+              <a:rPr lang="pt-BR" dirty="0"/>
+              <a:t> Toolkit:</a:t>
+            </a:r>
+            <a:br>
+              <a:rPr lang="pt-BR" dirty="0"/>
+            </a:br>
+            <a:r>
+              <a:rPr lang="pt-BR" dirty="0"/>
+              <a:t>Implementando as Melhorias</a:t>
+            </a:r>
+            <a:endParaRPr lang="pt-BR" dirty="0"/>
+          </a:p>
+        </p:txBody>
+      </p:sp>
+      <p:sp>
+        <p:nvSpPr>
+          <p:cNvPr id="5" name="Espaço Reservado para Conteúdo 2">
+            <a:extLst>
+              <a:ext uri="{FF2B5EF4-FFF2-40B4-BE49-F238E27FC236}">
+                <a16:creationId xmlns:a16="http://schemas.microsoft.com/office/drawing/2014/main" id="{C5B8AB74-06FA-413C-BD74-462D1F01C8FF}"/>
+              </a:ext>
+            </a:extLst>
+          </p:cNvPr>
+          <p:cNvSpPr>
+            <a:spLocks noGrp="1"/>
+          </p:cNvSpPr>
+          <p:nvPr>
+            <p:ph idx="1"/>
+          </p:nvPr>
+        </p:nvSpPr>
+        <p:spPr>
+          <a:xfrm>
+            <a:off x="680321" y="2505456"/>
+            <a:ext cx="9484759" cy="3599316"/>
+          </a:xfrm>
+        </p:spPr>
+        <p:txBody>
+          <a:bodyPr>
+            <a:noAutofit/>
+          </a:bodyPr>
+          <a:lstStyle/>
+          <a:p>
+            <a:pPr>
+              <a:spcAft>
+                <a:spcPts val="1000"/>
+              </a:spcAft>
+            </a:pPr>
+            <a:r>
+              <a:rPr lang="pt-BR" dirty="0"/>
+              <a:t>I</a:t>
+            </a:r>
+          </a:p>
+        </p:txBody>
+      </p:sp>
+    </p:spTree>
+    <p:extLst>
+      <p:ext uri="{BB962C8B-B14F-4D97-AF65-F5344CB8AC3E}">
+        <p14:creationId xmlns:p14="http://schemas.microsoft.com/office/powerpoint/2010/main" val="3464403235"/>
+      </p:ext>
+    </p:extLst>
+  </p:cSld>
+  <p:clrMapOvr>
+    <a:masterClrMapping/>
+  </p:clrMapOvr>
+</p:sld>
+</file>
+
+<file path=ppt/slides/slide98.xml><?xml version="1.0" encoding="utf-8"?>
+<p:sld xmlns:a="http://schemas.openxmlformats.org/drawingml/2006/main" xmlns:r="http://schemas.openxmlformats.org/officeDocument/2006/relationships" xmlns:p="http://schemas.openxmlformats.org/presentationml/2006/main">
+  <p:cSld>
+    <p:spTree>
+      <p:nvGrpSpPr>
+        <p:cNvPr id="1" name=""/>
+        <p:cNvGrpSpPr/>
+        <p:nvPr/>
+      </p:nvGrpSpPr>
+      <p:grpSpPr>
+        <a:xfrm>
+          <a:off x="0" y="0"/>
+          <a:ext cx="0" cy="0"/>
+          <a:chOff x="0" y="0"/>
+          <a:chExt cx="0" cy="0"/>
+        </a:xfrm>
+      </p:grpSpPr>
+      <p:sp>
+        <p:nvSpPr>
+          <p:cNvPr id="4" name="Título 1">
+            <a:extLst>
+              <a:ext uri="{FF2B5EF4-FFF2-40B4-BE49-F238E27FC236}">
+                <a16:creationId xmlns:a16="http://schemas.microsoft.com/office/drawing/2014/main" id="{9CA53688-E304-4704-85E6-8432DC608B05}"/>
+              </a:ext>
+            </a:extLst>
+          </p:cNvPr>
+          <p:cNvSpPr>
+            <a:spLocks noGrp="1"/>
+          </p:cNvSpPr>
+          <p:nvPr>
+            <p:ph type="title"/>
+          </p:nvPr>
+        </p:nvSpPr>
+        <p:spPr>
+          <a:xfrm>
+            <a:off x="680321" y="753228"/>
+            <a:ext cx="9613861" cy="1080938"/>
+          </a:xfrm>
+        </p:spPr>
+        <p:txBody>
+          <a:bodyPr/>
+          <a:lstStyle/>
+          <a:p>
+            <a:r>
+              <a:rPr lang="pt-BR" dirty="0"/>
+              <a:t>Experimento com </a:t>
+            </a:r>
+            <a:r>
+              <a:rPr lang="pt-BR" dirty="0" err="1"/>
+              <a:t>Chaos</a:t>
+            </a:r>
+            <a:r>
+              <a:rPr lang="pt-BR" dirty="0"/>
+              <a:t> Toolkit:</a:t>
+            </a:r>
+            <a:br>
+              <a:rPr lang="pt-BR" dirty="0"/>
+            </a:br>
+            <a:r>
+              <a:rPr lang="pt-BR" dirty="0"/>
+              <a:t>Implementando as Melhorias</a:t>
+            </a:r>
+            <a:endParaRPr lang="pt-BR" dirty="0"/>
+          </a:p>
+        </p:txBody>
+      </p:sp>
+      <p:sp>
+        <p:nvSpPr>
+          <p:cNvPr id="5" name="Espaço Reservado para Conteúdo 2">
+            <a:extLst>
+              <a:ext uri="{FF2B5EF4-FFF2-40B4-BE49-F238E27FC236}">
+                <a16:creationId xmlns:a16="http://schemas.microsoft.com/office/drawing/2014/main" id="{C5B8AB74-06FA-413C-BD74-462D1F01C8FF}"/>
+              </a:ext>
+            </a:extLst>
+          </p:cNvPr>
+          <p:cNvSpPr>
+            <a:spLocks noGrp="1"/>
+          </p:cNvSpPr>
+          <p:nvPr>
+            <p:ph idx="1"/>
+          </p:nvPr>
+        </p:nvSpPr>
+        <p:spPr>
+          <a:xfrm>
+            <a:off x="680321" y="2505456"/>
+            <a:ext cx="9484759" cy="3599316"/>
+          </a:xfrm>
+        </p:spPr>
+        <p:txBody>
+          <a:bodyPr>
+            <a:noAutofit/>
+          </a:bodyPr>
+          <a:lstStyle/>
+          <a:p>
+            <a:pPr>
+              <a:spcAft>
+                <a:spcPts val="1000"/>
+              </a:spcAft>
+            </a:pPr>
+            <a:r>
+              <a:rPr lang="pt-BR" dirty="0"/>
+              <a:t>I</a:t>
+            </a:r>
+          </a:p>
+        </p:txBody>
+      </p:sp>
+    </p:spTree>
+    <p:extLst>
+      <p:ext uri="{BB962C8B-B14F-4D97-AF65-F5344CB8AC3E}">
+        <p14:creationId xmlns:p14="http://schemas.microsoft.com/office/powerpoint/2010/main" val="3118546804"/>
+      </p:ext>
+    </p:extLst>
+  </p:cSld>
+  <p:clrMapOvr>
+    <a:masterClrMapping/>
+  </p:clrMapOvr>
+</p:sld>
+</file>
+
+<file path=ppt/slides/slide99.xml><?xml version="1.0" encoding="utf-8"?>
+<p:sld xmlns:a="http://schemas.openxmlformats.org/drawingml/2006/main" xmlns:r="http://schemas.openxmlformats.org/officeDocument/2006/relationships" xmlns:p="http://schemas.openxmlformats.org/presentationml/2006/main">
+  <p:cSld>
+    <p:spTree>
+      <p:nvGrpSpPr>
+        <p:cNvPr id="1" name=""/>
+        <p:cNvGrpSpPr/>
+        <p:nvPr/>
+      </p:nvGrpSpPr>
+      <p:grpSpPr>
+        <a:xfrm>
+          <a:off x="0" y="0"/>
+          <a:ext cx="0" cy="0"/>
+          <a:chOff x="0" y="0"/>
+          <a:chExt cx="0" cy="0"/>
+        </a:xfrm>
+      </p:grpSpPr>
+      <p:sp>
+        <p:nvSpPr>
+          <p:cNvPr id="4" name="Título 1">
+            <a:extLst>
+              <a:ext uri="{FF2B5EF4-FFF2-40B4-BE49-F238E27FC236}">
+                <a16:creationId xmlns:a16="http://schemas.microsoft.com/office/drawing/2014/main" id="{9CA53688-E304-4704-85E6-8432DC608B05}"/>
+              </a:ext>
+            </a:extLst>
+          </p:cNvPr>
+          <p:cNvSpPr>
+            <a:spLocks noGrp="1"/>
+          </p:cNvSpPr>
+          <p:nvPr>
+            <p:ph type="title"/>
+          </p:nvPr>
+        </p:nvSpPr>
+        <p:spPr>
+          <a:xfrm>
+            <a:off x="680321" y="753228"/>
+            <a:ext cx="9613861" cy="1080938"/>
+          </a:xfrm>
+        </p:spPr>
+        <p:txBody>
+          <a:bodyPr/>
+          <a:lstStyle/>
+          <a:p>
+            <a:r>
+              <a:rPr lang="pt-BR" dirty="0"/>
+              <a:t>Experimento com </a:t>
+            </a:r>
+            <a:r>
+              <a:rPr lang="pt-BR" dirty="0" err="1"/>
+              <a:t>Chaos</a:t>
+            </a:r>
+            <a:r>
+              <a:rPr lang="pt-BR" dirty="0"/>
+              <a:t> Toolkit:</a:t>
+            </a:r>
+            <a:br>
+              <a:rPr lang="pt-BR" dirty="0"/>
+            </a:br>
+            <a:r>
+              <a:rPr lang="pt-BR" dirty="0"/>
+              <a:t>Implementando as Melhorias</a:t>
+            </a:r>
+            <a:endParaRPr lang="pt-BR" dirty="0"/>
+          </a:p>
+        </p:txBody>
+      </p:sp>
+      <p:sp>
+        <p:nvSpPr>
+          <p:cNvPr id="5" name="Espaço Reservado para Conteúdo 2">
+            <a:extLst>
+              <a:ext uri="{FF2B5EF4-FFF2-40B4-BE49-F238E27FC236}">
+                <a16:creationId xmlns:a16="http://schemas.microsoft.com/office/drawing/2014/main" id="{C5B8AB74-06FA-413C-BD74-462D1F01C8FF}"/>
+              </a:ext>
+            </a:extLst>
+          </p:cNvPr>
+          <p:cNvSpPr>
+            <a:spLocks noGrp="1"/>
+          </p:cNvSpPr>
+          <p:nvPr>
+            <p:ph idx="1"/>
+          </p:nvPr>
+        </p:nvSpPr>
+        <p:spPr>
+          <a:xfrm>
+            <a:off x="680321" y="2505456"/>
+            <a:ext cx="9484759" cy="3599316"/>
+          </a:xfrm>
+        </p:spPr>
+        <p:txBody>
+          <a:bodyPr>
+            <a:noAutofit/>
+          </a:bodyPr>
+          <a:lstStyle/>
+          <a:p>
+            <a:pPr>
+              <a:spcAft>
+                <a:spcPts val="1000"/>
+              </a:spcAft>
+            </a:pPr>
+            <a:r>
+              <a:rPr lang="pt-BR" dirty="0"/>
+              <a:t>I</a:t>
+            </a:r>
+          </a:p>
+        </p:txBody>
+      </p:sp>
+    </p:spTree>
+    <p:extLst>
+      <p:ext uri="{BB962C8B-B14F-4D97-AF65-F5344CB8AC3E}">
+        <p14:creationId xmlns:p14="http://schemas.microsoft.com/office/powerpoint/2010/main" val="232034947"/>
       </p:ext>
     </p:extLst>
   </p:cSld>

</xml_diff>

<commit_message>
Chaos Toolkit - Implementando melhorias e visualizando arquivos de log
</commit_message>
<xml_diff>
--- a/docs/Chaos Engineering - Das Hipoteses aos Testes.pptx
+++ b/docs/Chaos Engineering - Das Hipoteses aos Testes.pptx
@@ -78,33 +78,34 @@
     <p:sldId id="327" r:id="rId72"/>
     <p:sldId id="328" r:id="rId73"/>
     <p:sldId id="329" r:id="rId74"/>
-    <p:sldId id="330" r:id="rId75"/>
-    <p:sldId id="331" r:id="rId76"/>
-    <p:sldId id="332" r:id="rId77"/>
-    <p:sldId id="333" r:id="rId78"/>
-    <p:sldId id="334" r:id="rId79"/>
-    <p:sldId id="335" r:id="rId80"/>
-    <p:sldId id="336" r:id="rId81"/>
-    <p:sldId id="337" r:id="rId82"/>
-    <p:sldId id="338" r:id="rId83"/>
-    <p:sldId id="339" r:id="rId84"/>
-    <p:sldId id="340" r:id="rId85"/>
-    <p:sldId id="341" r:id="rId86"/>
-    <p:sldId id="342" r:id="rId87"/>
-    <p:sldId id="343" r:id="rId88"/>
-    <p:sldId id="344" r:id="rId89"/>
-    <p:sldId id="345" r:id="rId90"/>
-    <p:sldId id="346" r:id="rId91"/>
-    <p:sldId id="347" r:id="rId92"/>
-    <p:sldId id="348" r:id="rId93"/>
-    <p:sldId id="349" r:id="rId94"/>
-    <p:sldId id="350" r:id="rId95"/>
-    <p:sldId id="351" r:id="rId96"/>
-    <p:sldId id="352" r:id="rId97"/>
-    <p:sldId id="353" r:id="rId98"/>
-    <p:sldId id="354" r:id="rId99"/>
-    <p:sldId id="355" r:id="rId100"/>
-    <p:sldId id="356" r:id="rId101"/>
+    <p:sldId id="357" r:id="rId75"/>
+    <p:sldId id="330" r:id="rId76"/>
+    <p:sldId id="331" r:id="rId77"/>
+    <p:sldId id="332" r:id="rId78"/>
+    <p:sldId id="333" r:id="rId79"/>
+    <p:sldId id="334" r:id="rId80"/>
+    <p:sldId id="335" r:id="rId81"/>
+    <p:sldId id="336" r:id="rId82"/>
+    <p:sldId id="337" r:id="rId83"/>
+    <p:sldId id="338" r:id="rId84"/>
+    <p:sldId id="339" r:id="rId85"/>
+    <p:sldId id="340" r:id="rId86"/>
+    <p:sldId id="341" r:id="rId87"/>
+    <p:sldId id="342" r:id="rId88"/>
+    <p:sldId id="343" r:id="rId89"/>
+    <p:sldId id="344" r:id="rId90"/>
+    <p:sldId id="345" r:id="rId91"/>
+    <p:sldId id="346" r:id="rId92"/>
+    <p:sldId id="347" r:id="rId93"/>
+    <p:sldId id="348" r:id="rId94"/>
+    <p:sldId id="349" r:id="rId95"/>
+    <p:sldId id="350" r:id="rId96"/>
+    <p:sldId id="351" r:id="rId97"/>
+    <p:sldId id="352" r:id="rId98"/>
+    <p:sldId id="353" r:id="rId99"/>
+    <p:sldId id="354" r:id="rId100"/>
+    <p:sldId id="355" r:id="rId101"/>
+    <p:sldId id="356" r:id="rId102"/>
   </p:sldIdLst>
   <p:sldSz cx="12192000" cy="6858000"/>
   <p:notesSz cx="6858000" cy="9144000"/>
@@ -8134,6 +8135,125 @@
     </p:spTree>
     <p:extLst>
       <p:ext uri="{BB962C8B-B14F-4D97-AF65-F5344CB8AC3E}">
+        <p14:creationId xmlns:p14="http://schemas.microsoft.com/office/powerpoint/2010/main" val="232034947"/>
+      </p:ext>
+    </p:extLst>
+  </p:cSld>
+  <p:clrMapOvr>
+    <a:masterClrMapping/>
+  </p:clrMapOvr>
+</p:sld>
+</file>
+
+<file path=ppt/slides/slide101.xml><?xml version="1.0" encoding="utf-8"?>
+<p:sld xmlns:a="http://schemas.openxmlformats.org/drawingml/2006/main" xmlns:r="http://schemas.openxmlformats.org/officeDocument/2006/relationships" xmlns:p="http://schemas.openxmlformats.org/presentationml/2006/main">
+  <p:cSld>
+    <p:spTree>
+      <p:nvGrpSpPr>
+        <p:cNvPr id="1" name=""/>
+        <p:cNvGrpSpPr/>
+        <p:nvPr/>
+      </p:nvGrpSpPr>
+      <p:grpSpPr>
+        <a:xfrm>
+          <a:off x="0" y="0"/>
+          <a:ext cx="0" cy="0"/>
+          <a:chOff x="0" y="0"/>
+          <a:chExt cx="0" cy="0"/>
+        </a:xfrm>
+      </p:grpSpPr>
+      <p:sp>
+        <p:nvSpPr>
+          <p:cNvPr id="4" name="Título 1">
+            <a:extLst>
+              <a:ext uri="{FF2B5EF4-FFF2-40B4-BE49-F238E27FC236}">
+                <a16:creationId xmlns:a16="http://schemas.microsoft.com/office/drawing/2014/main" id="{9CA53688-E304-4704-85E6-8432DC608B05}"/>
+              </a:ext>
+            </a:extLst>
+          </p:cNvPr>
+          <p:cNvSpPr>
+            <a:spLocks noGrp="1"/>
+          </p:cNvSpPr>
+          <p:nvPr>
+            <p:ph type="title"/>
+          </p:nvPr>
+        </p:nvSpPr>
+        <p:spPr>
+          <a:xfrm>
+            <a:off x="680321" y="753228"/>
+            <a:ext cx="9613861" cy="1080938"/>
+          </a:xfrm>
+        </p:spPr>
+        <p:txBody>
+          <a:bodyPr/>
+          <a:lstStyle/>
+          <a:p>
+            <a:r>
+              <a:rPr lang="pt-BR" dirty="0"/>
+              <a:t>Experimento com </a:t>
+            </a:r>
+            <a:r>
+              <a:rPr lang="pt-BR" dirty="0" err="1"/>
+              <a:t>Chaos</a:t>
+            </a:r>
+            <a:r>
+              <a:rPr lang="pt-BR" dirty="0"/>
+              <a:t> Toolkit:</a:t>
+            </a:r>
+            <a:br>
+              <a:rPr lang="pt-BR" dirty="0"/>
+            </a:br>
+            <a:r>
+              <a:rPr lang="pt-BR" dirty="0"/>
+              <a:t>Implementando as Melhorias</a:t>
+            </a:r>
+            <a:endParaRPr lang="pt-BR" dirty="0"/>
+          </a:p>
+        </p:txBody>
+      </p:sp>
+      <p:sp>
+        <p:nvSpPr>
+          <p:cNvPr id="5" name="Espaço Reservado para Conteúdo 2">
+            <a:extLst>
+              <a:ext uri="{FF2B5EF4-FFF2-40B4-BE49-F238E27FC236}">
+                <a16:creationId xmlns:a16="http://schemas.microsoft.com/office/drawing/2014/main" id="{C5B8AB74-06FA-413C-BD74-462D1F01C8FF}"/>
+              </a:ext>
+            </a:extLst>
+          </p:cNvPr>
+          <p:cNvSpPr>
+            <a:spLocks noGrp="1"/>
+          </p:cNvSpPr>
+          <p:nvPr>
+            <p:ph idx="1"/>
+          </p:nvPr>
+        </p:nvSpPr>
+        <p:spPr>
+          <a:xfrm>
+            <a:off x="680321" y="2505456"/>
+            <a:ext cx="9484759" cy="3599316"/>
+          </a:xfrm>
+        </p:spPr>
+        <p:txBody>
+          <a:bodyPr>
+            <a:noAutofit/>
+          </a:bodyPr>
+          <a:lstStyle/>
+          <a:p>
+            <a:pPr>
+              <a:spcAft>
+                <a:spcPts val="1000"/>
+              </a:spcAft>
+            </a:pPr>
+            <a:r>
+              <a:rPr lang="pt-BR" dirty="0"/>
+              <a:t>I</a:t>
+            </a:r>
+          </a:p>
+        </p:txBody>
+      </p:sp>
+    </p:spTree>
+    <p:extLst>
+      <p:ext uri="{BB962C8B-B14F-4D97-AF65-F5344CB8AC3E}">
         <p14:creationId xmlns:p14="http://schemas.microsoft.com/office/powerpoint/2010/main" val="922689365"/>
       </p:ext>
     </p:extLst>
@@ -9507,8 +9627,24 @@
             </a:pPr>
             <a:r>
               <a:rPr lang="pt-BR" sz="2800" dirty="0"/>
-              <a:t>Executando experimentos automatizados</a:t>
-            </a:r>
+              <a:t>Executando experimentos </a:t>
+            </a:r>
+            <a:r>
+              <a:rPr lang="pt-BR" sz="2800" dirty="0" smtClean="0"/>
+              <a:t>automatizados</a:t>
+            </a:r>
+          </a:p>
+          <a:p>
+            <a:pPr>
+              <a:spcAft>
+                <a:spcPts val="1000"/>
+              </a:spcAft>
+            </a:pPr>
+            <a:r>
+              <a:rPr lang="pt-BR" sz="2800" dirty="0" smtClean="0"/>
+              <a:t>Engenharia do Caos: Do começo ao fim</a:t>
+            </a:r>
+            <a:endParaRPr lang="pt-BR" sz="2800" dirty="0"/>
           </a:p>
           <a:p>
             <a:pPr>
@@ -19954,14 +20090,14 @@
               <a:t>Chaos</a:t>
             </a:r>
             <a:r>
-              <a:rPr lang="pt-BR"/>
+              <a:rPr lang="pt-BR" dirty="0"/>
               <a:t> Toolkit:</a:t>
             </a:r>
             <a:br>
-              <a:rPr lang="pt-BR"/>
+              <a:rPr lang="pt-BR" dirty="0"/>
             </a:br>
             <a:r>
-              <a:rPr lang="pt-BR"/>
+              <a:rPr lang="pt-BR" dirty="0"/>
               <a:t>Validando Melhorias</a:t>
             </a:r>
             <a:endParaRPr lang="pt-BR" dirty="0"/>
@@ -20003,7 +20139,7 @@
             </a:pPr>
             <a:r>
               <a:rPr lang="pt-BR" dirty="0" smtClean="0"/>
-              <a:t>Falha corrigida:</a:t>
+              <a:t>Quando a hipótese de estado não encontra nenhum desvio no sistema temos a falha corrigida.</a:t>
             </a:r>
             <a:endParaRPr lang="pt-BR" dirty="0"/>
           </a:p>
@@ -20031,7 +20167,7 @@
         </p:blipFill>
         <p:spPr>
           <a:xfrm>
-            <a:off x="2136985" y="3224758"/>
+            <a:off x="2136985" y="3382802"/>
             <a:ext cx="6571429" cy="3095238"/>
           </a:xfrm>
           <a:prstGeom prst="rect">
@@ -20112,7 +20248,11 @@
             </a:br>
             <a:r>
               <a:rPr lang="pt-BR" dirty="0"/>
-              <a:t>Implementando Melhorias</a:t>
+              <a:t>Implementando </a:t>
+            </a:r>
+            <a:r>
+              <a:rPr lang="pt-BR" dirty="0" smtClean="0"/>
+              <a:t>Melhorias – Log</a:t>
             </a:r>
             <a:endParaRPr lang="pt-BR" dirty="0"/>
           </a:p>
@@ -20136,8 +20276,8 @@
         </p:nvSpPr>
         <p:spPr>
           <a:xfrm>
-            <a:off x="680321" y="2505456"/>
-            <a:ext cx="9484759" cy="3599316"/>
+            <a:off x="680322" y="2505456"/>
+            <a:ext cx="9061990" cy="3599316"/>
           </a:xfrm>
         </p:spPr>
         <p:txBody>
@@ -20152,9 +20292,104 @@
               </a:spcAft>
             </a:pPr>
             <a:r>
-              <a:rPr lang="pt-BR" dirty="0"/>
-              <a:t>I</a:t>
-            </a:r>
+              <a:rPr lang="pt-BR" dirty="0" smtClean="0"/>
+              <a:t>Ao executar o experimento, dois arquivos são criados: </a:t>
+            </a:r>
+            <a:r>
+              <a:rPr lang="pt-BR" i="1" dirty="0" smtClean="0"/>
+              <a:t>chaostoolkit.log </a:t>
+            </a:r>
+            <a:r>
+              <a:rPr lang="pt-BR" dirty="0" smtClean="0"/>
+              <a:t>e</a:t>
+            </a:r>
+            <a:r>
+              <a:rPr lang="pt-BR" i="1" dirty="0" smtClean="0"/>
+              <a:t> </a:t>
+            </a:r>
+            <a:r>
+              <a:rPr lang="pt-BR" i="1" dirty="0" err="1" smtClean="0"/>
+              <a:t>journal.json</a:t>
+            </a:r>
+            <a:endParaRPr lang="pt-BR" i="1" dirty="0" smtClean="0"/>
+          </a:p>
+          <a:p>
+            <a:pPr>
+              <a:spcAft>
+                <a:spcPts val="1000"/>
+              </a:spcAft>
+            </a:pPr>
+            <a:r>
+              <a:rPr lang="pt-BR" dirty="0"/>
+              <a:t>O</a:t>
+            </a:r>
+            <a:r>
+              <a:rPr lang="pt-BR" i="1" dirty="0"/>
+              <a:t> </a:t>
+            </a:r>
+            <a:r>
+              <a:rPr lang="pt-BR" i="1" dirty="0" smtClean="0"/>
+              <a:t>chaostoolkit.log </a:t>
+            </a:r>
+            <a:r>
+              <a:rPr lang="pt-BR" dirty="0" smtClean="0"/>
+              <a:t>contém o log das operações executadas pelo </a:t>
+            </a:r>
+            <a:r>
+              <a:rPr lang="pt-BR" dirty="0" err="1" smtClean="0"/>
+              <a:t>Chaos</a:t>
+            </a:r>
+            <a:r>
+              <a:rPr lang="pt-BR" dirty="0" smtClean="0"/>
+              <a:t> Toolkit</a:t>
+            </a:r>
+          </a:p>
+          <a:p>
+            <a:pPr>
+              <a:spcAft>
+                <a:spcPts val="1000"/>
+              </a:spcAft>
+            </a:pPr>
+            <a:r>
+              <a:rPr lang="pt-BR" dirty="0" smtClean="0"/>
+              <a:t>O </a:t>
+            </a:r>
+            <a:r>
+              <a:rPr lang="pt-BR" i="1" dirty="0" err="1" smtClean="0"/>
+              <a:t>journal.json</a:t>
+            </a:r>
+            <a:r>
+              <a:rPr lang="pt-BR" dirty="0"/>
+              <a:t> </a:t>
+            </a:r>
+            <a:r>
+              <a:rPr lang="pt-BR" dirty="0" smtClean="0"/>
+              <a:t>contém todas as informações sobre as ações executadas durante o experimento</a:t>
+            </a:r>
+          </a:p>
+          <a:p>
+            <a:pPr>
+              <a:spcAft>
+                <a:spcPts val="1000"/>
+              </a:spcAft>
+            </a:pPr>
+            <a:r>
+              <a:rPr lang="pt-BR" dirty="0"/>
+              <a:t>O </a:t>
+            </a:r>
+            <a:r>
+              <a:rPr lang="pt-BR" i="1" dirty="0" err="1"/>
+              <a:t>journal.json</a:t>
+            </a:r>
+            <a:r>
+              <a:rPr lang="pt-BR" dirty="0"/>
+              <a:t> </a:t>
+            </a:r>
+            <a:r>
+              <a:rPr lang="pt-BR" dirty="0" smtClean="0"/>
+              <a:t>é muito útil para operações automatizadas de pós-experimentos. </a:t>
+            </a:r>
+            <a:endParaRPr lang="pt-BR" i="1" dirty="0"/>
           </a:p>
         </p:txBody>
       </p:sp>
@@ -20190,10 +20425,10 @@
       </p:grpSpPr>
       <p:sp>
         <p:nvSpPr>
-          <p:cNvPr id="4" name="Título 1">
+          <p:cNvPr id="8" name="Título 1">
             <a:extLst>
               <a:ext uri="{FF2B5EF4-FFF2-40B4-BE49-F238E27FC236}">
-                <a16:creationId xmlns:a16="http://schemas.microsoft.com/office/drawing/2014/main" id="{9CA53688-E304-4704-85E6-8432DC608B05}"/>
+                <a16:creationId xmlns:a16="http://schemas.microsoft.com/office/drawing/2014/main" id="{5BCED719-060C-4357-99A7-1C2583E4F254}"/>
               </a:ext>
             </a:extLst>
           </p:cNvPr>
@@ -20201,86 +20436,39 @@
             <a:spLocks noGrp="1"/>
           </p:cNvSpPr>
           <p:nvPr>
-            <p:ph type="title"/>
-          </p:nvPr>
-        </p:nvSpPr>
-        <p:spPr>
-          <a:xfrm>
-            <a:off x="680321" y="753228"/>
-            <a:ext cx="9613861" cy="1080938"/>
+            <p:ph type="ctrTitle"/>
+          </p:nvPr>
+        </p:nvSpPr>
+        <p:spPr>
+          <a:xfrm>
+            <a:off x="1143000" y="2733709"/>
+            <a:ext cx="7681456" cy="1373070"/>
           </a:xfrm>
         </p:spPr>
         <p:txBody>
           <a:bodyPr/>
           <a:lstStyle/>
           <a:p>
-            <a:r>
-              <a:rPr lang="pt-BR" dirty="0"/>
-              <a:t>Experimento com </a:t>
-            </a:r>
-            <a:r>
-              <a:rPr lang="pt-BR" dirty="0" err="1"/>
-              <a:t>Chaos</a:t>
-            </a:r>
-            <a:r>
-              <a:rPr lang="pt-BR" dirty="0"/>
-              <a:t> Toolkit:</a:t>
+            <a:pPr algn="l"/>
+            <a:r>
+              <a:rPr lang="pt-BR" sz="4400" dirty="0" smtClean="0"/>
+              <a:t>ENGENHARIA DO CAOS: </a:t>
             </a:r>
             <a:br>
-              <a:rPr lang="pt-BR" dirty="0"/>
+              <a:rPr lang="pt-BR" sz="4400" dirty="0" smtClean="0"/>
             </a:br>
             <a:r>
-              <a:rPr lang="pt-BR" dirty="0"/>
-              <a:t>Implementando as Melhorias</a:t>
-            </a:r>
-            <a:endParaRPr lang="pt-BR" dirty="0"/>
-          </a:p>
-        </p:txBody>
-      </p:sp>
-      <p:sp>
-        <p:nvSpPr>
-          <p:cNvPr id="5" name="Espaço Reservado para Conteúdo 2">
-            <a:extLst>
-              <a:ext uri="{FF2B5EF4-FFF2-40B4-BE49-F238E27FC236}">
-                <a16:creationId xmlns:a16="http://schemas.microsoft.com/office/drawing/2014/main" id="{C5B8AB74-06FA-413C-BD74-462D1F01C8FF}"/>
-              </a:ext>
-            </a:extLst>
-          </p:cNvPr>
-          <p:cNvSpPr>
-            <a:spLocks noGrp="1"/>
-          </p:cNvSpPr>
-          <p:nvPr>
-            <p:ph idx="1"/>
-          </p:nvPr>
-        </p:nvSpPr>
-        <p:spPr>
-          <a:xfrm>
-            <a:off x="680321" y="2505456"/>
-            <a:ext cx="9484759" cy="3599316"/>
-          </a:xfrm>
-        </p:spPr>
-        <p:txBody>
-          <a:bodyPr>
-            <a:noAutofit/>
-          </a:bodyPr>
-          <a:lstStyle/>
-          <a:p>
-            <a:pPr>
-              <a:spcAft>
-                <a:spcPts val="1000"/>
-              </a:spcAft>
-            </a:pPr>
-            <a:r>
-              <a:rPr lang="pt-BR" dirty="0"/>
-              <a:t>I</a:t>
-            </a:r>
+              <a:rPr lang="pt-BR" sz="4400" dirty="0" smtClean="0"/>
+              <a:t>DO COMEÇO AO FIM</a:t>
+            </a:r>
+            <a:endParaRPr lang="pt-BR" sz="4400" dirty="0"/>
           </a:p>
         </p:txBody>
       </p:sp>
     </p:spTree>
     <p:extLst>
       <p:ext uri="{BB962C8B-B14F-4D97-AF65-F5344CB8AC3E}">
-        <p14:creationId xmlns:p14="http://schemas.microsoft.com/office/powerpoint/2010/main" val="4006977507"/>
+        <p14:creationId xmlns:p14="http://schemas.microsoft.com/office/powerpoint/2010/main" val="4226008484"/>
       </p:ext>
     </p:extLst>
   </p:cSld>
@@ -20399,7 +20587,7 @@
     </p:spTree>
     <p:extLst>
       <p:ext uri="{BB962C8B-B14F-4D97-AF65-F5344CB8AC3E}">
-        <p14:creationId xmlns:p14="http://schemas.microsoft.com/office/powerpoint/2010/main" val="832317490"/>
+        <p14:creationId xmlns:p14="http://schemas.microsoft.com/office/powerpoint/2010/main" val="4006977507"/>
       </p:ext>
     </p:extLst>
   </p:cSld>
@@ -20518,7 +20706,7 @@
     </p:spTree>
     <p:extLst>
       <p:ext uri="{BB962C8B-B14F-4D97-AF65-F5344CB8AC3E}">
-        <p14:creationId xmlns:p14="http://schemas.microsoft.com/office/powerpoint/2010/main" val="2988246251"/>
+        <p14:creationId xmlns:p14="http://schemas.microsoft.com/office/powerpoint/2010/main" val="832317490"/>
       </p:ext>
     </p:extLst>
   </p:cSld>
@@ -20637,7 +20825,7 @@
     </p:spTree>
     <p:extLst>
       <p:ext uri="{BB962C8B-B14F-4D97-AF65-F5344CB8AC3E}">
-        <p14:creationId xmlns:p14="http://schemas.microsoft.com/office/powerpoint/2010/main" val="1980136933"/>
+        <p14:creationId xmlns:p14="http://schemas.microsoft.com/office/powerpoint/2010/main" val="2988246251"/>
       </p:ext>
     </p:extLst>
   </p:cSld>
@@ -20756,7 +20944,7 @@
     </p:spTree>
     <p:extLst>
       <p:ext uri="{BB962C8B-B14F-4D97-AF65-F5344CB8AC3E}">
-        <p14:creationId xmlns:p14="http://schemas.microsoft.com/office/powerpoint/2010/main" val="712599509"/>
+        <p14:creationId xmlns:p14="http://schemas.microsoft.com/office/powerpoint/2010/main" val="1980136933"/>
       </p:ext>
     </p:extLst>
   </p:cSld>
@@ -20875,7 +21063,7 @@
     </p:spTree>
     <p:extLst>
       <p:ext uri="{BB962C8B-B14F-4D97-AF65-F5344CB8AC3E}">
-        <p14:creationId xmlns:p14="http://schemas.microsoft.com/office/powerpoint/2010/main" val="1245950099"/>
+        <p14:creationId xmlns:p14="http://schemas.microsoft.com/office/powerpoint/2010/main" val="712599509"/>
       </p:ext>
     </p:extLst>
   </p:cSld>
@@ -21116,7 +21304,7 @@
     </p:spTree>
     <p:extLst>
       <p:ext uri="{BB962C8B-B14F-4D97-AF65-F5344CB8AC3E}">
-        <p14:creationId xmlns:p14="http://schemas.microsoft.com/office/powerpoint/2010/main" val="3947057208"/>
+        <p14:creationId xmlns:p14="http://schemas.microsoft.com/office/powerpoint/2010/main" val="1245950099"/>
       </p:ext>
     </p:extLst>
   </p:cSld>
@@ -21235,7 +21423,7 @@
     </p:spTree>
     <p:extLst>
       <p:ext uri="{BB962C8B-B14F-4D97-AF65-F5344CB8AC3E}">
-        <p14:creationId xmlns:p14="http://schemas.microsoft.com/office/powerpoint/2010/main" val="548608083"/>
+        <p14:creationId xmlns:p14="http://schemas.microsoft.com/office/powerpoint/2010/main" val="3947057208"/>
       </p:ext>
     </p:extLst>
   </p:cSld>
@@ -21354,7 +21542,7 @@
     </p:spTree>
     <p:extLst>
       <p:ext uri="{BB962C8B-B14F-4D97-AF65-F5344CB8AC3E}">
-        <p14:creationId xmlns:p14="http://schemas.microsoft.com/office/powerpoint/2010/main" val="2536589371"/>
+        <p14:creationId xmlns:p14="http://schemas.microsoft.com/office/powerpoint/2010/main" val="548608083"/>
       </p:ext>
     </p:extLst>
   </p:cSld>
@@ -21473,7 +21661,7 @@
     </p:spTree>
     <p:extLst>
       <p:ext uri="{BB962C8B-B14F-4D97-AF65-F5344CB8AC3E}">
-        <p14:creationId xmlns:p14="http://schemas.microsoft.com/office/powerpoint/2010/main" val="3690110089"/>
+        <p14:creationId xmlns:p14="http://schemas.microsoft.com/office/powerpoint/2010/main" val="2536589371"/>
       </p:ext>
     </p:extLst>
   </p:cSld>
@@ -21592,7 +21780,7 @@
     </p:spTree>
     <p:extLst>
       <p:ext uri="{BB962C8B-B14F-4D97-AF65-F5344CB8AC3E}">
-        <p14:creationId xmlns:p14="http://schemas.microsoft.com/office/powerpoint/2010/main" val="493742300"/>
+        <p14:creationId xmlns:p14="http://schemas.microsoft.com/office/powerpoint/2010/main" val="3690110089"/>
       </p:ext>
     </p:extLst>
   </p:cSld>
@@ -21711,7 +21899,7 @@
     </p:spTree>
     <p:extLst>
       <p:ext uri="{BB962C8B-B14F-4D97-AF65-F5344CB8AC3E}">
-        <p14:creationId xmlns:p14="http://schemas.microsoft.com/office/powerpoint/2010/main" val="1942654230"/>
+        <p14:creationId xmlns:p14="http://schemas.microsoft.com/office/powerpoint/2010/main" val="493742300"/>
       </p:ext>
     </p:extLst>
   </p:cSld>
@@ -21830,7 +22018,7 @@
     </p:spTree>
     <p:extLst>
       <p:ext uri="{BB962C8B-B14F-4D97-AF65-F5344CB8AC3E}">
-        <p14:creationId xmlns:p14="http://schemas.microsoft.com/office/powerpoint/2010/main" val="1629469719"/>
+        <p14:creationId xmlns:p14="http://schemas.microsoft.com/office/powerpoint/2010/main" val="1942654230"/>
       </p:ext>
     </p:extLst>
   </p:cSld>
@@ -21949,7 +22137,7 @@
     </p:spTree>
     <p:extLst>
       <p:ext uri="{BB962C8B-B14F-4D97-AF65-F5344CB8AC3E}">
-        <p14:creationId xmlns:p14="http://schemas.microsoft.com/office/powerpoint/2010/main" val="1928828955"/>
+        <p14:creationId xmlns:p14="http://schemas.microsoft.com/office/powerpoint/2010/main" val="1629469719"/>
       </p:ext>
     </p:extLst>
   </p:cSld>
@@ -22068,7 +22256,7 @@
     </p:spTree>
     <p:extLst>
       <p:ext uri="{BB962C8B-B14F-4D97-AF65-F5344CB8AC3E}">
-        <p14:creationId xmlns:p14="http://schemas.microsoft.com/office/powerpoint/2010/main" val="3336876521"/>
+        <p14:creationId xmlns:p14="http://schemas.microsoft.com/office/powerpoint/2010/main" val="1928828955"/>
       </p:ext>
     </p:extLst>
   </p:cSld>
@@ -22187,7 +22375,7 @@
     </p:spTree>
     <p:extLst>
       <p:ext uri="{BB962C8B-B14F-4D97-AF65-F5344CB8AC3E}">
-        <p14:creationId xmlns:p14="http://schemas.microsoft.com/office/powerpoint/2010/main" val="4257787573"/>
+        <p14:creationId xmlns:p14="http://schemas.microsoft.com/office/powerpoint/2010/main" val="3336876521"/>
       </p:ext>
     </p:extLst>
   </p:cSld>
@@ -22472,7 +22660,7 @@
     </p:spTree>
     <p:extLst>
       <p:ext uri="{BB962C8B-B14F-4D97-AF65-F5344CB8AC3E}">
-        <p14:creationId xmlns:p14="http://schemas.microsoft.com/office/powerpoint/2010/main" val="506737807"/>
+        <p14:creationId xmlns:p14="http://schemas.microsoft.com/office/powerpoint/2010/main" val="4257787573"/>
       </p:ext>
     </p:extLst>
   </p:cSld>
@@ -22591,7 +22779,7 @@
     </p:spTree>
     <p:extLst>
       <p:ext uri="{BB962C8B-B14F-4D97-AF65-F5344CB8AC3E}">
-        <p14:creationId xmlns:p14="http://schemas.microsoft.com/office/powerpoint/2010/main" val="895753721"/>
+        <p14:creationId xmlns:p14="http://schemas.microsoft.com/office/powerpoint/2010/main" val="506737807"/>
       </p:ext>
     </p:extLst>
   </p:cSld>
@@ -22710,7 +22898,7 @@
     </p:spTree>
     <p:extLst>
       <p:ext uri="{BB962C8B-B14F-4D97-AF65-F5344CB8AC3E}">
-        <p14:creationId xmlns:p14="http://schemas.microsoft.com/office/powerpoint/2010/main" val="2350357056"/>
+        <p14:creationId xmlns:p14="http://schemas.microsoft.com/office/powerpoint/2010/main" val="895753721"/>
       </p:ext>
     </p:extLst>
   </p:cSld>
@@ -22829,7 +23017,7 @@
     </p:spTree>
     <p:extLst>
       <p:ext uri="{BB962C8B-B14F-4D97-AF65-F5344CB8AC3E}">
-        <p14:creationId xmlns:p14="http://schemas.microsoft.com/office/powerpoint/2010/main" val="3878320112"/>
+        <p14:creationId xmlns:p14="http://schemas.microsoft.com/office/powerpoint/2010/main" val="2350357056"/>
       </p:ext>
     </p:extLst>
   </p:cSld>
@@ -22948,7 +23136,7 @@
     </p:spTree>
     <p:extLst>
       <p:ext uri="{BB962C8B-B14F-4D97-AF65-F5344CB8AC3E}">
-        <p14:creationId xmlns:p14="http://schemas.microsoft.com/office/powerpoint/2010/main" val="2141744937"/>
+        <p14:creationId xmlns:p14="http://schemas.microsoft.com/office/powerpoint/2010/main" val="3878320112"/>
       </p:ext>
     </p:extLst>
   </p:cSld>
@@ -23067,7 +23255,7 @@
     </p:spTree>
     <p:extLst>
       <p:ext uri="{BB962C8B-B14F-4D97-AF65-F5344CB8AC3E}">
-        <p14:creationId xmlns:p14="http://schemas.microsoft.com/office/powerpoint/2010/main" val="1012399773"/>
+        <p14:creationId xmlns:p14="http://schemas.microsoft.com/office/powerpoint/2010/main" val="2141744937"/>
       </p:ext>
     </p:extLst>
   </p:cSld>
@@ -23186,7 +23374,7 @@
     </p:spTree>
     <p:extLst>
       <p:ext uri="{BB962C8B-B14F-4D97-AF65-F5344CB8AC3E}">
-        <p14:creationId xmlns:p14="http://schemas.microsoft.com/office/powerpoint/2010/main" val="3182877706"/>
+        <p14:creationId xmlns:p14="http://schemas.microsoft.com/office/powerpoint/2010/main" val="1012399773"/>
       </p:ext>
     </p:extLst>
   </p:cSld>
@@ -23305,7 +23493,7 @@
     </p:spTree>
     <p:extLst>
       <p:ext uri="{BB962C8B-B14F-4D97-AF65-F5344CB8AC3E}">
-        <p14:creationId xmlns:p14="http://schemas.microsoft.com/office/powerpoint/2010/main" val="3464403235"/>
+        <p14:creationId xmlns:p14="http://schemas.microsoft.com/office/powerpoint/2010/main" val="3182877706"/>
       </p:ext>
     </p:extLst>
   </p:cSld>
@@ -23424,7 +23612,7 @@
     </p:spTree>
     <p:extLst>
       <p:ext uri="{BB962C8B-B14F-4D97-AF65-F5344CB8AC3E}">
-        <p14:creationId xmlns:p14="http://schemas.microsoft.com/office/powerpoint/2010/main" val="3118546804"/>
+        <p14:creationId xmlns:p14="http://schemas.microsoft.com/office/powerpoint/2010/main" val="3464403235"/>
       </p:ext>
     </p:extLst>
   </p:cSld>
@@ -23543,7 +23731,7 @@
     </p:spTree>
     <p:extLst>
       <p:ext uri="{BB962C8B-B14F-4D97-AF65-F5344CB8AC3E}">
-        <p14:creationId xmlns:p14="http://schemas.microsoft.com/office/powerpoint/2010/main" val="232034947"/>
+        <p14:creationId xmlns:p14="http://schemas.microsoft.com/office/powerpoint/2010/main" val="3118546804"/>
       </p:ext>
     </p:extLst>
   </p:cSld>

</xml_diff>

<commit_message>
Adicionado Pessoas, Práticas e Processos
</commit_message>
<xml_diff>
--- a/docs/Chaos Engineering - Das Hipoteses aos Testes.pptx
+++ b/docs/Chaos Engineering - Das Hipoteses aos Testes.pptx
@@ -486,7 +486,7 @@
           <a:p>
             <a:fld id="{4AAD347D-5ACD-4C99-B74B-A9C85AD731AF}" type="datetimeFigureOut">
               <a:rPr lang="en-US" smtClean="0"/>
-              <a:t>10/1/2019</a:t>
+              <a:t>10/5/2019</a:t>
             </a:fld>
             <a:endParaRPr lang="en-US" dirty="0"/>
           </a:p>
@@ -901,7 +901,7 @@
           <a:p>
             <a:fld id="{4509A250-FF31-4206-8172-F9D3106AACB1}" type="datetimeFigureOut">
               <a:rPr lang="en-US" smtClean="0"/>
-              <a:t>10/1/2019</a:t>
+              <a:t>10/5/2019</a:t>
             </a:fld>
             <a:endParaRPr lang="en-US" dirty="0"/>
           </a:p>
@@ -1237,7 +1237,7 @@
           <a:p>
             <a:fld id="{4509A250-FF31-4206-8172-F9D3106AACB1}" type="datetimeFigureOut">
               <a:rPr lang="en-US" smtClean="0"/>
-              <a:t>10/1/2019</a:t>
+              <a:t>10/5/2019</a:t>
             </a:fld>
             <a:endParaRPr lang="en-US" dirty="0"/>
           </a:p>
@@ -1642,7 +1642,7 @@
           <a:p>
             <a:fld id="{4AAD347D-5ACD-4C99-B74B-A9C85AD731AF}" type="datetimeFigureOut">
               <a:rPr lang="en-US" smtClean="0"/>
-              <a:t>10/1/2019</a:t>
+              <a:t>10/5/2019</a:t>
             </a:fld>
             <a:endParaRPr lang="en-US" dirty="0"/>
           </a:p>
@@ -2211,7 +2211,7 @@
           <a:p>
             <a:fld id="{4AAD347D-5ACD-4C99-B74B-A9C85AD731AF}" type="datetimeFigureOut">
               <a:rPr lang="en-US" smtClean="0"/>
-              <a:t>10/1/2019</a:t>
+              <a:t>10/5/2019</a:t>
             </a:fld>
             <a:endParaRPr lang="en-US" dirty="0"/>
           </a:p>
@@ -2893,7 +2893,7 @@
           <a:p>
             <a:fld id="{4509A250-FF31-4206-8172-F9D3106AACB1}" type="datetimeFigureOut">
               <a:rPr lang="en-US" smtClean="0"/>
-              <a:t>10/1/2019</a:t>
+              <a:t>10/5/2019</a:t>
             </a:fld>
             <a:endParaRPr lang="en-US" dirty="0"/>
           </a:p>
@@ -3806,7 +3806,7 @@
           <a:p>
             <a:fld id="{4509A250-FF31-4206-8172-F9D3106AACB1}" type="datetimeFigureOut">
               <a:rPr lang="en-US" smtClean="0"/>
-              <a:t>10/1/2019</a:t>
+              <a:t>10/5/2019</a:t>
             </a:fld>
             <a:endParaRPr lang="en-US" dirty="0"/>
           </a:p>
@@ -4119,7 +4119,7 @@
           <a:p>
             <a:fld id="{4AAD347D-5ACD-4C99-B74B-A9C85AD731AF}" type="datetimeFigureOut">
               <a:rPr lang="en-US" smtClean="0"/>
-              <a:t>10/1/2019</a:t>
+              <a:t>10/5/2019</a:t>
             </a:fld>
             <a:endParaRPr lang="en-US" dirty="0"/>
           </a:p>
@@ -4384,7 +4384,7 @@
           <a:p>
             <a:fld id="{4AAD347D-5ACD-4C99-B74B-A9C85AD731AF}" type="datetimeFigureOut">
               <a:rPr lang="en-US" smtClean="0"/>
-              <a:t>10/1/2019</a:t>
+              <a:t>10/5/2019</a:t>
             </a:fld>
             <a:endParaRPr lang="en-US" dirty="0"/>
           </a:p>
@@ -4708,7 +4708,7 @@
           <a:p>
             <a:fld id="{4AAD347D-5ACD-4C99-B74B-A9C85AD731AF}" type="datetimeFigureOut">
               <a:rPr lang="en-US" smtClean="0"/>
-              <a:t>10/1/2019</a:t>
+              <a:t>10/5/2019</a:t>
             </a:fld>
             <a:endParaRPr lang="en-US" dirty="0"/>
           </a:p>
@@ -5098,7 +5098,7 @@
           <a:p>
             <a:fld id="{9796027F-7875-4030-9381-8BD8C4F21935}" type="datetimeFigureOut">
               <a:rPr lang="en-US" smtClean="0"/>
-              <a:t>10/1/2019</a:t>
+              <a:t>10/5/2019</a:t>
             </a:fld>
             <a:endParaRPr lang="en-US" dirty="0"/>
           </a:p>
@@ -5474,7 +5474,7 @@
           <a:p>
             <a:fld id="{9796027F-7875-4030-9381-8BD8C4F21935}" type="datetimeFigureOut">
               <a:rPr lang="en-US" smtClean="0"/>
-              <a:t>10/1/2019</a:t>
+              <a:t>10/5/2019</a:t>
             </a:fld>
             <a:endParaRPr lang="en-US" dirty="0"/>
           </a:p>
@@ -5980,7 +5980,7 @@
           <a:p>
             <a:fld id="{9796027F-7875-4030-9381-8BD8C4F21935}" type="datetimeFigureOut">
               <a:rPr lang="en-US" smtClean="0"/>
-              <a:t>10/1/2019</a:t>
+              <a:t>10/5/2019</a:t>
             </a:fld>
             <a:endParaRPr lang="en-US" dirty="0"/>
           </a:p>
@@ -6237,7 +6237,7 @@
           <a:p>
             <a:fld id="{4AAD347D-5ACD-4C99-B74B-A9C85AD731AF}" type="datetimeFigureOut">
               <a:rPr lang="en-US" smtClean="0"/>
-              <a:t>10/1/2019</a:t>
+              <a:t>10/5/2019</a:t>
             </a:fld>
             <a:endParaRPr lang="en-US" dirty="0"/>
           </a:p>
@@ -6401,7 +6401,7 @@
           <a:p>
             <a:fld id="{4509A250-FF31-4206-8172-F9D3106AACB1}" type="datetimeFigureOut">
               <a:rPr lang="en-US" smtClean="0"/>
-              <a:t>10/1/2019</a:t>
+              <a:t>10/5/2019</a:t>
             </a:fld>
             <a:endParaRPr lang="en-US" dirty="0"/>
           </a:p>
@@ -6791,7 +6791,7 @@
           <a:p>
             <a:fld id="{4509A250-FF31-4206-8172-F9D3106AACB1}" type="datetimeFigureOut">
               <a:rPr lang="en-US" smtClean="0"/>
-              <a:t>10/1/2019</a:t>
+              <a:t>10/5/2019</a:t>
             </a:fld>
             <a:endParaRPr lang="en-US" dirty="0"/>
           </a:p>
@@ -7200,7 +7200,7 @@
           <a:p>
             <a:fld id="{4509A250-FF31-4206-8172-F9D3106AACB1}" type="datetimeFigureOut">
               <a:rPr lang="en-US" smtClean="0"/>
-              <a:t>10/1/2019</a:t>
+              <a:t>10/5/2019</a:t>
             </a:fld>
             <a:endParaRPr lang="en-US" dirty="0"/>
           </a:p>
@@ -7444,7 +7444,7 @@
           <a:p>
             <a:fld id="{4AAD347D-5ACD-4C99-B74B-A9C85AD731AF}" type="datetimeFigureOut">
               <a:rPr lang="en-US" smtClean="0"/>
-              <a:t>10/1/2019</a:t>
+              <a:t>10/5/2019</a:t>
             </a:fld>
             <a:endParaRPr lang="en-US" dirty="0"/>
           </a:p>
@@ -8088,7 +8088,6 @@
               <a:rPr lang="pt-BR" dirty="0"/>
               <a:t>Implementando as Melhorias</a:t>
             </a:r>
-            <a:endParaRPr lang="pt-BR" dirty="0"/>
           </a:p>
         </p:txBody>
       </p:sp>
@@ -8207,7 +8206,6 @@
               <a:rPr lang="pt-BR" dirty="0"/>
               <a:t>Implementando as Melhorias</a:t>
             </a:r>
-            <a:endParaRPr lang="pt-BR" dirty="0"/>
           </a:p>
         </p:txBody>
       </p:sp>
@@ -9627,11 +9625,7 @@
             </a:pPr>
             <a:r>
               <a:rPr lang="pt-BR" sz="2800" dirty="0"/>
-              <a:t>Executando experimentos </a:t>
-            </a:r>
-            <a:r>
-              <a:rPr lang="pt-BR" sz="2800" dirty="0" smtClean="0"/>
-              <a:t>automatizados</a:t>
+              <a:t>Executando experimentos automatizados</a:t>
             </a:r>
           </a:p>
           <a:p>
@@ -9641,10 +9635,9 @@
               </a:spcAft>
             </a:pPr>
             <a:r>
-              <a:rPr lang="pt-BR" sz="2800" dirty="0" smtClean="0"/>
+              <a:rPr lang="pt-BR" sz="2800" dirty="0"/>
               <a:t>Engenharia do Caos: Do começo ao fim</a:t>
             </a:r>
-            <a:endParaRPr lang="pt-BR" sz="2800" dirty="0"/>
           </a:p>
           <a:p>
             <a:pPr>
@@ -12197,10 +12190,6 @@
             <a:br>
               <a:rPr lang="pt-BR" sz="2200" dirty="0"/>
             </a:br>
-            <a:r>
-              <a:rPr lang="pt-BR" sz="2200" dirty="0"/>
-              <a:t/>
-            </a:r>
             <a:br>
               <a:rPr lang="pt-BR" sz="2200" dirty="0"/>
             </a:br>
@@ -12485,10 +12474,6 @@
               <a:rPr lang="pt-BR" sz="2200" dirty="0" err="1"/>
               <a:t>Steady-State</a:t>
             </a:r>
-            <a:r>
-              <a:rPr lang="pt-BR" sz="2200" dirty="0"/>
-              <a:t/>
-            </a:r>
             <a:br>
               <a:rPr lang="pt-BR" sz="2200" dirty="0"/>
             </a:br>
@@ -12524,10 +12509,6 @@
             <a:r>
               <a:rPr lang="pt-BR" sz="2200" dirty="0" err="1"/>
               <a:t>Rollbacks</a:t>
-            </a:r>
-            <a:r>
-              <a:rPr lang="pt-BR" sz="2200" dirty="0"/>
-              <a:t/>
             </a:r>
             <a:br>
               <a:rPr lang="pt-BR" sz="2200" dirty="0"/>
@@ -15492,7 +15473,7 @@
                 <a16:creationId xmlns:a16="http://schemas.microsoft.com/office/drawing/2014/main" id="{AC3E6C53-102E-4ACA-BCBB-3CC973B99486}"/>
               </a:ext>
               <a:ext uri="{C183D7F6-B498-43B3-948B-1728B52AA6E4}">
-                <adec:decorative xmlns:adec="http://schemas.microsoft.com/office/drawing/2017/decorative" xmlns="" val="1"/>
+                <adec:decorative xmlns:adec="http://schemas.microsoft.com/office/drawing/2017/decorative" val="1"/>
               </a:ext>
             </a:extLst>
           </p:cNvPr>
@@ -15538,7 +15519,7 @@
                 <a16:creationId xmlns:a16="http://schemas.microsoft.com/office/drawing/2014/main" id="{17B2B42C-0777-4D6E-9432-535281803A88}"/>
               </a:ext>
               <a:ext uri="{C183D7F6-B498-43B3-948B-1728B52AA6E4}">
-                <adec:decorative xmlns:adec="http://schemas.microsoft.com/office/drawing/2017/decorative" xmlns="" val="1"/>
+                <adec:decorative xmlns:adec="http://schemas.microsoft.com/office/drawing/2017/decorative" val="1"/>
               </a:ext>
             </a:extLst>
           </p:cNvPr>
@@ -15583,7 +15564,7 @@
                 <a16:creationId xmlns:a16="http://schemas.microsoft.com/office/drawing/2014/main" id="{EFEAAB60-93E2-4DC6-99AC-939637BCE864}"/>
               </a:ext>
               <a:ext uri="{C183D7F6-B498-43B3-948B-1728B52AA6E4}">
-                <adec:decorative xmlns:adec="http://schemas.microsoft.com/office/drawing/2017/decorative" xmlns="" val="1"/>
+                <adec:decorative xmlns:adec="http://schemas.microsoft.com/office/drawing/2017/decorative" val="1"/>
               </a:ext>
             </a:extLst>
           </p:cNvPr>
@@ -15628,7 +15609,7 @@
                 <a16:creationId xmlns:a16="http://schemas.microsoft.com/office/drawing/2014/main" id="{7EF5ECB8-D49C-48FB-A93E-88EB2FFDFD42}"/>
               </a:ext>
               <a:ext uri="{C183D7F6-B498-43B3-948B-1728B52AA6E4}">
-                <adec:decorative xmlns:adec="http://schemas.microsoft.com/office/drawing/2017/decorative" xmlns="" val="1"/>
+                <adec:decorative xmlns:adec="http://schemas.microsoft.com/office/drawing/2017/decorative" val="1"/>
               </a:ext>
             </a:extLst>
           </p:cNvPr>
@@ -15686,7 +15667,7 @@
                 <a16:creationId xmlns:a16="http://schemas.microsoft.com/office/drawing/2014/main" id="{411B77A2-BD5C-432D-B52E-C12612C74C17}"/>
               </a:ext>
               <a:ext uri="{C183D7F6-B498-43B3-948B-1728B52AA6E4}">
-                <adec:decorative xmlns:adec="http://schemas.microsoft.com/office/drawing/2017/decorative" xmlns="" val="1"/>
+                <adec:decorative xmlns:adec="http://schemas.microsoft.com/office/drawing/2017/decorative" val="1"/>
               </a:ext>
             </a:extLst>
           </p:cNvPr>
@@ -15741,7 +15722,7 @@
                 <a16:creationId xmlns:a16="http://schemas.microsoft.com/office/drawing/2014/main" id="{B5C18694-F55B-41C0-ABF3-C1D971F99ADB}"/>
               </a:ext>
               <a:ext uri="{C183D7F6-B498-43B3-948B-1728B52AA6E4}">
-                <adec:decorative xmlns:adec="http://schemas.microsoft.com/office/drawing/2017/decorative" xmlns="" val="1"/>
+                <adec:decorative xmlns:adec="http://schemas.microsoft.com/office/drawing/2017/decorative" val="1"/>
               </a:ext>
             </a:extLst>
           </p:cNvPr>
@@ -15801,7 +15782,7 @@
                 <a16:creationId xmlns:a16="http://schemas.microsoft.com/office/drawing/2014/main" id="{E3E46CA8-7278-4BA3-AACE-235B5B3B53E0}"/>
               </a:ext>
               <a:ext uri="{C183D7F6-B498-43B3-948B-1728B52AA6E4}">
-                <adec:decorative xmlns:adec="http://schemas.microsoft.com/office/drawing/2017/decorative" xmlns="" val="1"/>
+                <adec:decorative xmlns:adec="http://schemas.microsoft.com/office/drawing/2017/decorative" val="1"/>
               </a:ext>
             </a:extLst>
           </p:cNvPr>
@@ -18181,10 +18162,6 @@
               </a:spcAft>
               <a:buNone/>
             </a:pPr>
-            <a:r>
-              <a:rPr lang="pt-BR" dirty="0"/>
-              <a:t/>
-            </a:r>
             <a:br>
               <a:rPr lang="pt-BR" dirty="0"/>
             </a:br>
@@ -18378,31 +18355,15 @@
             <a:br>
               <a:rPr lang="pt-BR" dirty="0"/>
             </a:br>
-            <a:r>
-              <a:rPr lang="pt-BR" dirty="0"/>
-              <a:t/>
-            </a:r>
             <a:br>
               <a:rPr lang="pt-BR" dirty="0"/>
             </a:br>
-            <a:r>
-              <a:rPr lang="pt-BR" dirty="0"/>
-              <a:t/>
-            </a:r>
             <a:br>
               <a:rPr lang="pt-BR" dirty="0"/>
             </a:br>
-            <a:r>
-              <a:rPr lang="pt-BR" dirty="0"/>
-              <a:t/>
-            </a:r>
             <a:br>
               <a:rPr lang="pt-BR" dirty="0"/>
             </a:br>
-            <a:r>
-              <a:rPr lang="pt-BR" dirty="0"/>
-              <a:t/>
-            </a:r>
             <a:br>
               <a:rPr lang="pt-BR" dirty="0"/>
             </a:br>
@@ -18726,12 +18687,8 @@
               </a:spcAft>
             </a:pPr>
             <a:r>
-              <a:rPr lang="pt-BR" dirty="0" smtClean="0"/>
-              <a:t>Por dentro </a:t>
-            </a:r>
-            <a:r>
-              <a:rPr lang="pt-BR" dirty="0"/>
-              <a:t>da execução do comando </a:t>
+              <a:rPr lang="pt-BR" dirty="0"/>
+              <a:t>Por dentro da execução do comando </a:t>
             </a:r>
             <a:r>
               <a:rPr lang="pt-BR" i="1" dirty="0" err="1"/>
@@ -18764,14 +18721,14 @@
               <a:t>Esse passo também pode ser executado com o comando </a:t>
             </a:r>
             <a:r>
-              <a:rPr lang="pt-BR" i="1" dirty="0" err="1" smtClean="0">
+              <a:rPr lang="pt-BR" i="1" dirty="0" err="1">
                 <a:highlight>
                   <a:srgbClr val="000000"/>
                 </a:highlight>
               </a:rPr>
               <a:t>validate</a:t>
             </a:r>
-            <a:endParaRPr lang="pt-BR" i="1" dirty="0" smtClean="0">
+            <a:endParaRPr lang="pt-BR" i="1" dirty="0">
               <a:highlight>
                 <a:srgbClr val="000000"/>
               </a:highlight>
@@ -18784,15 +18741,15 @@
               </a:spcAft>
             </a:pPr>
             <a:r>
-              <a:rPr lang="pt-BR" dirty="0" smtClean="0"/>
+              <a:rPr lang="pt-BR" dirty="0"/>
               <a:t>Uma vez que o experimento seja válido o </a:t>
             </a:r>
             <a:r>
-              <a:rPr lang="pt-BR" dirty="0" err="1" smtClean="0"/>
+              <a:rPr lang="pt-BR" dirty="0" err="1"/>
               <a:t>Chaos</a:t>
             </a:r>
             <a:r>
-              <a:rPr lang="pt-BR" dirty="0" smtClean="0"/>
+              <a:rPr lang="pt-BR" dirty="0"/>
               <a:t> Toolkit orquestra a sua execução.</a:t>
             </a:r>
           </a:p>
@@ -18803,10 +18760,9 @@
               </a:spcAft>
             </a:pPr>
             <a:r>
-              <a:rPr lang="pt-BR" dirty="0" smtClean="0"/>
+              <a:rPr lang="pt-BR" dirty="0"/>
               <a:t>A execução é baseada nas definições do experimento.</a:t>
             </a:r>
-            <a:endParaRPr lang="pt-BR" dirty="0"/>
           </a:p>
           <a:p>
             <a:pPr>
@@ -18934,15 +18890,15 @@
               </a:spcAft>
             </a:pPr>
             <a:r>
-              <a:rPr lang="pt-BR" dirty="0" smtClean="0"/>
+              <a:rPr lang="pt-BR" dirty="0"/>
               <a:t>Processo de execução de experimento do </a:t>
             </a:r>
             <a:r>
-              <a:rPr lang="pt-BR" dirty="0" err="1" smtClean="0"/>
+              <a:rPr lang="pt-BR" dirty="0" err="1"/>
               <a:t>Chaos</a:t>
             </a:r>
             <a:r>
-              <a:rPr lang="pt-BR" dirty="0" smtClean="0"/>
+              <a:rPr lang="pt-BR" dirty="0"/>
               <a:t> Toolkit:</a:t>
             </a:r>
           </a:p>
@@ -19090,7 +19046,7 @@
               </a:spcAft>
             </a:pPr>
             <a:r>
-              <a:rPr lang="pt-BR" dirty="0" smtClean="0"/>
+              <a:rPr lang="pt-BR" dirty="0"/>
               <a:t>Com o diagrama podemos observar que:</a:t>
             </a:r>
           </a:p>
@@ -19101,12 +19057,8 @@
               </a:spcAft>
             </a:pPr>
             <a:r>
-              <a:rPr lang="pt-BR" dirty="0" smtClean="0"/>
-              <a:t>A hipótese de estado do sistema é usada dua</a:t>
-            </a:r>
-            <a:r>
-              <a:rPr lang="pt-BR" dirty="0" smtClean="0"/>
-              <a:t>s vezes no processo.</a:t>
+              <a:rPr lang="pt-BR" dirty="0"/>
+              <a:t>A hipótese de estado do sistema é usada duas vezes no processo.</a:t>
             </a:r>
           </a:p>
           <a:p>
@@ -19116,7 +19068,7 @@
               </a:spcAft>
             </a:pPr>
             <a:r>
-              <a:rPr lang="pt-BR" dirty="0" smtClean="0"/>
+              <a:rPr lang="pt-BR" dirty="0"/>
               <a:t>A hipótese de estado é usada para verificar se o sistema se encontra em seu estado normal.</a:t>
             </a:r>
           </a:p>
@@ -19127,7 +19079,7 @@
               </a:spcAft>
             </a:pPr>
             <a:r>
-              <a:rPr lang="pt-BR" dirty="0" smtClean="0"/>
+              <a:rPr lang="pt-BR" dirty="0"/>
               <a:t>E também para verificar se o sistema irá se comportar como o esperado de acordo com as condições previamente definidas.</a:t>
             </a:r>
           </a:p>
@@ -19138,10 +19090,9 @@
               </a:spcAft>
             </a:pPr>
             <a:r>
-              <a:rPr lang="pt-BR" dirty="0" smtClean="0"/>
+              <a:rPr lang="pt-BR" dirty="0"/>
               <a:t>Qualquer comportamento fora do esperado pode indicar um ponto fraco em questão.</a:t>
             </a:r>
-            <a:endParaRPr lang="pt-BR" dirty="0"/>
           </a:p>
         </p:txBody>
       </p:sp>
@@ -19249,7 +19200,7 @@
               </a:spcAft>
             </a:pPr>
             <a:r>
-              <a:rPr lang="pt-BR" dirty="0" smtClean="0"/>
+              <a:rPr lang="pt-BR" dirty="0"/>
               <a:t>Os comportamentos inesperados durante a execução de um experimento indicam uma oportunidade para melhorias.</a:t>
             </a:r>
           </a:p>
@@ -19260,16 +19211,8 @@
               </a:spcAft>
             </a:pPr>
             <a:r>
-              <a:rPr lang="pt-BR" dirty="0" smtClean="0"/>
-              <a:t>Mais ainda, encontrar uma falha </a:t>
-            </a:r>
-            <a:r>
-              <a:rPr lang="pt-BR" dirty="0" smtClean="0"/>
-              <a:t>durante</a:t>
-            </a:r>
-            <a:r>
-              <a:rPr lang="pt-BR" dirty="0" smtClean="0"/>
-              <a:t> um experimento significa encontrá-la antes do usuário final.</a:t>
+              <a:rPr lang="pt-BR" dirty="0"/>
+              <a:t>Mais ainda, encontrar uma falha durante um experimento significa encontrá-la antes do usuário final.</a:t>
             </a:r>
           </a:p>
           <a:p>
@@ -19279,15 +19222,15 @@
               </a:spcAft>
             </a:pPr>
             <a:r>
-              <a:rPr lang="pt-BR" dirty="0" smtClean="0"/>
+              <a:rPr lang="pt-BR" dirty="0"/>
               <a:t>Voltando ao nosso experimento, uma olhada no arquivo </a:t>
             </a:r>
             <a:r>
-              <a:rPr lang="pt-BR" i="1" dirty="0" smtClean="0"/>
+              <a:rPr lang="pt-BR" i="1" dirty="0"/>
               <a:t>service.py</a:t>
             </a:r>
             <a:r>
-              <a:rPr lang="pt-BR" dirty="0" smtClean="0"/>
+              <a:rPr lang="pt-BR" dirty="0"/>
               <a:t> indicará a falha.</a:t>
             </a:r>
           </a:p>
@@ -19298,10 +19241,9 @@
               </a:spcAft>
             </a:pPr>
             <a:r>
-              <a:rPr lang="pt-BR" dirty="0" smtClean="0"/>
+              <a:rPr lang="pt-BR" dirty="0"/>
               <a:t>Ao assumir que o arquivo Exchange.dat sempre estará presente o serviço irá falhar se o mesmo não estará presente.</a:t>
             </a:r>
-            <a:endParaRPr lang="pt-BR" dirty="0"/>
           </a:p>
         </p:txBody>
       </p:sp>
@@ -19377,10 +19319,9 @@
               <a:rPr lang="pt-BR" dirty="0"/>
             </a:br>
             <a:r>
-              <a:rPr lang="pt-BR" dirty="0" smtClean="0"/>
+              <a:rPr lang="pt-BR" dirty="0"/>
               <a:t>Implementando Melhorias</a:t>
             </a:r>
-            <a:endParaRPr lang="pt-BR" dirty="0"/>
           </a:p>
         </p:txBody>
       </p:sp>
@@ -19418,7 +19359,7 @@
               </a:spcAft>
             </a:pPr>
             <a:r>
-              <a:rPr lang="pt-BR" dirty="0" smtClean="0"/>
+              <a:rPr lang="pt-BR" dirty="0"/>
               <a:t>Em nossa hipótese indicamos que o serviço deveria ter resiliência a essa falha.</a:t>
             </a:r>
           </a:p>
@@ -19429,10 +19370,9 @@
               </a:spcAft>
             </a:pPr>
             <a:r>
-              <a:rPr lang="pt-BR" dirty="0" smtClean="0"/>
+              <a:rPr lang="pt-BR" dirty="0"/>
               <a:t>Em alguns casos a fase da análise por si só exigirá um certo esforço.</a:t>
             </a:r>
-            <a:endParaRPr lang="pt-BR" dirty="0" smtClean="0"/>
           </a:p>
           <a:p>
             <a:pPr>
@@ -19441,7 +19381,7 @@
               </a:spcAft>
             </a:pPr>
             <a:r>
-              <a:rPr lang="pt-BR" dirty="0" smtClean="0"/>
+              <a:rPr lang="pt-BR" dirty="0"/>
               <a:t>Depois da descoberta de uma possível falha, os esforços devem ser direcionados a correção da mesma.</a:t>
             </a:r>
           </a:p>
@@ -19452,7 +19392,7 @@
               </a:spcAft>
             </a:pPr>
             <a:r>
-              <a:rPr lang="pt-BR" dirty="0" smtClean="0"/>
+              <a:rPr lang="pt-BR" dirty="0"/>
               <a:t>Os pontos críticos devem ser priorizados.</a:t>
             </a:r>
           </a:p>
@@ -19703,7 +19643,6 @@
               <a:rPr lang="pt-BR" dirty="0"/>
               <a:t>Implementando Melhorias</a:t>
             </a:r>
-            <a:endParaRPr lang="pt-BR" dirty="0"/>
           </a:p>
         </p:txBody>
       </p:sp>
@@ -19741,7 +19680,7 @@
               </a:spcAft>
             </a:pPr>
             <a:r>
-              <a:rPr lang="pt-BR" dirty="0" smtClean="0"/>
+              <a:rPr lang="pt-BR" dirty="0"/>
               <a:t>Como temos um serviço muito simples a resolução é fácil.</a:t>
             </a:r>
           </a:p>
@@ -19752,11 +19691,11 @@
               </a:spcAft>
             </a:pPr>
             <a:r>
-              <a:rPr lang="pt-BR" dirty="0" smtClean="0"/>
+              <a:rPr lang="pt-BR" dirty="0"/>
               <a:t>A implementação resiliente se encontra no arquivo </a:t>
             </a:r>
             <a:r>
-              <a:rPr lang="pt-BR" i="1" dirty="0" smtClean="0"/>
+              <a:rPr lang="pt-BR" i="1" dirty="0"/>
               <a:t>resilient-service.py</a:t>
             </a:r>
           </a:p>
@@ -19767,15 +19706,15 @@
               </a:spcAft>
             </a:pPr>
             <a:r>
-              <a:rPr lang="pt-BR" dirty="0" smtClean="0"/>
+              <a:rPr lang="pt-BR" dirty="0"/>
               <a:t>O mesmo checa a existência do arquivo </a:t>
             </a:r>
             <a:r>
-              <a:rPr lang="pt-BR" i="1" dirty="0" smtClean="0"/>
+              <a:rPr lang="pt-BR" i="1" dirty="0"/>
               <a:t>exchange.dat </a:t>
             </a:r>
             <a:r>
-              <a:rPr lang="pt-BR" dirty="0" smtClean="0"/>
+              <a:rPr lang="pt-BR" dirty="0"/>
               <a:t>e caso não encontre o mesmo retorna uma mensagem de erro.</a:t>
             </a:r>
           </a:p>
@@ -19786,10 +19725,9 @@
               </a:spcAft>
             </a:pPr>
             <a:r>
-              <a:rPr lang="pt-BR" dirty="0" smtClean="0"/>
+              <a:rPr lang="pt-BR" dirty="0"/>
               <a:t> </a:t>
             </a:r>
-            <a:endParaRPr lang="pt-BR" dirty="0"/>
           </a:p>
         </p:txBody>
       </p:sp>
@@ -19895,14 +19833,9 @@
               <a:rPr lang="pt-BR" dirty="0"/>
             </a:br>
             <a:r>
-              <a:rPr lang="pt-BR" dirty="0" smtClean="0"/>
-              <a:t>Validando </a:t>
-            </a:r>
-            <a:r>
-              <a:rPr lang="pt-BR" dirty="0"/>
-              <a:t>Melhorias</a:t>
-            </a:r>
-            <a:endParaRPr lang="pt-BR" dirty="0"/>
+              <a:rPr lang="pt-BR" dirty="0"/>
+              <a:t>Validando Melhorias</a:t>
+            </a:r>
           </a:p>
         </p:txBody>
       </p:sp>
@@ -19940,7 +19873,7 @@
               </a:spcAft>
             </a:pPr>
             <a:r>
-              <a:rPr lang="pt-BR" dirty="0" smtClean="0"/>
+              <a:rPr lang="pt-BR" dirty="0"/>
               <a:t>Agora executamos o experimento de novo para validar a melhoria implementada.</a:t>
             </a:r>
           </a:p>
@@ -19954,18 +19887,14 @@
               </a:spcAft>
             </a:pPr>
             <a:r>
-              <a:rPr lang="pt-BR" dirty="0" smtClean="0"/>
+              <a:rPr lang="pt-BR" dirty="0"/>
               <a:t>Primeiro devemos parar a instância do serviço antigo e rodar a do novo serviço resiliente.</a:t>
             </a:r>
             <a:br>
-              <a:rPr lang="pt-BR" dirty="0" smtClean="0"/>
+              <a:rPr lang="pt-BR" dirty="0"/>
             </a:br>
-            <a:r>
-              <a:rPr lang="pt-BR" dirty="0" smtClean="0"/>
-              <a:t/>
-            </a:r>
             <a:br>
-              <a:rPr lang="pt-BR" dirty="0" smtClean="0"/>
+              <a:rPr lang="pt-BR" dirty="0"/>
             </a:br>
             <a:r>
               <a:rPr lang="pt-BR" dirty="0">
@@ -19975,11 +19904,6 @@
               </a:rPr>
               <a:t>$ python3 resilient-service.py</a:t>
             </a:r>
-            <a:endParaRPr lang="pt-BR" dirty="0">
-              <a:highlight>
-                <a:srgbClr val="000000"/>
-              </a:highlight>
-            </a:endParaRPr>
           </a:p>
           <a:p>
             <a:pPr>
@@ -19988,10 +19912,9 @@
               </a:spcAft>
             </a:pPr>
             <a:r>
-              <a:rPr lang="pt-BR" dirty="0" smtClean="0"/>
+              <a:rPr lang="pt-BR" dirty="0"/>
               <a:t>Ao rodarmos o experimento de novo no terminal vemos que a falha foi corrigida.</a:t>
             </a:r>
-            <a:endParaRPr lang="pt-BR" dirty="0"/>
           </a:p>
         </p:txBody>
       </p:sp>
@@ -20100,7 +20023,6 @@
               <a:rPr lang="pt-BR" dirty="0"/>
               <a:t>Validando Melhorias</a:t>
             </a:r>
-            <a:endParaRPr lang="pt-BR" dirty="0"/>
           </a:p>
         </p:txBody>
       </p:sp>
@@ -20138,10 +20060,9 @@
               </a:spcAft>
             </a:pPr>
             <a:r>
-              <a:rPr lang="pt-BR" dirty="0" smtClean="0"/>
+              <a:rPr lang="pt-BR" dirty="0"/>
               <a:t>Quando a hipótese de estado não encontra nenhum desvio no sistema temos a falha corrigida.</a:t>
             </a:r>
-            <a:endParaRPr lang="pt-BR" dirty="0"/>
           </a:p>
         </p:txBody>
       </p:sp>
@@ -20248,13 +20169,8 @@
             </a:br>
             <a:r>
               <a:rPr lang="pt-BR" dirty="0"/>
-              <a:t>Implementando </a:t>
-            </a:r>
-            <a:r>
-              <a:rPr lang="pt-BR" dirty="0" smtClean="0"/>
-              <a:t>Melhorias – Log</a:t>
-            </a:r>
-            <a:endParaRPr lang="pt-BR" dirty="0"/>
+              <a:t>Implementando Melhorias – Log</a:t>
+            </a:r>
           </a:p>
         </p:txBody>
       </p:sp>
@@ -20292,102 +20208,90 @@
               </a:spcAft>
             </a:pPr>
             <a:r>
-              <a:rPr lang="pt-BR" dirty="0" smtClean="0"/>
+              <a:rPr lang="pt-BR" dirty="0"/>
               <a:t>Ao executar o experimento, dois arquivos são criados: </a:t>
             </a:r>
             <a:r>
-              <a:rPr lang="pt-BR" i="1" dirty="0" smtClean="0"/>
+              <a:rPr lang="pt-BR" i="1" dirty="0"/>
               <a:t>chaostoolkit.log </a:t>
             </a:r>
             <a:r>
-              <a:rPr lang="pt-BR" dirty="0" smtClean="0"/>
+              <a:rPr lang="pt-BR" dirty="0"/>
               <a:t>e</a:t>
-            </a:r>
-            <a:r>
-              <a:rPr lang="pt-BR" i="1" dirty="0" smtClean="0"/>
-              <a:t> </a:t>
-            </a:r>
-            <a:r>
-              <a:rPr lang="pt-BR" i="1" dirty="0" err="1" smtClean="0"/>
-              <a:t>journal.json</a:t>
-            </a:r>
-            <a:endParaRPr lang="pt-BR" i="1" dirty="0" smtClean="0"/>
-          </a:p>
-          <a:p>
-            <a:pPr>
-              <a:spcAft>
-                <a:spcPts val="1000"/>
-              </a:spcAft>
-            </a:pPr>
-            <a:r>
-              <a:rPr lang="pt-BR" dirty="0"/>
-              <a:t>O</a:t>
             </a:r>
             <a:r>
               <a:rPr lang="pt-BR" i="1" dirty="0"/>
               <a:t> </a:t>
             </a:r>
             <a:r>
-              <a:rPr lang="pt-BR" i="1" dirty="0" smtClean="0"/>
-              <a:t>chaostoolkit.log </a:t>
-            </a:r>
-            <a:r>
-              <a:rPr lang="pt-BR" dirty="0" smtClean="0"/>
-              <a:t>contém o log das operações executadas pelo </a:t>
-            </a:r>
-            <a:r>
-              <a:rPr lang="pt-BR" dirty="0" err="1" smtClean="0"/>
-              <a:t>Chaos</a:t>
-            </a:r>
-            <a:r>
-              <a:rPr lang="pt-BR" dirty="0" smtClean="0"/>
-              <a:t> Toolkit</a:t>
-            </a:r>
-          </a:p>
-          <a:p>
-            <a:pPr>
-              <a:spcAft>
-                <a:spcPts val="1000"/>
-              </a:spcAft>
-            </a:pPr>
-            <a:r>
-              <a:rPr lang="pt-BR" dirty="0" smtClean="0"/>
-              <a:t>O </a:t>
-            </a:r>
-            <a:r>
-              <a:rPr lang="pt-BR" i="1" dirty="0" err="1" smtClean="0"/>
-              <a:t>journal.json</a:t>
-            </a:r>
-            <a:r>
-              <a:rPr lang="pt-BR" dirty="0"/>
-              <a:t> </a:t>
-            </a:r>
-            <a:r>
-              <a:rPr lang="pt-BR" dirty="0" smtClean="0"/>
-              <a:t>contém todas as informações sobre as ações executadas durante o experimento</a:t>
-            </a:r>
-          </a:p>
-          <a:p>
-            <a:pPr>
-              <a:spcAft>
-                <a:spcPts val="1000"/>
-              </a:spcAft>
-            </a:pPr>
-            <a:r>
-              <a:rPr lang="pt-BR" dirty="0"/>
-              <a:t>O </a:t>
-            </a:r>
-            <a:r>
               <a:rPr lang="pt-BR" i="1" dirty="0" err="1"/>
               <a:t>journal.json</a:t>
             </a:r>
-            <a:r>
-              <a:rPr lang="pt-BR" dirty="0"/>
-              <a:t> </a:t>
-            </a:r>
-            <a:r>
-              <a:rPr lang="pt-BR" dirty="0" smtClean="0"/>
-              <a:t>é muito útil para operações automatizadas de pós-experimentos. </a:t>
+            <a:endParaRPr lang="pt-BR" i="1" dirty="0"/>
+          </a:p>
+          <a:p>
+            <a:pPr>
+              <a:spcAft>
+                <a:spcPts val="1000"/>
+              </a:spcAft>
+            </a:pPr>
+            <a:r>
+              <a:rPr lang="pt-BR" dirty="0"/>
+              <a:t>O</a:t>
+            </a:r>
+            <a:r>
+              <a:rPr lang="pt-BR" i="1" dirty="0"/>
+              <a:t> chaostoolkit.log </a:t>
+            </a:r>
+            <a:r>
+              <a:rPr lang="pt-BR" dirty="0"/>
+              <a:t>contém o log das operações executadas pelo </a:t>
+            </a:r>
+            <a:r>
+              <a:rPr lang="pt-BR" dirty="0" err="1"/>
+              <a:t>Chaos</a:t>
+            </a:r>
+            <a:r>
+              <a:rPr lang="pt-BR" dirty="0"/>
+              <a:t> Toolkit</a:t>
+            </a:r>
+          </a:p>
+          <a:p>
+            <a:pPr>
+              <a:spcAft>
+                <a:spcPts val="1000"/>
+              </a:spcAft>
+            </a:pPr>
+            <a:r>
+              <a:rPr lang="pt-BR" dirty="0"/>
+              <a:t>O </a:t>
+            </a:r>
+            <a:r>
+              <a:rPr lang="pt-BR" i="1" dirty="0" err="1"/>
+              <a:t>journal.json</a:t>
+            </a:r>
+            <a:r>
+              <a:rPr lang="pt-BR" dirty="0"/>
+              <a:t> contém todas as informações sobre as ações executadas durante o experimento</a:t>
+            </a:r>
+          </a:p>
+          <a:p>
+            <a:pPr>
+              <a:spcAft>
+                <a:spcPts val="1000"/>
+              </a:spcAft>
+            </a:pPr>
+            <a:r>
+              <a:rPr lang="pt-BR" dirty="0"/>
+              <a:t>O </a:t>
+            </a:r>
+            <a:r>
+              <a:rPr lang="pt-BR" i="1" dirty="0" err="1"/>
+              <a:t>journal.json</a:t>
+            </a:r>
+            <a:r>
+              <a:rPr lang="pt-BR" dirty="0"/>
+              <a:t> é muito útil para operações automatizadas de pós-experimentos. </a:t>
             </a:r>
             <a:endParaRPr lang="pt-BR" i="1" dirty="0"/>
           </a:p>
@@ -20451,17 +20355,16 @@
           <a:p>
             <a:pPr algn="l"/>
             <a:r>
-              <a:rPr lang="pt-BR" sz="4400" dirty="0" smtClean="0"/>
+              <a:rPr lang="pt-BR" sz="4400" dirty="0"/>
               <a:t>ENGENHARIA DO CAOS: </a:t>
             </a:r>
             <a:br>
-              <a:rPr lang="pt-BR" sz="4400" dirty="0" smtClean="0"/>
+              <a:rPr lang="pt-BR" sz="4400" dirty="0"/>
             </a:br>
             <a:r>
-              <a:rPr lang="pt-BR" sz="4400" dirty="0" smtClean="0"/>
+              <a:rPr lang="pt-BR" sz="4400" dirty="0"/>
               <a:t>DO COMEÇO AO FIM</a:t>
             </a:r>
-            <a:endParaRPr lang="pt-BR" sz="4400" dirty="0"/>
           </a:p>
         </p:txBody>
       </p:sp>
@@ -20518,29 +20421,22 @@
           </a:xfrm>
         </p:spPr>
         <p:txBody>
-          <a:bodyPr/>
-          <a:lstStyle/>
-          <a:p>
-            <a:r>
-              <a:rPr lang="pt-BR" dirty="0"/>
-              <a:t>Experimento com </a:t>
-            </a:r>
-            <a:r>
-              <a:rPr lang="pt-BR" dirty="0" err="1"/>
-              <a:t>Chaos</a:t>
-            </a:r>
-            <a:r>
-              <a:rPr lang="pt-BR" dirty="0"/>
-              <a:t> Toolkit:</a:t>
+          <a:bodyPr>
+            <a:normAutofit/>
+          </a:bodyPr>
+          <a:lstStyle/>
+          <a:p>
+            <a:r>
+              <a:rPr lang="pt-BR" dirty="0"/>
+              <a:t>Mergulhando no Caos: </a:t>
             </a:r>
             <a:br>
               <a:rPr lang="pt-BR" dirty="0"/>
             </a:br>
             <a:r>
               <a:rPr lang="pt-BR" dirty="0"/>
-              <a:t>Implementando as Melhorias</a:t>
-            </a:r>
-            <a:endParaRPr lang="pt-BR" dirty="0"/>
+              <a:t>Pessoas, Práticas e Processos</a:t>
+            </a:r>
           </a:p>
         </p:txBody>
       </p:sp>
@@ -20579,7 +20475,40 @@
             </a:pPr>
             <a:r>
               <a:rPr lang="pt-BR" dirty="0"/>
-              <a:t>I</a:t>
+              <a:t>No capítulo anterior vimos o ciclo de um experimento aplicado pelo Chaos Toolkit.</a:t>
+            </a:r>
+          </a:p>
+          <a:p>
+            <a:pPr>
+              <a:spcAft>
+                <a:spcPts val="1000"/>
+              </a:spcAft>
+            </a:pPr>
+            <a:r>
+              <a:rPr lang="pt-BR" dirty="0"/>
+              <a:t>Agora ampliaremos os nossos horizontes e iremos mais a fundo.</a:t>
+            </a:r>
+          </a:p>
+          <a:p>
+            <a:pPr>
+              <a:spcAft>
+                <a:spcPts val="1000"/>
+              </a:spcAft>
+            </a:pPr>
+            <a:r>
+              <a:rPr lang="pt-BR" dirty="0"/>
+              <a:t>Iremos abordar todo o processo, desde os princípios fundamentais.</a:t>
+            </a:r>
+          </a:p>
+          <a:p>
+            <a:pPr>
+              <a:spcAft>
+                <a:spcPts val="1000"/>
+              </a:spcAft>
+            </a:pPr>
+            <a:r>
+              <a:rPr lang="pt-BR" dirty="0"/>
+              <a:t>Também iremos trabalhar com um experimento mais complexo que buscará falhas não somente na área da plataforma, mas também na infraestrutura e até mesmo nas pessoas.</a:t>
             </a:r>
           </a:p>
         </p:txBody>
@@ -20642,24 +20571,15 @@
           <a:p>
             <a:r>
               <a:rPr lang="pt-BR" dirty="0"/>
-              <a:t>Experimento com </a:t>
-            </a:r>
-            <a:r>
-              <a:rPr lang="pt-BR" dirty="0" err="1"/>
-              <a:t>Chaos</a:t>
-            </a:r>
-            <a:r>
-              <a:rPr lang="pt-BR" dirty="0"/>
-              <a:t> Toolkit:</a:t>
+              <a:t>Mergulhando no Caos: </a:t>
             </a:r>
             <a:br>
               <a:rPr lang="pt-BR" dirty="0"/>
             </a:br>
             <a:r>
               <a:rPr lang="pt-BR" dirty="0"/>
-              <a:t>Implementando as Melhorias</a:t>
-            </a:r>
-            <a:endParaRPr lang="pt-BR" dirty="0"/>
+              <a:t>Pessoas, Práticas e Processos</a:t>
+            </a:r>
           </a:p>
         </p:txBody>
       </p:sp>
@@ -20698,8 +20618,50 @@
             </a:pPr>
             <a:r>
               <a:rPr lang="pt-BR" dirty="0"/>
-              <a:t>I</a:t>
-            </a:r>
+              <a:t>Usaremos um sistema alvo mais complexo nesse experimento, além de termos mais informações sobre os processos do mesmo.</a:t>
+            </a:r>
+          </a:p>
+          <a:p>
+            <a:pPr>
+              <a:spcAft>
+                <a:spcPts val="1000"/>
+              </a:spcAft>
+            </a:pPr>
+            <a:r>
+              <a:rPr lang="pt-BR" dirty="0"/>
+              <a:t>Como nesse experimento também abordaremos a área de processos em que as pessoas estão envolvidas precisaremos mais do que os detalhes técnicos do mesmo.</a:t>
+            </a:r>
+          </a:p>
+          <a:p>
+            <a:pPr>
+              <a:spcAft>
+                <a:spcPts val="1000"/>
+              </a:spcAft>
+            </a:pPr>
+            <a:r>
+              <a:rPr lang="pt-BR" dirty="0"/>
+              <a:t>Assim como no experimento anterior, partiremos dos aspectos técnicos, mas também abordaremos as pessoas, práticas e processos do nosso sistema alvo.</a:t>
+            </a:r>
+          </a:p>
+          <a:p>
+            <a:pPr>
+              <a:spcAft>
+                <a:spcPts val="1000"/>
+              </a:spcAft>
+            </a:pPr>
+            <a:r>
+              <a:rPr lang="pt-BR" dirty="0"/>
+              <a:t>O nosso sistema alvo terá as seguintes especificações:</a:t>
+            </a:r>
+          </a:p>
+          <a:p>
+            <a:pPr marL="0" indent="0">
+              <a:spcAft>
+                <a:spcPts val="1000"/>
+              </a:spcAft>
+              <a:buNone/>
+            </a:pPr>
+            <a:endParaRPr lang="pt-BR" dirty="0"/>
           </a:p>
         </p:txBody>
       </p:sp>
@@ -20761,24 +20723,8 @@
           <a:p>
             <a:r>
               <a:rPr lang="pt-BR" dirty="0"/>
-              <a:t>Experimento com </a:t>
-            </a:r>
-            <a:r>
-              <a:rPr lang="pt-BR" dirty="0" err="1"/>
-              <a:t>Chaos</a:t>
-            </a:r>
-            <a:r>
-              <a:rPr lang="pt-BR" dirty="0"/>
-              <a:t> Toolkit:</a:t>
-            </a:r>
-            <a:br>
-              <a:rPr lang="pt-BR" dirty="0"/>
-            </a:br>
-            <a:r>
-              <a:rPr lang="pt-BR" dirty="0"/>
-              <a:t>Implementando as Melhorias</a:t>
-            </a:r>
-            <a:endParaRPr lang="pt-BR" dirty="0"/>
+              <a:t>Mergulhando no Caos: A Plataforma</a:t>
+            </a:r>
           </a:p>
         </p:txBody>
       </p:sp>
@@ -20801,7 +20747,7 @@
         <p:spPr>
           <a:xfrm>
             <a:off x="680321" y="2505456"/>
-            <a:ext cx="9484759" cy="3599316"/>
+            <a:ext cx="8890399" cy="3599316"/>
           </a:xfrm>
         </p:spPr>
         <p:txBody>
@@ -20817,7 +20763,86 @@
             </a:pPr>
             <a:r>
               <a:rPr lang="pt-BR" dirty="0"/>
-              <a:t>I</a:t>
+              <a:t>A Plataforma: Um cluster </a:t>
+            </a:r>
+            <a:r>
+              <a:rPr lang="pt-BR" dirty="0" err="1"/>
+              <a:t>Kurbenetes</a:t>
+            </a:r>
+            <a:r>
+              <a:rPr lang="pt-BR" dirty="0"/>
+              <a:t> de três nós</a:t>
+            </a:r>
+          </a:p>
+          <a:p>
+            <a:pPr lvl="1">
+              <a:spcAft>
+                <a:spcPts val="1000"/>
+              </a:spcAft>
+            </a:pPr>
+            <a:r>
+              <a:rPr lang="pt-BR" dirty="0"/>
+              <a:t>O sistema alvo está baseado em um cluster </a:t>
+            </a:r>
+            <a:r>
+              <a:rPr lang="pt-BR" dirty="0" err="1"/>
+              <a:t>Kurbenetes</a:t>
+            </a:r>
+            <a:r>
+              <a:rPr lang="pt-BR" dirty="0"/>
+              <a:t> que rodará um serviço simples.</a:t>
+            </a:r>
+          </a:p>
+          <a:p>
+            <a:pPr lvl="1">
+              <a:spcAft>
+                <a:spcPts val="1000"/>
+              </a:spcAft>
+            </a:pPr>
+            <a:r>
+              <a:rPr lang="pt-BR" dirty="0"/>
+              <a:t>Com o </a:t>
+            </a:r>
+            <a:r>
+              <a:rPr lang="pt-BR" dirty="0" err="1"/>
+              <a:t>Kurbenetes</a:t>
+            </a:r>
+            <a:r>
+              <a:rPr lang="pt-BR" dirty="0"/>
+              <a:t> como plataforma o nosso sistema terá os nós como a camada mais baixa de infraestrutura</a:t>
+            </a:r>
+          </a:p>
+          <a:p>
+            <a:pPr lvl="1">
+              <a:spcAft>
+                <a:spcPts val="1000"/>
+              </a:spcAft>
+            </a:pPr>
+            <a:r>
+              <a:rPr lang="pt-BR" dirty="0"/>
+              <a:t>Essa infraestrutura de recursos irá suportar e executará os containers e serviços no cluster</a:t>
+            </a:r>
+          </a:p>
+          <a:p>
+            <a:pPr lvl="1">
+              <a:spcAft>
+                <a:spcPts val="1000"/>
+              </a:spcAft>
+            </a:pPr>
+            <a:r>
+              <a:rPr lang="pt-BR" dirty="0"/>
+              <a:t>Neste caso o nosso sistema possui uma topografia de 3 nós no cluster</a:t>
+            </a:r>
+          </a:p>
+          <a:p>
+            <a:pPr lvl="1">
+              <a:spcAft>
+                <a:spcPts val="1000"/>
+              </a:spcAft>
+            </a:pPr>
+            <a:r>
+              <a:rPr lang="pt-BR" dirty="0"/>
+              <a:t>Para esse experimento teremos um serviço rodando sobre ou mais containers sobre um cluster de 3 nós</a:t>
             </a:r>
           </a:p>
         </p:txBody>
@@ -20880,24 +20905,8 @@
           <a:p>
             <a:r>
               <a:rPr lang="pt-BR" dirty="0"/>
-              <a:t>Experimento com </a:t>
-            </a:r>
-            <a:r>
-              <a:rPr lang="pt-BR" dirty="0" err="1"/>
-              <a:t>Chaos</a:t>
-            </a:r>
-            <a:r>
-              <a:rPr lang="pt-BR" dirty="0"/>
-              <a:t> Toolkit:</a:t>
-            </a:r>
-            <a:br>
-              <a:rPr lang="pt-BR" dirty="0"/>
-            </a:br>
-            <a:r>
-              <a:rPr lang="pt-BR" dirty="0"/>
-              <a:t>Implementando as Melhorias</a:t>
-            </a:r>
-            <a:endParaRPr lang="pt-BR" dirty="0"/>
+              <a:t>Mergulhando no Caos: A Aplicação</a:t>
+            </a:r>
           </a:p>
         </p:txBody>
       </p:sp>
@@ -20936,11 +20945,52 @@
             </a:pPr>
             <a:r>
               <a:rPr lang="pt-BR" dirty="0"/>
-              <a:t>I</a:t>
-            </a:r>
-          </a:p>
-        </p:txBody>
-      </p:sp>
+              <a:t>A Aplicação: Um único serviço replicado em 3 nós</a:t>
+            </a:r>
+          </a:p>
+          <a:p>
+            <a:pPr lvl="1">
+              <a:spcAft>
+                <a:spcPts val="1000"/>
+              </a:spcAft>
+            </a:pPr>
+            <a:r>
+              <a:rPr lang="pt-BR" dirty="0"/>
+              <a:t>Para o nosso experimento usaremos uma aplicação simples com um único serviço a ser replicado em 3 nós.</a:t>
+            </a:r>
+          </a:p>
+        </p:txBody>
+      </p:sp>
+      <p:pic>
+        <p:nvPicPr>
+          <p:cNvPr id="3" name="Imagem 2">
+            <a:extLst>
+              <a:ext uri="{FF2B5EF4-FFF2-40B4-BE49-F238E27FC236}">
+                <a16:creationId xmlns:a16="http://schemas.microsoft.com/office/drawing/2014/main" id="{CDEBFE71-41FB-44C6-BC87-660E3B680630}"/>
+              </a:ext>
+            </a:extLst>
+          </p:cNvPr>
+          <p:cNvPicPr>
+            <a:picLocks noChangeAspect="1"/>
+          </p:cNvPicPr>
+          <p:nvPr/>
+        </p:nvPicPr>
+        <p:blipFill>
+          <a:blip r:embed="rId2"/>
+          <a:stretch>
+            <a:fillRect/>
+          </a:stretch>
+        </p:blipFill>
+        <p:spPr>
+          <a:xfrm>
+            <a:off x="3948403" y="3849475"/>
+            <a:ext cx="4295194" cy="2716619"/>
+          </a:xfrm>
+          <a:prstGeom prst="rect">
+            <a:avLst/>
+          </a:prstGeom>
+        </p:spPr>
+      </p:pic>
     </p:spTree>
     <p:extLst>
       <p:ext uri="{BB962C8B-B14F-4D97-AF65-F5344CB8AC3E}">
@@ -20999,24 +21049,8 @@
           <a:p>
             <a:r>
               <a:rPr lang="pt-BR" dirty="0"/>
-              <a:t>Experimento com </a:t>
-            </a:r>
-            <a:r>
-              <a:rPr lang="pt-BR" dirty="0" err="1"/>
-              <a:t>Chaos</a:t>
-            </a:r>
-            <a:r>
-              <a:rPr lang="pt-BR" dirty="0"/>
-              <a:t> Toolkit:</a:t>
-            </a:r>
-            <a:br>
-              <a:rPr lang="pt-BR" dirty="0"/>
-            </a:br>
-            <a:r>
-              <a:rPr lang="pt-BR" dirty="0"/>
-              <a:t>Implementando as Melhorias</a:t>
-            </a:r>
-            <a:endParaRPr lang="pt-BR" dirty="0"/>
+              <a:t>Mergulhando no Caos: A Aplicação</a:t>
+            </a:r>
           </a:p>
         </p:txBody>
       </p:sp>
@@ -21039,7 +21073,7 @@
         <p:spPr>
           <a:xfrm>
             <a:off x="680321" y="2505456"/>
-            <a:ext cx="9484759" cy="3599316"/>
+            <a:ext cx="4574811" cy="3599316"/>
           </a:xfrm>
         </p:spPr>
         <p:txBody>
@@ -21055,11 +21089,135 @@
             </a:pPr>
             <a:r>
               <a:rPr lang="pt-BR" dirty="0"/>
-              <a:t>I</a:t>
-            </a:r>
-          </a:p>
-        </p:txBody>
-      </p:sp>
+              <a:t>A Aplicação:</a:t>
+            </a:r>
+          </a:p>
+          <a:p>
+            <a:pPr lvl="1">
+              <a:spcAft>
+                <a:spcPts val="1000"/>
+              </a:spcAft>
+            </a:pPr>
+            <a:r>
+              <a:rPr lang="pt-BR" dirty="0"/>
+              <a:t>Este código está disponível no repositório do </a:t>
+            </a:r>
+            <a:r>
+              <a:rPr lang="pt-BR" dirty="0" err="1"/>
+              <a:t>Github</a:t>
+            </a:r>
+            <a:r>
+              <a:rPr lang="pt-BR" dirty="0"/>
+              <a:t> disponibilizado anteriormente na pasta </a:t>
+            </a:r>
+            <a:r>
+              <a:rPr lang="pt-BR" i="1" dirty="0"/>
+              <a:t>chapter4/</a:t>
+            </a:r>
+            <a:r>
+              <a:rPr lang="pt-BR" i="1" dirty="0" err="1"/>
+              <a:t>before</a:t>
+            </a:r>
+            <a:r>
+              <a:rPr lang="pt-BR" i="1" dirty="0"/>
+              <a:t> </a:t>
+            </a:r>
+          </a:p>
+          <a:p>
+            <a:pPr lvl="1">
+              <a:spcAft>
+                <a:spcPts val="1000"/>
+              </a:spcAft>
+            </a:pPr>
+            <a:r>
+              <a:rPr lang="pt-BR" i="1" dirty="0">
+                <a:highlight>
+                  <a:srgbClr val="000000"/>
+                </a:highlight>
+              </a:rPr>
+              <a:t>https://github.com/chaostoolkit-incubator/community-playground</a:t>
+            </a:r>
+          </a:p>
+          <a:p>
+            <a:pPr lvl="1">
+              <a:spcAft>
+                <a:spcPts val="1000"/>
+              </a:spcAft>
+            </a:pPr>
+            <a:r>
+              <a:rPr lang="pt-BR" dirty="0"/>
+              <a:t>Junto da descrição deste serviço, também temos </a:t>
+            </a:r>
+            <a:br>
+              <a:rPr lang="pt-BR" dirty="0"/>
+            </a:br>
+            <a:r>
+              <a:rPr lang="pt-BR" dirty="0"/>
+              <a:t>a descrição da implantação do mesmo.</a:t>
+            </a:r>
+          </a:p>
+        </p:txBody>
+      </p:sp>
+      <p:pic>
+        <p:nvPicPr>
+          <p:cNvPr id="19" name="Imagem 18" descr="Mapa colorido com texto preto sobre fundo branco&#10;&#10;Descrição gerada automaticamente">
+            <a:extLst>
+              <a:ext uri="{FF2B5EF4-FFF2-40B4-BE49-F238E27FC236}">
+                <a16:creationId xmlns:a16="http://schemas.microsoft.com/office/drawing/2014/main" id="{FD3AFE34-7077-4A60-96E2-6F8DAB0E63E5}"/>
+              </a:ext>
+            </a:extLst>
+          </p:cNvPr>
+          <p:cNvPicPr>
+            <a:picLocks noChangeAspect="1"/>
+          </p:cNvPicPr>
+          <p:nvPr/>
+        </p:nvPicPr>
+        <p:blipFill>
+          <a:blip r:embed="rId2"/>
+          <a:stretch>
+            <a:fillRect/>
+          </a:stretch>
+        </p:blipFill>
+        <p:spPr>
+          <a:xfrm>
+            <a:off x="5395042" y="3157377"/>
+            <a:ext cx="3022695" cy="2947395"/>
+          </a:xfrm>
+          <a:prstGeom prst="rect">
+            <a:avLst/>
+          </a:prstGeom>
+        </p:spPr>
+      </p:pic>
+      <p:pic>
+        <p:nvPicPr>
+          <p:cNvPr id="21" name="Imagem 20" descr="Texto preto sobre fundo branco&#10;&#10;Descrição gerada automaticamente">
+            <a:extLst>
+              <a:ext uri="{FF2B5EF4-FFF2-40B4-BE49-F238E27FC236}">
+                <a16:creationId xmlns:a16="http://schemas.microsoft.com/office/drawing/2014/main" id="{2091E8B3-C288-4E2C-B4F5-EE8F924B0EE3}"/>
+              </a:ext>
+            </a:extLst>
+          </p:cNvPr>
+          <p:cNvPicPr>
+            <a:picLocks noChangeAspect="1"/>
+          </p:cNvPicPr>
+          <p:nvPr/>
+        </p:nvPicPr>
+        <p:blipFill>
+          <a:blip r:embed="rId3"/>
+          <a:stretch>
+            <a:fillRect/>
+          </a:stretch>
+        </p:blipFill>
+        <p:spPr>
+          <a:xfrm>
+            <a:off x="8537540" y="3560826"/>
+            <a:ext cx="3324965" cy="2169404"/>
+          </a:xfrm>
+          <a:prstGeom prst="rect">
+            <a:avLst/>
+          </a:prstGeom>
+        </p:spPr>
+      </p:pic>
     </p:spTree>
     <p:extLst>
       <p:ext uri="{BB962C8B-B14F-4D97-AF65-F5344CB8AC3E}">
@@ -21240,54 +21398,231 @@
           <a:p>
             <a:r>
               <a:rPr lang="pt-BR" dirty="0"/>
-              <a:t>Experimento com </a:t>
-            </a:r>
-            <a:r>
-              <a:rPr lang="pt-BR" dirty="0" err="1"/>
-              <a:t>Chaos</a:t>
-            </a:r>
-            <a:r>
-              <a:rPr lang="pt-BR" dirty="0"/>
-              <a:t> Toolkit:</a:t>
-            </a:r>
-            <a:br>
-              <a:rPr lang="pt-BR" dirty="0"/>
-            </a:br>
-            <a:r>
-              <a:rPr lang="pt-BR" dirty="0"/>
-              <a:t>Implementando as Melhorias</a:t>
-            </a:r>
-            <a:endParaRPr lang="pt-BR" dirty="0"/>
-          </a:p>
-        </p:txBody>
-      </p:sp>
-      <p:sp>
-        <p:nvSpPr>
-          <p:cNvPr id="5" name="Espaço Reservado para Conteúdo 2">
+              <a:t>Mergulhando no Caos: A Aplicação</a:t>
+            </a:r>
+          </a:p>
+        </p:txBody>
+      </p:sp>
+      <p:pic>
+        <p:nvPicPr>
+          <p:cNvPr id="8" name="Espaço Reservado para Conteúdo 7" descr="Mapa colorido com texto preto sobre fundo branco&#10;&#10;Descrição gerada automaticamente">
             <a:extLst>
               <a:ext uri="{FF2B5EF4-FFF2-40B4-BE49-F238E27FC236}">
-                <a16:creationId xmlns:a16="http://schemas.microsoft.com/office/drawing/2014/main" id="{C5B8AB74-06FA-413C-BD74-462D1F01C8FF}"/>
+                <a16:creationId xmlns:a16="http://schemas.microsoft.com/office/drawing/2014/main" id="{21A4DC99-B1D5-47CE-8DB3-1834DEBDC3F1}"/>
               </a:ext>
             </a:extLst>
           </p:cNvPr>
-          <p:cNvSpPr>
-            <a:spLocks noGrp="1"/>
-          </p:cNvSpPr>
+          <p:cNvPicPr>
+            <a:picLocks noGrp="1" noChangeAspect="1"/>
+          </p:cNvPicPr>
           <p:nvPr>
             <p:ph idx="1"/>
           </p:nvPr>
+        </p:nvPicPr>
+        <p:blipFill>
+          <a:blip r:embed="rId2"/>
+          <a:stretch>
+            <a:fillRect/>
+          </a:stretch>
+        </p:blipFill>
+        <p:spPr>
+          <a:xfrm>
+            <a:off x="8971656" y="2947416"/>
+            <a:ext cx="2858411" cy="3017211"/>
+          </a:xfrm>
+        </p:spPr>
+      </p:pic>
+      <p:sp>
+        <p:nvSpPr>
+          <p:cNvPr id="9" name="Espaço Reservado para Conteúdo 2">
+            <a:extLst>
+              <a:ext uri="{FF2B5EF4-FFF2-40B4-BE49-F238E27FC236}">
+                <a16:creationId xmlns:a16="http://schemas.microsoft.com/office/drawing/2014/main" id="{05AB6E71-484C-4934-8487-C3CDD32A933C}"/>
+              </a:ext>
+            </a:extLst>
+          </p:cNvPr>
+          <p:cNvSpPr txBox="1">
+            <a:spLocks/>
+          </p:cNvSpPr>
+          <p:nvPr/>
         </p:nvSpPr>
         <p:spPr>
           <a:xfrm>
             <a:off x="680321" y="2505456"/>
-            <a:ext cx="9484759" cy="3599316"/>
-          </a:xfrm>
-        </p:spPr>
-        <p:txBody>
-          <a:bodyPr>
+            <a:ext cx="8036959" cy="3599316"/>
+          </a:xfrm>
+          <a:prstGeom prst="rect">
+            <a:avLst/>
+          </a:prstGeom>
+        </p:spPr>
+        <p:txBody>
+          <a:bodyPr vert="horz" lIns="91440" tIns="45720" rIns="91440" bIns="45720" rtlCol="0">
             <a:noAutofit/>
           </a:bodyPr>
-          <a:lstStyle/>
+          <a:lstStyle>
+            <a:lvl1pPr marL="228600" indent="-228600" algn="l" defTabSz="914400" rtl="0" eaLnBrk="1" latinLnBrk="0" hangingPunct="1">
+              <a:lnSpc>
+                <a:spcPct val="90000"/>
+              </a:lnSpc>
+              <a:spcBef>
+                <a:spcPts val="1000"/>
+              </a:spcBef>
+              <a:buFont typeface="Arial" panose="020B0604020202020204" pitchFamily="34" charset="0"/>
+              <a:buChar char="•"/>
+              <a:defRPr sz="2400" kern="1200">
+                <a:solidFill>
+                  <a:schemeClr val="tx1"/>
+                </a:solidFill>
+                <a:latin typeface="+mn-lt"/>
+                <a:ea typeface="+mn-ea"/>
+                <a:cs typeface="+mn-cs"/>
+              </a:defRPr>
+            </a:lvl1pPr>
+            <a:lvl2pPr marL="685800" indent="-228600" algn="l" defTabSz="914400" rtl="0" eaLnBrk="1" latinLnBrk="0" hangingPunct="1">
+              <a:lnSpc>
+                <a:spcPct val="90000"/>
+              </a:lnSpc>
+              <a:spcBef>
+                <a:spcPts val="500"/>
+              </a:spcBef>
+              <a:buFont typeface="Arial" panose="020B0604020202020204" pitchFamily="34" charset="0"/>
+              <a:buChar char="•"/>
+              <a:defRPr sz="2000" kern="1200">
+                <a:solidFill>
+                  <a:schemeClr val="tx1"/>
+                </a:solidFill>
+                <a:latin typeface="+mn-lt"/>
+                <a:ea typeface="+mn-ea"/>
+                <a:cs typeface="+mn-cs"/>
+              </a:defRPr>
+            </a:lvl2pPr>
+            <a:lvl3pPr marL="1143000" indent="-228600" algn="l" defTabSz="914400" rtl="0" eaLnBrk="1" latinLnBrk="0" hangingPunct="1">
+              <a:lnSpc>
+                <a:spcPct val="90000"/>
+              </a:lnSpc>
+              <a:spcBef>
+                <a:spcPts val="500"/>
+              </a:spcBef>
+              <a:buFont typeface="Arial" panose="020B0604020202020204" pitchFamily="34" charset="0"/>
+              <a:buChar char="•"/>
+              <a:defRPr sz="1800" kern="1200">
+                <a:solidFill>
+                  <a:schemeClr val="tx1"/>
+                </a:solidFill>
+                <a:latin typeface="+mn-lt"/>
+                <a:ea typeface="+mn-ea"/>
+                <a:cs typeface="+mn-cs"/>
+              </a:defRPr>
+            </a:lvl3pPr>
+            <a:lvl4pPr marL="1600200" indent="-228600" algn="l" defTabSz="914400" rtl="0" eaLnBrk="1" latinLnBrk="0" hangingPunct="1">
+              <a:lnSpc>
+                <a:spcPct val="90000"/>
+              </a:lnSpc>
+              <a:spcBef>
+                <a:spcPts val="500"/>
+              </a:spcBef>
+              <a:buFont typeface="Arial" panose="020B0604020202020204" pitchFamily="34" charset="0"/>
+              <a:buChar char="•"/>
+              <a:defRPr sz="1600" kern="1200">
+                <a:solidFill>
+                  <a:schemeClr val="tx1"/>
+                </a:solidFill>
+                <a:latin typeface="+mn-lt"/>
+                <a:ea typeface="+mn-ea"/>
+                <a:cs typeface="+mn-cs"/>
+              </a:defRPr>
+            </a:lvl4pPr>
+            <a:lvl5pPr marL="2057400" indent="-228600" algn="l" defTabSz="914400" rtl="0" eaLnBrk="1" latinLnBrk="0" hangingPunct="1">
+              <a:lnSpc>
+                <a:spcPct val="90000"/>
+              </a:lnSpc>
+              <a:spcBef>
+                <a:spcPts val="500"/>
+              </a:spcBef>
+              <a:buFont typeface="Arial" panose="020B0604020202020204" pitchFamily="34" charset="0"/>
+              <a:buChar char="•"/>
+              <a:defRPr sz="1600" kern="1200">
+                <a:solidFill>
+                  <a:schemeClr val="tx1"/>
+                </a:solidFill>
+                <a:latin typeface="+mn-lt"/>
+                <a:ea typeface="+mn-ea"/>
+                <a:cs typeface="+mn-cs"/>
+              </a:defRPr>
+            </a:lvl5pPr>
+            <a:lvl6pPr marL="2514600" indent="-228600" algn="l" defTabSz="914400" rtl="0" eaLnBrk="1" latinLnBrk="0" hangingPunct="1">
+              <a:lnSpc>
+                <a:spcPct val="90000"/>
+              </a:lnSpc>
+              <a:spcBef>
+                <a:spcPts val="500"/>
+              </a:spcBef>
+              <a:buFont typeface="Arial" panose="020B0604020202020204" pitchFamily="34" charset="0"/>
+              <a:buChar char="•"/>
+              <a:defRPr sz="1400" kern="1200">
+                <a:solidFill>
+                  <a:schemeClr val="tx1"/>
+                </a:solidFill>
+                <a:latin typeface="+mn-lt"/>
+                <a:ea typeface="+mn-ea"/>
+                <a:cs typeface="+mn-cs"/>
+              </a:defRPr>
+            </a:lvl6pPr>
+            <a:lvl7pPr marL="2971800" indent="-228600" algn="l" defTabSz="914400" rtl="0" eaLnBrk="1" latinLnBrk="0" hangingPunct="1">
+              <a:lnSpc>
+                <a:spcPct val="90000"/>
+              </a:lnSpc>
+              <a:spcBef>
+                <a:spcPts val="500"/>
+              </a:spcBef>
+              <a:buFont typeface="Arial" panose="020B0604020202020204" pitchFamily="34" charset="0"/>
+              <a:buChar char="•"/>
+              <a:defRPr sz="1400" kern="1200">
+                <a:solidFill>
+                  <a:schemeClr val="tx1"/>
+                </a:solidFill>
+                <a:latin typeface="+mn-lt"/>
+                <a:ea typeface="+mn-ea"/>
+                <a:cs typeface="+mn-cs"/>
+              </a:defRPr>
+            </a:lvl7pPr>
+            <a:lvl8pPr marL="3429000" indent="-228600" algn="l" defTabSz="914400" rtl="0" eaLnBrk="1" latinLnBrk="0" hangingPunct="1">
+              <a:lnSpc>
+                <a:spcPct val="90000"/>
+              </a:lnSpc>
+              <a:spcBef>
+                <a:spcPts val="500"/>
+              </a:spcBef>
+              <a:buFont typeface="Arial" panose="020B0604020202020204" pitchFamily="34" charset="0"/>
+              <a:buChar char="•"/>
+              <a:defRPr sz="1400" kern="1200">
+                <a:solidFill>
+                  <a:schemeClr val="tx1"/>
+                </a:solidFill>
+                <a:latin typeface="+mn-lt"/>
+                <a:ea typeface="+mn-ea"/>
+                <a:cs typeface="+mn-cs"/>
+              </a:defRPr>
+            </a:lvl8pPr>
+            <a:lvl9pPr marL="3886200" indent="-228600" algn="l" defTabSz="914400" rtl="0" eaLnBrk="1" latinLnBrk="0" hangingPunct="1">
+              <a:lnSpc>
+                <a:spcPct val="90000"/>
+              </a:lnSpc>
+              <a:spcBef>
+                <a:spcPts val="500"/>
+              </a:spcBef>
+              <a:buFont typeface="Arial" panose="020B0604020202020204" pitchFamily="34" charset="0"/>
+              <a:buChar char="•"/>
+              <a:defRPr sz="1400" kern="1200">
+                <a:solidFill>
+                  <a:schemeClr val="tx1"/>
+                </a:solidFill>
+                <a:latin typeface="+mn-lt"/>
+                <a:ea typeface="+mn-ea"/>
+                <a:cs typeface="+mn-cs"/>
+              </a:defRPr>
+            </a:lvl9pPr>
+          </a:lstStyle>
           <a:p>
             <a:pPr>
               <a:spcAft>
@@ -21296,7 +21631,119 @@
             </a:pPr>
             <a:r>
               <a:rPr lang="pt-BR" dirty="0"/>
-              <a:t>I</a:t>
+              <a:t>A Aplicação:</a:t>
+            </a:r>
+          </a:p>
+          <a:p>
+            <a:pPr lvl="1">
+              <a:spcAft>
+                <a:spcPts val="1000"/>
+              </a:spcAft>
+            </a:pPr>
+            <a:r>
+              <a:rPr lang="pt-BR" dirty="0"/>
+              <a:t>Na diretiva de replicas do arquivo podemos notar a estratégia  da equipe ao distribuir o serviço em três instâncias.</a:t>
+            </a:r>
+          </a:p>
+          <a:p>
+            <a:pPr lvl="1">
+              <a:spcAft>
+                <a:spcPts val="1000"/>
+              </a:spcAft>
+            </a:pPr>
+            <a:r>
+              <a:rPr lang="pt-BR" dirty="0"/>
+              <a:t>Ao executar o comando </a:t>
+            </a:r>
+            <a:r>
+              <a:rPr lang="pt-BR" i="1" dirty="0" err="1">
+                <a:highlight>
+                  <a:srgbClr val="000000"/>
+                </a:highlight>
+              </a:rPr>
+              <a:t>kubectl</a:t>
+            </a:r>
+            <a:r>
+              <a:rPr lang="pt-BR" i="1" dirty="0">
+                <a:highlight>
+                  <a:srgbClr val="000000"/>
+                </a:highlight>
+              </a:rPr>
+              <a:t> </a:t>
+            </a:r>
+            <a:r>
+              <a:rPr lang="pt-BR" i="1" dirty="0" err="1">
+                <a:highlight>
+                  <a:srgbClr val="000000"/>
+                </a:highlight>
+              </a:rPr>
+              <a:t>apply</a:t>
+            </a:r>
+            <a:r>
+              <a:rPr lang="pt-BR" i="1" dirty="0">
+                <a:highlight>
+                  <a:srgbClr val="000000"/>
+                </a:highlight>
+              </a:rPr>
+              <a:t> -f </a:t>
+            </a:r>
+            <a:r>
+              <a:rPr lang="pt-BR" i="1" dirty="0" err="1">
+                <a:highlight>
+                  <a:srgbClr val="000000"/>
+                </a:highlight>
+              </a:rPr>
+              <a:t>before</a:t>
+            </a:r>
+            <a:r>
+              <a:rPr lang="pt-BR" dirty="0"/>
+              <a:t>, o </a:t>
+            </a:r>
+            <a:r>
+              <a:rPr lang="pt-BR" dirty="0" err="1"/>
+              <a:t>Kubernetes</a:t>
+            </a:r>
+            <a:r>
+              <a:rPr lang="pt-BR" dirty="0"/>
+              <a:t> estabelecerá um cluster no qual o serviço </a:t>
+            </a:r>
+            <a:r>
+              <a:rPr lang="pt-BR" i="1" dirty="0" err="1">
+                <a:highlight>
+                  <a:srgbClr val="000000"/>
+                </a:highlight>
+              </a:rPr>
+              <a:t>my-service</a:t>
+            </a:r>
+            <a:r>
+              <a:rPr lang="pt-BR" i="1" dirty="0"/>
+              <a:t> </a:t>
+            </a:r>
+            <a:r>
+              <a:rPr lang="pt-BR" dirty="0"/>
+              <a:t>será replicado entre os nós disponíveis</a:t>
+            </a:r>
+          </a:p>
+          <a:p>
+            <a:pPr lvl="1">
+              <a:spcAft>
+                <a:spcPts val="1000"/>
+              </a:spcAft>
+            </a:pPr>
+            <a:r>
+              <a:rPr lang="pt-BR" dirty="0"/>
+              <a:t>Aqui temos uma implementação da equipe responsável pelo sistema, até este ponto tudo está ok.</a:t>
+            </a:r>
+          </a:p>
+          <a:p>
+            <a:pPr lvl="1">
+              <a:spcAft>
+                <a:spcPts val="1000"/>
+              </a:spcAft>
+            </a:pPr>
+            <a:r>
+              <a:rPr lang="pt-BR" dirty="0"/>
+              <a:t>Entretanto, geralmente há outra equipe responsável pelos clusters o que pode levar á condições turbulentas.</a:t>
             </a:r>
           </a:p>
         </p:txBody>
@@ -21359,24 +21806,8 @@
           <a:p>
             <a:r>
               <a:rPr lang="pt-BR" dirty="0"/>
-              <a:t>Experimento com </a:t>
-            </a:r>
-            <a:r>
-              <a:rPr lang="pt-BR" dirty="0" err="1"/>
-              <a:t>Chaos</a:t>
-            </a:r>
-            <a:r>
-              <a:rPr lang="pt-BR" dirty="0"/>
-              <a:t> Toolkit:</a:t>
-            </a:r>
-            <a:br>
-              <a:rPr lang="pt-BR" dirty="0"/>
-            </a:br>
-            <a:r>
-              <a:rPr lang="pt-BR" dirty="0"/>
-              <a:t>Implementando as Melhorias</a:t>
-            </a:r>
-            <a:endParaRPr lang="pt-BR" dirty="0"/>
+              <a:t>Mergulhando no Caos: As Pessoas</a:t>
+            </a:r>
           </a:p>
         </p:txBody>
       </p:sp>
@@ -21399,7 +21830,7 @@
         <p:spPr>
           <a:xfrm>
             <a:off x="680321" y="2505456"/>
-            <a:ext cx="9484759" cy="3599316"/>
+            <a:ext cx="9210439" cy="3599316"/>
           </a:xfrm>
         </p:spPr>
         <p:txBody>
@@ -21415,8 +21846,60 @@
             </a:pPr>
             <a:r>
               <a:rPr lang="pt-BR" dirty="0"/>
-              <a:t>I</a:t>
-            </a:r>
+              <a:t>As Pessoas:</a:t>
+            </a:r>
+          </a:p>
+          <a:p>
+            <a:pPr lvl="1">
+              <a:spcAft>
+                <a:spcPts val="1000"/>
+              </a:spcAft>
+            </a:pPr>
+            <a:r>
+              <a:rPr lang="pt-BR" dirty="0"/>
+              <a:t>Em sistemas assim, geralmente há o time de desenvolvimento e o time que gerencia os clusters.</a:t>
+            </a:r>
+          </a:p>
+          <a:p>
+            <a:pPr lvl="1">
+              <a:spcAft>
+                <a:spcPts val="1000"/>
+              </a:spcAft>
+            </a:pPr>
+            <a:r>
+              <a:rPr lang="pt-BR" dirty="0"/>
+              <a:t>Cada equipe terá um foco e prioridades diferentes</a:t>
+            </a:r>
+          </a:p>
+          <a:p>
+            <a:pPr lvl="1">
+              <a:spcAft>
+                <a:spcPts val="1000"/>
+              </a:spcAft>
+            </a:pPr>
+            <a:r>
+              <a:rPr lang="pt-BR" dirty="0"/>
+              <a:t>Os administradores dos clusters se preocuparão em administrar nós, discos virtuais, com desperdício de recursos, etc.</a:t>
+            </a:r>
+          </a:p>
+          <a:p>
+            <a:pPr lvl="1">
+              <a:spcAft>
+                <a:spcPts val="1000"/>
+              </a:spcAft>
+            </a:pPr>
+            <a:r>
+              <a:rPr lang="pt-BR" dirty="0"/>
+              <a:t>Já os administradores da aplicação estarão focados em manter a saúde da aplicação e de sistemas relacionados a ela, assegurar redundância, garantir o armazenamento necessário para que a aplicação se mantenha estável, etc. </a:t>
+            </a:r>
+          </a:p>
+          <a:p>
+            <a:pPr lvl="1">
+              <a:spcAft>
+                <a:spcPts val="1000"/>
+              </a:spcAft>
+            </a:pPr>
+            <a:endParaRPr lang="pt-BR" dirty="0"/>
           </a:p>
         </p:txBody>
       </p:sp>
@@ -21478,24 +21961,8 @@
           <a:p>
             <a:r>
               <a:rPr lang="pt-BR" dirty="0"/>
-              <a:t>Experimento com </a:t>
-            </a:r>
-            <a:r>
-              <a:rPr lang="pt-BR" dirty="0" err="1"/>
-              <a:t>Chaos</a:t>
-            </a:r>
-            <a:r>
-              <a:rPr lang="pt-BR" dirty="0"/>
-              <a:t> Toolkit:</a:t>
-            </a:r>
-            <a:br>
-              <a:rPr lang="pt-BR" dirty="0"/>
-            </a:br>
-            <a:r>
-              <a:rPr lang="pt-BR" dirty="0"/>
-              <a:t>Implementando as Melhorias</a:t>
-            </a:r>
-            <a:endParaRPr lang="pt-BR" dirty="0"/>
+              <a:t>Mergulhando no Caos: As Pessoas</a:t>
+            </a:r>
           </a:p>
         </p:txBody>
       </p:sp>
@@ -21518,7 +21985,7 @@
         <p:spPr>
           <a:xfrm>
             <a:off x="680321" y="2505456"/>
-            <a:ext cx="9484759" cy="3599316"/>
+            <a:ext cx="7290199" cy="3599316"/>
           </a:xfrm>
         </p:spPr>
         <p:txBody>
@@ -21534,11 +22001,74 @@
             </a:pPr>
             <a:r>
               <a:rPr lang="pt-BR" dirty="0"/>
-              <a:t>I</a:t>
-            </a:r>
-          </a:p>
-        </p:txBody>
-      </p:sp>
+              <a:t>Aqui temos os administradores da aplicação solicitando recursos e os administradores dos clusters servindo esses recursos.</a:t>
+            </a:r>
+          </a:p>
+          <a:p>
+            <a:pPr>
+              <a:spcAft>
+                <a:spcPts val="1000"/>
+              </a:spcAft>
+            </a:pPr>
+            <a:r>
+              <a:rPr lang="pt-BR" dirty="0"/>
+              <a:t>Até esse ponto tudo parece ocorrer bem.</a:t>
+            </a:r>
+          </a:p>
+          <a:p>
+            <a:pPr>
+              <a:spcAft>
+                <a:spcPts val="1000"/>
+              </a:spcAft>
+            </a:pPr>
+            <a:r>
+              <a:rPr lang="pt-BR" dirty="0"/>
+              <a:t>Mas, como engenheiros do caos o nosso trabalho é testar a confiabilidade e resiliência do sistema.</a:t>
+            </a:r>
+          </a:p>
+          <a:p>
+            <a:pPr>
+              <a:spcAft>
+                <a:spcPts val="1000"/>
+              </a:spcAft>
+            </a:pPr>
+            <a:r>
+              <a:rPr lang="pt-BR" dirty="0"/>
+              <a:t>Após uma reunião foi descoberta uma situação bem comum que tem haver com o conflito entre os objetivos desses dois grupos.</a:t>
+            </a:r>
+          </a:p>
+        </p:txBody>
+      </p:sp>
+      <p:pic>
+        <p:nvPicPr>
+          <p:cNvPr id="3" name="Imagem 2" descr="Tela de celular com texto preto sobre fundo branco&#10;&#10;Descrição gerada automaticamente">
+            <a:extLst>
+              <a:ext uri="{FF2B5EF4-FFF2-40B4-BE49-F238E27FC236}">
+                <a16:creationId xmlns:a16="http://schemas.microsoft.com/office/drawing/2014/main" id="{3D2C6B6C-0E73-402B-B1CA-A1A8ACF3F67C}"/>
+              </a:ext>
+            </a:extLst>
+          </p:cNvPr>
+          <p:cNvPicPr>
+            <a:picLocks noChangeAspect="1"/>
+          </p:cNvPicPr>
+          <p:nvPr/>
+        </p:nvPicPr>
+        <p:blipFill>
+          <a:blip r:embed="rId2"/>
+          <a:stretch>
+            <a:fillRect/>
+          </a:stretch>
+        </p:blipFill>
+        <p:spPr>
+          <a:xfrm>
+            <a:off x="8143586" y="2640905"/>
+            <a:ext cx="3569617" cy="3759895"/>
+          </a:xfrm>
+          <a:prstGeom prst="rect">
+            <a:avLst/>
+          </a:prstGeom>
+        </p:spPr>
+      </p:pic>
     </p:spTree>
     <p:extLst>
       <p:ext uri="{BB962C8B-B14F-4D97-AF65-F5344CB8AC3E}">
@@ -21597,24 +22127,8 @@
           <a:p>
             <a:r>
               <a:rPr lang="pt-BR" dirty="0"/>
-              <a:t>Experimento com </a:t>
-            </a:r>
-            <a:r>
-              <a:rPr lang="pt-BR" dirty="0" err="1"/>
-              <a:t>Chaos</a:t>
-            </a:r>
-            <a:r>
-              <a:rPr lang="pt-BR" dirty="0"/>
-              <a:t> Toolkit:</a:t>
-            </a:r>
-            <a:br>
-              <a:rPr lang="pt-BR" dirty="0"/>
-            </a:br>
-            <a:r>
-              <a:rPr lang="pt-BR" dirty="0"/>
-              <a:t>Implementando as Melhorias</a:t>
-            </a:r>
-            <a:endParaRPr lang="pt-BR" dirty="0"/>
+              <a:t>Mergulhando no Caos: As Pessoas</a:t>
+            </a:r>
           </a:p>
         </p:txBody>
       </p:sp>
@@ -21653,8 +22167,49 @@
             </a:pPr>
             <a:r>
               <a:rPr lang="pt-BR" dirty="0"/>
-              <a:t>I</a:t>
-            </a:r>
+              <a:t>O cenário se da a partir da divisão de responsabilidades entre as duas equipes.</a:t>
+            </a:r>
+          </a:p>
+          <a:p>
+            <a:pPr>
+              <a:spcAft>
+                <a:spcPts val="1000"/>
+              </a:spcAft>
+            </a:pPr>
+            <a:r>
+              <a:rPr lang="pt-BR" dirty="0"/>
+              <a:t>No caso de um administrador de cluster remover um cluster para manutenções de rotina por exemplo, isso poderia afetar o serviço que estava naquele cluster e serviços relacionados.</a:t>
+            </a:r>
+          </a:p>
+          <a:p>
+            <a:pPr>
+              <a:spcAft>
+                <a:spcPts val="1000"/>
+              </a:spcAft>
+            </a:pPr>
+            <a:r>
+              <a:rPr lang="pt-BR" dirty="0"/>
+              <a:t>Para tirarmos a dúvida de como essa condição afetará o sistema em um ambiente próximo do real iremos ao experimento.</a:t>
+            </a:r>
+          </a:p>
+          <a:p>
+            <a:pPr>
+              <a:spcAft>
+                <a:spcPts val="1000"/>
+              </a:spcAft>
+            </a:pPr>
+            <a:r>
+              <a:rPr lang="pt-BR" dirty="0"/>
+              <a:t>É hora de deixar a fase de Exploração e entrar na fase de Descoberta no ciclo de aprendizado do caos.</a:t>
+            </a:r>
+          </a:p>
+          <a:p>
+            <a:pPr>
+              <a:spcAft>
+                <a:spcPts val="1000"/>
+              </a:spcAft>
+            </a:pPr>
+            <a:endParaRPr lang="pt-BR" dirty="0"/>
           </a:p>
         </p:txBody>
       </p:sp>
@@ -21716,24 +22271,8 @@
           <a:p>
             <a:r>
               <a:rPr lang="pt-BR" dirty="0"/>
-              <a:t>Experimento com </a:t>
-            </a:r>
-            <a:r>
-              <a:rPr lang="pt-BR" dirty="0" err="1"/>
-              <a:t>Chaos</a:t>
-            </a:r>
-            <a:r>
-              <a:rPr lang="pt-BR" dirty="0"/>
-              <a:t> Toolkit:</a:t>
-            </a:r>
-            <a:br>
-              <a:rPr lang="pt-BR" dirty="0"/>
-            </a:br>
-            <a:r>
-              <a:rPr lang="pt-BR" dirty="0"/>
-              <a:t>Implementando as Melhorias</a:t>
-            </a:r>
-            <a:endParaRPr lang="pt-BR" dirty="0"/>
+              <a:t>Mergulhando no Caos: Experimento</a:t>
+            </a:r>
           </a:p>
         </p:txBody>
       </p:sp>
@@ -21835,24 +22374,8 @@
           <a:p>
             <a:r>
               <a:rPr lang="pt-BR" dirty="0"/>
-              <a:t>Experimento com </a:t>
-            </a:r>
-            <a:r>
-              <a:rPr lang="pt-BR" dirty="0" err="1"/>
-              <a:t>Chaos</a:t>
-            </a:r>
-            <a:r>
-              <a:rPr lang="pt-BR" dirty="0"/>
-              <a:t> Toolkit:</a:t>
-            </a:r>
-            <a:br>
-              <a:rPr lang="pt-BR" dirty="0"/>
-            </a:br>
-            <a:r>
-              <a:rPr lang="pt-BR" dirty="0"/>
-              <a:t>Implementando as Melhorias</a:t>
-            </a:r>
-            <a:endParaRPr lang="pt-BR" dirty="0"/>
+              <a:t>Mergulhando no Caos: Experimento</a:t>
+            </a:r>
           </a:p>
         </p:txBody>
       </p:sp>
@@ -21954,24 +22477,8 @@
           <a:p>
             <a:r>
               <a:rPr lang="pt-BR" dirty="0"/>
-              <a:t>Experimento com </a:t>
-            </a:r>
-            <a:r>
-              <a:rPr lang="pt-BR" dirty="0" err="1"/>
-              <a:t>Chaos</a:t>
-            </a:r>
-            <a:r>
-              <a:rPr lang="pt-BR" dirty="0"/>
-              <a:t> Toolkit:</a:t>
-            </a:r>
-            <a:br>
-              <a:rPr lang="pt-BR" dirty="0"/>
-            </a:br>
-            <a:r>
-              <a:rPr lang="pt-BR" dirty="0"/>
-              <a:t>Implementando as Melhorias</a:t>
-            </a:r>
-            <a:endParaRPr lang="pt-BR" dirty="0"/>
+              <a:t>Mergulhando no Caos: Experimento</a:t>
+            </a:r>
           </a:p>
         </p:txBody>
       </p:sp>
@@ -22073,24 +22580,8 @@
           <a:p>
             <a:r>
               <a:rPr lang="pt-BR" dirty="0"/>
-              <a:t>Experimento com </a:t>
-            </a:r>
-            <a:r>
-              <a:rPr lang="pt-BR" dirty="0" err="1"/>
-              <a:t>Chaos</a:t>
-            </a:r>
-            <a:r>
-              <a:rPr lang="pt-BR" dirty="0"/>
-              <a:t> Toolkit:</a:t>
-            </a:r>
-            <a:br>
-              <a:rPr lang="pt-BR" dirty="0"/>
-            </a:br>
-            <a:r>
-              <a:rPr lang="pt-BR" dirty="0"/>
-              <a:t>Implementando as Melhorias</a:t>
-            </a:r>
-            <a:endParaRPr lang="pt-BR" dirty="0"/>
+              <a:t>Mergulhando no Caos: Experimento</a:t>
+            </a:r>
           </a:p>
         </p:txBody>
       </p:sp>
@@ -22192,24 +22683,8 @@
           <a:p>
             <a:r>
               <a:rPr lang="pt-BR" dirty="0"/>
-              <a:t>Experimento com </a:t>
-            </a:r>
-            <a:r>
-              <a:rPr lang="pt-BR" dirty="0" err="1"/>
-              <a:t>Chaos</a:t>
-            </a:r>
-            <a:r>
-              <a:rPr lang="pt-BR" dirty="0"/>
-              <a:t> Toolkit:</a:t>
-            </a:r>
-            <a:br>
-              <a:rPr lang="pt-BR" dirty="0"/>
-            </a:br>
-            <a:r>
-              <a:rPr lang="pt-BR" dirty="0"/>
-              <a:t>Implementando as Melhorias</a:t>
-            </a:r>
-            <a:endParaRPr lang="pt-BR" dirty="0"/>
+              <a:t>Mergulhando no Caos: Experimento</a:t>
+            </a:r>
           </a:p>
         </p:txBody>
       </p:sp>
@@ -22311,24 +22786,8 @@
           <a:p>
             <a:r>
               <a:rPr lang="pt-BR" dirty="0"/>
-              <a:t>Experimento com </a:t>
-            </a:r>
-            <a:r>
-              <a:rPr lang="pt-BR" dirty="0" err="1"/>
-              <a:t>Chaos</a:t>
-            </a:r>
-            <a:r>
-              <a:rPr lang="pt-BR" dirty="0"/>
-              <a:t> Toolkit:</a:t>
-            </a:r>
-            <a:br>
-              <a:rPr lang="pt-BR" dirty="0"/>
-            </a:br>
-            <a:r>
-              <a:rPr lang="pt-BR" dirty="0"/>
-              <a:t>Implementando as Melhorias</a:t>
-            </a:r>
-            <a:endParaRPr lang="pt-BR" dirty="0"/>
+              <a:t>Mergulhando no Caos: Experimento</a:t>
+            </a:r>
           </a:p>
         </p:txBody>
       </p:sp>
@@ -22496,10 +22955,6 @@
             <a:r>
               <a:rPr lang="pt-BR" sz="2800" dirty="0"/>
               <a:t>Entretanto outras áreas que podem apresentar falhas devem ser levadas em consideração.</a:t>
-            </a:r>
-            <a:r>
-              <a:rPr lang="pt-BR" sz="2400" dirty="0"/>
-              <a:t/>
             </a:r>
             <a:br>
               <a:rPr lang="pt-BR" sz="2400" dirty="0"/>
@@ -22596,24 +23051,8 @@
           <a:p>
             <a:r>
               <a:rPr lang="pt-BR" dirty="0"/>
-              <a:t>Experimento com </a:t>
-            </a:r>
-            <a:r>
-              <a:rPr lang="pt-BR" dirty="0" err="1"/>
-              <a:t>Chaos</a:t>
-            </a:r>
-            <a:r>
-              <a:rPr lang="pt-BR" dirty="0"/>
-              <a:t> Toolkit:</a:t>
-            </a:r>
-            <a:br>
-              <a:rPr lang="pt-BR" dirty="0"/>
-            </a:br>
-            <a:r>
-              <a:rPr lang="pt-BR" dirty="0"/>
-              <a:t>Implementando as Melhorias</a:t>
-            </a:r>
-            <a:endParaRPr lang="pt-BR" dirty="0"/>
+              <a:t>Mergulhando no Caos: Experimento</a:t>
+            </a:r>
           </a:p>
         </p:txBody>
       </p:sp>
@@ -22715,24 +23154,8 @@
           <a:p>
             <a:r>
               <a:rPr lang="pt-BR" dirty="0"/>
-              <a:t>Experimento com </a:t>
-            </a:r>
-            <a:r>
-              <a:rPr lang="pt-BR" dirty="0" err="1"/>
-              <a:t>Chaos</a:t>
-            </a:r>
-            <a:r>
-              <a:rPr lang="pt-BR" dirty="0"/>
-              <a:t> Toolkit:</a:t>
-            </a:r>
-            <a:br>
-              <a:rPr lang="pt-BR" dirty="0"/>
-            </a:br>
-            <a:r>
-              <a:rPr lang="pt-BR" dirty="0"/>
-              <a:t>Implementando as Melhorias</a:t>
-            </a:r>
-            <a:endParaRPr lang="pt-BR" dirty="0"/>
+              <a:t>Mergulhando no Caos: Experimento</a:t>
+            </a:r>
           </a:p>
         </p:txBody>
       </p:sp>
@@ -22851,7 +23274,6 @@
               <a:rPr lang="pt-BR" dirty="0"/>
               <a:t>Implementando as Melhorias</a:t>
             </a:r>
-            <a:endParaRPr lang="pt-BR" dirty="0"/>
           </a:p>
         </p:txBody>
       </p:sp>
@@ -22970,7 +23392,6 @@
               <a:rPr lang="pt-BR" dirty="0"/>
               <a:t>Implementando as Melhorias</a:t>
             </a:r>
-            <a:endParaRPr lang="pt-BR" dirty="0"/>
           </a:p>
         </p:txBody>
       </p:sp>
@@ -23089,7 +23510,6 @@
               <a:rPr lang="pt-BR" dirty="0"/>
               <a:t>Implementando as Melhorias</a:t>
             </a:r>
-            <a:endParaRPr lang="pt-BR" dirty="0"/>
           </a:p>
         </p:txBody>
       </p:sp>
@@ -23208,7 +23628,6 @@
               <a:rPr lang="pt-BR" dirty="0"/>
               <a:t>Implementando as Melhorias</a:t>
             </a:r>
-            <a:endParaRPr lang="pt-BR" dirty="0"/>
           </a:p>
         </p:txBody>
       </p:sp>
@@ -23327,7 +23746,6 @@
               <a:rPr lang="pt-BR" dirty="0"/>
               <a:t>Implementando as Melhorias</a:t>
             </a:r>
-            <a:endParaRPr lang="pt-BR" dirty="0"/>
           </a:p>
         </p:txBody>
       </p:sp>
@@ -23446,7 +23864,6 @@
               <a:rPr lang="pt-BR" dirty="0"/>
               <a:t>Implementando as Melhorias</a:t>
             </a:r>
-            <a:endParaRPr lang="pt-BR" dirty="0"/>
           </a:p>
         </p:txBody>
       </p:sp>
@@ -23565,7 +23982,6 @@
               <a:rPr lang="pt-BR" dirty="0"/>
               <a:t>Implementando as Melhorias</a:t>
             </a:r>
-            <a:endParaRPr lang="pt-BR" dirty="0"/>
           </a:p>
         </p:txBody>
       </p:sp>
@@ -23684,7 +24100,6 @@
               <a:rPr lang="pt-BR" dirty="0"/>
               <a:t>Implementando as Melhorias</a:t>
             </a:r>
-            <a:endParaRPr lang="pt-BR" dirty="0"/>
           </a:p>
         </p:txBody>
       </p:sp>

</xml_diff>

<commit_message>
Experimentos com Kurbenetes e Rollbacks
</commit_message>
<xml_diff>
--- a/docs/Chaos Engineering - Das Hipoteses aos Testes.pptx
+++ b/docs/Chaos Engineering - Das Hipoteses aos Testes.pptx
@@ -8071,22 +8071,7 @@
           <a:p>
             <a:r>
               <a:rPr lang="pt-BR" dirty="0"/>
-              <a:t>Experimento com </a:t>
-            </a:r>
-            <a:r>
-              <a:rPr lang="pt-BR" dirty="0" err="1"/>
-              <a:t>Chaos</a:t>
-            </a:r>
-            <a:r>
-              <a:rPr lang="pt-BR" dirty="0"/>
-              <a:t> Toolkit:</a:t>
-            </a:r>
-            <a:br>
-              <a:rPr lang="pt-BR" dirty="0"/>
-            </a:br>
-            <a:r>
-              <a:rPr lang="pt-BR" dirty="0"/>
-              <a:t>Implementando as Melhorias</a:t>
+              <a:t>Mergulhando no Caos: O Experimento</a:t>
             </a:r>
           </a:p>
         </p:txBody>
@@ -8126,11 +8111,68 @@
             </a:pPr>
             <a:r>
               <a:rPr lang="pt-BR" dirty="0"/>
-              <a:t>I</a:t>
-            </a:r>
-          </a:p>
-        </p:txBody>
-      </p:sp>
+              <a:t>Criação do </a:t>
+            </a:r>
+            <a:r>
+              <a:rPr lang="pt-BR" dirty="0" err="1"/>
+              <a:t>Rollback</a:t>
+            </a:r>
+            <a:r>
+              <a:rPr lang="pt-BR" dirty="0"/>
+              <a:t>:</a:t>
+            </a:r>
+          </a:p>
+          <a:p>
+            <a:pPr lvl="1">
+              <a:spcAft>
+                <a:spcPts val="1000"/>
+              </a:spcAft>
+            </a:pPr>
+            <a:r>
+              <a:rPr lang="pt-BR" dirty="0"/>
+              <a:t>1. A função </a:t>
+            </a:r>
+            <a:r>
+              <a:rPr lang="pt-BR" dirty="0" err="1"/>
+              <a:t>uncordon_node</a:t>
+            </a:r>
+            <a:r>
+              <a:rPr lang="pt-BR" dirty="0"/>
+              <a:t> pode ser usada para colocar de volta para dentro do cluster o nó que foi drenado.</a:t>
+            </a:r>
+          </a:p>
+        </p:txBody>
+      </p:sp>
+      <p:pic>
+        <p:nvPicPr>
+          <p:cNvPr id="3" name="Imagem 2" descr="Tela de celular com texto preto sobre fundo branco&#10;&#10;Descrição gerada automaticamente">
+            <a:extLst>
+              <a:ext uri="{FF2B5EF4-FFF2-40B4-BE49-F238E27FC236}">
+                <a16:creationId xmlns:a16="http://schemas.microsoft.com/office/drawing/2014/main" id="{4F053A24-1862-48D7-93BB-86F504AA78A5}"/>
+              </a:ext>
+            </a:extLst>
+          </p:cNvPr>
+          <p:cNvPicPr>
+            <a:picLocks noChangeAspect="1"/>
+          </p:cNvPicPr>
+          <p:nvPr/>
+        </p:nvPicPr>
+        <p:blipFill>
+          <a:blip r:embed="rId2"/>
+          <a:stretch>
+            <a:fillRect/>
+          </a:stretch>
+        </p:blipFill>
+        <p:spPr>
+          <a:xfrm>
+            <a:off x="3161145" y="3793660"/>
+            <a:ext cx="5869709" cy="2713820"/>
+          </a:xfrm>
+          <a:prstGeom prst="rect">
+            <a:avLst/>
+          </a:prstGeom>
+        </p:spPr>
+      </p:pic>
     </p:spTree>
     <p:extLst>
       <p:ext uri="{BB962C8B-B14F-4D97-AF65-F5344CB8AC3E}">
@@ -8189,22 +8231,7 @@
           <a:p>
             <a:r>
               <a:rPr lang="pt-BR" dirty="0"/>
-              <a:t>Experimento com </a:t>
-            </a:r>
-            <a:r>
-              <a:rPr lang="pt-BR" dirty="0" err="1"/>
-              <a:t>Chaos</a:t>
-            </a:r>
-            <a:r>
-              <a:rPr lang="pt-BR" dirty="0"/>
-              <a:t> Toolkit:</a:t>
-            </a:r>
-            <a:br>
-              <a:rPr lang="pt-BR" dirty="0"/>
-            </a:br>
-            <a:r>
-              <a:rPr lang="pt-BR" dirty="0"/>
-              <a:t>Implementando as Melhorias</a:t>
+              <a:t>Mergulhando no Caos: O Experimento</a:t>
             </a:r>
           </a:p>
         </p:txBody>
@@ -8244,7 +8271,111 @@
             </a:pPr>
             <a:r>
               <a:rPr lang="pt-BR" dirty="0"/>
-              <a:t>I</a:t>
+              <a:t>Criação do </a:t>
+            </a:r>
+            <a:r>
+              <a:rPr lang="pt-BR" dirty="0" err="1"/>
+              <a:t>Rollback</a:t>
+            </a:r>
+            <a:r>
+              <a:rPr lang="pt-BR" dirty="0"/>
+              <a:t>:</a:t>
+            </a:r>
+          </a:p>
+          <a:p>
+            <a:pPr lvl="1">
+              <a:spcAft>
+                <a:spcPts val="1000"/>
+              </a:spcAft>
+            </a:pPr>
+            <a:r>
+              <a:rPr lang="pt-BR" dirty="0"/>
+              <a:t>2. O nome do node deverá ser o mesmo do nó que foi drenado durante o experimento. Você pode obter a lista de nós com o comando do </a:t>
+            </a:r>
+            <a:r>
+              <a:rPr lang="pt-BR" dirty="0" err="1"/>
+              <a:t>Kurbenetes</a:t>
+            </a:r>
+            <a:r>
+              <a:rPr lang="pt-BR" dirty="0"/>
+              <a:t> </a:t>
+            </a:r>
+            <a:r>
+              <a:rPr lang="pt-BR" dirty="0" err="1">
+                <a:highlight>
+                  <a:srgbClr val="000000"/>
+                </a:highlight>
+              </a:rPr>
+              <a:t>kubectl</a:t>
+            </a:r>
+            <a:r>
+              <a:rPr lang="pt-BR" dirty="0">
+                <a:highlight>
+                  <a:srgbClr val="000000"/>
+                </a:highlight>
+              </a:rPr>
+              <a:t> get nodes</a:t>
+            </a:r>
+            <a:r>
+              <a:rPr lang="pt-BR" dirty="0"/>
+              <a:t>. </a:t>
+            </a:r>
+          </a:p>
+          <a:p>
+            <a:pPr lvl="1">
+              <a:spcAft>
+                <a:spcPts val="1000"/>
+              </a:spcAft>
+            </a:pPr>
+            <a:r>
+              <a:rPr lang="pt-BR" dirty="0"/>
+              <a:t>*Embora seja uma boa ideia reverter as alterações feitas durante o experimento, a criação do </a:t>
+            </a:r>
+            <a:r>
+              <a:rPr lang="pt-BR" dirty="0" err="1"/>
+              <a:t>rollback</a:t>
+            </a:r>
+            <a:r>
+              <a:rPr lang="pt-BR" dirty="0"/>
+              <a:t> não é obrigatória.</a:t>
+            </a:r>
+          </a:p>
+          <a:p>
+            <a:pPr lvl="1">
+              <a:spcAft>
+                <a:spcPts val="1000"/>
+              </a:spcAft>
+            </a:pPr>
+            <a:r>
+              <a:rPr lang="pt-BR" dirty="0"/>
+              <a:t>Se desejarmos observar o comportamento do sistema durante um período de tempo, não faz sentido a criação do </a:t>
+            </a:r>
+            <a:r>
+              <a:rPr lang="pt-BR" dirty="0" err="1"/>
+              <a:t>rollback</a:t>
+            </a:r>
+            <a:r>
+              <a:rPr lang="pt-BR" dirty="0"/>
+              <a:t>.</a:t>
+            </a:r>
+          </a:p>
+          <a:p>
+            <a:pPr lvl="1">
+              <a:spcAft>
+                <a:spcPts val="1000"/>
+              </a:spcAft>
+            </a:pPr>
+            <a:r>
+              <a:rPr lang="pt-BR" dirty="0"/>
+              <a:t>O mesmo pensamento vale para os </a:t>
+            </a:r>
+            <a:r>
+              <a:rPr lang="pt-BR" dirty="0" err="1"/>
+              <a:t>rollbacks</a:t>
+            </a:r>
+            <a:r>
+              <a:rPr lang="pt-BR" dirty="0"/>
+              <a:t> automáticos, embora seja uma ação padrão na criação de um experimento ela não é obrigatória.</a:t>
             </a:r>
           </a:p>
         </p:txBody>
@@ -22271,7 +22402,7 @@
           <a:p>
             <a:r>
               <a:rPr lang="pt-BR" dirty="0"/>
-              <a:t>Mergulhando no Caos: Experimento</a:t>
+              <a:t>Mergulhando no Caos: O Experimento</a:t>
             </a:r>
           </a:p>
         </p:txBody>
@@ -22311,11 +22442,82 @@
             </a:pPr>
             <a:r>
               <a:rPr lang="pt-BR" dirty="0"/>
-              <a:t>I</a:t>
-            </a:r>
-          </a:p>
-        </p:txBody>
-      </p:sp>
+              <a:t>Nomeando o Experimento:</a:t>
+            </a:r>
+          </a:p>
+          <a:p>
+            <a:pPr lvl="1">
+              <a:spcAft>
+                <a:spcPts val="1000"/>
+              </a:spcAft>
+            </a:pPr>
+            <a:r>
+              <a:rPr lang="pt-BR" dirty="0"/>
+              <a:t>Crie um novo arquivo </a:t>
+            </a:r>
+            <a:r>
+              <a:rPr lang="pt-BR" dirty="0" err="1"/>
+              <a:t>experiment.json</a:t>
+            </a:r>
+            <a:r>
+              <a:rPr lang="pt-BR" dirty="0"/>
+              <a:t> no diretório do capitulo 6</a:t>
+            </a:r>
+          </a:p>
+          <a:p>
+            <a:pPr lvl="1">
+              <a:spcAft>
+                <a:spcPts val="1000"/>
+              </a:spcAft>
+            </a:pPr>
+            <a:r>
+              <a:rPr lang="pt-BR" dirty="0"/>
+              <a:t>Crie a definição do experimento</a:t>
+            </a:r>
+          </a:p>
+          <a:p>
+            <a:pPr lvl="1">
+              <a:spcAft>
+                <a:spcPts val="1000"/>
+              </a:spcAft>
+            </a:pPr>
+            <a:r>
+              <a:rPr lang="pt-BR" dirty="0"/>
+              <a:t>Complete a seção de descrição com algumas tags</a:t>
+            </a:r>
+          </a:p>
+        </p:txBody>
+      </p:sp>
+      <p:pic>
+        <p:nvPicPr>
+          <p:cNvPr id="3" name="Imagem 2" descr="Tela de celular com texto preto sobre fundo branco&#10;&#10;Descrição gerada automaticamente">
+            <a:extLst>
+              <a:ext uri="{FF2B5EF4-FFF2-40B4-BE49-F238E27FC236}">
+                <a16:creationId xmlns:a16="http://schemas.microsoft.com/office/drawing/2014/main" id="{7520A8EB-2E63-4A8A-9AC6-2ACFC1972BAC}"/>
+              </a:ext>
+            </a:extLst>
+          </p:cNvPr>
+          <p:cNvPicPr>
+            <a:picLocks noChangeAspect="1"/>
+          </p:cNvPicPr>
+          <p:nvPr/>
+        </p:nvPicPr>
+        <p:blipFill>
+          <a:blip r:embed="rId2"/>
+          <a:stretch>
+            <a:fillRect/>
+          </a:stretch>
+        </p:blipFill>
+        <p:spPr>
+          <a:xfrm>
+            <a:off x="2727960" y="4623548"/>
+            <a:ext cx="6736080" cy="1762088"/>
+          </a:xfrm>
+          <a:prstGeom prst="rect">
+            <a:avLst/>
+          </a:prstGeom>
+        </p:spPr>
+      </p:pic>
     </p:spTree>
     <p:extLst>
       <p:ext uri="{BB962C8B-B14F-4D97-AF65-F5344CB8AC3E}">
@@ -22374,7 +22576,7 @@
           <a:p>
             <a:r>
               <a:rPr lang="pt-BR" dirty="0"/>
-              <a:t>Mergulhando no Caos: Experimento</a:t>
+              <a:t>Mergulhando no Caos: O Experimento</a:t>
             </a:r>
           </a:p>
         </p:txBody>
@@ -22414,7 +22616,62 @@
             </a:pPr>
             <a:r>
               <a:rPr lang="pt-BR" dirty="0"/>
-              <a:t>I</a:t>
+              <a:t>Nomeando o Experimento:</a:t>
+            </a:r>
+          </a:p>
+          <a:p>
+            <a:pPr lvl="1">
+              <a:spcAft>
+                <a:spcPts val="1000"/>
+              </a:spcAft>
+            </a:pPr>
+            <a:r>
+              <a:rPr lang="pt-BR" dirty="0"/>
+              <a:t>1. Declaração da crença. Acreditamos que o sistema se comportará bem durante o experimento.</a:t>
+            </a:r>
+          </a:p>
+          <a:p>
+            <a:pPr lvl="1">
+              <a:spcAft>
+                <a:spcPts val="1000"/>
+              </a:spcAft>
+            </a:pPr>
+            <a:r>
+              <a:rPr lang="pt-BR" dirty="0"/>
+              <a:t>2. Descrição detalhada, possível dúvida do porque do experimento estar sendo executado</a:t>
+            </a:r>
+          </a:p>
+          <a:p>
+            <a:pPr lvl="1">
+              <a:spcAft>
+                <a:spcPts val="1000"/>
+              </a:spcAft>
+            </a:pPr>
+            <a:r>
+              <a:rPr lang="pt-BR" dirty="0"/>
+              <a:t>3. Indicação da plataforma aonde o experimento será executado.</a:t>
+            </a:r>
+          </a:p>
+          <a:p>
+            <a:pPr>
+              <a:spcAft>
+                <a:spcPts val="1000"/>
+              </a:spcAft>
+            </a:pPr>
+            <a:r>
+              <a:rPr lang="pt-BR" dirty="0"/>
+              <a:t>Definindo a Hipótese de Estado:</a:t>
+            </a:r>
+          </a:p>
+          <a:p>
+            <a:pPr lvl="1">
+              <a:spcAft>
+                <a:spcPts val="1000"/>
+              </a:spcAft>
+            </a:pPr>
+            <a:r>
+              <a:rPr lang="pt-BR" dirty="0"/>
+              <a:t>Definição do estado normal do sistema. Definição do que é o comportamento normal esperado.</a:t>
             </a:r>
           </a:p>
         </p:txBody>
@@ -22477,7 +22734,7 @@
           <a:p>
             <a:r>
               <a:rPr lang="pt-BR" dirty="0"/>
-              <a:t>Mergulhando no Caos: Experimento</a:t>
+              <a:t>Mergulhando no Caos: O Experimento</a:t>
             </a:r>
           </a:p>
         </p:txBody>
@@ -22501,7 +22758,7 @@
         <p:spPr>
           <a:xfrm>
             <a:off x="680321" y="2505456"/>
-            <a:ext cx="9484759" cy="3599316"/>
+            <a:ext cx="9439039" cy="3599316"/>
           </a:xfrm>
         </p:spPr>
         <p:txBody>
@@ -22517,8 +22774,76 @@
             </a:pPr>
             <a:r>
               <a:rPr lang="pt-BR" dirty="0"/>
-              <a:t>I</a:t>
-            </a:r>
+              <a:t>Definindo a Hipótese de Estado:</a:t>
+            </a:r>
+          </a:p>
+          <a:p>
+            <a:pPr lvl="1">
+              <a:spcAft>
+                <a:spcPts val="1000"/>
+              </a:spcAft>
+            </a:pPr>
+            <a:r>
+              <a:rPr lang="pt-BR" dirty="0"/>
+              <a:t>O sistema deverá oferecer resiliência mesmo com as condições turbulentas injetadas durante o experimento.</a:t>
+            </a:r>
+          </a:p>
+          <a:p>
+            <a:pPr lvl="1">
+              <a:spcAft>
+                <a:spcPts val="1000"/>
+              </a:spcAft>
+            </a:pPr>
+            <a:r>
+              <a:rPr lang="pt-BR" dirty="0"/>
+              <a:t>Como já vimos a hipótese de estado é composta de uma ou mais </a:t>
+            </a:r>
+            <a:r>
+              <a:rPr lang="pt-BR" dirty="0" err="1"/>
+              <a:t>probes</a:t>
+            </a:r>
+            <a:r>
+              <a:rPr lang="pt-BR" dirty="0"/>
+              <a:t>/investigações e tolerâncias associadas.</a:t>
+            </a:r>
+          </a:p>
+          <a:p>
+            <a:pPr lvl="1">
+              <a:spcAft>
+                <a:spcPts val="1000"/>
+              </a:spcAft>
+            </a:pPr>
+            <a:r>
+              <a:rPr lang="pt-BR" dirty="0"/>
+              <a:t>Cada </a:t>
+            </a:r>
+            <a:r>
+              <a:rPr lang="pt-BR" dirty="0" err="1"/>
+              <a:t>probe</a:t>
+            </a:r>
+            <a:r>
+              <a:rPr lang="pt-BR" dirty="0"/>
+              <a:t> irá validar os valores de tolerância e comparar com o estado atual do sistema</a:t>
+            </a:r>
+          </a:p>
+          <a:p>
+            <a:pPr lvl="1">
+              <a:spcAft>
+                <a:spcPts val="1000"/>
+              </a:spcAft>
+            </a:pPr>
+            <a:r>
+              <a:rPr lang="pt-BR" dirty="0"/>
+              <a:t>Se todos os dados forem validados com sucesso o sistema estará em um estado normal, caso contrário há uma falha a ser corrigida.</a:t>
+            </a:r>
+          </a:p>
+          <a:p>
+            <a:pPr lvl="1">
+              <a:spcAft>
+                <a:spcPts val="1000"/>
+              </a:spcAft>
+            </a:pPr>
+            <a:endParaRPr lang="pt-BR" dirty="0"/>
           </a:p>
         </p:txBody>
       </p:sp>
@@ -22580,7 +22905,7 @@
           <a:p>
             <a:r>
               <a:rPr lang="pt-BR" dirty="0"/>
-              <a:t>Mergulhando no Caos: Experimento</a:t>
+              <a:t>Mergulhando no Caos: O Experimento</a:t>
             </a:r>
           </a:p>
         </p:txBody>
@@ -22620,11 +22945,60 @@
             </a:pPr>
             <a:r>
               <a:rPr lang="pt-BR" dirty="0"/>
-              <a:t>I</a:t>
-            </a:r>
-          </a:p>
-        </p:txBody>
-      </p:sp>
+              <a:t>Definindo a Hipótese de Estado:</a:t>
+            </a:r>
+          </a:p>
+          <a:p>
+            <a:pPr lvl="1">
+              <a:spcAft>
+                <a:spcPts val="1000"/>
+              </a:spcAft>
+            </a:pPr>
+            <a:r>
+              <a:rPr lang="pt-BR" dirty="0"/>
+              <a:t>Defina a hipótese de estado na próxima seção do arquivo </a:t>
+            </a:r>
+            <a:r>
+              <a:rPr lang="pt-BR" dirty="0" err="1"/>
+              <a:t>experiment.json</a:t>
+            </a:r>
+            <a:r>
+              <a:rPr lang="pt-BR" dirty="0"/>
+              <a:t> como mostrado abaixo:</a:t>
+            </a:r>
+          </a:p>
+        </p:txBody>
+      </p:sp>
+      <p:pic>
+        <p:nvPicPr>
+          <p:cNvPr id="7" name="Imagem 6" descr="Tela de celular com texto preto sobre fundo branco&#10;&#10;Descrição gerada automaticamente">
+            <a:extLst>
+              <a:ext uri="{FF2B5EF4-FFF2-40B4-BE49-F238E27FC236}">
+                <a16:creationId xmlns:a16="http://schemas.microsoft.com/office/drawing/2014/main" id="{373E52E4-1D8C-4A9F-B70B-6EE4E6191D2F}"/>
+              </a:ext>
+            </a:extLst>
+          </p:cNvPr>
+          <p:cNvPicPr>
+            <a:picLocks noChangeAspect="1"/>
+          </p:cNvPicPr>
+          <p:nvPr/>
+        </p:nvPicPr>
+        <p:blipFill>
+          <a:blip r:embed="rId2"/>
+          <a:stretch>
+            <a:fillRect/>
+          </a:stretch>
+        </p:blipFill>
+        <p:spPr>
+          <a:xfrm>
+            <a:off x="3552642" y="3821299"/>
+            <a:ext cx="5086716" cy="2724034"/>
+          </a:xfrm>
+          <a:prstGeom prst="rect">
+            <a:avLst/>
+          </a:prstGeom>
+        </p:spPr>
+      </p:pic>
     </p:spTree>
     <p:extLst>
       <p:ext uri="{BB962C8B-B14F-4D97-AF65-F5344CB8AC3E}">
@@ -22683,7 +23057,7 @@
           <a:p>
             <a:r>
               <a:rPr lang="pt-BR" dirty="0"/>
-              <a:t>Mergulhando no Caos: Experimento</a:t>
+              <a:t>Mergulhando no Caos: O Experimento</a:t>
             </a:r>
           </a:p>
         </p:txBody>
@@ -22723,11 +23097,60 @@
             </a:pPr>
             <a:r>
               <a:rPr lang="pt-BR" dirty="0"/>
-              <a:t>I</a:t>
-            </a:r>
-          </a:p>
-        </p:txBody>
-      </p:sp>
+              <a:t>Definindo a Hipótese de Estado:</a:t>
+            </a:r>
+          </a:p>
+          <a:p>
+            <a:pPr lvl="1">
+              <a:spcAft>
+                <a:spcPts val="1000"/>
+              </a:spcAft>
+            </a:pPr>
+            <a:r>
+              <a:rPr lang="pt-BR" dirty="0"/>
+              <a:t>Configuração da hipótese de estado.</a:t>
+            </a:r>
+          </a:p>
+          <a:p>
+            <a:pPr>
+              <a:spcAft>
+                <a:spcPts val="1000"/>
+              </a:spcAft>
+            </a:pPr>
+            <a:endParaRPr lang="pt-BR" dirty="0"/>
+          </a:p>
+        </p:txBody>
+      </p:sp>
+      <p:pic>
+        <p:nvPicPr>
+          <p:cNvPr id="6" name="Imagem 5" descr="Texto preto sobre fundo branco&#10;&#10;Descrição gerada automaticamente">
+            <a:extLst>
+              <a:ext uri="{FF2B5EF4-FFF2-40B4-BE49-F238E27FC236}">
+                <a16:creationId xmlns:a16="http://schemas.microsoft.com/office/drawing/2014/main" id="{C14BBD80-A053-4667-991C-D82C308EF958}"/>
+              </a:ext>
+            </a:extLst>
+          </p:cNvPr>
+          <p:cNvPicPr>
+            <a:picLocks noChangeAspect="1"/>
+          </p:cNvPicPr>
+          <p:nvPr/>
+        </p:nvPicPr>
+        <p:blipFill>
+          <a:blip r:embed="rId2"/>
+          <a:stretch>
+            <a:fillRect/>
+          </a:stretch>
+        </p:blipFill>
+        <p:spPr>
+          <a:xfrm>
+            <a:off x="3946018" y="3474304"/>
+            <a:ext cx="4237862" cy="3091554"/>
+          </a:xfrm>
+          <a:prstGeom prst="rect">
+            <a:avLst/>
+          </a:prstGeom>
+        </p:spPr>
+      </p:pic>
     </p:spTree>
     <p:extLst>
       <p:ext uri="{BB962C8B-B14F-4D97-AF65-F5344CB8AC3E}">
@@ -22786,7 +23209,7 @@
           <a:p>
             <a:r>
               <a:rPr lang="pt-BR" dirty="0"/>
-              <a:t>Mergulhando no Caos: Experimento</a:t>
+              <a:t>Mergulhando no Caos: O Experimento</a:t>
             </a:r>
           </a:p>
         </p:txBody>
@@ -22826,8 +23249,114 @@
             </a:pPr>
             <a:r>
               <a:rPr lang="pt-BR" dirty="0"/>
-              <a:t>I</a:t>
-            </a:r>
+              <a:t>Definindo a Hipótese de Estado:</a:t>
+            </a:r>
+          </a:p>
+          <a:p>
+            <a:pPr lvl="1">
+              <a:spcAft>
+                <a:spcPts val="1000"/>
+              </a:spcAft>
+            </a:pPr>
+            <a:r>
+              <a:rPr lang="pt-BR" dirty="0"/>
+              <a:t>1. O título descreve o comportamento normal do sistema de acordo com o que se acredita.</a:t>
+            </a:r>
+          </a:p>
+          <a:p>
+            <a:pPr lvl="1">
+              <a:spcAft>
+                <a:spcPts val="1000"/>
+              </a:spcAft>
+            </a:pPr>
+            <a:r>
+              <a:rPr lang="pt-BR" dirty="0"/>
+              <a:t>2. A tolerância neste caso espera uma resposta http com o código 200</a:t>
+            </a:r>
+          </a:p>
+          <a:p>
+            <a:pPr lvl="1">
+              <a:spcAft>
+                <a:spcPts val="1000"/>
+              </a:spcAft>
+            </a:pPr>
+            <a:r>
+              <a:rPr lang="pt-BR" dirty="0"/>
+              <a:t>3. A primeira </a:t>
+            </a:r>
+            <a:r>
+              <a:rPr lang="pt-BR" dirty="0" err="1"/>
+              <a:t>probe</a:t>
+            </a:r>
+            <a:r>
+              <a:rPr lang="pt-BR" dirty="0"/>
+              <a:t> usa o http para acessar o valor de retorno de um </a:t>
+            </a:r>
+            <a:r>
+              <a:rPr lang="pt-BR" dirty="0" err="1"/>
+              <a:t>endpoint</a:t>
+            </a:r>
+            <a:r>
+              <a:rPr lang="pt-BR" dirty="0"/>
+              <a:t>.</a:t>
+            </a:r>
+          </a:p>
+          <a:p>
+            <a:pPr lvl="1">
+              <a:spcAft>
+                <a:spcPts val="1000"/>
+              </a:spcAft>
+            </a:pPr>
+            <a:r>
+              <a:rPr lang="pt-BR" dirty="0"/>
+              <a:t>4. O valor precisará ser alterado para o </a:t>
+            </a:r>
+            <a:r>
+              <a:rPr lang="pt-BR" dirty="0" err="1"/>
+              <a:t>endpoint</a:t>
+            </a:r>
+            <a:r>
+              <a:rPr lang="pt-BR" dirty="0"/>
+              <a:t> do serviço</a:t>
+            </a:r>
+          </a:p>
+          <a:p>
+            <a:pPr lvl="1">
+              <a:spcAft>
+                <a:spcPts val="1000"/>
+              </a:spcAft>
+            </a:pPr>
+            <a:r>
+              <a:rPr lang="pt-BR" dirty="0"/>
+              <a:t>5. Definição de um tempo de espera máximo</a:t>
+            </a:r>
+          </a:p>
+          <a:p>
+            <a:pPr lvl="1">
+              <a:spcAft>
+                <a:spcPts val="1000"/>
+              </a:spcAft>
+            </a:pPr>
+            <a:r>
+              <a:rPr lang="pt-BR" dirty="0"/>
+              <a:t>6. A segunda </a:t>
+            </a:r>
+            <a:r>
+              <a:rPr lang="pt-BR" dirty="0" err="1"/>
+              <a:t>probe</a:t>
+            </a:r>
+            <a:r>
+              <a:rPr lang="pt-BR" dirty="0"/>
+              <a:t> faz uma chamada para um módulo Python</a:t>
+            </a:r>
+          </a:p>
+          <a:p>
+            <a:pPr>
+              <a:spcAft>
+                <a:spcPts val="1000"/>
+              </a:spcAft>
+            </a:pPr>
+            <a:endParaRPr lang="pt-BR" dirty="0"/>
           </a:p>
         </p:txBody>
       </p:sp>
@@ -23051,7 +23580,7 @@
           <a:p>
             <a:r>
               <a:rPr lang="pt-BR" dirty="0"/>
-              <a:t>Mergulhando no Caos: Experimento</a:t>
+              <a:t>Mergulhando no Caos: O Experimento</a:t>
             </a:r>
           </a:p>
         </p:txBody>
@@ -23091,8 +23620,86 @@
             </a:pPr>
             <a:r>
               <a:rPr lang="pt-BR" dirty="0"/>
-              <a:t>I</a:t>
-            </a:r>
+              <a:t>Definindo a Hipótese de Estado:</a:t>
+            </a:r>
+          </a:p>
+          <a:p>
+            <a:pPr lvl="1">
+              <a:spcAft>
+                <a:spcPts val="1000"/>
+              </a:spcAft>
+            </a:pPr>
+            <a:r>
+              <a:rPr lang="pt-BR" dirty="0"/>
+              <a:t>7. O nome do módulo Python usado nessa </a:t>
+            </a:r>
+            <a:r>
+              <a:rPr lang="pt-BR" dirty="0" err="1"/>
+              <a:t>probe</a:t>
+            </a:r>
+            <a:endParaRPr lang="pt-BR" dirty="0"/>
+          </a:p>
+          <a:p>
+            <a:pPr lvl="1">
+              <a:spcAft>
+                <a:spcPts val="1000"/>
+              </a:spcAft>
+            </a:pPr>
+            <a:r>
+              <a:rPr lang="pt-BR" dirty="0"/>
+              <a:t>8. Nome da função Python usada nessa </a:t>
+            </a:r>
+            <a:r>
+              <a:rPr lang="pt-BR" dirty="0" err="1"/>
+              <a:t>probe</a:t>
+            </a:r>
+            <a:endParaRPr lang="pt-BR" dirty="0"/>
+          </a:p>
+          <a:p>
+            <a:pPr lvl="1">
+              <a:spcAft>
+                <a:spcPts val="1000"/>
+              </a:spcAft>
+            </a:pPr>
+            <a:r>
+              <a:rPr lang="pt-BR" dirty="0"/>
+              <a:t>9. Lista de argumentos suportados pelo módulo do Python</a:t>
+            </a:r>
+          </a:p>
+          <a:p>
+            <a:pPr lvl="1">
+              <a:spcAft>
+                <a:spcPts val="1000"/>
+              </a:spcAft>
+            </a:pPr>
+            <a:r>
+              <a:rPr lang="pt-BR" dirty="0"/>
+              <a:t>*Essa hipótese nos mostra 2 exemplos de </a:t>
+            </a:r>
+            <a:r>
+              <a:rPr lang="pt-BR" dirty="0" err="1"/>
+              <a:t>probes</a:t>
+            </a:r>
+            <a:r>
+              <a:rPr lang="pt-BR" dirty="0"/>
+              <a:t>, seja uma chamada http ou uma função de um módulo Python</a:t>
+            </a:r>
+          </a:p>
+          <a:p>
+            <a:pPr lvl="1">
+              <a:spcAft>
+                <a:spcPts val="1000"/>
+              </a:spcAft>
+            </a:pPr>
+            <a:r>
+              <a:rPr lang="pt-BR" dirty="0"/>
+              <a:t>**Há ainda uma terceira forma, ao usar uma chamada para um processo local como uma </a:t>
+            </a:r>
+            <a:r>
+              <a:rPr lang="pt-BR" dirty="0" err="1"/>
+              <a:t>probe</a:t>
+            </a:r>
+            <a:endParaRPr lang="pt-BR" dirty="0"/>
           </a:p>
         </p:txBody>
       </p:sp>
@@ -23154,7 +23761,7 @@
           <a:p>
             <a:r>
               <a:rPr lang="pt-BR" dirty="0"/>
-              <a:t>Mergulhando no Caos: Experimento</a:t>
+              <a:t>Mergulhando no Caos: O Experimento</a:t>
             </a:r>
           </a:p>
         </p:txBody>
@@ -23194,8 +23801,111 @@
             </a:pPr>
             <a:r>
               <a:rPr lang="pt-BR" dirty="0"/>
-              <a:t>I</a:t>
-            </a:r>
+              <a:t>Definindo a Hipótese de Estado:</a:t>
+            </a:r>
+          </a:p>
+          <a:p>
+            <a:pPr lvl="1">
+              <a:spcAft>
+                <a:spcPts val="1000"/>
+              </a:spcAft>
+            </a:pPr>
+            <a:r>
+              <a:rPr lang="pt-BR" dirty="0"/>
+              <a:t>Essa hipótese criada verifica se o alvo responde com o status </a:t>
+            </a:r>
+            <a:r>
+              <a:rPr lang="pt-BR" dirty="0" err="1"/>
+              <a:t>code</a:t>
+            </a:r>
+            <a:br>
+              <a:rPr lang="pt-BR" dirty="0"/>
+            </a:br>
+            <a:r>
+              <a:rPr lang="pt-BR" dirty="0"/>
+              <a:t>http 200, com um limite de tempo máximo de 3 segundos.</a:t>
+            </a:r>
+          </a:p>
+          <a:p>
+            <a:pPr lvl="1">
+              <a:spcAft>
+                <a:spcPts val="1000"/>
+              </a:spcAft>
+            </a:pPr>
+            <a:r>
+              <a:rPr lang="pt-BR" dirty="0"/>
+              <a:t>Ela também verifica se os </a:t>
+            </a:r>
+            <a:r>
+              <a:rPr lang="pt-BR" dirty="0" err="1"/>
+              <a:t>pods</a:t>
+            </a:r>
+            <a:r>
+              <a:rPr lang="pt-BR" dirty="0"/>
+              <a:t> que o </a:t>
+            </a:r>
+            <a:r>
+              <a:rPr lang="pt-BR" dirty="0" err="1"/>
+              <a:t>Kurbenetes</a:t>
+            </a:r>
+            <a:r>
+              <a:rPr lang="pt-BR" dirty="0"/>
+              <a:t> está monitorando estão executando o sistema em um estado normal.</a:t>
+            </a:r>
+          </a:p>
+          <a:p>
+            <a:pPr>
+              <a:spcAft>
+                <a:spcPts val="1000"/>
+              </a:spcAft>
+            </a:pPr>
+            <a:r>
+              <a:rPr lang="pt-BR" dirty="0"/>
+              <a:t>O próximo passo é a criação do nosso método, mas para isso, primeiro iremos precisar de uma pequena configuração.</a:t>
+            </a:r>
+          </a:p>
+          <a:p>
+            <a:pPr>
+              <a:spcAft>
+                <a:spcPts val="1000"/>
+              </a:spcAft>
+            </a:pPr>
+            <a:r>
+              <a:rPr lang="pt-BR" dirty="0"/>
+              <a:t>*Para que o Chaos Toolkit trabalhe com o </a:t>
+            </a:r>
+            <a:r>
+              <a:rPr lang="pt-BR" dirty="0" err="1"/>
+              <a:t>Kurbenetes</a:t>
+            </a:r>
+            <a:r>
+              <a:rPr lang="pt-BR" dirty="0"/>
+              <a:t> é necessário a instalação de um plugin adicional.</a:t>
+            </a:r>
+          </a:p>
+          <a:p>
+            <a:pPr>
+              <a:spcAft>
+                <a:spcPts val="1000"/>
+              </a:spcAft>
+            </a:pPr>
+            <a:endParaRPr lang="pt-BR" dirty="0"/>
+          </a:p>
+          <a:p>
+            <a:pPr>
+              <a:spcAft>
+                <a:spcPts val="1000"/>
+              </a:spcAft>
+            </a:pPr>
+            <a:endParaRPr lang="pt-BR" dirty="0"/>
+          </a:p>
+          <a:p>
+            <a:pPr>
+              <a:spcAft>
+                <a:spcPts val="1000"/>
+              </a:spcAft>
+            </a:pPr>
+            <a:endParaRPr lang="pt-BR" dirty="0"/>
           </a:p>
         </p:txBody>
       </p:sp>
@@ -23257,22 +23967,7 @@
           <a:p>
             <a:r>
               <a:rPr lang="pt-BR" dirty="0"/>
-              <a:t>Experimento com </a:t>
-            </a:r>
-            <a:r>
-              <a:rPr lang="pt-BR" dirty="0" err="1"/>
-              <a:t>Chaos</a:t>
-            </a:r>
-            <a:r>
-              <a:rPr lang="pt-BR" dirty="0"/>
-              <a:t> Toolkit:</a:t>
-            </a:r>
-            <a:br>
-              <a:rPr lang="pt-BR" dirty="0"/>
-            </a:br>
-            <a:r>
-              <a:rPr lang="pt-BR" dirty="0"/>
-              <a:t>Implementando as Melhorias</a:t>
+              <a:t>Mergulhando no Caos: O Experimento</a:t>
             </a:r>
           </a:p>
         </p:txBody>
@@ -23296,7 +23991,7 @@
         <p:spPr>
           <a:xfrm>
             <a:off x="680321" y="2505456"/>
-            <a:ext cx="9484759" cy="3599316"/>
+            <a:ext cx="9613861" cy="3599316"/>
           </a:xfrm>
         </p:spPr>
         <p:txBody>
@@ -23312,7 +24007,144 @@
             </a:pPr>
             <a:r>
               <a:rPr lang="pt-BR" dirty="0"/>
-              <a:t>I</a:t>
+              <a:t>Dentro do ambiente de caos execute o seguinte comando:</a:t>
+            </a:r>
+            <a:br>
+              <a:rPr lang="pt-BR" dirty="0"/>
+            </a:br>
+            <a:r>
+              <a:rPr lang="pt-BR" i="1" dirty="0">
+                <a:highlight>
+                  <a:srgbClr val="000000"/>
+                </a:highlight>
+              </a:rPr>
+              <a:t>$ </a:t>
+            </a:r>
+            <a:r>
+              <a:rPr lang="pt-BR" i="1" dirty="0" err="1">
+                <a:highlight>
+                  <a:srgbClr val="000000"/>
+                </a:highlight>
+              </a:rPr>
+              <a:t>pip</a:t>
+            </a:r>
+            <a:r>
+              <a:rPr lang="pt-BR" i="1" dirty="0">
+                <a:highlight>
+                  <a:srgbClr val="000000"/>
+                </a:highlight>
+              </a:rPr>
+              <a:t> </a:t>
+            </a:r>
+            <a:r>
+              <a:rPr lang="pt-BR" i="1" dirty="0" err="1">
+                <a:highlight>
+                  <a:srgbClr val="000000"/>
+                </a:highlight>
+              </a:rPr>
+              <a:t>install</a:t>
+            </a:r>
+            <a:r>
+              <a:rPr lang="pt-BR" i="1" dirty="0">
+                <a:highlight>
+                  <a:srgbClr val="000000"/>
+                </a:highlight>
+              </a:rPr>
+              <a:t> </a:t>
+            </a:r>
+            <a:r>
+              <a:rPr lang="pt-BR" i="1" dirty="0" err="1">
+                <a:highlight>
+                  <a:srgbClr val="000000"/>
+                </a:highlight>
+              </a:rPr>
+              <a:t>chaostoolkit-kubernetes</a:t>
+            </a:r>
+            <a:endParaRPr lang="pt-BR" i="1" dirty="0">
+              <a:highlight>
+                <a:srgbClr val="000000"/>
+              </a:highlight>
+            </a:endParaRPr>
+          </a:p>
+          <a:p>
+            <a:pPr>
+              <a:spcAft>
+                <a:spcPts val="1000"/>
+              </a:spcAft>
+            </a:pPr>
+            <a:r>
+              <a:rPr lang="pt-BR" dirty="0"/>
+              <a:t>Isso é tudo que precisamos para trabalhar com </a:t>
+            </a:r>
+            <a:r>
+              <a:rPr lang="pt-BR" dirty="0" err="1"/>
+              <a:t>Kurbenetes</a:t>
+            </a:r>
+            <a:r>
+              <a:rPr lang="pt-BR" dirty="0"/>
+              <a:t> usando o Chaos Toolkit</a:t>
+            </a:r>
+          </a:p>
+          <a:p>
+            <a:pPr>
+              <a:spcAft>
+                <a:spcPts val="1000"/>
+              </a:spcAft>
+            </a:pPr>
+            <a:r>
+              <a:rPr lang="pt-BR" dirty="0"/>
+              <a:t>Esse driver contem um conjunto de </a:t>
+            </a:r>
+            <a:r>
+              <a:rPr lang="pt-BR" dirty="0" err="1"/>
+              <a:t>probes</a:t>
+            </a:r>
+            <a:r>
+              <a:rPr lang="pt-BR" dirty="0"/>
+              <a:t> e </a:t>
+            </a:r>
+            <a:r>
+              <a:rPr lang="pt-BR" dirty="0" err="1"/>
+              <a:t>action</a:t>
+            </a:r>
+            <a:endParaRPr lang="pt-BR" dirty="0"/>
+          </a:p>
+          <a:p>
+            <a:pPr>
+              <a:spcAft>
+                <a:spcPts val="1000"/>
+              </a:spcAft>
+            </a:pPr>
+            <a:r>
+              <a:rPr lang="pt-BR" dirty="0"/>
+              <a:t>As </a:t>
+            </a:r>
+            <a:r>
+              <a:rPr lang="pt-BR" dirty="0" err="1"/>
+              <a:t>probes</a:t>
+            </a:r>
+            <a:r>
+              <a:rPr lang="pt-BR" dirty="0"/>
+              <a:t> inspecionam o sistema e as </a:t>
+            </a:r>
+            <a:r>
+              <a:rPr lang="pt-BR" dirty="0" err="1"/>
+              <a:t>actions</a:t>
+            </a:r>
+            <a:r>
+              <a:rPr lang="pt-BR" dirty="0"/>
+              <a:t> injetam as condições turbulentas.</a:t>
+            </a:r>
+          </a:p>
+          <a:p>
+            <a:pPr>
+              <a:spcAft>
+                <a:spcPts val="1000"/>
+              </a:spcAft>
+            </a:pPr>
+            <a:r>
+              <a:rPr lang="pt-BR" dirty="0"/>
+              <a:t>Para o nosso experimento assumiremos o papel de administrador do cluster.</a:t>
             </a:r>
           </a:p>
         </p:txBody>
@@ -23375,22 +24207,7 @@
           <a:p>
             <a:r>
               <a:rPr lang="pt-BR" dirty="0"/>
-              <a:t>Experimento com </a:t>
-            </a:r>
-            <a:r>
-              <a:rPr lang="pt-BR" dirty="0" err="1"/>
-              <a:t>Chaos</a:t>
-            </a:r>
-            <a:r>
-              <a:rPr lang="pt-BR" dirty="0"/>
-              <a:t> Toolkit:</a:t>
-            </a:r>
-            <a:br>
-              <a:rPr lang="pt-BR" dirty="0"/>
-            </a:br>
-            <a:r>
-              <a:rPr lang="pt-BR" dirty="0"/>
-              <a:t>Implementando as Melhorias</a:t>
+              <a:t>Mergulhando no Caos: O Experimento</a:t>
             </a:r>
           </a:p>
         </p:txBody>
@@ -23430,7 +24247,79 @@
             </a:pPr>
             <a:r>
               <a:rPr lang="pt-BR" dirty="0"/>
-              <a:t>I</a:t>
+              <a:t>Criação do Método do Experimento:</a:t>
+            </a:r>
+          </a:p>
+          <a:p>
+            <a:pPr lvl="1">
+              <a:spcAft>
+                <a:spcPts val="1000"/>
+              </a:spcAft>
+            </a:pPr>
+            <a:r>
+              <a:rPr lang="pt-BR" dirty="0"/>
+              <a:t>Para o nosso experimento tentaremos retirar um dos nós do </a:t>
+            </a:r>
+            <a:r>
+              <a:rPr lang="pt-BR" dirty="0" err="1"/>
+              <a:t>Kurebenetes</a:t>
+            </a:r>
+            <a:r>
+              <a:rPr lang="pt-BR" dirty="0"/>
+              <a:t> para fins de manutenção.</a:t>
+            </a:r>
+          </a:p>
+          <a:p>
+            <a:pPr lvl="1">
+              <a:spcAft>
+                <a:spcPts val="1000"/>
+              </a:spcAft>
+            </a:pPr>
+            <a:r>
+              <a:rPr lang="pt-BR" dirty="0"/>
+              <a:t>Partindo do pressuposto que o administrador do cluster não tem conhecimento do impacto de suas ações.</a:t>
+            </a:r>
+          </a:p>
+          <a:p>
+            <a:pPr lvl="1">
+              <a:spcAft>
+                <a:spcPts val="1000"/>
+              </a:spcAft>
+            </a:pPr>
+            <a:r>
+              <a:rPr lang="pt-BR" dirty="0"/>
+              <a:t>Iremos criar uma entrada com a </a:t>
+            </a:r>
+            <a:r>
+              <a:rPr lang="pt-BR" dirty="0" err="1"/>
+              <a:t>action</a:t>
+            </a:r>
+            <a:r>
+              <a:rPr lang="pt-BR" dirty="0"/>
+              <a:t> </a:t>
+            </a:r>
+            <a:r>
+              <a:rPr lang="pt-BR" dirty="0" err="1">
+                <a:highlight>
+                  <a:srgbClr val="000000"/>
+                </a:highlight>
+              </a:rPr>
+              <a:t>drain_nodes</a:t>
+            </a:r>
+            <a:r>
+              <a:rPr lang="pt-BR" dirty="0"/>
+              <a:t> para simular esse efeito</a:t>
+            </a:r>
+          </a:p>
+          <a:p>
+            <a:pPr lvl="1">
+              <a:spcAft>
+                <a:spcPts val="1000"/>
+              </a:spcAft>
+            </a:pPr>
+            <a:r>
+              <a:rPr lang="pt-BR" dirty="0"/>
+              <a:t>Primeiro vamos criar um bloco de método logo após o bloco da hipótese de estado.</a:t>
             </a:r>
           </a:p>
         </p:txBody>
@@ -23493,22 +24382,7 @@
           <a:p>
             <a:r>
               <a:rPr lang="pt-BR" dirty="0"/>
-              <a:t>Experimento com </a:t>
-            </a:r>
-            <a:r>
-              <a:rPr lang="pt-BR" dirty="0" err="1"/>
-              <a:t>Chaos</a:t>
-            </a:r>
-            <a:r>
-              <a:rPr lang="pt-BR" dirty="0"/>
-              <a:t> Toolkit:</a:t>
-            </a:r>
-            <a:br>
-              <a:rPr lang="pt-BR" dirty="0"/>
-            </a:br>
-            <a:r>
-              <a:rPr lang="pt-BR" dirty="0"/>
-              <a:t>Implementando as Melhorias</a:t>
+              <a:t>Mergulhando no Caos: O Experimento</a:t>
             </a:r>
           </a:p>
         </p:txBody>
@@ -23532,7 +24406,7 @@
         <p:spPr>
           <a:xfrm>
             <a:off x="680321" y="2505456"/>
-            <a:ext cx="9484759" cy="3599316"/>
+            <a:ext cx="7777879" cy="3599316"/>
           </a:xfrm>
         </p:spPr>
         <p:txBody>
@@ -23548,11 +24422,219 @@
             </a:pPr>
             <a:r>
               <a:rPr lang="pt-BR" dirty="0"/>
-              <a:t>I</a:t>
-            </a:r>
-          </a:p>
-        </p:txBody>
-      </p:sp>
+              <a:t>Criação do Método do Experimento:</a:t>
+            </a:r>
+          </a:p>
+          <a:p>
+            <a:pPr lvl="1">
+              <a:spcAft>
+                <a:spcPts val="1000"/>
+              </a:spcAft>
+            </a:pPr>
+            <a:r>
+              <a:rPr lang="pt-BR" dirty="0"/>
+              <a:t>Para o nosso experimento tentaremos retirar um dos nós do </a:t>
+            </a:r>
+            <a:r>
+              <a:rPr lang="pt-BR" dirty="0" err="1"/>
+              <a:t>Kurebenetes</a:t>
+            </a:r>
+            <a:r>
+              <a:rPr lang="pt-BR" dirty="0"/>
+              <a:t> para fins de manutenção.</a:t>
+            </a:r>
+          </a:p>
+          <a:p>
+            <a:pPr lvl="1">
+              <a:spcAft>
+                <a:spcPts val="1000"/>
+              </a:spcAft>
+            </a:pPr>
+            <a:r>
+              <a:rPr lang="pt-BR" dirty="0"/>
+              <a:t>*1. Como o experimento pode conter muitas </a:t>
+            </a:r>
+            <a:r>
+              <a:rPr lang="pt-BR" dirty="0" err="1"/>
+              <a:t>probes</a:t>
+            </a:r>
+            <a:r>
+              <a:rPr lang="pt-BR" dirty="0"/>
+              <a:t> e </a:t>
+            </a:r>
+            <a:r>
+              <a:rPr lang="pt-BR" dirty="0" err="1"/>
+              <a:t>actions</a:t>
+            </a:r>
+            <a:r>
+              <a:rPr lang="pt-BR" dirty="0"/>
+              <a:t> é inicializado como um </a:t>
+            </a:r>
+            <a:r>
+              <a:rPr lang="pt-BR" dirty="0" err="1"/>
+              <a:t>array</a:t>
+            </a:r>
+            <a:r>
+              <a:rPr lang="pt-BR" dirty="0"/>
+              <a:t> em </a:t>
+            </a:r>
+            <a:r>
+              <a:rPr lang="pt-BR" dirty="0" err="1"/>
+              <a:t>javascript</a:t>
+            </a:r>
+            <a:endParaRPr lang="pt-BR" dirty="0"/>
+          </a:p>
+          <a:p>
+            <a:pPr lvl="1">
+              <a:spcAft>
+                <a:spcPts val="1000"/>
+              </a:spcAft>
+            </a:pPr>
+            <a:r>
+              <a:rPr lang="pt-BR" dirty="0"/>
+              <a:t>Agora inicializamos a </a:t>
+            </a:r>
+            <a:r>
+              <a:rPr lang="pt-BR" dirty="0" err="1"/>
+              <a:t>action</a:t>
+            </a:r>
+            <a:r>
+              <a:rPr lang="pt-BR" dirty="0"/>
+              <a:t>, o </a:t>
+            </a:r>
+            <a:r>
+              <a:rPr lang="pt-BR" dirty="0" err="1"/>
+              <a:t>type</a:t>
+            </a:r>
+            <a:r>
+              <a:rPr lang="pt-BR" dirty="0"/>
+              <a:t> indica se é uma </a:t>
+            </a:r>
+            <a:r>
+              <a:rPr lang="pt-BR" dirty="0" err="1"/>
+              <a:t>action</a:t>
+            </a:r>
+            <a:r>
+              <a:rPr lang="pt-BR" dirty="0"/>
+              <a:t> ou uma </a:t>
+            </a:r>
+            <a:r>
+              <a:rPr lang="pt-BR" dirty="0" err="1"/>
+              <a:t>probe</a:t>
+            </a:r>
+            <a:r>
+              <a:rPr lang="pt-BR" dirty="0"/>
+              <a:t>.</a:t>
+            </a:r>
+          </a:p>
+          <a:p>
+            <a:pPr lvl="1">
+              <a:spcAft>
+                <a:spcPts val="1000"/>
+              </a:spcAft>
+            </a:pPr>
+            <a:r>
+              <a:rPr lang="pt-BR" dirty="0"/>
+              <a:t>Se for uma </a:t>
+            </a:r>
+            <a:r>
+              <a:rPr lang="pt-BR" dirty="0" err="1"/>
+              <a:t>probe</a:t>
+            </a:r>
+            <a:r>
+              <a:rPr lang="pt-BR" dirty="0"/>
+              <a:t>, o resultado da mesma será adicionado ao jornal, sendo uma </a:t>
+            </a:r>
+            <a:r>
+              <a:rPr lang="pt-BR" dirty="0" err="1"/>
+              <a:t>action</a:t>
+            </a:r>
+            <a:r>
+              <a:rPr lang="pt-BR" dirty="0"/>
+              <a:t>, apenas será executada.</a:t>
+            </a:r>
+          </a:p>
+          <a:p>
+            <a:pPr lvl="1">
+              <a:spcAft>
+                <a:spcPts val="1000"/>
+              </a:spcAft>
+            </a:pPr>
+            <a:r>
+              <a:rPr lang="pt-BR" dirty="0"/>
+              <a:t>O nome deverá ser o mais relevante possível.</a:t>
+            </a:r>
+          </a:p>
+          <a:p>
+            <a:pPr lvl="2">
+              <a:spcAft>
+                <a:spcPts val="1000"/>
+              </a:spcAft>
+            </a:pPr>
+            <a:endParaRPr lang="pt-BR" dirty="0"/>
+          </a:p>
+        </p:txBody>
+      </p:sp>
+      <p:pic>
+        <p:nvPicPr>
+          <p:cNvPr id="3" name="Imagem 2" descr="Tela de celular com texto preto sobre fundo branco&#10;&#10;Descrição gerada automaticamente">
+            <a:extLst>
+              <a:ext uri="{FF2B5EF4-FFF2-40B4-BE49-F238E27FC236}">
+                <a16:creationId xmlns:a16="http://schemas.microsoft.com/office/drawing/2014/main" id="{588C33E3-3F3D-4C26-88E5-A5D0E3391AE6}"/>
+              </a:ext>
+            </a:extLst>
+          </p:cNvPr>
+          <p:cNvPicPr>
+            <a:picLocks noChangeAspect="1"/>
+          </p:cNvPicPr>
+          <p:nvPr/>
+        </p:nvPicPr>
+        <p:blipFill>
+          <a:blip r:embed="rId2"/>
+          <a:stretch>
+            <a:fillRect/>
+          </a:stretch>
+        </p:blipFill>
+        <p:spPr>
+          <a:xfrm>
+            <a:off x="8688924" y="2888530"/>
+            <a:ext cx="3106406" cy="1207153"/>
+          </a:xfrm>
+          <a:prstGeom prst="rect">
+            <a:avLst/>
+          </a:prstGeom>
+        </p:spPr>
+      </p:pic>
+      <p:pic>
+        <p:nvPicPr>
+          <p:cNvPr id="7" name="Imagem 6" descr="Uma imagem contendo screenshot&#10;&#10;Descrição gerada automaticamente">
+            <a:extLst>
+              <a:ext uri="{FF2B5EF4-FFF2-40B4-BE49-F238E27FC236}">
+                <a16:creationId xmlns:a16="http://schemas.microsoft.com/office/drawing/2014/main" id="{3F6A1892-F05E-4FA1-83EB-B28F5804C7E1}"/>
+              </a:ext>
+            </a:extLst>
+          </p:cNvPr>
+          <p:cNvPicPr>
+            <a:picLocks noChangeAspect="1"/>
+          </p:cNvPicPr>
+          <p:nvPr/>
+        </p:nvPicPr>
+        <p:blipFill>
+          <a:blip r:embed="rId3"/>
+          <a:stretch>
+            <a:fillRect/>
+          </a:stretch>
+        </p:blipFill>
+        <p:spPr>
+          <a:xfrm>
+            <a:off x="8688922" y="4399104"/>
+            <a:ext cx="3106405" cy="1615330"/>
+          </a:xfrm>
+          <a:prstGeom prst="rect">
+            <a:avLst/>
+          </a:prstGeom>
+        </p:spPr>
+      </p:pic>
     </p:spTree>
     <p:extLst>
       <p:ext uri="{BB962C8B-B14F-4D97-AF65-F5344CB8AC3E}">
@@ -23611,22 +24693,7 @@
           <a:p>
             <a:r>
               <a:rPr lang="pt-BR" dirty="0"/>
-              <a:t>Experimento com </a:t>
-            </a:r>
-            <a:r>
-              <a:rPr lang="pt-BR" dirty="0" err="1"/>
-              <a:t>Chaos</a:t>
-            </a:r>
-            <a:r>
-              <a:rPr lang="pt-BR" dirty="0"/>
-              <a:t> Toolkit:</a:t>
-            </a:r>
-            <a:br>
-              <a:rPr lang="pt-BR" dirty="0"/>
-            </a:br>
-            <a:r>
-              <a:rPr lang="pt-BR" dirty="0"/>
-              <a:t>Implementando as Melhorias</a:t>
+              <a:t>Mergulhando no Caos: O Experimento</a:t>
             </a:r>
           </a:p>
         </p:txBody>
@@ -23650,7 +24717,7 @@
         <p:spPr>
           <a:xfrm>
             <a:off x="680321" y="2505456"/>
-            <a:ext cx="9484759" cy="3599316"/>
+            <a:ext cx="7884559" cy="3599316"/>
           </a:xfrm>
         </p:spPr>
         <p:txBody>
@@ -23660,17 +24727,242 @@
           <a:lstStyle/>
           <a:p>
             <a:pPr>
-              <a:spcAft>
-                <a:spcPts val="1000"/>
-              </a:spcAft>
-            </a:pPr>
-            <a:r>
-              <a:rPr lang="pt-BR" dirty="0"/>
-              <a:t>I</a:t>
-            </a:r>
-          </a:p>
-        </p:txBody>
-      </p:sp>
+              <a:spcBef>
+                <a:spcPts val="0"/>
+              </a:spcBef>
+              <a:spcAft>
+                <a:spcPts val="600"/>
+              </a:spcAft>
+            </a:pPr>
+            <a:r>
+              <a:rPr lang="pt-BR" dirty="0"/>
+              <a:t>Criação do Método do Experimento:</a:t>
+            </a:r>
+          </a:p>
+          <a:p>
+            <a:pPr lvl="1">
+              <a:spcBef>
+                <a:spcPts val="300"/>
+              </a:spcBef>
+              <a:spcAft>
+                <a:spcPts val="300"/>
+              </a:spcAft>
+            </a:pPr>
+            <a:r>
+              <a:rPr lang="pt-BR" dirty="0"/>
+              <a:t>Devemos dizer ao Chaos Toolkit para usar o método </a:t>
+            </a:r>
+            <a:r>
+              <a:rPr lang="pt-BR" dirty="0" err="1"/>
+              <a:t>drain_nodes</a:t>
+            </a:r>
+            <a:r>
+              <a:rPr lang="pt-BR" dirty="0"/>
+              <a:t> </a:t>
+            </a:r>
+            <a:r>
+              <a:rPr lang="pt-BR" dirty="0" err="1"/>
+              <a:t>action</a:t>
+            </a:r>
+            <a:r>
+              <a:rPr lang="pt-BR" dirty="0"/>
+              <a:t> do driver </a:t>
+            </a:r>
+            <a:r>
+              <a:rPr lang="pt-BR" dirty="0" err="1"/>
+              <a:t>Kurbenetes</a:t>
+            </a:r>
+            <a:r>
+              <a:rPr lang="pt-BR" dirty="0"/>
+              <a:t> instalado anteriormente.</a:t>
+            </a:r>
+          </a:p>
+          <a:p>
+            <a:pPr lvl="1">
+              <a:spcBef>
+                <a:spcPts val="300"/>
+              </a:spcBef>
+              <a:spcAft>
+                <a:spcPts val="300"/>
+              </a:spcAft>
+            </a:pPr>
+            <a:r>
+              <a:rPr lang="pt-BR" dirty="0"/>
+              <a:t>Seguindo o bloco de código no próximo slide teremos os seguintes passos executados:</a:t>
+            </a:r>
+          </a:p>
+          <a:p>
+            <a:pPr lvl="1">
+              <a:spcBef>
+                <a:spcPts val="300"/>
+              </a:spcBef>
+              <a:spcAft>
+                <a:spcPts val="300"/>
+              </a:spcAft>
+            </a:pPr>
+            <a:r>
+              <a:rPr lang="pt-BR" dirty="0"/>
+              <a:t>1. O bloco </a:t>
+            </a:r>
+            <a:r>
+              <a:rPr lang="pt-BR" dirty="0" err="1"/>
+              <a:t>provider</a:t>
+            </a:r>
+            <a:r>
+              <a:rPr lang="pt-BR" dirty="0"/>
+              <a:t> captura como a </a:t>
+            </a:r>
+            <a:r>
+              <a:rPr lang="pt-BR" dirty="0" err="1"/>
+              <a:t>action</a:t>
+            </a:r>
+            <a:r>
+              <a:rPr lang="pt-BR" dirty="0"/>
+              <a:t> será executada</a:t>
+            </a:r>
+          </a:p>
+          <a:p>
+            <a:pPr lvl="1">
+              <a:spcBef>
+                <a:spcPts val="300"/>
+              </a:spcBef>
+              <a:spcAft>
+                <a:spcPts val="300"/>
+              </a:spcAft>
+            </a:pPr>
+            <a:r>
+              <a:rPr lang="pt-BR" dirty="0"/>
+              <a:t>2. O </a:t>
+            </a:r>
+            <a:r>
+              <a:rPr lang="pt-BR" dirty="0" err="1"/>
+              <a:t>provider</a:t>
+            </a:r>
+            <a:r>
+              <a:rPr lang="pt-BR" dirty="0"/>
+              <a:t> nesse caso é um módulo Python</a:t>
+            </a:r>
+          </a:p>
+          <a:p>
+            <a:pPr lvl="1">
+              <a:spcBef>
+                <a:spcPts val="300"/>
+              </a:spcBef>
+              <a:spcAft>
+                <a:spcPts val="300"/>
+              </a:spcAft>
+            </a:pPr>
+            <a:r>
+              <a:rPr lang="pt-BR" dirty="0"/>
+              <a:t>3. Esse é o módulo Python que o Chaos Toolkit deverá usar</a:t>
+            </a:r>
+          </a:p>
+          <a:p>
+            <a:pPr lvl="1">
+              <a:spcBef>
+                <a:spcPts val="300"/>
+              </a:spcBef>
+              <a:spcAft>
+                <a:spcPts val="300"/>
+              </a:spcAft>
+            </a:pPr>
+            <a:r>
+              <a:rPr lang="pt-BR" dirty="0"/>
+              <a:t>4. Nome da função Python a ser chamada por esta ação</a:t>
+            </a:r>
+          </a:p>
+          <a:p>
+            <a:pPr lvl="1">
+              <a:spcBef>
+                <a:spcPts val="300"/>
+              </a:spcBef>
+              <a:spcAft>
+                <a:spcPts val="300"/>
+              </a:spcAft>
+            </a:pPr>
+            <a:r>
+              <a:rPr lang="pt-BR" dirty="0"/>
+              <a:t>5. Parâmetros esperados pela função </a:t>
+            </a:r>
+            <a:r>
+              <a:rPr lang="pt-BR" dirty="0" err="1"/>
+              <a:t>drain_node</a:t>
+            </a:r>
+            <a:endParaRPr lang="pt-BR" dirty="0"/>
+          </a:p>
+          <a:p>
+            <a:pPr lvl="1">
+              <a:spcBef>
+                <a:spcPts val="300"/>
+              </a:spcBef>
+              <a:spcAft>
+                <a:spcPts val="300"/>
+              </a:spcAft>
+            </a:pPr>
+            <a:r>
+              <a:rPr lang="pt-BR" dirty="0"/>
+              <a:t>6. Nome do nó atual</a:t>
+            </a:r>
+          </a:p>
+          <a:p>
+            <a:pPr lvl="1">
+              <a:spcBef>
+                <a:spcPts val="300"/>
+              </a:spcBef>
+              <a:spcAft>
+                <a:spcPts val="300"/>
+              </a:spcAft>
+            </a:pPr>
+            <a:endParaRPr lang="pt-BR" dirty="0"/>
+          </a:p>
+          <a:p>
+            <a:pPr lvl="1">
+              <a:spcAft>
+                <a:spcPts val="1000"/>
+              </a:spcAft>
+            </a:pPr>
+            <a:endParaRPr lang="pt-BR" dirty="0"/>
+          </a:p>
+          <a:p>
+            <a:pPr lvl="1">
+              <a:spcAft>
+                <a:spcPts val="1000"/>
+              </a:spcAft>
+            </a:pPr>
+            <a:endParaRPr lang="pt-BR" dirty="0"/>
+          </a:p>
+        </p:txBody>
+      </p:sp>
+      <p:pic>
+        <p:nvPicPr>
+          <p:cNvPr id="9" name="Imagem 8" descr="Uma imagem contendo screenshot&#10;&#10;Descrição gerada automaticamente">
+            <a:extLst>
+              <a:ext uri="{FF2B5EF4-FFF2-40B4-BE49-F238E27FC236}">
+                <a16:creationId xmlns:a16="http://schemas.microsoft.com/office/drawing/2014/main" id="{B2A9A641-3EC2-4ED9-BA4B-1AAD8B4FD6AD}"/>
+              </a:ext>
+            </a:extLst>
+          </p:cNvPr>
+          <p:cNvPicPr>
+            <a:picLocks noChangeAspect="1"/>
+          </p:cNvPicPr>
+          <p:nvPr/>
+        </p:nvPicPr>
+        <p:blipFill>
+          <a:blip r:embed="rId2"/>
+          <a:stretch>
+            <a:fillRect/>
+          </a:stretch>
+        </p:blipFill>
+        <p:spPr>
+          <a:xfrm>
+            <a:off x="8710498" y="3764280"/>
+            <a:ext cx="3113688" cy="1824181"/>
+          </a:xfrm>
+          <a:prstGeom prst="rect">
+            <a:avLst/>
+          </a:prstGeom>
+        </p:spPr>
+      </p:pic>
     </p:spTree>
     <p:extLst>
       <p:ext uri="{BB962C8B-B14F-4D97-AF65-F5344CB8AC3E}">
@@ -23729,22 +25021,7 @@
           <a:p>
             <a:r>
               <a:rPr lang="pt-BR" dirty="0"/>
-              <a:t>Experimento com </a:t>
-            </a:r>
-            <a:r>
-              <a:rPr lang="pt-BR" dirty="0" err="1"/>
-              <a:t>Chaos</a:t>
-            </a:r>
-            <a:r>
-              <a:rPr lang="pt-BR" dirty="0"/>
-              <a:t> Toolkit:</a:t>
-            </a:r>
-            <a:br>
-              <a:rPr lang="pt-BR" dirty="0"/>
-            </a:br>
-            <a:r>
-              <a:rPr lang="pt-BR" dirty="0"/>
-              <a:t>Implementando as Melhorias</a:t>
+              <a:t>Mergulhando no Caos: O Experimento</a:t>
             </a:r>
           </a:p>
         </p:txBody>
@@ -23768,7 +25045,7 @@
         <p:spPr>
           <a:xfrm>
             <a:off x="680321" y="2505456"/>
-            <a:ext cx="9484759" cy="3599316"/>
+            <a:ext cx="8280799" cy="3599316"/>
           </a:xfrm>
         </p:spPr>
         <p:txBody>
@@ -23778,17 +25055,102 @@
           <a:lstStyle/>
           <a:p>
             <a:pPr>
-              <a:spcAft>
-                <a:spcPts val="1000"/>
-              </a:spcAft>
-            </a:pPr>
-            <a:r>
-              <a:rPr lang="pt-BR" dirty="0"/>
-              <a:t>I</a:t>
-            </a:r>
-          </a:p>
-        </p:txBody>
-      </p:sp>
+              <a:spcBef>
+                <a:spcPts val="300"/>
+              </a:spcBef>
+              <a:spcAft>
+                <a:spcPts val="300"/>
+              </a:spcAft>
+            </a:pPr>
+            <a:r>
+              <a:rPr lang="pt-BR" dirty="0"/>
+              <a:t>Criação do Método do Experimento:</a:t>
+            </a:r>
+          </a:p>
+          <a:p>
+            <a:pPr lvl="1">
+              <a:spcBef>
+                <a:spcPts val="300"/>
+              </a:spcBef>
+              <a:spcAft>
+                <a:spcPts val="300"/>
+              </a:spcAft>
+            </a:pPr>
+            <a:r>
+              <a:rPr lang="pt-BR" dirty="0"/>
+              <a:t>7. O </a:t>
+            </a:r>
+            <a:r>
+              <a:rPr lang="pt-BR" dirty="0" err="1"/>
+              <a:t>drain_node</a:t>
+            </a:r>
+            <a:r>
+              <a:rPr lang="pt-BR" dirty="0"/>
+              <a:t> pode ser parado se estiver associado a um armazenamento local, esse flag força a ação mesmo neste caso.</a:t>
+            </a:r>
+          </a:p>
+        </p:txBody>
+      </p:sp>
+      <p:pic>
+        <p:nvPicPr>
+          <p:cNvPr id="7" name="Imagem 6" descr="Tela de celular com texto preto sobre fundo branco&#10;&#10;Descrição gerada automaticamente">
+            <a:extLst>
+              <a:ext uri="{FF2B5EF4-FFF2-40B4-BE49-F238E27FC236}">
+                <a16:creationId xmlns:a16="http://schemas.microsoft.com/office/drawing/2014/main" id="{80D3385B-873F-4530-84FD-DB2AB88E3171}"/>
+              </a:ext>
+            </a:extLst>
+          </p:cNvPr>
+          <p:cNvPicPr>
+            <a:picLocks noChangeAspect="1"/>
+          </p:cNvPicPr>
+          <p:nvPr/>
+        </p:nvPicPr>
+        <p:blipFill>
+          <a:blip r:embed="rId2"/>
+          <a:stretch>
+            <a:fillRect/>
+          </a:stretch>
+        </p:blipFill>
+        <p:spPr>
+          <a:xfrm>
+            <a:off x="3149370" y="3682981"/>
+            <a:ext cx="5219599" cy="2153939"/>
+          </a:xfrm>
+          <a:prstGeom prst="rect">
+            <a:avLst/>
+          </a:prstGeom>
+        </p:spPr>
+      </p:pic>
+      <p:pic>
+        <p:nvPicPr>
+          <p:cNvPr id="9" name="Imagem 8" descr="Uma imagem contendo faca&#10;&#10;Descrição gerada automaticamente">
+            <a:extLst>
+              <a:ext uri="{FF2B5EF4-FFF2-40B4-BE49-F238E27FC236}">
+                <a16:creationId xmlns:a16="http://schemas.microsoft.com/office/drawing/2014/main" id="{5EE85B43-911B-411F-B248-F9CDB0AF815B}"/>
+              </a:ext>
+            </a:extLst>
+          </p:cNvPr>
+          <p:cNvPicPr>
+            <a:picLocks noChangeAspect="1"/>
+          </p:cNvPicPr>
+          <p:nvPr/>
+        </p:nvPicPr>
+        <p:blipFill>
+          <a:blip r:embed="rId3"/>
+          <a:stretch>
+            <a:fillRect/>
+          </a:stretch>
+        </p:blipFill>
+        <p:spPr>
+          <a:xfrm>
+            <a:off x="3149370" y="5742420"/>
+            <a:ext cx="5217029" cy="846623"/>
+          </a:xfrm>
+          <a:prstGeom prst="rect">
+            <a:avLst/>
+          </a:prstGeom>
+        </p:spPr>
+      </p:pic>
     </p:spTree>
     <p:extLst>
       <p:ext uri="{BB962C8B-B14F-4D97-AF65-F5344CB8AC3E}">
@@ -23847,22 +25209,7 @@
           <a:p>
             <a:r>
               <a:rPr lang="pt-BR" dirty="0"/>
-              <a:t>Experimento com </a:t>
-            </a:r>
-            <a:r>
-              <a:rPr lang="pt-BR" dirty="0" err="1"/>
-              <a:t>Chaos</a:t>
-            </a:r>
-            <a:r>
-              <a:rPr lang="pt-BR" dirty="0"/>
-              <a:t> Toolkit:</a:t>
-            </a:r>
-            <a:br>
-              <a:rPr lang="pt-BR" dirty="0"/>
-            </a:br>
-            <a:r>
-              <a:rPr lang="pt-BR" dirty="0"/>
-              <a:t>Implementando as Melhorias</a:t>
+              <a:t>Mergulhando no Caos: O Experimento</a:t>
             </a:r>
           </a:p>
         </p:txBody>
@@ -23902,7 +25249,51 @@
             </a:pPr>
             <a:r>
               <a:rPr lang="pt-BR" dirty="0"/>
-              <a:t>I</a:t>
+              <a:t>Criação do Método do Experimento:</a:t>
+            </a:r>
+          </a:p>
+          <a:p>
+            <a:pPr lvl="1">
+              <a:spcAft>
+                <a:spcPts val="1000"/>
+              </a:spcAft>
+            </a:pPr>
+            <a:r>
+              <a:rPr lang="pt-BR" dirty="0"/>
+              <a:t>Finalmente temos o nosso método de experimento completo</a:t>
+            </a:r>
+          </a:p>
+          <a:p>
+            <a:pPr lvl="1">
+              <a:spcAft>
+                <a:spcPts val="1000"/>
+              </a:spcAft>
+            </a:pPr>
+            <a:r>
+              <a:rPr lang="pt-BR" dirty="0"/>
+              <a:t>O método testa o trabalho de um administrador de cluster retirando um nó.</a:t>
+            </a:r>
+          </a:p>
+          <a:p>
+            <a:pPr lvl="1">
+              <a:spcAft>
+                <a:spcPts val="1000"/>
+              </a:spcAft>
+            </a:pPr>
+            <a:r>
+              <a:rPr lang="pt-BR" dirty="0"/>
+              <a:t>Se não houver nenhuma falha encontrada as condições deverão estar de acordo com as tolerâncias da hipótese de estado.</a:t>
+            </a:r>
+          </a:p>
+          <a:p>
+            <a:pPr lvl="1">
+              <a:spcAft>
+                <a:spcPts val="1000"/>
+              </a:spcAft>
+            </a:pPr>
+            <a:r>
+              <a:rPr lang="pt-BR" dirty="0"/>
+              <a:t>Antes de executarmos o nosso experimento, teremos ainda mais um bloco a ser introduzido.</a:t>
             </a:r>
           </a:p>
         </p:txBody>
@@ -23965,22 +25356,7 @@
           <a:p>
             <a:r>
               <a:rPr lang="pt-BR" dirty="0"/>
-              <a:t>Experimento com </a:t>
-            </a:r>
-            <a:r>
-              <a:rPr lang="pt-BR" dirty="0" err="1"/>
-              <a:t>Chaos</a:t>
-            </a:r>
-            <a:r>
-              <a:rPr lang="pt-BR" dirty="0"/>
-              <a:t> Toolkit:</a:t>
-            </a:r>
-            <a:br>
-              <a:rPr lang="pt-BR" dirty="0"/>
-            </a:br>
-            <a:r>
-              <a:rPr lang="pt-BR" dirty="0"/>
-              <a:t>Implementando as Melhorias</a:t>
+              <a:t>Mergulhando no Caos: O Experimento</a:t>
             </a:r>
           </a:p>
         </p:txBody>
@@ -24020,8 +25396,92 @@
             </a:pPr>
             <a:r>
               <a:rPr lang="pt-BR" dirty="0"/>
-              <a:t>I</a:t>
-            </a:r>
+              <a:t>Criação do </a:t>
+            </a:r>
+            <a:r>
+              <a:rPr lang="pt-BR" dirty="0" err="1"/>
+              <a:t>Rollback</a:t>
+            </a:r>
+            <a:r>
+              <a:rPr lang="pt-BR" dirty="0"/>
+              <a:t>:</a:t>
+            </a:r>
+          </a:p>
+          <a:p>
+            <a:pPr lvl="1">
+              <a:spcAft>
+                <a:spcPts val="1000"/>
+              </a:spcAft>
+            </a:pPr>
+            <a:r>
+              <a:rPr lang="pt-BR" dirty="0"/>
+              <a:t>O </a:t>
+            </a:r>
+            <a:r>
+              <a:rPr lang="pt-BR" dirty="0" err="1"/>
+              <a:t>roolback</a:t>
+            </a:r>
+            <a:r>
+              <a:rPr lang="pt-BR" dirty="0"/>
+              <a:t> pode ter diferentes definições dependendo da sua área de atuação.</a:t>
+            </a:r>
+          </a:p>
+          <a:p>
+            <a:pPr lvl="1">
+              <a:spcAft>
+                <a:spcPts val="1000"/>
+              </a:spcAft>
+            </a:pPr>
+            <a:r>
+              <a:rPr lang="pt-BR" dirty="0"/>
+              <a:t>Em banco de dados ele consiste em retornar a </a:t>
+            </a:r>
+            <a:r>
+              <a:rPr lang="pt-BR" dirty="0" err="1"/>
+              <a:t>database</a:t>
+            </a:r>
+            <a:r>
+              <a:rPr lang="pt-BR" dirty="0"/>
+              <a:t> a um ponto anterior.</a:t>
+            </a:r>
+          </a:p>
+          <a:p>
+            <a:pPr lvl="1">
+              <a:spcAft>
+                <a:spcPts val="1000"/>
+              </a:spcAft>
+            </a:pPr>
+            <a:r>
+              <a:rPr lang="pt-BR" dirty="0"/>
+              <a:t>Nos experimentos do caos ele atua como uma ação corretiva as turbulências causadas pelo experimento.</a:t>
+            </a:r>
+          </a:p>
+          <a:p>
+            <a:pPr lvl="1">
+              <a:spcAft>
+                <a:spcPts val="1000"/>
+              </a:spcAft>
+            </a:pPr>
+            <a:r>
+              <a:rPr lang="pt-BR" dirty="0"/>
+              <a:t>Ele consiste em restabelecer as propriedades do sistema que foram manipuladas durante o método do experimento.</a:t>
+            </a:r>
+          </a:p>
+          <a:p>
+            <a:pPr lvl="1">
+              <a:spcAft>
+                <a:spcPts val="1000"/>
+              </a:spcAft>
+            </a:pPr>
+            <a:endParaRPr lang="pt-BR" dirty="0"/>
+          </a:p>
+          <a:p>
+            <a:pPr lvl="1">
+              <a:spcAft>
+                <a:spcPts val="1000"/>
+              </a:spcAft>
+            </a:pPr>
+            <a:endParaRPr lang="pt-BR" dirty="0"/>
           </a:p>
         </p:txBody>
       </p:sp>
@@ -24083,22 +25543,7 @@
           <a:p>
             <a:r>
               <a:rPr lang="pt-BR" dirty="0"/>
-              <a:t>Experimento com </a:t>
-            </a:r>
-            <a:r>
-              <a:rPr lang="pt-BR" dirty="0" err="1"/>
-              <a:t>Chaos</a:t>
-            </a:r>
-            <a:r>
-              <a:rPr lang="pt-BR" dirty="0"/>
-              <a:t> Toolkit:</a:t>
-            </a:r>
-            <a:br>
-              <a:rPr lang="pt-BR" dirty="0"/>
-            </a:br>
-            <a:r>
-              <a:rPr lang="pt-BR" dirty="0"/>
-              <a:t>Implementando as Melhorias</a:t>
+              <a:t>Mergulhando no Caos: O Experimento</a:t>
             </a:r>
           </a:p>
         </p:txBody>
@@ -24138,7 +25583,72 @@
             </a:pPr>
             <a:r>
               <a:rPr lang="pt-BR" dirty="0"/>
-              <a:t>I</a:t>
+              <a:t>Criação do </a:t>
+            </a:r>
+            <a:r>
+              <a:rPr lang="pt-BR" dirty="0" err="1"/>
+              <a:t>Rollback</a:t>
+            </a:r>
+            <a:r>
+              <a:rPr lang="pt-BR" dirty="0"/>
+              <a:t>:</a:t>
+            </a:r>
+          </a:p>
+          <a:p>
+            <a:pPr lvl="1">
+              <a:spcAft>
+                <a:spcPts val="1000"/>
+              </a:spcAft>
+            </a:pPr>
+            <a:r>
+              <a:rPr lang="pt-BR" dirty="0"/>
+              <a:t>Durante o experimento há uma tentativa de remoção de um nó do </a:t>
+            </a:r>
+            <a:r>
+              <a:rPr lang="pt-BR" dirty="0" err="1"/>
+              <a:t>Kurbenetes</a:t>
+            </a:r>
+            <a:r>
+              <a:rPr lang="pt-BR" dirty="0"/>
+              <a:t>.</a:t>
+            </a:r>
+          </a:p>
+          <a:p>
+            <a:pPr lvl="1">
+              <a:spcAft>
+                <a:spcPts val="1000"/>
+              </a:spcAft>
+            </a:pPr>
+            <a:r>
+              <a:rPr lang="pt-BR" dirty="0"/>
+              <a:t>Sendo assim durante o </a:t>
+            </a:r>
+            <a:r>
+              <a:rPr lang="pt-BR" dirty="0" err="1"/>
+              <a:t>Rollback</a:t>
+            </a:r>
+            <a:r>
+              <a:rPr lang="pt-BR" dirty="0"/>
+              <a:t> iremos tentar reverter esta ação para que o sistema se encontre ao menos em um estado próximo de seu estado inicial.</a:t>
+            </a:r>
+          </a:p>
+          <a:p>
+            <a:pPr lvl="1">
+              <a:spcAft>
+                <a:spcPts val="1000"/>
+              </a:spcAft>
+            </a:pPr>
+            <a:r>
+              <a:rPr lang="pt-BR" dirty="0"/>
+              <a:t>Isso é feito através da definição de uma seção de </a:t>
+            </a:r>
+            <a:r>
+              <a:rPr lang="pt-BR" dirty="0" err="1"/>
+              <a:t>rollback</a:t>
+            </a:r>
+            <a:r>
+              <a:rPr lang="pt-BR" dirty="0"/>
+              <a:t> como podemos ver no próximo slide.</a:t>
             </a:r>
           </a:p>
         </p:txBody>

</xml_diff>

<commit_message>
Finaliza rollbacks e Kurbenetes Disruption Budget
</commit_message>
<xml_diff>
--- a/docs/Chaos Engineering - Das Hipoteses aos Testes.pptx
+++ b/docs/Chaos Engineering - Das Hipoteses aos Testes.pptx
@@ -106,6 +106,37 @@
     <p:sldId id="354" r:id="rId100"/>
     <p:sldId id="355" r:id="rId101"/>
     <p:sldId id="356" r:id="rId102"/>
+    <p:sldId id="358" r:id="rId103"/>
+    <p:sldId id="359" r:id="rId104"/>
+    <p:sldId id="360" r:id="rId105"/>
+    <p:sldId id="361" r:id="rId106"/>
+    <p:sldId id="362" r:id="rId107"/>
+    <p:sldId id="388" r:id="rId108"/>
+    <p:sldId id="363" r:id="rId109"/>
+    <p:sldId id="364" r:id="rId110"/>
+    <p:sldId id="365" r:id="rId111"/>
+    <p:sldId id="366" r:id="rId112"/>
+    <p:sldId id="367" r:id="rId113"/>
+    <p:sldId id="368" r:id="rId114"/>
+    <p:sldId id="369" r:id="rId115"/>
+    <p:sldId id="370" r:id="rId116"/>
+    <p:sldId id="371" r:id="rId117"/>
+    <p:sldId id="372" r:id="rId118"/>
+    <p:sldId id="373" r:id="rId119"/>
+    <p:sldId id="374" r:id="rId120"/>
+    <p:sldId id="375" r:id="rId121"/>
+    <p:sldId id="376" r:id="rId122"/>
+    <p:sldId id="377" r:id="rId123"/>
+    <p:sldId id="378" r:id="rId124"/>
+    <p:sldId id="379" r:id="rId125"/>
+    <p:sldId id="380" r:id="rId126"/>
+    <p:sldId id="381" r:id="rId127"/>
+    <p:sldId id="382" r:id="rId128"/>
+    <p:sldId id="383" r:id="rId129"/>
+    <p:sldId id="384" r:id="rId130"/>
+    <p:sldId id="385" r:id="rId131"/>
+    <p:sldId id="386" r:id="rId132"/>
+    <p:sldId id="387" r:id="rId133"/>
   </p:sldIdLst>
   <p:sldSz cx="12192000" cy="6858000"/>
   <p:notesSz cx="6858000" cy="9144000"/>
@@ -486,7 +517,7 @@
           <a:p>
             <a:fld id="{4AAD347D-5ACD-4C99-B74B-A9C85AD731AF}" type="datetimeFigureOut">
               <a:rPr lang="en-US" smtClean="0"/>
-              <a:t>10/5/2019</a:t>
+              <a:t>10/6/2019</a:t>
             </a:fld>
             <a:endParaRPr lang="en-US" dirty="0"/>
           </a:p>
@@ -901,7 +932,7 @@
           <a:p>
             <a:fld id="{4509A250-FF31-4206-8172-F9D3106AACB1}" type="datetimeFigureOut">
               <a:rPr lang="en-US" smtClean="0"/>
-              <a:t>10/5/2019</a:t>
+              <a:t>10/6/2019</a:t>
             </a:fld>
             <a:endParaRPr lang="en-US" dirty="0"/>
           </a:p>
@@ -1237,7 +1268,7 @@
           <a:p>
             <a:fld id="{4509A250-FF31-4206-8172-F9D3106AACB1}" type="datetimeFigureOut">
               <a:rPr lang="en-US" smtClean="0"/>
-              <a:t>10/5/2019</a:t>
+              <a:t>10/6/2019</a:t>
             </a:fld>
             <a:endParaRPr lang="en-US" dirty="0"/>
           </a:p>
@@ -1642,7 +1673,7 @@
           <a:p>
             <a:fld id="{4AAD347D-5ACD-4C99-B74B-A9C85AD731AF}" type="datetimeFigureOut">
               <a:rPr lang="en-US" smtClean="0"/>
-              <a:t>10/5/2019</a:t>
+              <a:t>10/6/2019</a:t>
             </a:fld>
             <a:endParaRPr lang="en-US" dirty="0"/>
           </a:p>
@@ -2211,7 +2242,7 @@
           <a:p>
             <a:fld id="{4AAD347D-5ACD-4C99-B74B-A9C85AD731AF}" type="datetimeFigureOut">
               <a:rPr lang="en-US" smtClean="0"/>
-              <a:t>10/5/2019</a:t>
+              <a:t>10/6/2019</a:t>
             </a:fld>
             <a:endParaRPr lang="en-US" dirty="0"/>
           </a:p>
@@ -2893,7 +2924,7 @@
           <a:p>
             <a:fld id="{4509A250-FF31-4206-8172-F9D3106AACB1}" type="datetimeFigureOut">
               <a:rPr lang="en-US" smtClean="0"/>
-              <a:t>10/5/2019</a:t>
+              <a:t>10/6/2019</a:t>
             </a:fld>
             <a:endParaRPr lang="en-US" dirty="0"/>
           </a:p>
@@ -3806,7 +3837,7 @@
           <a:p>
             <a:fld id="{4509A250-FF31-4206-8172-F9D3106AACB1}" type="datetimeFigureOut">
               <a:rPr lang="en-US" smtClean="0"/>
-              <a:t>10/5/2019</a:t>
+              <a:t>10/6/2019</a:t>
             </a:fld>
             <a:endParaRPr lang="en-US" dirty="0"/>
           </a:p>
@@ -4119,7 +4150,7 @@
           <a:p>
             <a:fld id="{4AAD347D-5ACD-4C99-B74B-A9C85AD731AF}" type="datetimeFigureOut">
               <a:rPr lang="en-US" smtClean="0"/>
-              <a:t>10/5/2019</a:t>
+              <a:t>10/6/2019</a:t>
             </a:fld>
             <a:endParaRPr lang="en-US" dirty="0"/>
           </a:p>
@@ -4384,7 +4415,7 @@
           <a:p>
             <a:fld id="{4AAD347D-5ACD-4C99-B74B-A9C85AD731AF}" type="datetimeFigureOut">
               <a:rPr lang="en-US" smtClean="0"/>
-              <a:t>10/5/2019</a:t>
+              <a:t>10/6/2019</a:t>
             </a:fld>
             <a:endParaRPr lang="en-US" dirty="0"/>
           </a:p>
@@ -4708,7 +4739,7 @@
           <a:p>
             <a:fld id="{4AAD347D-5ACD-4C99-B74B-A9C85AD731AF}" type="datetimeFigureOut">
               <a:rPr lang="en-US" smtClean="0"/>
-              <a:t>10/5/2019</a:t>
+              <a:t>10/6/2019</a:t>
             </a:fld>
             <a:endParaRPr lang="en-US" dirty="0"/>
           </a:p>
@@ -5098,7 +5129,7 @@
           <a:p>
             <a:fld id="{9796027F-7875-4030-9381-8BD8C4F21935}" type="datetimeFigureOut">
               <a:rPr lang="en-US" smtClean="0"/>
-              <a:t>10/5/2019</a:t>
+              <a:t>10/6/2019</a:t>
             </a:fld>
             <a:endParaRPr lang="en-US" dirty="0"/>
           </a:p>
@@ -5474,7 +5505,7 @@
           <a:p>
             <a:fld id="{9796027F-7875-4030-9381-8BD8C4F21935}" type="datetimeFigureOut">
               <a:rPr lang="en-US" smtClean="0"/>
-              <a:t>10/5/2019</a:t>
+              <a:t>10/6/2019</a:t>
             </a:fld>
             <a:endParaRPr lang="en-US" dirty="0"/>
           </a:p>
@@ -5980,7 +6011,7 @@
           <a:p>
             <a:fld id="{9796027F-7875-4030-9381-8BD8C4F21935}" type="datetimeFigureOut">
               <a:rPr lang="en-US" smtClean="0"/>
-              <a:t>10/5/2019</a:t>
+              <a:t>10/6/2019</a:t>
             </a:fld>
             <a:endParaRPr lang="en-US" dirty="0"/>
           </a:p>
@@ -6237,7 +6268,7 @@
           <a:p>
             <a:fld id="{4AAD347D-5ACD-4C99-B74B-A9C85AD731AF}" type="datetimeFigureOut">
               <a:rPr lang="en-US" smtClean="0"/>
-              <a:t>10/5/2019</a:t>
+              <a:t>10/6/2019</a:t>
             </a:fld>
             <a:endParaRPr lang="en-US" dirty="0"/>
           </a:p>
@@ -6401,7 +6432,7 @@
           <a:p>
             <a:fld id="{4509A250-FF31-4206-8172-F9D3106AACB1}" type="datetimeFigureOut">
               <a:rPr lang="en-US" smtClean="0"/>
-              <a:t>10/5/2019</a:t>
+              <a:t>10/6/2019</a:t>
             </a:fld>
             <a:endParaRPr lang="en-US" dirty="0"/>
           </a:p>
@@ -6791,7 +6822,7 @@
           <a:p>
             <a:fld id="{4509A250-FF31-4206-8172-F9D3106AACB1}" type="datetimeFigureOut">
               <a:rPr lang="en-US" smtClean="0"/>
-              <a:t>10/5/2019</a:t>
+              <a:t>10/6/2019</a:t>
             </a:fld>
             <a:endParaRPr lang="en-US" dirty="0"/>
           </a:p>
@@ -7200,7 +7231,7 @@
           <a:p>
             <a:fld id="{4509A250-FF31-4206-8172-F9D3106AACB1}" type="datetimeFigureOut">
               <a:rPr lang="en-US" smtClean="0"/>
-              <a:t>10/5/2019</a:t>
+              <a:t>10/6/2019</a:t>
             </a:fld>
             <a:endParaRPr lang="en-US" dirty="0"/>
           </a:p>
@@ -7444,7 +7475,7 @@
           <a:p>
             <a:fld id="{4AAD347D-5ACD-4C99-B74B-A9C85AD731AF}" type="datetimeFigureOut">
               <a:rPr lang="en-US" smtClean="0"/>
-              <a:t>10/5/2019</a:t>
+              <a:t>10/6/2019</a:t>
             </a:fld>
             <a:endParaRPr lang="en-US" dirty="0"/>
           </a:p>
@@ -8393,6 +8424,1410 @@
 </p:sld>
 </file>
 
+<file path=ppt/slides/slide102.xml><?xml version="1.0" encoding="utf-8"?>
+<p:sld xmlns:a="http://schemas.openxmlformats.org/drawingml/2006/main" xmlns:r="http://schemas.openxmlformats.org/officeDocument/2006/relationships" xmlns:p="http://schemas.openxmlformats.org/presentationml/2006/main">
+  <p:cSld>
+    <p:spTree>
+      <p:nvGrpSpPr>
+        <p:cNvPr id="1" name=""/>
+        <p:cNvGrpSpPr/>
+        <p:nvPr/>
+      </p:nvGrpSpPr>
+      <p:grpSpPr>
+        <a:xfrm>
+          <a:off x="0" y="0"/>
+          <a:ext cx="0" cy="0"/>
+          <a:chOff x="0" y="0"/>
+          <a:chExt cx="0" cy="0"/>
+        </a:xfrm>
+      </p:grpSpPr>
+      <p:sp>
+        <p:nvSpPr>
+          <p:cNvPr id="4" name="Título 1">
+            <a:extLst>
+              <a:ext uri="{FF2B5EF4-FFF2-40B4-BE49-F238E27FC236}">
+                <a16:creationId xmlns:a16="http://schemas.microsoft.com/office/drawing/2014/main" id="{9CA53688-E304-4704-85E6-8432DC608B05}"/>
+              </a:ext>
+            </a:extLst>
+          </p:cNvPr>
+          <p:cNvSpPr>
+            <a:spLocks noGrp="1"/>
+          </p:cNvSpPr>
+          <p:nvPr>
+            <p:ph type="title"/>
+          </p:nvPr>
+        </p:nvSpPr>
+        <p:spPr>
+          <a:xfrm>
+            <a:off x="680321" y="753228"/>
+            <a:ext cx="9613861" cy="1080938"/>
+          </a:xfrm>
+        </p:spPr>
+        <p:txBody>
+          <a:bodyPr/>
+          <a:lstStyle/>
+          <a:p>
+            <a:r>
+              <a:rPr lang="pt-BR" dirty="0"/>
+              <a:t>Mergulhando no Caos: O Experimento</a:t>
+            </a:r>
+          </a:p>
+        </p:txBody>
+      </p:sp>
+      <p:sp>
+        <p:nvSpPr>
+          <p:cNvPr id="5" name="Espaço Reservado para Conteúdo 2">
+            <a:extLst>
+              <a:ext uri="{FF2B5EF4-FFF2-40B4-BE49-F238E27FC236}">
+                <a16:creationId xmlns:a16="http://schemas.microsoft.com/office/drawing/2014/main" id="{C5B8AB74-06FA-413C-BD74-462D1F01C8FF}"/>
+              </a:ext>
+            </a:extLst>
+          </p:cNvPr>
+          <p:cNvSpPr>
+            <a:spLocks noGrp="1"/>
+          </p:cNvSpPr>
+          <p:nvPr>
+            <p:ph idx="1"/>
+          </p:nvPr>
+        </p:nvSpPr>
+        <p:spPr>
+          <a:xfrm>
+            <a:off x="680321" y="2505456"/>
+            <a:ext cx="9484759" cy="3599316"/>
+          </a:xfrm>
+        </p:spPr>
+        <p:txBody>
+          <a:bodyPr>
+            <a:noAutofit/>
+          </a:bodyPr>
+          <a:lstStyle/>
+          <a:p>
+            <a:pPr>
+              <a:spcAft>
+                <a:spcPts val="1000"/>
+              </a:spcAft>
+            </a:pPr>
+            <a:r>
+              <a:rPr lang="pt-BR" dirty="0"/>
+              <a:t>Executando o Experimento:</a:t>
+            </a:r>
+          </a:p>
+          <a:p>
+            <a:pPr lvl="1">
+              <a:spcAft>
+                <a:spcPts val="1000"/>
+              </a:spcAft>
+            </a:pPr>
+            <a:r>
+              <a:rPr lang="pt-BR" dirty="0"/>
+              <a:t>Agora executaremos o experimento</a:t>
+            </a:r>
+          </a:p>
+          <a:p>
+            <a:pPr lvl="1">
+              <a:spcAft>
+                <a:spcPts val="1000"/>
+              </a:spcAft>
+            </a:pPr>
+            <a:r>
+              <a:rPr lang="pt-BR" dirty="0"/>
+              <a:t>Primeiro verifique se o estamos no cluster correto com o comando </a:t>
+            </a:r>
+            <a:br>
+              <a:rPr lang="pt-BR" dirty="0"/>
+            </a:br>
+            <a:r>
+              <a:rPr lang="pt-BR" dirty="0" err="1">
+                <a:highlight>
+                  <a:srgbClr val="000000"/>
+                </a:highlight>
+              </a:rPr>
+              <a:t>kubectl</a:t>
+            </a:r>
+            <a:r>
+              <a:rPr lang="pt-BR" dirty="0">
+                <a:highlight>
+                  <a:srgbClr val="000000"/>
+                </a:highlight>
+              </a:rPr>
+              <a:t> </a:t>
+            </a:r>
+            <a:r>
+              <a:rPr lang="pt-BR" dirty="0" err="1">
+                <a:highlight>
+                  <a:srgbClr val="000000"/>
+                </a:highlight>
+              </a:rPr>
+              <a:t>apply</a:t>
+            </a:r>
+            <a:r>
+              <a:rPr lang="pt-BR" dirty="0">
+                <a:highlight>
+                  <a:srgbClr val="000000"/>
+                </a:highlight>
+              </a:rPr>
+              <a:t> -f ./</a:t>
+            </a:r>
+            <a:r>
+              <a:rPr lang="pt-BR" dirty="0" err="1">
+                <a:highlight>
+                  <a:srgbClr val="000000"/>
+                </a:highlight>
+              </a:rPr>
+              <a:t>before</a:t>
+            </a:r>
+            <a:r>
+              <a:rPr lang="pt-BR" dirty="0"/>
+              <a:t> </a:t>
+            </a:r>
+          </a:p>
+          <a:p>
+            <a:pPr lvl="1">
+              <a:spcAft>
+                <a:spcPts val="1000"/>
+              </a:spcAft>
+            </a:pPr>
+            <a:r>
+              <a:rPr lang="pt-BR" dirty="0"/>
+              <a:t>Esse comando irá configurar um único serviço com 3 instâncias em </a:t>
+            </a:r>
+            <a:r>
+              <a:rPr lang="pt-BR" dirty="0" err="1"/>
+              <a:t>pods</a:t>
+            </a:r>
+            <a:r>
+              <a:rPr lang="pt-BR" dirty="0"/>
+              <a:t> que servirão de tráfego para o serviço.</a:t>
+            </a:r>
+          </a:p>
+          <a:p>
+            <a:pPr lvl="1">
+              <a:spcAft>
+                <a:spcPts val="1000"/>
+              </a:spcAft>
+            </a:pPr>
+            <a:r>
+              <a:rPr lang="pt-BR" dirty="0"/>
+              <a:t>Agora podemos executar o comando do caos </a:t>
+            </a:r>
+            <a:r>
+              <a:rPr lang="pt-BR" i="1" dirty="0" err="1">
+                <a:highlight>
+                  <a:srgbClr val="000000"/>
+                </a:highlight>
+              </a:rPr>
+              <a:t>run</a:t>
+            </a:r>
+            <a:endParaRPr lang="pt-BR" i="1" dirty="0">
+              <a:highlight>
+                <a:srgbClr val="000000"/>
+              </a:highlight>
+            </a:endParaRPr>
+          </a:p>
+          <a:p>
+            <a:pPr lvl="1">
+              <a:spcAft>
+                <a:spcPts val="1000"/>
+              </a:spcAft>
+            </a:pPr>
+            <a:r>
+              <a:rPr lang="pt-BR" dirty="0"/>
+              <a:t>*Devemos especificar o nome do arquivo se não for o </a:t>
+            </a:r>
+            <a:r>
+              <a:rPr lang="pt-BR" i="1" dirty="0" err="1"/>
+              <a:t>experiment.json</a:t>
+            </a:r>
+            <a:endParaRPr lang="pt-BR" i="1" dirty="0"/>
+          </a:p>
+          <a:p>
+            <a:pPr lvl="1">
+              <a:spcAft>
+                <a:spcPts val="1000"/>
+              </a:spcAft>
+            </a:pPr>
+            <a:r>
+              <a:rPr lang="en-US" dirty="0">
+                <a:highlight>
+                  <a:srgbClr val="000000"/>
+                </a:highlight>
+              </a:rPr>
+              <a:t>(</a:t>
+            </a:r>
+            <a:r>
+              <a:rPr lang="en-US" dirty="0" err="1">
+                <a:highlight>
+                  <a:srgbClr val="000000"/>
+                </a:highlight>
+              </a:rPr>
+              <a:t>chaostk</a:t>
+            </a:r>
+            <a:r>
+              <a:rPr lang="en-US" dirty="0">
+                <a:highlight>
+                  <a:srgbClr val="000000"/>
+                </a:highlight>
+              </a:rPr>
+              <a:t>) $ chaos run </a:t>
+            </a:r>
+            <a:r>
+              <a:rPr lang="en-US" dirty="0" err="1">
+                <a:highlight>
+                  <a:srgbClr val="000000"/>
+                </a:highlight>
+              </a:rPr>
+              <a:t>experiment.json</a:t>
+            </a:r>
+            <a:endParaRPr lang="pt-BR" dirty="0">
+              <a:highlight>
+                <a:srgbClr val="000000"/>
+              </a:highlight>
+            </a:endParaRPr>
+          </a:p>
+          <a:p>
+            <a:pPr lvl="1">
+              <a:spcAft>
+                <a:spcPts val="1000"/>
+              </a:spcAft>
+            </a:pPr>
+            <a:endParaRPr lang="pt-BR" dirty="0"/>
+          </a:p>
+        </p:txBody>
+      </p:sp>
+    </p:spTree>
+    <p:extLst>
+      <p:ext uri="{BB962C8B-B14F-4D97-AF65-F5344CB8AC3E}">
+        <p14:creationId xmlns:p14="http://schemas.microsoft.com/office/powerpoint/2010/main" val="3674740278"/>
+      </p:ext>
+    </p:extLst>
+  </p:cSld>
+  <p:clrMapOvr>
+    <a:masterClrMapping/>
+  </p:clrMapOvr>
+</p:sld>
+</file>
+
+<file path=ppt/slides/slide103.xml><?xml version="1.0" encoding="utf-8"?>
+<p:sld xmlns:a="http://schemas.openxmlformats.org/drawingml/2006/main" xmlns:r="http://schemas.openxmlformats.org/officeDocument/2006/relationships" xmlns:p="http://schemas.openxmlformats.org/presentationml/2006/main">
+  <p:cSld>
+    <p:spTree>
+      <p:nvGrpSpPr>
+        <p:cNvPr id="1" name=""/>
+        <p:cNvGrpSpPr/>
+        <p:nvPr/>
+      </p:nvGrpSpPr>
+      <p:grpSpPr>
+        <a:xfrm>
+          <a:off x="0" y="0"/>
+          <a:ext cx="0" cy="0"/>
+          <a:chOff x="0" y="0"/>
+          <a:chExt cx="0" cy="0"/>
+        </a:xfrm>
+      </p:grpSpPr>
+      <p:sp>
+        <p:nvSpPr>
+          <p:cNvPr id="4" name="Título 1">
+            <a:extLst>
+              <a:ext uri="{FF2B5EF4-FFF2-40B4-BE49-F238E27FC236}">
+                <a16:creationId xmlns:a16="http://schemas.microsoft.com/office/drawing/2014/main" id="{9CA53688-E304-4704-85E6-8432DC608B05}"/>
+              </a:ext>
+            </a:extLst>
+          </p:cNvPr>
+          <p:cNvSpPr>
+            <a:spLocks noGrp="1"/>
+          </p:cNvSpPr>
+          <p:nvPr>
+            <p:ph type="title"/>
+          </p:nvPr>
+        </p:nvSpPr>
+        <p:spPr>
+          <a:xfrm>
+            <a:off x="680321" y="753228"/>
+            <a:ext cx="9613861" cy="1080938"/>
+          </a:xfrm>
+        </p:spPr>
+        <p:txBody>
+          <a:bodyPr/>
+          <a:lstStyle/>
+          <a:p>
+            <a:r>
+              <a:rPr lang="pt-BR" dirty="0"/>
+              <a:t>Mergulhando no Caos: O Experimento</a:t>
+            </a:r>
+          </a:p>
+        </p:txBody>
+      </p:sp>
+      <p:sp>
+        <p:nvSpPr>
+          <p:cNvPr id="5" name="Espaço Reservado para Conteúdo 2">
+            <a:extLst>
+              <a:ext uri="{FF2B5EF4-FFF2-40B4-BE49-F238E27FC236}">
+                <a16:creationId xmlns:a16="http://schemas.microsoft.com/office/drawing/2014/main" id="{C5B8AB74-06FA-413C-BD74-462D1F01C8FF}"/>
+              </a:ext>
+            </a:extLst>
+          </p:cNvPr>
+          <p:cNvSpPr>
+            <a:spLocks noGrp="1"/>
+          </p:cNvSpPr>
+          <p:nvPr>
+            <p:ph idx="1"/>
+          </p:nvPr>
+        </p:nvSpPr>
+        <p:spPr>
+          <a:xfrm>
+            <a:off x="680321" y="2505456"/>
+            <a:ext cx="6360559" cy="3599316"/>
+          </a:xfrm>
+        </p:spPr>
+        <p:txBody>
+          <a:bodyPr>
+            <a:noAutofit/>
+          </a:bodyPr>
+          <a:lstStyle/>
+          <a:p>
+            <a:pPr>
+              <a:spcAft>
+                <a:spcPts val="1000"/>
+              </a:spcAft>
+            </a:pPr>
+            <a:r>
+              <a:rPr lang="pt-BR" dirty="0"/>
+              <a:t>Executando o Experimento:</a:t>
+            </a:r>
+          </a:p>
+          <a:p>
+            <a:pPr lvl="1">
+              <a:spcAft>
+                <a:spcPts val="1000"/>
+              </a:spcAft>
+            </a:pPr>
+            <a:r>
+              <a:rPr lang="pt-BR" dirty="0"/>
+              <a:t>Ao lado temos a saída do comando </a:t>
+            </a:r>
+            <a:r>
+              <a:rPr lang="pt-BR" dirty="0" err="1"/>
+              <a:t>run</a:t>
+            </a:r>
+            <a:endParaRPr lang="pt-BR" dirty="0"/>
+          </a:p>
+          <a:p>
+            <a:pPr lvl="1">
+              <a:spcAft>
+                <a:spcPts val="1000"/>
+              </a:spcAft>
+            </a:pPr>
+            <a:r>
+              <a:rPr lang="pt-BR" dirty="0"/>
+              <a:t>Podemos observar que o experimento encontrou uma falha/fraqueza</a:t>
+            </a:r>
+          </a:p>
+          <a:p>
+            <a:pPr lvl="1">
+              <a:spcAft>
+                <a:spcPts val="1000"/>
+              </a:spcAft>
+            </a:pPr>
+            <a:r>
+              <a:rPr lang="pt-BR" dirty="0"/>
+              <a:t>Ao drenar um ou mais nós do sistema o mesmo fica inutilizável por causa da necessidade de possuir 3 instâncias (</a:t>
+            </a:r>
+            <a:r>
+              <a:rPr lang="pt-BR" dirty="0" err="1"/>
+              <a:t>pods</a:t>
+            </a:r>
+            <a:r>
+              <a:rPr lang="pt-BR" dirty="0"/>
+              <a:t>) para manter o serviço.</a:t>
+            </a:r>
+          </a:p>
+          <a:p>
+            <a:pPr lvl="1">
+              <a:spcAft>
+                <a:spcPts val="1000"/>
+              </a:spcAft>
+            </a:pPr>
+            <a:r>
+              <a:rPr lang="pt-BR" dirty="0"/>
+              <a:t>Também podemos o notar a realização do </a:t>
+            </a:r>
+            <a:r>
+              <a:rPr lang="pt-BR" dirty="0" err="1"/>
+              <a:t>rollback</a:t>
+            </a:r>
+            <a:r>
+              <a:rPr lang="pt-BR" dirty="0"/>
+              <a:t> no experimento, lembrando que a realização do mesmo é opcional.</a:t>
+            </a:r>
+          </a:p>
+        </p:txBody>
+      </p:sp>
+      <p:pic>
+        <p:nvPicPr>
+          <p:cNvPr id="3" name="Imagem 2" descr="Tela de computador com texto preto sobre fundo branco&#10;&#10;Descrição gerada automaticamente">
+            <a:extLst>
+              <a:ext uri="{FF2B5EF4-FFF2-40B4-BE49-F238E27FC236}">
+                <a16:creationId xmlns:a16="http://schemas.microsoft.com/office/drawing/2014/main" id="{459D6CBF-3496-4008-A3D5-EDFE7F288CDA}"/>
+              </a:ext>
+            </a:extLst>
+          </p:cNvPr>
+          <p:cNvPicPr>
+            <a:picLocks noChangeAspect="1"/>
+          </p:cNvPicPr>
+          <p:nvPr/>
+        </p:nvPicPr>
+        <p:blipFill>
+          <a:blip r:embed="rId2"/>
+          <a:stretch>
+            <a:fillRect/>
+          </a:stretch>
+        </p:blipFill>
+        <p:spPr>
+          <a:xfrm>
+            <a:off x="7193280" y="2505456"/>
+            <a:ext cx="4660875" cy="4058450"/>
+          </a:xfrm>
+          <a:prstGeom prst="rect">
+            <a:avLst/>
+          </a:prstGeom>
+        </p:spPr>
+      </p:pic>
+    </p:spTree>
+    <p:extLst>
+      <p:ext uri="{BB962C8B-B14F-4D97-AF65-F5344CB8AC3E}">
+        <p14:creationId xmlns:p14="http://schemas.microsoft.com/office/powerpoint/2010/main" val="3084405741"/>
+      </p:ext>
+    </p:extLst>
+  </p:cSld>
+  <p:clrMapOvr>
+    <a:masterClrMapping/>
+  </p:clrMapOvr>
+</p:sld>
+</file>
+
+<file path=ppt/slides/slide104.xml><?xml version="1.0" encoding="utf-8"?>
+<p:sld xmlns:a="http://schemas.openxmlformats.org/drawingml/2006/main" xmlns:r="http://schemas.openxmlformats.org/officeDocument/2006/relationships" xmlns:p="http://schemas.openxmlformats.org/presentationml/2006/main">
+  <p:cSld>
+    <p:spTree>
+      <p:nvGrpSpPr>
+        <p:cNvPr id="1" name=""/>
+        <p:cNvGrpSpPr/>
+        <p:nvPr/>
+      </p:nvGrpSpPr>
+      <p:grpSpPr>
+        <a:xfrm>
+          <a:off x="0" y="0"/>
+          <a:ext cx="0" cy="0"/>
+          <a:chOff x="0" y="0"/>
+          <a:chExt cx="0" cy="0"/>
+        </a:xfrm>
+      </p:grpSpPr>
+      <p:sp>
+        <p:nvSpPr>
+          <p:cNvPr id="4" name="Título 1">
+            <a:extLst>
+              <a:ext uri="{FF2B5EF4-FFF2-40B4-BE49-F238E27FC236}">
+                <a16:creationId xmlns:a16="http://schemas.microsoft.com/office/drawing/2014/main" id="{9CA53688-E304-4704-85E6-8432DC608B05}"/>
+              </a:ext>
+            </a:extLst>
+          </p:cNvPr>
+          <p:cNvSpPr>
+            <a:spLocks noGrp="1"/>
+          </p:cNvSpPr>
+          <p:nvPr>
+            <p:ph type="title"/>
+          </p:nvPr>
+        </p:nvSpPr>
+        <p:spPr>
+          <a:xfrm>
+            <a:off x="680321" y="753228"/>
+            <a:ext cx="9613861" cy="1080938"/>
+          </a:xfrm>
+        </p:spPr>
+        <p:txBody>
+          <a:bodyPr/>
+          <a:lstStyle/>
+          <a:p>
+            <a:r>
+              <a:rPr lang="pt-BR" dirty="0"/>
+              <a:t>Mergulhando no Caos: O Experimento</a:t>
+            </a:r>
+          </a:p>
+        </p:txBody>
+      </p:sp>
+      <p:sp>
+        <p:nvSpPr>
+          <p:cNvPr id="5" name="Espaço Reservado para Conteúdo 2">
+            <a:extLst>
+              <a:ext uri="{FF2B5EF4-FFF2-40B4-BE49-F238E27FC236}">
+                <a16:creationId xmlns:a16="http://schemas.microsoft.com/office/drawing/2014/main" id="{C5B8AB74-06FA-413C-BD74-462D1F01C8FF}"/>
+              </a:ext>
+            </a:extLst>
+          </p:cNvPr>
+          <p:cNvSpPr>
+            <a:spLocks noGrp="1"/>
+          </p:cNvSpPr>
+          <p:nvPr>
+            <p:ph idx="1"/>
+          </p:nvPr>
+        </p:nvSpPr>
+        <p:spPr>
+          <a:xfrm>
+            <a:off x="680321" y="2505456"/>
+            <a:ext cx="9484759" cy="3599316"/>
+          </a:xfrm>
+        </p:spPr>
+        <p:txBody>
+          <a:bodyPr>
+            <a:noAutofit/>
+          </a:bodyPr>
+          <a:lstStyle/>
+          <a:p>
+            <a:pPr>
+              <a:spcAft>
+                <a:spcPts val="1000"/>
+              </a:spcAft>
+            </a:pPr>
+            <a:r>
+              <a:rPr lang="pt-BR" dirty="0"/>
+              <a:t>Implementando a Melhoria:</a:t>
+            </a:r>
+          </a:p>
+          <a:p>
+            <a:pPr lvl="1">
+              <a:spcAft>
+                <a:spcPts val="1000"/>
+              </a:spcAft>
+            </a:pPr>
+            <a:r>
+              <a:rPr lang="pt-BR" dirty="0"/>
+              <a:t>Uma das formas de corrigir essa falha no sistema seria impedir que o administrador do cluster seja capaz de drenar o nó quando isso atingisse os requisitos dos serviços da equipe de administração.</a:t>
+            </a:r>
+          </a:p>
+          <a:p>
+            <a:pPr lvl="1">
+              <a:spcAft>
+                <a:spcPts val="1000"/>
+              </a:spcAft>
+            </a:pPr>
+            <a:r>
+              <a:rPr lang="pt-BR" dirty="0"/>
+              <a:t>Isto poderia ser configurado deixando algumas regras a serem seguidas pelo administrador do cluster.</a:t>
+            </a:r>
+          </a:p>
+          <a:p>
+            <a:pPr lvl="1">
+              <a:spcAft>
+                <a:spcPts val="1000"/>
+              </a:spcAft>
+            </a:pPr>
+            <a:r>
+              <a:rPr lang="pt-BR" dirty="0"/>
+              <a:t>Entretanto, neste caso sempre teremos a possibilidade de alguém cometer um erro.</a:t>
+            </a:r>
+          </a:p>
+          <a:p>
+            <a:pPr lvl="1">
+              <a:spcAft>
+                <a:spcPts val="1000"/>
+              </a:spcAft>
+            </a:pPr>
+            <a:r>
+              <a:rPr lang="pt-BR" dirty="0"/>
+              <a:t>Portanto, iremos aplicar uma </a:t>
+            </a:r>
+            <a:r>
+              <a:rPr lang="pt-BR" dirty="0" err="1"/>
+              <a:t>policy</a:t>
+            </a:r>
+            <a:r>
+              <a:rPr lang="pt-BR" dirty="0"/>
+              <a:t> ao sistema que previna situações como essa.</a:t>
+            </a:r>
+          </a:p>
+        </p:txBody>
+      </p:sp>
+    </p:spTree>
+    <p:extLst>
+      <p:ext uri="{BB962C8B-B14F-4D97-AF65-F5344CB8AC3E}">
+        <p14:creationId xmlns:p14="http://schemas.microsoft.com/office/powerpoint/2010/main" val="4072675985"/>
+      </p:ext>
+    </p:extLst>
+  </p:cSld>
+  <p:clrMapOvr>
+    <a:masterClrMapping/>
+  </p:clrMapOvr>
+</p:sld>
+</file>
+
+<file path=ppt/slides/slide105.xml><?xml version="1.0" encoding="utf-8"?>
+<p:sld xmlns:a="http://schemas.openxmlformats.org/drawingml/2006/main" xmlns:r="http://schemas.openxmlformats.org/officeDocument/2006/relationships" xmlns:p="http://schemas.openxmlformats.org/presentationml/2006/main">
+  <p:cSld>
+    <p:spTree>
+      <p:nvGrpSpPr>
+        <p:cNvPr id="1" name=""/>
+        <p:cNvGrpSpPr/>
+        <p:nvPr/>
+      </p:nvGrpSpPr>
+      <p:grpSpPr>
+        <a:xfrm>
+          <a:off x="0" y="0"/>
+          <a:ext cx="0" cy="0"/>
+          <a:chOff x="0" y="0"/>
+          <a:chExt cx="0" cy="0"/>
+        </a:xfrm>
+      </p:grpSpPr>
+      <p:sp>
+        <p:nvSpPr>
+          <p:cNvPr id="4" name="Título 1">
+            <a:extLst>
+              <a:ext uri="{FF2B5EF4-FFF2-40B4-BE49-F238E27FC236}">
+                <a16:creationId xmlns:a16="http://schemas.microsoft.com/office/drawing/2014/main" id="{9CA53688-E304-4704-85E6-8432DC608B05}"/>
+              </a:ext>
+            </a:extLst>
+          </p:cNvPr>
+          <p:cNvSpPr>
+            <a:spLocks noGrp="1"/>
+          </p:cNvSpPr>
+          <p:nvPr>
+            <p:ph type="title"/>
+          </p:nvPr>
+        </p:nvSpPr>
+        <p:spPr>
+          <a:xfrm>
+            <a:off x="680321" y="753228"/>
+            <a:ext cx="9613861" cy="1080938"/>
+          </a:xfrm>
+        </p:spPr>
+        <p:txBody>
+          <a:bodyPr/>
+          <a:lstStyle/>
+          <a:p>
+            <a:r>
+              <a:rPr lang="pt-BR" dirty="0"/>
+              <a:t>Mergulhando no Caos: O Experimento</a:t>
+            </a:r>
+          </a:p>
+        </p:txBody>
+      </p:sp>
+      <p:sp>
+        <p:nvSpPr>
+          <p:cNvPr id="5" name="Espaço Reservado para Conteúdo 2">
+            <a:extLst>
+              <a:ext uri="{FF2B5EF4-FFF2-40B4-BE49-F238E27FC236}">
+                <a16:creationId xmlns:a16="http://schemas.microsoft.com/office/drawing/2014/main" id="{C5B8AB74-06FA-413C-BD74-462D1F01C8FF}"/>
+              </a:ext>
+            </a:extLst>
+          </p:cNvPr>
+          <p:cNvSpPr>
+            <a:spLocks noGrp="1"/>
+          </p:cNvSpPr>
+          <p:nvPr>
+            <p:ph idx="1"/>
+          </p:nvPr>
+        </p:nvSpPr>
+        <p:spPr>
+          <a:xfrm>
+            <a:off x="680321" y="2505456"/>
+            <a:ext cx="9484759" cy="3599316"/>
+          </a:xfrm>
+        </p:spPr>
+        <p:txBody>
+          <a:bodyPr>
+            <a:noAutofit/>
+          </a:bodyPr>
+          <a:lstStyle/>
+          <a:p>
+            <a:pPr>
+              <a:spcAft>
+                <a:spcPts val="1000"/>
+              </a:spcAft>
+            </a:pPr>
+            <a:r>
+              <a:rPr lang="pt-BR" dirty="0"/>
+              <a:t>Implementando a Melhoria:</a:t>
+            </a:r>
+          </a:p>
+          <a:p>
+            <a:pPr lvl="1">
+              <a:spcAft>
+                <a:spcPts val="1000"/>
+              </a:spcAft>
+            </a:pPr>
+            <a:r>
+              <a:rPr lang="pt-BR" dirty="0"/>
+              <a:t>Para a implementação da </a:t>
+            </a:r>
+            <a:r>
+              <a:rPr lang="pt-BR" dirty="0" err="1"/>
+              <a:t>policy</a:t>
+            </a:r>
+            <a:r>
+              <a:rPr lang="pt-BR" dirty="0"/>
+              <a:t> iremos usar o </a:t>
+            </a:r>
+            <a:r>
+              <a:rPr lang="pt-BR" dirty="0" err="1"/>
+              <a:t>Kurbenetes</a:t>
+            </a:r>
+            <a:r>
+              <a:rPr lang="pt-BR" dirty="0"/>
+              <a:t> </a:t>
+            </a:r>
+            <a:r>
+              <a:rPr lang="pt-BR" dirty="0" err="1"/>
+              <a:t>Disruption</a:t>
+            </a:r>
+            <a:r>
+              <a:rPr lang="pt-BR" dirty="0"/>
+              <a:t> Budget.</a:t>
+            </a:r>
+          </a:p>
+          <a:p>
+            <a:pPr lvl="1">
+              <a:spcAft>
+                <a:spcPts val="1000"/>
+              </a:spcAft>
+            </a:pPr>
+            <a:r>
+              <a:rPr lang="pt-BR" dirty="0"/>
+              <a:t>Ele limite o número de </a:t>
+            </a:r>
+            <a:r>
+              <a:rPr lang="pt-BR" dirty="0" err="1"/>
+              <a:t>pods</a:t>
+            </a:r>
+            <a:r>
+              <a:rPr lang="pt-BR" dirty="0"/>
+              <a:t> que podem voluntariamente serem removidos simultaneamente de uma aplicação replicada.</a:t>
+            </a:r>
+          </a:p>
+          <a:p>
+            <a:pPr lvl="1">
+              <a:spcAft>
+                <a:spcPts val="1000"/>
+              </a:spcAft>
+            </a:pPr>
+            <a:r>
+              <a:rPr lang="pt-BR" dirty="0"/>
+              <a:t>Como nosso experimento se baseia na remoção voluntaria dos nós, a equipe da aplicação pode guardar os seus </a:t>
+            </a:r>
+            <a:r>
+              <a:rPr lang="pt-BR" dirty="0" err="1"/>
+              <a:t>pods</a:t>
+            </a:r>
+            <a:r>
+              <a:rPr lang="pt-BR" dirty="0"/>
+              <a:t> por segurança.</a:t>
+            </a:r>
+          </a:p>
+          <a:p>
+            <a:pPr lvl="1">
+              <a:spcAft>
+                <a:spcPts val="1000"/>
+              </a:spcAft>
+            </a:pPr>
+            <a:r>
+              <a:rPr lang="pt-BR" dirty="0"/>
+              <a:t>Eles podem parar a drenagem de nós pelo administrador do cluster forçando uma </a:t>
+            </a:r>
+            <a:r>
+              <a:rPr lang="pt-BR" dirty="0" err="1"/>
+              <a:t>Disruption</a:t>
+            </a:r>
+            <a:r>
+              <a:rPr lang="pt-BR" dirty="0"/>
+              <a:t> </a:t>
+            </a:r>
+            <a:r>
+              <a:rPr lang="pt-BR" dirty="0" err="1"/>
+              <a:t>Resource</a:t>
+            </a:r>
+            <a:r>
+              <a:rPr lang="pt-BR" dirty="0"/>
+              <a:t> no cluster do </a:t>
+            </a:r>
+            <a:r>
+              <a:rPr lang="pt-BR" dirty="0" err="1"/>
+              <a:t>Kurbenetes</a:t>
+            </a:r>
+            <a:r>
+              <a:rPr lang="pt-BR" dirty="0"/>
+              <a:t>.</a:t>
+            </a:r>
+          </a:p>
+        </p:txBody>
+      </p:sp>
+    </p:spTree>
+    <p:extLst>
+      <p:ext uri="{BB962C8B-B14F-4D97-AF65-F5344CB8AC3E}">
+        <p14:creationId xmlns:p14="http://schemas.microsoft.com/office/powerpoint/2010/main" val="1568673548"/>
+      </p:ext>
+    </p:extLst>
+  </p:cSld>
+  <p:clrMapOvr>
+    <a:masterClrMapping/>
+  </p:clrMapOvr>
+</p:sld>
+</file>
+
+<file path=ppt/slides/slide106.xml><?xml version="1.0" encoding="utf-8"?>
+<p:sld xmlns:a="http://schemas.openxmlformats.org/drawingml/2006/main" xmlns:r="http://schemas.openxmlformats.org/officeDocument/2006/relationships" xmlns:p="http://schemas.openxmlformats.org/presentationml/2006/main">
+  <p:cSld>
+    <p:spTree>
+      <p:nvGrpSpPr>
+        <p:cNvPr id="1" name=""/>
+        <p:cNvGrpSpPr/>
+        <p:nvPr/>
+      </p:nvGrpSpPr>
+      <p:grpSpPr>
+        <a:xfrm>
+          <a:off x="0" y="0"/>
+          <a:ext cx="0" cy="0"/>
+          <a:chOff x="0" y="0"/>
+          <a:chExt cx="0" cy="0"/>
+        </a:xfrm>
+      </p:grpSpPr>
+      <p:sp>
+        <p:nvSpPr>
+          <p:cNvPr id="4" name="Título 1">
+            <a:extLst>
+              <a:ext uri="{FF2B5EF4-FFF2-40B4-BE49-F238E27FC236}">
+                <a16:creationId xmlns:a16="http://schemas.microsoft.com/office/drawing/2014/main" id="{9CA53688-E304-4704-85E6-8432DC608B05}"/>
+              </a:ext>
+            </a:extLst>
+          </p:cNvPr>
+          <p:cNvSpPr>
+            <a:spLocks noGrp="1"/>
+          </p:cNvSpPr>
+          <p:nvPr>
+            <p:ph type="title"/>
+          </p:nvPr>
+        </p:nvSpPr>
+        <p:spPr>
+          <a:xfrm>
+            <a:off x="680321" y="753228"/>
+            <a:ext cx="9613861" cy="1080938"/>
+          </a:xfrm>
+        </p:spPr>
+        <p:txBody>
+          <a:bodyPr/>
+          <a:lstStyle/>
+          <a:p>
+            <a:r>
+              <a:rPr lang="pt-BR" dirty="0"/>
+              <a:t>Mergulhando no Caos: O Experimento</a:t>
+            </a:r>
+          </a:p>
+        </p:txBody>
+      </p:sp>
+      <p:sp>
+        <p:nvSpPr>
+          <p:cNvPr id="5" name="Espaço Reservado para Conteúdo 2">
+            <a:extLst>
+              <a:ext uri="{FF2B5EF4-FFF2-40B4-BE49-F238E27FC236}">
+                <a16:creationId xmlns:a16="http://schemas.microsoft.com/office/drawing/2014/main" id="{C5B8AB74-06FA-413C-BD74-462D1F01C8FF}"/>
+              </a:ext>
+            </a:extLst>
+          </p:cNvPr>
+          <p:cNvSpPr>
+            <a:spLocks noGrp="1"/>
+          </p:cNvSpPr>
+          <p:nvPr>
+            <p:ph idx="1"/>
+          </p:nvPr>
+        </p:nvSpPr>
+        <p:spPr>
+          <a:xfrm>
+            <a:off x="680321" y="2505456"/>
+            <a:ext cx="7274959" cy="3599316"/>
+          </a:xfrm>
+        </p:spPr>
+        <p:txBody>
+          <a:bodyPr>
+            <a:noAutofit/>
+          </a:bodyPr>
+          <a:lstStyle/>
+          <a:p>
+            <a:pPr>
+              <a:spcAft>
+                <a:spcPts val="1000"/>
+              </a:spcAft>
+            </a:pPr>
+            <a:r>
+              <a:rPr lang="pt-BR" dirty="0"/>
+              <a:t>Implementando a Melhoria:</a:t>
+            </a:r>
+          </a:p>
+          <a:p>
+            <a:pPr lvl="1">
+              <a:spcAft>
+                <a:spcPts val="1000"/>
+              </a:spcAft>
+            </a:pPr>
+            <a:r>
+              <a:rPr lang="pt-BR" dirty="0"/>
+              <a:t>1. Especifica o número mínimo de </a:t>
+            </a:r>
+            <a:r>
+              <a:rPr lang="pt-BR" dirty="0" err="1"/>
+              <a:t>pods</a:t>
+            </a:r>
+            <a:r>
+              <a:rPr lang="pt-BR" dirty="0"/>
+              <a:t> que devem estar no estado de prontos em um dado momento no tempo</a:t>
+            </a:r>
+          </a:p>
+          <a:p>
+            <a:pPr lvl="1">
+              <a:spcAft>
+                <a:spcPts val="1000"/>
+              </a:spcAft>
+            </a:pPr>
+            <a:r>
+              <a:rPr lang="pt-BR" dirty="0"/>
+              <a:t>2. Seleciona os </a:t>
+            </a:r>
+            <a:r>
+              <a:rPr lang="pt-BR" dirty="0" err="1"/>
+              <a:t>pods</a:t>
+            </a:r>
+            <a:r>
+              <a:rPr lang="pt-BR" dirty="0"/>
+              <a:t> a serem protegidos</a:t>
+            </a:r>
+          </a:p>
+          <a:p>
+            <a:pPr lvl="1">
+              <a:spcAft>
+                <a:spcPts val="1000"/>
+              </a:spcAft>
+            </a:pPr>
+            <a:r>
+              <a:rPr lang="pt-BR" dirty="0"/>
+              <a:t>O seguinte comando aplica o </a:t>
+            </a:r>
+            <a:r>
+              <a:rPr lang="pt-BR" dirty="0" err="1"/>
+              <a:t>Disruption</a:t>
+            </a:r>
+            <a:r>
+              <a:rPr lang="pt-BR" dirty="0"/>
+              <a:t> Budget </a:t>
+            </a:r>
+            <a:br>
+              <a:rPr lang="pt-BR" dirty="0"/>
+            </a:br>
+            <a:r>
+              <a:rPr lang="pt-BR" dirty="0">
+                <a:highlight>
+                  <a:srgbClr val="000000"/>
+                </a:highlight>
+              </a:rPr>
+              <a:t>$ </a:t>
+            </a:r>
+            <a:r>
+              <a:rPr lang="pt-BR" dirty="0" err="1">
+                <a:highlight>
+                  <a:srgbClr val="000000"/>
+                </a:highlight>
+              </a:rPr>
+              <a:t>kubectl</a:t>
+            </a:r>
+            <a:r>
+              <a:rPr lang="pt-BR" dirty="0">
+                <a:highlight>
+                  <a:srgbClr val="000000"/>
+                </a:highlight>
+              </a:rPr>
+              <a:t> </a:t>
+            </a:r>
+            <a:r>
+              <a:rPr lang="pt-BR" dirty="0" err="1">
+                <a:highlight>
+                  <a:srgbClr val="000000"/>
+                </a:highlight>
+              </a:rPr>
+              <a:t>apply</a:t>
+            </a:r>
+            <a:r>
+              <a:rPr lang="pt-BR" dirty="0">
+                <a:highlight>
+                  <a:srgbClr val="000000"/>
+                </a:highlight>
+              </a:rPr>
+              <a:t> -f ./</a:t>
+            </a:r>
+            <a:r>
+              <a:rPr lang="pt-BR" dirty="0" err="1">
+                <a:highlight>
+                  <a:srgbClr val="000000"/>
+                </a:highlight>
+              </a:rPr>
+              <a:t>after</a:t>
+            </a:r>
+            <a:endParaRPr lang="pt-BR" dirty="0">
+              <a:highlight>
+                <a:srgbClr val="000000"/>
+              </a:highlight>
+            </a:endParaRPr>
+          </a:p>
+          <a:p>
+            <a:pPr>
+              <a:spcAft>
+                <a:spcPts val="1000"/>
+              </a:spcAft>
+            </a:pPr>
+            <a:r>
+              <a:rPr lang="pt-BR" dirty="0"/>
+              <a:t>Agora podemos executar o experimento novamente para nos certificar das correções aplicadas.</a:t>
+            </a:r>
+          </a:p>
+          <a:p>
+            <a:pPr lvl="1">
+              <a:spcAft>
+                <a:spcPts val="1000"/>
+              </a:spcAft>
+            </a:pPr>
+            <a:endParaRPr lang="pt-BR" dirty="0"/>
+          </a:p>
+        </p:txBody>
+      </p:sp>
+      <p:pic>
+        <p:nvPicPr>
+          <p:cNvPr id="3" name="Imagem 2" descr="Texto preto sobre fundo branco&#10;&#10;Descrição gerada automaticamente">
+            <a:extLst>
+              <a:ext uri="{FF2B5EF4-FFF2-40B4-BE49-F238E27FC236}">
+                <a16:creationId xmlns:a16="http://schemas.microsoft.com/office/drawing/2014/main" id="{91587B14-F678-4E16-92AB-2CB26687EB62}"/>
+              </a:ext>
+            </a:extLst>
+          </p:cNvPr>
+          <p:cNvPicPr>
+            <a:picLocks noChangeAspect="1"/>
+          </p:cNvPicPr>
+          <p:nvPr/>
+        </p:nvPicPr>
+        <p:blipFill>
+          <a:blip r:embed="rId2"/>
+          <a:stretch>
+            <a:fillRect/>
+          </a:stretch>
+        </p:blipFill>
+        <p:spPr>
+          <a:xfrm>
+            <a:off x="8152194" y="3429000"/>
+            <a:ext cx="3629532" cy="2553056"/>
+          </a:xfrm>
+          <a:prstGeom prst="rect">
+            <a:avLst/>
+          </a:prstGeom>
+        </p:spPr>
+      </p:pic>
+    </p:spTree>
+    <p:extLst>
+      <p:ext uri="{BB962C8B-B14F-4D97-AF65-F5344CB8AC3E}">
+        <p14:creationId xmlns:p14="http://schemas.microsoft.com/office/powerpoint/2010/main" val="1535670741"/>
+      </p:ext>
+    </p:extLst>
+  </p:cSld>
+  <p:clrMapOvr>
+    <a:masterClrMapping/>
+  </p:clrMapOvr>
+</p:sld>
+</file>
+
+<file path=ppt/slides/slide107.xml><?xml version="1.0" encoding="utf-8"?>
+<p:sld xmlns:a="http://schemas.openxmlformats.org/drawingml/2006/main" xmlns:r="http://schemas.openxmlformats.org/officeDocument/2006/relationships" xmlns:p="http://schemas.openxmlformats.org/presentationml/2006/main">
+  <p:cSld>
+    <p:spTree>
+      <p:nvGrpSpPr>
+        <p:cNvPr id="1" name=""/>
+        <p:cNvGrpSpPr/>
+        <p:nvPr/>
+      </p:nvGrpSpPr>
+      <p:grpSpPr>
+        <a:xfrm>
+          <a:off x="0" y="0"/>
+          <a:ext cx="0" cy="0"/>
+          <a:chOff x="0" y="0"/>
+          <a:chExt cx="0" cy="0"/>
+        </a:xfrm>
+      </p:grpSpPr>
+      <p:sp>
+        <p:nvSpPr>
+          <p:cNvPr id="8" name="Título 1">
+            <a:extLst>
+              <a:ext uri="{FF2B5EF4-FFF2-40B4-BE49-F238E27FC236}">
+                <a16:creationId xmlns:a16="http://schemas.microsoft.com/office/drawing/2014/main" id="{5BCED719-060C-4357-99A7-1C2583E4F254}"/>
+              </a:ext>
+            </a:extLst>
+          </p:cNvPr>
+          <p:cNvSpPr>
+            <a:spLocks noGrp="1"/>
+          </p:cNvSpPr>
+          <p:nvPr>
+            <p:ph type="ctrTitle"/>
+          </p:nvPr>
+        </p:nvSpPr>
+        <p:spPr>
+          <a:xfrm>
+            <a:off x="1143000" y="2733709"/>
+            <a:ext cx="7681456" cy="1373070"/>
+          </a:xfrm>
+        </p:spPr>
+        <p:txBody>
+          <a:bodyPr/>
+          <a:lstStyle/>
+          <a:p>
+            <a:pPr algn="l"/>
+            <a:r>
+              <a:rPr lang="pt-BR" sz="6000" dirty="0"/>
+              <a:t>CAOS COLABORATIVO</a:t>
+            </a:r>
+          </a:p>
+        </p:txBody>
+      </p:sp>
+    </p:spTree>
+    <p:extLst>
+      <p:ext uri="{BB962C8B-B14F-4D97-AF65-F5344CB8AC3E}">
+        <p14:creationId xmlns:p14="http://schemas.microsoft.com/office/powerpoint/2010/main" val="935883289"/>
+      </p:ext>
+    </p:extLst>
+  </p:cSld>
+  <p:clrMapOvr>
+    <a:masterClrMapping/>
+  </p:clrMapOvr>
+</p:sld>
+</file>
+
+<file path=ppt/slides/slide108.xml><?xml version="1.0" encoding="utf-8"?>
+<p:sld xmlns:a="http://schemas.openxmlformats.org/drawingml/2006/main" xmlns:r="http://schemas.openxmlformats.org/officeDocument/2006/relationships" xmlns:p="http://schemas.openxmlformats.org/presentationml/2006/main">
+  <p:cSld>
+    <p:spTree>
+      <p:nvGrpSpPr>
+        <p:cNvPr id="1" name=""/>
+        <p:cNvGrpSpPr/>
+        <p:nvPr/>
+      </p:nvGrpSpPr>
+      <p:grpSpPr>
+        <a:xfrm>
+          <a:off x="0" y="0"/>
+          <a:ext cx="0" cy="0"/>
+          <a:chOff x="0" y="0"/>
+          <a:chExt cx="0" cy="0"/>
+        </a:xfrm>
+      </p:grpSpPr>
+      <p:sp>
+        <p:nvSpPr>
+          <p:cNvPr id="4" name="Título 1">
+            <a:extLst>
+              <a:ext uri="{FF2B5EF4-FFF2-40B4-BE49-F238E27FC236}">
+                <a16:creationId xmlns:a16="http://schemas.microsoft.com/office/drawing/2014/main" id="{9CA53688-E304-4704-85E6-8432DC608B05}"/>
+              </a:ext>
+            </a:extLst>
+          </p:cNvPr>
+          <p:cNvSpPr>
+            <a:spLocks noGrp="1"/>
+          </p:cNvSpPr>
+          <p:nvPr>
+            <p:ph type="title"/>
+          </p:nvPr>
+        </p:nvSpPr>
+        <p:spPr>
+          <a:xfrm>
+            <a:off x="680321" y="753228"/>
+            <a:ext cx="9613861" cy="1080938"/>
+          </a:xfrm>
+        </p:spPr>
+        <p:txBody>
+          <a:bodyPr/>
+          <a:lstStyle/>
+          <a:p>
+            <a:r>
+              <a:rPr lang="pt-BR" dirty="0"/>
+              <a:t>Mergulhando no Caos: O Experimento</a:t>
+            </a:r>
+          </a:p>
+        </p:txBody>
+      </p:sp>
+      <p:sp>
+        <p:nvSpPr>
+          <p:cNvPr id="5" name="Espaço Reservado para Conteúdo 2">
+            <a:extLst>
+              <a:ext uri="{FF2B5EF4-FFF2-40B4-BE49-F238E27FC236}">
+                <a16:creationId xmlns:a16="http://schemas.microsoft.com/office/drawing/2014/main" id="{C5B8AB74-06FA-413C-BD74-462D1F01C8FF}"/>
+              </a:ext>
+            </a:extLst>
+          </p:cNvPr>
+          <p:cNvSpPr>
+            <a:spLocks noGrp="1"/>
+          </p:cNvSpPr>
+          <p:nvPr>
+            <p:ph idx="1"/>
+          </p:nvPr>
+        </p:nvSpPr>
+        <p:spPr>
+          <a:xfrm>
+            <a:off x="680321" y="2505456"/>
+            <a:ext cx="9484759" cy="3599316"/>
+          </a:xfrm>
+        </p:spPr>
+        <p:txBody>
+          <a:bodyPr>
+            <a:noAutofit/>
+          </a:bodyPr>
+          <a:lstStyle/>
+          <a:p>
+            <a:pPr>
+              <a:spcAft>
+                <a:spcPts val="1000"/>
+              </a:spcAft>
+            </a:pPr>
+            <a:r>
+              <a:rPr lang="pt-BR" dirty="0"/>
+              <a:t>Executando o Experimento:</a:t>
+            </a:r>
+          </a:p>
+          <a:p>
+            <a:pPr lvl="1">
+              <a:spcAft>
+                <a:spcPts val="1000"/>
+              </a:spcAft>
+            </a:pPr>
+            <a:r>
+              <a:rPr lang="pt-BR" dirty="0"/>
+              <a:t>O</a:t>
+            </a:r>
+          </a:p>
+        </p:txBody>
+      </p:sp>
+    </p:spTree>
+    <p:extLst>
+      <p:ext uri="{BB962C8B-B14F-4D97-AF65-F5344CB8AC3E}">
+        <p14:creationId xmlns:p14="http://schemas.microsoft.com/office/powerpoint/2010/main" val="3086442974"/>
+      </p:ext>
+    </p:extLst>
+  </p:cSld>
+  <p:clrMapOvr>
+    <a:masterClrMapping/>
+  </p:clrMapOvr>
+</p:sld>
+</file>
+
+<file path=ppt/slides/slide109.xml><?xml version="1.0" encoding="utf-8"?>
+<p:sld xmlns:a="http://schemas.openxmlformats.org/drawingml/2006/main" xmlns:r="http://schemas.openxmlformats.org/officeDocument/2006/relationships" xmlns:p="http://schemas.openxmlformats.org/presentationml/2006/main">
+  <p:cSld>
+    <p:spTree>
+      <p:nvGrpSpPr>
+        <p:cNvPr id="1" name=""/>
+        <p:cNvGrpSpPr/>
+        <p:nvPr/>
+      </p:nvGrpSpPr>
+      <p:grpSpPr>
+        <a:xfrm>
+          <a:off x="0" y="0"/>
+          <a:ext cx="0" cy="0"/>
+          <a:chOff x="0" y="0"/>
+          <a:chExt cx="0" cy="0"/>
+        </a:xfrm>
+      </p:grpSpPr>
+      <p:sp>
+        <p:nvSpPr>
+          <p:cNvPr id="4" name="Título 1">
+            <a:extLst>
+              <a:ext uri="{FF2B5EF4-FFF2-40B4-BE49-F238E27FC236}">
+                <a16:creationId xmlns:a16="http://schemas.microsoft.com/office/drawing/2014/main" id="{9CA53688-E304-4704-85E6-8432DC608B05}"/>
+              </a:ext>
+            </a:extLst>
+          </p:cNvPr>
+          <p:cNvSpPr>
+            <a:spLocks noGrp="1"/>
+          </p:cNvSpPr>
+          <p:nvPr>
+            <p:ph type="title"/>
+          </p:nvPr>
+        </p:nvSpPr>
+        <p:spPr>
+          <a:xfrm>
+            <a:off x="680321" y="753228"/>
+            <a:ext cx="9613861" cy="1080938"/>
+          </a:xfrm>
+        </p:spPr>
+        <p:txBody>
+          <a:bodyPr/>
+          <a:lstStyle/>
+          <a:p>
+            <a:r>
+              <a:rPr lang="pt-BR" dirty="0"/>
+              <a:t>Mergulhando no Caos: O Experimento</a:t>
+            </a:r>
+          </a:p>
+        </p:txBody>
+      </p:sp>
+      <p:sp>
+        <p:nvSpPr>
+          <p:cNvPr id="5" name="Espaço Reservado para Conteúdo 2">
+            <a:extLst>
+              <a:ext uri="{FF2B5EF4-FFF2-40B4-BE49-F238E27FC236}">
+                <a16:creationId xmlns:a16="http://schemas.microsoft.com/office/drawing/2014/main" id="{C5B8AB74-06FA-413C-BD74-462D1F01C8FF}"/>
+              </a:ext>
+            </a:extLst>
+          </p:cNvPr>
+          <p:cNvSpPr>
+            <a:spLocks noGrp="1"/>
+          </p:cNvSpPr>
+          <p:nvPr>
+            <p:ph idx="1"/>
+          </p:nvPr>
+        </p:nvSpPr>
+        <p:spPr>
+          <a:xfrm>
+            <a:off x="680321" y="2505456"/>
+            <a:ext cx="9484759" cy="3599316"/>
+          </a:xfrm>
+        </p:spPr>
+        <p:txBody>
+          <a:bodyPr>
+            <a:noAutofit/>
+          </a:bodyPr>
+          <a:lstStyle/>
+          <a:p>
+            <a:pPr>
+              <a:spcAft>
+                <a:spcPts val="1000"/>
+              </a:spcAft>
+            </a:pPr>
+            <a:r>
+              <a:rPr lang="pt-BR" dirty="0"/>
+              <a:t>Executando o Experimento:</a:t>
+            </a:r>
+          </a:p>
+          <a:p>
+            <a:pPr lvl="1">
+              <a:spcAft>
+                <a:spcPts val="1000"/>
+              </a:spcAft>
+            </a:pPr>
+            <a:r>
+              <a:rPr lang="pt-BR" dirty="0"/>
+              <a:t>O</a:t>
+            </a:r>
+          </a:p>
+        </p:txBody>
+      </p:sp>
+    </p:spTree>
+    <p:extLst>
+      <p:ext uri="{BB962C8B-B14F-4D97-AF65-F5344CB8AC3E}">
+        <p14:creationId xmlns:p14="http://schemas.microsoft.com/office/powerpoint/2010/main" val="1222283100"/>
+      </p:ext>
+    </p:extLst>
+  </p:cSld>
+  <p:clrMapOvr>
+    <a:masterClrMapping/>
+  </p:clrMapOvr>
+</p:sld>
+</file>
+
 <file path=ppt/slides/slide11.xml><?xml version="1.0" encoding="utf-8"?>
 <p:sld xmlns:a="http://schemas.openxmlformats.org/drawingml/2006/main" xmlns:r="http://schemas.openxmlformats.org/officeDocument/2006/relationships" xmlns:p="http://schemas.openxmlformats.org/presentationml/2006/main">
   <p:cSld>
@@ -8512,6 +9947,1146 @@
     <p:extLst>
       <p:ext uri="{BB962C8B-B14F-4D97-AF65-F5344CB8AC3E}">
         <p14:creationId xmlns:p14="http://schemas.microsoft.com/office/powerpoint/2010/main" val="3871209202"/>
+      </p:ext>
+    </p:extLst>
+  </p:cSld>
+  <p:clrMapOvr>
+    <a:masterClrMapping/>
+  </p:clrMapOvr>
+</p:sld>
+</file>
+
+<file path=ppt/slides/slide110.xml><?xml version="1.0" encoding="utf-8"?>
+<p:sld xmlns:a="http://schemas.openxmlformats.org/drawingml/2006/main" xmlns:r="http://schemas.openxmlformats.org/officeDocument/2006/relationships" xmlns:p="http://schemas.openxmlformats.org/presentationml/2006/main">
+  <p:cSld>
+    <p:spTree>
+      <p:nvGrpSpPr>
+        <p:cNvPr id="1" name=""/>
+        <p:cNvGrpSpPr/>
+        <p:nvPr/>
+      </p:nvGrpSpPr>
+      <p:grpSpPr>
+        <a:xfrm>
+          <a:off x="0" y="0"/>
+          <a:ext cx="0" cy="0"/>
+          <a:chOff x="0" y="0"/>
+          <a:chExt cx="0" cy="0"/>
+        </a:xfrm>
+      </p:grpSpPr>
+      <p:sp>
+        <p:nvSpPr>
+          <p:cNvPr id="4" name="Título 1">
+            <a:extLst>
+              <a:ext uri="{FF2B5EF4-FFF2-40B4-BE49-F238E27FC236}">
+                <a16:creationId xmlns:a16="http://schemas.microsoft.com/office/drawing/2014/main" id="{9CA53688-E304-4704-85E6-8432DC608B05}"/>
+              </a:ext>
+            </a:extLst>
+          </p:cNvPr>
+          <p:cNvSpPr>
+            <a:spLocks noGrp="1"/>
+          </p:cNvSpPr>
+          <p:nvPr>
+            <p:ph type="title"/>
+          </p:nvPr>
+        </p:nvSpPr>
+        <p:spPr>
+          <a:xfrm>
+            <a:off x="680321" y="753228"/>
+            <a:ext cx="9613861" cy="1080938"/>
+          </a:xfrm>
+        </p:spPr>
+        <p:txBody>
+          <a:bodyPr/>
+          <a:lstStyle/>
+          <a:p>
+            <a:r>
+              <a:rPr lang="pt-BR" dirty="0"/>
+              <a:t>Mergulhando no Caos: O Experimento</a:t>
+            </a:r>
+          </a:p>
+        </p:txBody>
+      </p:sp>
+      <p:sp>
+        <p:nvSpPr>
+          <p:cNvPr id="5" name="Espaço Reservado para Conteúdo 2">
+            <a:extLst>
+              <a:ext uri="{FF2B5EF4-FFF2-40B4-BE49-F238E27FC236}">
+                <a16:creationId xmlns:a16="http://schemas.microsoft.com/office/drawing/2014/main" id="{C5B8AB74-06FA-413C-BD74-462D1F01C8FF}"/>
+              </a:ext>
+            </a:extLst>
+          </p:cNvPr>
+          <p:cNvSpPr>
+            <a:spLocks noGrp="1"/>
+          </p:cNvSpPr>
+          <p:nvPr>
+            <p:ph idx="1"/>
+          </p:nvPr>
+        </p:nvSpPr>
+        <p:spPr>
+          <a:xfrm>
+            <a:off x="680321" y="2505456"/>
+            <a:ext cx="9484759" cy="3599316"/>
+          </a:xfrm>
+        </p:spPr>
+        <p:txBody>
+          <a:bodyPr>
+            <a:noAutofit/>
+          </a:bodyPr>
+          <a:lstStyle/>
+          <a:p>
+            <a:pPr>
+              <a:spcAft>
+                <a:spcPts val="1000"/>
+              </a:spcAft>
+            </a:pPr>
+            <a:r>
+              <a:rPr lang="pt-BR" dirty="0"/>
+              <a:t>Executando o Experimento:</a:t>
+            </a:r>
+          </a:p>
+          <a:p>
+            <a:pPr lvl="1">
+              <a:spcAft>
+                <a:spcPts val="1000"/>
+              </a:spcAft>
+            </a:pPr>
+            <a:r>
+              <a:rPr lang="pt-BR" dirty="0"/>
+              <a:t>O</a:t>
+            </a:r>
+          </a:p>
+        </p:txBody>
+      </p:sp>
+    </p:spTree>
+    <p:extLst>
+      <p:ext uri="{BB962C8B-B14F-4D97-AF65-F5344CB8AC3E}">
+        <p14:creationId xmlns:p14="http://schemas.microsoft.com/office/powerpoint/2010/main" val="2169207984"/>
+      </p:ext>
+    </p:extLst>
+  </p:cSld>
+  <p:clrMapOvr>
+    <a:masterClrMapping/>
+  </p:clrMapOvr>
+</p:sld>
+</file>
+
+<file path=ppt/slides/slide111.xml><?xml version="1.0" encoding="utf-8"?>
+<p:sld xmlns:a="http://schemas.openxmlformats.org/drawingml/2006/main" xmlns:r="http://schemas.openxmlformats.org/officeDocument/2006/relationships" xmlns:p="http://schemas.openxmlformats.org/presentationml/2006/main">
+  <p:cSld>
+    <p:spTree>
+      <p:nvGrpSpPr>
+        <p:cNvPr id="1" name=""/>
+        <p:cNvGrpSpPr/>
+        <p:nvPr/>
+      </p:nvGrpSpPr>
+      <p:grpSpPr>
+        <a:xfrm>
+          <a:off x="0" y="0"/>
+          <a:ext cx="0" cy="0"/>
+          <a:chOff x="0" y="0"/>
+          <a:chExt cx="0" cy="0"/>
+        </a:xfrm>
+      </p:grpSpPr>
+      <p:sp>
+        <p:nvSpPr>
+          <p:cNvPr id="4" name="Título 1">
+            <a:extLst>
+              <a:ext uri="{FF2B5EF4-FFF2-40B4-BE49-F238E27FC236}">
+                <a16:creationId xmlns:a16="http://schemas.microsoft.com/office/drawing/2014/main" id="{9CA53688-E304-4704-85E6-8432DC608B05}"/>
+              </a:ext>
+            </a:extLst>
+          </p:cNvPr>
+          <p:cNvSpPr>
+            <a:spLocks noGrp="1"/>
+          </p:cNvSpPr>
+          <p:nvPr>
+            <p:ph type="title"/>
+          </p:nvPr>
+        </p:nvSpPr>
+        <p:spPr>
+          <a:xfrm>
+            <a:off x="680321" y="753228"/>
+            <a:ext cx="9613861" cy="1080938"/>
+          </a:xfrm>
+        </p:spPr>
+        <p:txBody>
+          <a:bodyPr/>
+          <a:lstStyle/>
+          <a:p>
+            <a:r>
+              <a:rPr lang="pt-BR" dirty="0"/>
+              <a:t>Mergulhando no Caos: O Experimento</a:t>
+            </a:r>
+          </a:p>
+        </p:txBody>
+      </p:sp>
+      <p:sp>
+        <p:nvSpPr>
+          <p:cNvPr id="5" name="Espaço Reservado para Conteúdo 2">
+            <a:extLst>
+              <a:ext uri="{FF2B5EF4-FFF2-40B4-BE49-F238E27FC236}">
+                <a16:creationId xmlns:a16="http://schemas.microsoft.com/office/drawing/2014/main" id="{C5B8AB74-06FA-413C-BD74-462D1F01C8FF}"/>
+              </a:ext>
+            </a:extLst>
+          </p:cNvPr>
+          <p:cNvSpPr>
+            <a:spLocks noGrp="1"/>
+          </p:cNvSpPr>
+          <p:nvPr>
+            <p:ph idx="1"/>
+          </p:nvPr>
+        </p:nvSpPr>
+        <p:spPr>
+          <a:xfrm>
+            <a:off x="680321" y="2505456"/>
+            <a:ext cx="9484759" cy="3599316"/>
+          </a:xfrm>
+        </p:spPr>
+        <p:txBody>
+          <a:bodyPr>
+            <a:noAutofit/>
+          </a:bodyPr>
+          <a:lstStyle/>
+          <a:p>
+            <a:pPr>
+              <a:spcAft>
+                <a:spcPts val="1000"/>
+              </a:spcAft>
+            </a:pPr>
+            <a:r>
+              <a:rPr lang="pt-BR" dirty="0"/>
+              <a:t>Executando o Experimento:</a:t>
+            </a:r>
+          </a:p>
+          <a:p>
+            <a:pPr lvl="1">
+              <a:spcAft>
+                <a:spcPts val="1000"/>
+              </a:spcAft>
+            </a:pPr>
+            <a:r>
+              <a:rPr lang="pt-BR" dirty="0"/>
+              <a:t>O</a:t>
+            </a:r>
+          </a:p>
+        </p:txBody>
+      </p:sp>
+    </p:spTree>
+    <p:extLst>
+      <p:ext uri="{BB962C8B-B14F-4D97-AF65-F5344CB8AC3E}">
+        <p14:creationId xmlns:p14="http://schemas.microsoft.com/office/powerpoint/2010/main" val="438830966"/>
+      </p:ext>
+    </p:extLst>
+  </p:cSld>
+  <p:clrMapOvr>
+    <a:masterClrMapping/>
+  </p:clrMapOvr>
+</p:sld>
+</file>
+
+<file path=ppt/slides/slide112.xml><?xml version="1.0" encoding="utf-8"?>
+<p:sld xmlns:a="http://schemas.openxmlformats.org/drawingml/2006/main" xmlns:r="http://schemas.openxmlformats.org/officeDocument/2006/relationships" xmlns:p="http://schemas.openxmlformats.org/presentationml/2006/main">
+  <p:cSld>
+    <p:spTree>
+      <p:nvGrpSpPr>
+        <p:cNvPr id="1" name=""/>
+        <p:cNvGrpSpPr/>
+        <p:nvPr/>
+      </p:nvGrpSpPr>
+      <p:grpSpPr>
+        <a:xfrm>
+          <a:off x="0" y="0"/>
+          <a:ext cx="0" cy="0"/>
+          <a:chOff x="0" y="0"/>
+          <a:chExt cx="0" cy="0"/>
+        </a:xfrm>
+      </p:grpSpPr>
+      <p:sp>
+        <p:nvSpPr>
+          <p:cNvPr id="4" name="Título 1">
+            <a:extLst>
+              <a:ext uri="{FF2B5EF4-FFF2-40B4-BE49-F238E27FC236}">
+                <a16:creationId xmlns:a16="http://schemas.microsoft.com/office/drawing/2014/main" id="{9CA53688-E304-4704-85E6-8432DC608B05}"/>
+              </a:ext>
+            </a:extLst>
+          </p:cNvPr>
+          <p:cNvSpPr>
+            <a:spLocks noGrp="1"/>
+          </p:cNvSpPr>
+          <p:nvPr>
+            <p:ph type="title"/>
+          </p:nvPr>
+        </p:nvSpPr>
+        <p:spPr>
+          <a:xfrm>
+            <a:off x="680321" y="753228"/>
+            <a:ext cx="9613861" cy="1080938"/>
+          </a:xfrm>
+        </p:spPr>
+        <p:txBody>
+          <a:bodyPr/>
+          <a:lstStyle/>
+          <a:p>
+            <a:r>
+              <a:rPr lang="pt-BR" dirty="0"/>
+              <a:t>Mergulhando no Caos: O Experimento</a:t>
+            </a:r>
+          </a:p>
+        </p:txBody>
+      </p:sp>
+      <p:sp>
+        <p:nvSpPr>
+          <p:cNvPr id="5" name="Espaço Reservado para Conteúdo 2">
+            <a:extLst>
+              <a:ext uri="{FF2B5EF4-FFF2-40B4-BE49-F238E27FC236}">
+                <a16:creationId xmlns:a16="http://schemas.microsoft.com/office/drawing/2014/main" id="{C5B8AB74-06FA-413C-BD74-462D1F01C8FF}"/>
+              </a:ext>
+            </a:extLst>
+          </p:cNvPr>
+          <p:cNvSpPr>
+            <a:spLocks noGrp="1"/>
+          </p:cNvSpPr>
+          <p:nvPr>
+            <p:ph idx="1"/>
+          </p:nvPr>
+        </p:nvSpPr>
+        <p:spPr>
+          <a:xfrm>
+            <a:off x="680321" y="2505456"/>
+            <a:ext cx="9484759" cy="3599316"/>
+          </a:xfrm>
+        </p:spPr>
+        <p:txBody>
+          <a:bodyPr>
+            <a:noAutofit/>
+          </a:bodyPr>
+          <a:lstStyle/>
+          <a:p>
+            <a:pPr>
+              <a:spcAft>
+                <a:spcPts val="1000"/>
+              </a:spcAft>
+            </a:pPr>
+            <a:r>
+              <a:rPr lang="pt-BR" dirty="0"/>
+              <a:t>Executando o Experimento:</a:t>
+            </a:r>
+          </a:p>
+          <a:p>
+            <a:pPr lvl="1">
+              <a:spcAft>
+                <a:spcPts val="1000"/>
+              </a:spcAft>
+            </a:pPr>
+            <a:r>
+              <a:rPr lang="pt-BR" dirty="0"/>
+              <a:t>O</a:t>
+            </a:r>
+          </a:p>
+        </p:txBody>
+      </p:sp>
+    </p:spTree>
+    <p:extLst>
+      <p:ext uri="{BB962C8B-B14F-4D97-AF65-F5344CB8AC3E}">
+        <p14:creationId xmlns:p14="http://schemas.microsoft.com/office/powerpoint/2010/main" val="3861194432"/>
+      </p:ext>
+    </p:extLst>
+  </p:cSld>
+  <p:clrMapOvr>
+    <a:masterClrMapping/>
+  </p:clrMapOvr>
+</p:sld>
+</file>
+
+<file path=ppt/slides/slide113.xml><?xml version="1.0" encoding="utf-8"?>
+<p:sld xmlns:a="http://schemas.openxmlformats.org/drawingml/2006/main" xmlns:r="http://schemas.openxmlformats.org/officeDocument/2006/relationships" xmlns:p="http://schemas.openxmlformats.org/presentationml/2006/main">
+  <p:cSld>
+    <p:spTree>
+      <p:nvGrpSpPr>
+        <p:cNvPr id="1" name=""/>
+        <p:cNvGrpSpPr/>
+        <p:nvPr/>
+      </p:nvGrpSpPr>
+      <p:grpSpPr>
+        <a:xfrm>
+          <a:off x="0" y="0"/>
+          <a:ext cx="0" cy="0"/>
+          <a:chOff x="0" y="0"/>
+          <a:chExt cx="0" cy="0"/>
+        </a:xfrm>
+      </p:grpSpPr>
+      <p:sp>
+        <p:nvSpPr>
+          <p:cNvPr id="4" name="Título 1">
+            <a:extLst>
+              <a:ext uri="{FF2B5EF4-FFF2-40B4-BE49-F238E27FC236}">
+                <a16:creationId xmlns:a16="http://schemas.microsoft.com/office/drawing/2014/main" id="{9CA53688-E304-4704-85E6-8432DC608B05}"/>
+              </a:ext>
+            </a:extLst>
+          </p:cNvPr>
+          <p:cNvSpPr>
+            <a:spLocks noGrp="1"/>
+          </p:cNvSpPr>
+          <p:nvPr>
+            <p:ph type="title"/>
+          </p:nvPr>
+        </p:nvSpPr>
+        <p:spPr>
+          <a:xfrm>
+            <a:off x="680321" y="753228"/>
+            <a:ext cx="9613861" cy="1080938"/>
+          </a:xfrm>
+        </p:spPr>
+        <p:txBody>
+          <a:bodyPr/>
+          <a:lstStyle/>
+          <a:p>
+            <a:r>
+              <a:rPr lang="pt-BR" dirty="0"/>
+              <a:t>Mergulhando no Caos: O Experimento</a:t>
+            </a:r>
+          </a:p>
+        </p:txBody>
+      </p:sp>
+      <p:sp>
+        <p:nvSpPr>
+          <p:cNvPr id="5" name="Espaço Reservado para Conteúdo 2">
+            <a:extLst>
+              <a:ext uri="{FF2B5EF4-FFF2-40B4-BE49-F238E27FC236}">
+                <a16:creationId xmlns:a16="http://schemas.microsoft.com/office/drawing/2014/main" id="{C5B8AB74-06FA-413C-BD74-462D1F01C8FF}"/>
+              </a:ext>
+            </a:extLst>
+          </p:cNvPr>
+          <p:cNvSpPr>
+            <a:spLocks noGrp="1"/>
+          </p:cNvSpPr>
+          <p:nvPr>
+            <p:ph idx="1"/>
+          </p:nvPr>
+        </p:nvSpPr>
+        <p:spPr>
+          <a:xfrm>
+            <a:off x="680321" y="2505456"/>
+            <a:ext cx="9484759" cy="3599316"/>
+          </a:xfrm>
+        </p:spPr>
+        <p:txBody>
+          <a:bodyPr>
+            <a:noAutofit/>
+          </a:bodyPr>
+          <a:lstStyle/>
+          <a:p>
+            <a:pPr>
+              <a:spcAft>
+                <a:spcPts val="1000"/>
+              </a:spcAft>
+            </a:pPr>
+            <a:r>
+              <a:rPr lang="pt-BR" dirty="0"/>
+              <a:t>Executando o Experimento:</a:t>
+            </a:r>
+          </a:p>
+          <a:p>
+            <a:pPr lvl="1">
+              <a:spcAft>
+                <a:spcPts val="1000"/>
+              </a:spcAft>
+            </a:pPr>
+            <a:r>
+              <a:rPr lang="pt-BR" dirty="0"/>
+              <a:t>O</a:t>
+            </a:r>
+          </a:p>
+        </p:txBody>
+      </p:sp>
+    </p:spTree>
+    <p:extLst>
+      <p:ext uri="{BB962C8B-B14F-4D97-AF65-F5344CB8AC3E}">
+        <p14:creationId xmlns:p14="http://schemas.microsoft.com/office/powerpoint/2010/main" val="2011136968"/>
+      </p:ext>
+    </p:extLst>
+  </p:cSld>
+  <p:clrMapOvr>
+    <a:masterClrMapping/>
+  </p:clrMapOvr>
+</p:sld>
+</file>
+
+<file path=ppt/slides/slide114.xml><?xml version="1.0" encoding="utf-8"?>
+<p:sld xmlns:a="http://schemas.openxmlformats.org/drawingml/2006/main" xmlns:r="http://schemas.openxmlformats.org/officeDocument/2006/relationships" xmlns:p="http://schemas.openxmlformats.org/presentationml/2006/main">
+  <p:cSld>
+    <p:spTree>
+      <p:nvGrpSpPr>
+        <p:cNvPr id="1" name=""/>
+        <p:cNvGrpSpPr/>
+        <p:nvPr/>
+      </p:nvGrpSpPr>
+      <p:grpSpPr>
+        <a:xfrm>
+          <a:off x="0" y="0"/>
+          <a:ext cx="0" cy="0"/>
+          <a:chOff x="0" y="0"/>
+          <a:chExt cx="0" cy="0"/>
+        </a:xfrm>
+      </p:grpSpPr>
+      <p:sp>
+        <p:nvSpPr>
+          <p:cNvPr id="4" name="Título 1">
+            <a:extLst>
+              <a:ext uri="{FF2B5EF4-FFF2-40B4-BE49-F238E27FC236}">
+                <a16:creationId xmlns:a16="http://schemas.microsoft.com/office/drawing/2014/main" id="{9CA53688-E304-4704-85E6-8432DC608B05}"/>
+              </a:ext>
+            </a:extLst>
+          </p:cNvPr>
+          <p:cNvSpPr>
+            <a:spLocks noGrp="1"/>
+          </p:cNvSpPr>
+          <p:nvPr>
+            <p:ph type="title"/>
+          </p:nvPr>
+        </p:nvSpPr>
+        <p:spPr>
+          <a:xfrm>
+            <a:off x="680321" y="753228"/>
+            <a:ext cx="9613861" cy="1080938"/>
+          </a:xfrm>
+        </p:spPr>
+        <p:txBody>
+          <a:bodyPr/>
+          <a:lstStyle/>
+          <a:p>
+            <a:r>
+              <a:rPr lang="pt-BR" dirty="0"/>
+              <a:t>Mergulhando no Caos: O Experimento</a:t>
+            </a:r>
+          </a:p>
+        </p:txBody>
+      </p:sp>
+      <p:sp>
+        <p:nvSpPr>
+          <p:cNvPr id="5" name="Espaço Reservado para Conteúdo 2">
+            <a:extLst>
+              <a:ext uri="{FF2B5EF4-FFF2-40B4-BE49-F238E27FC236}">
+                <a16:creationId xmlns:a16="http://schemas.microsoft.com/office/drawing/2014/main" id="{C5B8AB74-06FA-413C-BD74-462D1F01C8FF}"/>
+              </a:ext>
+            </a:extLst>
+          </p:cNvPr>
+          <p:cNvSpPr>
+            <a:spLocks noGrp="1"/>
+          </p:cNvSpPr>
+          <p:nvPr>
+            <p:ph idx="1"/>
+          </p:nvPr>
+        </p:nvSpPr>
+        <p:spPr>
+          <a:xfrm>
+            <a:off x="680321" y="2505456"/>
+            <a:ext cx="9484759" cy="3599316"/>
+          </a:xfrm>
+        </p:spPr>
+        <p:txBody>
+          <a:bodyPr>
+            <a:noAutofit/>
+          </a:bodyPr>
+          <a:lstStyle/>
+          <a:p>
+            <a:pPr>
+              <a:spcAft>
+                <a:spcPts val="1000"/>
+              </a:spcAft>
+            </a:pPr>
+            <a:r>
+              <a:rPr lang="pt-BR" dirty="0"/>
+              <a:t>Executando o Experimento:</a:t>
+            </a:r>
+          </a:p>
+          <a:p>
+            <a:pPr lvl="1">
+              <a:spcAft>
+                <a:spcPts val="1000"/>
+              </a:spcAft>
+            </a:pPr>
+            <a:r>
+              <a:rPr lang="pt-BR" dirty="0"/>
+              <a:t>O</a:t>
+            </a:r>
+          </a:p>
+        </p:txBody>
+      </p:sp>
+    </p:spTree>
+    <p:extLst>
+      <p:ext uri="{BB962C8B-B14F-4D97-AF65-F5344CB8AC3E}">
+        <p14:creationId xmlns:p14="http://schemas.microsoft.com/office/powerpoint/2010/main" val="1909048234"/>
+      </p:ext>
+    </p:extLst>
+  </p:cSld>
+  <p:clrMapOvr>
+    <a:masterClrMapping/>
+  </p:clrMapOvr>
+</p:sld>
+</file>
+
+<file path=ppt/slides/slide115.xml><?xml version="1.0" encoding="utf-8"?>
+<p:sld xmlns:a="http://schemas.openxmlformats.org/drawingml/2006/main" xmlns:r="http://schemas.openxmlformats.org/officeDocument/2006/relationships" xmlns:p="http://schemas.openxmlformats.org/presentationml/2006/main">
+  <p:cSld>
+    <p:spTree>
+      <p:nvGrpSpPr>
+        <p:cNvPr id="1" name=""/>
+        <p:cNvGrpSpPr/>
+        <p:nvPr/>
+      </p:nvGrpSpPr>
+      <p:grpSpPr>
+        <a:xfrm>
+          <a:off x="0" y="0"/>
+          <a:ext cx="0" cy="0"/>
+          <a:chOff x="0" y="0"/>
+          <a:chExt cx="0" cy="0"/>
+        </a:xfrm>
+      </p:grpSpPr>
+      <p:sp>
+        <p:nvSpPr>
+          <p:cNvPr id="4" name="Título 1">
+            <a:extLst>
+              <a:ext uri="{FF2B5EF4-FFF2-40B4-BE49-F238E27FC236}">
+                <a16:creationId xmlns:a16="http://schemas.microsoft.com/office/drawing/2014/main" id="{9CA53688-E304-4704-85E6-8432DC608B05}"/>
+              </a:ext>
+            </a:extLst>
+          </p:cNvPr>
+          <p:cNvSpPr>
+            <a:spLocks noGrp="1"/>
+          </p:cNvSpPr>
+          <p:nvPr>
+            <p:ph type="title"/>
+          </p:nvPr>
+        </p:nvSpPr>
+        <p:spPr>
+          <a:xfrm>
+            <a:off x="680321" y="753228"/>
+            <a:ext cx="9613861" cy="1080938"/>
+          </a:xfrm>
+        </p:spPr>
+        <p:txBody>
+          <a:bodyPr/>
+          <a:lstStyle/>
+          <a:p>
+            <a:r>
+              <a:rPr lang="pt-BR" dirty="0"/>
+              <a:t>Mergulhando no Caos: O Experimento</a:t>
+            </a:r>
+          </a:p>
+        </p:txBody>
+      </p:sp>
+      <p:sp>
+        <p:nvSpPr>
+          <p:cNvPr id="5" name="Espaço Reservado para Conteúdo 2">
+            <a:extLst>
+              <a:ext uri="{FF2B5EF4-FFF2-40B4-BE49-F238E27FC236}">
+                <a16:creationId xmlns:a16="http://schemas.microsoft.com/office/drawing/2014/main" id="{C5B8AB74-06FA-413C-BD74-462D1F01C8FF}"/>
+              </a:ext>
+            </a:extLst>
+          </p:cNvPr>
+          <p:cNvSpPr>
+            <a:spLocks noGrp="1"/>
+          </p:cNvSpPr>
+          <p:nvPr>
+            <p:ph idx="1"/>
+          </p:nvPr>
+        </p:nvSpPr>
+        <p:spPr>
+          <a:xfrm>
+            <a:off x="680321" y="2505456"/>
+            <a:ext cx="9484759" cy="3599316"/>
+          </a:xfrm>
+        </p:spPr>
+        <p:txBody>
+          <a:bodyPr>
+            <a:noAutofit/>
+          </a:bodyPr>
+          <a:lstStyle/>
+          <a:p>
+            <a:pPr>
+              <a:spcAft>
+                <a:spcPts val="1000"/>
+              </a:spcAft>
+            </a:pPr>
+            <a:r>
+              <a:rPr lang="pt-BR" dirty="0"/>
+              <a:t>Executando o Experimento:</a:t>
+            </a:r>
+          </a:p>
+          <a:p>
+            <a:pPr lvl="1">
+              <a:spcAft>
+                <a:spcPts val="1000"/>
+              </a:spcAft>
+            </a:pPr>
+            <a:r>
+              <a:rPr lang="pt-BR" dirty="0"/>
+              <a:t>O</a:t>
+            </a:r>
+          </a:p>
+        </p:txBody>
+      </p:sp>
+    </p:spTree>
+    <p:extLst>
+      <p:ext uri="{BB962C8B-B14F-4D97-AF65-F5344CB8AC3E}">
+        <p14:creationId xmlns:p14="http://schemas.microsoft.com/office/powerpoint/2010/main" val="1436024711"/>
+      </p:ext>
+    </p:extLst>
+  </p:cSld>
+  <p:clrMapOvr>
+    <a:masterClrMapping/>
+  </p:clrMapOvr>
+</p:sld>
+</file>
+
+<file path=ppt/slides/slide116.xml><?xml version="1.0" encoding="utf-8"?>
+<p:sld xmlns:a="http://schemas.openxmlformats.org/drawingml/2006/main" xmlns:r="http://schemas.openxmlformats.org/officeDocument/2006/relationships" xmlns:p="http://schemas.openxmlformats.org/presentationml/2006/main">
+  <p:cSld>
+    <p:spTree>
+      <p:nvGrpSpPr>
+        <p:cNvPr id="1" name=""/>
+        <p:cNvGrpSpPr/>
+        <p:nvPr/>
+      </p:nvGrpSpPr>
+      <p:grpSpPr>
+        <a:xfrm>
+          <a:off x="0" y="0"/>
+          <a:ext cx="0" cy="0"/>
+          <a:chOff x="0" y="0"/>
+          <a:chExt cx="0" cy="0"/>
+        </a:xfrm>
+      </p:grpSpPr>
+      <p:sp>
+        <p:nvSpPr>
+          <p:cNvPr id="4" name="Título 1">
+            <a:extLst>
+              <a:ext uri="{FF2B5EF4-FFF2-40B4-BE49-F238E27FC236}">
+                <a16:creationId xmlns:a16="http://schemas.microsoft.com/office/drawing/2014/main" id="{9CA53688-E304-4704-85E6-8432DC608B05}"/>
+              </a:ext>
+            </a:extLst>
+          </p:cNvPr>
+          <p:cNvSpPr>
+            <a:spLocks noGrp="1"/>
+          </p:cNvSpPr>
+          <p:nvPr>
+            <p:ph type="title"/>
+          </p:nvPr>
+        </p:nvSpPr>
+        <p:spPr>
+          <a:xfrm>
+            <a:off x="680321" y="753228"/>
+            <a:ext cx="9613861" cy="1080938"/>
+          </a:xfrm>
+        </p:spPr>
+        <p:txBody>
+          <a:bodyPr/>
+          <a:lstStyle/>
+          <a:p>
+            <a:r>
+              <a:rPr lang="pt-BR" dirty="0"/>
+              <a:t>Mergulhando no Caos: O Experimento</a:t>
+            </a:r>
+          </a:p>
+        </p:txBody>
+      </p:sp>
+      <p:sp>
+        <p:nvSpPr>
+          <p:cNvPr id="5" name="Espaço Reservado para Conteúdo 2">
+            <a:extLst>
+              <a:ext uri="{FF2B5EF4-FFF2-40B4-BE49-F238E27FC236}">
+                <a16:creationId xmlns:a16="http://schemas.microsoft.com/office/drawing/2014/main" id="{C5B8AB74-06FA-413C-BD74-462D1F01C8FF}"/>
+              </a:ext>
+            </a:extLst>
+          </p:cNvPr>
+          <p:cNvSpPr>
+            <a:spLocks noGrp="1"/>
+          </p:cNvSpPr>
+          <p:nvPr>
+            <p:ph idx="1"/>
+          </p:nvPr>
+        </p:nvSpPr>
+        <p:spPr>
+          <a:xfrm>
+            <a:off x="680321" y="2505456"/>
+            <a:ext cx="9484759" cy="3599316"/>
+          </a:xfrm>
+        </p:spPr>
+        <p:txBody>
+          <a:bodyPr>
+            <a:noAutofit/>
+          </a:bodyPr>
+          <a:lstStyle/>
+          <a:p>
+            <a:pPr>
+              <a:spcAft>
+                <a:spcPts val="1000"/>
+              </a:spcAft>
+            </a:pPr>
+            <a:r>
+              <a:rPr lang="pt-BR" dirty="0"/>
+              <a:t>Executando o Experimento:</a:t>
+            </a:r>
+          </a:p>
+          <a:p>
+            <a:pPr lvl="1">
+              <a:spcAft>
+                <a:spcPts val="1000"/>
+              </a:spcAft>
+            </a:pPr>
+            <a:r>
+              <a:rPr lang="pt-BR" dirty="0"/>
+              <a:t>O</a:t>
+            </a:r>
+          </a:p>
+        </p:txBody>
+      </p:sp>
+    </p:spTree>
+    <p:extLst>
+      <p:ext uri="{BB962C8B-B14F-4D97-AF65-F5344CB8AC3E}">
+        <p14:creationId xmlns:p14="http://schemas.microsoft.com/office/powerpoint/2010/main" val="3753200689"/>
+      </p:ext>
+    </p:extLst>
+  </p:cSld>
+  <p:clrMapOvr>
+    <a:masterClrMapping/>
+  </p:clrMapOvr>
+</p:sld>
+</file>
+
+<file path=ppt/slides/slide117.xml><?xml version="1.0" encoding="utf-8"?>
+<p:sld xmlns:a="http://schemas.openxmlformats.org/drawingml/2006/main" xmlns:r="http://schemas.openxmlformats.org/officeDocument/2006/relationships" xmlns:p="http://schemas.openxmlformats.org/presentationml/2006/main">
+  <p:cSld>
+    <p:spTree>
+      <p:nvGrpSpPr>
+        <p:cNvPr id="1" name=""/>
+        <p:cNvGrpSpPr/>
+        <p:nvPr/>
+      </p:nvGrpSpPr>
+      <p:grpSpPr>
+        <a:xfrm>
+          <a:off x="0" y="0"/>
+          <a:ext cx="0" cy="0"/>
+          <a:chOff x="0" y="0"/>
+          <a:chExt cx="0" cy="0"/>
+        </a:xfrm>
+      </p:grpSpPr>
+      <p:sp>
+        <p:nvSpPr>
+          <p:cNvPr id="4" name="Título 1">
+            <a:extLst>
+              <a:ext uri="{FF2B5EF4-FFF2-40B4-BE49-F238E27FC236}">
+                <a16:creationId xmlns:a16="http://schemas.microsoft.com/office/drawing/2014/main" id="{9CA53688-E304-4704-85E6-8432DC608B05}"/>
+              </a:ext>
+            </a:extLst>
+          </p:cNvPr>
+          <p:cNvSpPr>
+            <a:spLocks noGrp="1"/>
+          </p:cNvSpPr>
+          <p:nvPr>
+            <p:ph type="title"/>
+          </p:nvPr>
+        </p:nvSpPr>
+        <p:spPr>
+          <a:xfrm>
+            <a:off x="680321" y="753228"/>
+            <a:ext cx="9613861" cy="1080938"/>
+          </a:xfrm>
+        </p:spPr>
+        <p:txBody>
+          <a:bodyPr/>
+          <a:lstStyle/>
+          <a:p>
+            <a:r>
+              <a:rPr lang="pt-BR" dirty="0"/>
+              <a:t>Mergulhando no Caos: O Experimento</a:t>
+            </a:r>
+          </a:p>
+        </p:txBody>
+      </p:sp>
+      <p:sp>
+        <p:nvSpPr>
+          <p:cNvPr id="5" name="Espaço Reservado para Conteúdo 2">
+            <a:extLst>
+              <a:ext uri="{FF2B5EF4-FFF2-40B4-BE49-F238E27FC236}">
+                <a16:creationId xmlns:a16="http://schemas.microsoft.com/office/drawing/2014/main" id="{C5B8AB74-06FA-413C-BD74-462D1F01C8FF}"/>
+              </a:ext>
+            </a:extLst>
+          </p:cNvPr>
+          <p:cNvSpPr>
+            <a:spLocks noGrp="1"/>
+          </p:cNvSpPr>
+          <p:nvPr>
+            <p:ph idx="1"/>
+          </p:nvPr>
+        </p:nvSpPr>
+        <p:spPr>
+          <a:xfrm>
+            <a:off x="680321" y="2505456"/>
+            <a:ext cx="9484759" cy="3599316"/>
+          </a:xfrm>
+        </p:spPr>
+        <p:txBody>
+          <a:bodyPr>
+            <a:noAutofit/>
+          </a:bodyPr>
+          <a:lstStyle/>
+          <a:p>
+            <a:pPr>
+              <a:spcAft>
+                <a:spcPts val="1000"/>
+              </a:spcAft>
+            </a:pPr>
+            <a:r>
+              <a:rPr lang="pt-BR" dirty="0"/>
+              <a:t>Executando o Experimento:</a:t>
+            </a:r>
+          </a:p>
+          <a:p>
+            <a:pPr lvl="1">
+              <a:spcAft>
+                <a:spcPts val="1000"/>
+              </a:spcAft>
+            </a:pPr>
+            <a:r>
+              <a:rPr lang="pt-BR" dirty="0"/>
+              <a:t>O</a:t>
+            </a:r>
+          </a:p>
+        </p:txBody>
+      </p:sp>
+    </p:spTree>
+    <p:extLst>
+      <p:ext uri="{BB962C8B-B14F-4D97-AF65-F5344CB8AC3E}">
+        <p14:creationId xmlns:p14="http://schemas.microsoft.com/office/powerpoint/2010/main" val="702281282"/>
+      </p:ext>
+    </p:extLst>
+  </p:cSld>
+  <p:clrMapOvr>
+    <a:masterClrMapping/>
+  </p:clrMapOvr>
+</p:sld>
+</file>
+
+<file path=ppt/slides/slide118.xml><?xml version="1.0" encoding="utf-8"?>
+<p:sld xmlns:a="http://schemas.openxmlformats.org/drawingml/2006/main" xmlns:r="http://schemas.openxmlformats.org/officeDocument/2006/relationships" xmlns:p="http://schemas.openxmlformats.org/presentationml/2006/main">
+  <p:cSld>
+    <p:spTree>
+      <p:nvGrpSpPr>
+        <p:cNvPr id="1" name=""/>
+        <p:cNvGrpSpPr/>
+        <p:nvPr/>
+      </p:nvGrpSpPr>
+      <p:grpSpPr>
+        <a:xfrm>
+          <a:off x="0" y="0"/>
+          <a:ext cx="0" cy="0"/>
+          <a:chOff x="0" y="0"/>
+          <a:chExt cx="0" cy="0"/>
+        </a:xfrm>
+      </p:grpSpPr>
+      <p:sp>
+        <p:nvSpPr>
+          <p:cNvPr id="4" name="Título 1">
+            <a:extLst>
+              <a:ext uri="{FF2B5EF4-FFF2-40B4-BE49-F238E27FC236}">
+                <a16:creationId xmlns:a16="http://schemas.microsoft.com/office/drawing/2014/main" id="{9CA53688-E304-4704-85E6-8432DC608B05}"/>
+              </a:ext>
+            </a:extLst>
+          </p:cNvPr>
+          <p:cNvSpPr>
+            <a:spLocks noGrp="1"/>
+          </p:cNvSpPr>
+          <p:nvPr>
+            <p:ph type="title"/>
+          </p:nvPr>
+        </p:nvSpPr>
+        <p:spPr>
+          <a:xfrm>
+            <a:off x="680321" y="753228"/>
+            <a:ext cx="9613861" cy="1080938"/>
+          </a:xfrm>
+        </p:spPr>
+        <p:txBody>
+          <a:bodyPr/>
+          <a:lstStyle/>
+          <a:p>
+            <a:r>
+              <a:rPr lang="pt-BR" dirty="0"/>
+              <a:t>Mergulhando no Caos: O Experimento</a:t>
+            </a:r>
+          </a:p>
+        </p:txBody>
+      </p:sp>
+      <p:sp>
+        <p:nvSpPr>
+          <p:cNvPr id="5" name="Espaço Reservado para Conteúdo 2">
+            <a:extLst>
+              <a:ext uri="{FF2B5EF4-FFF2-40B4-BE49-F238E27FC236}">
+                <a16:creationId xmlns:a16="http://schemas.microsoft.com/office/drawing/2014/main" id="{C5B8AB74-06FA-413C-BD74-462D1F01C8FF}"/>
+              </a:ext>
+            </a:extLst>
+          </p:cNvPr>
+          <p:cNvSpPr>
+            <a:spLocks noGrp="1"/>
+          </p:cNvSpPr>
+          <p:nvPr>
+            <p:ph idx="1"/>
+          </p:nvPr>
+        </p:nvSpPr>
+        <p:spPr>
+          <a:xfrm>
+            <a:off x="680321" y="2505456"/>
+            <a:ext cx="9484759" cy="3599316"/>
+          </a:xfrm>
+        </p:spPr>
+        <p:txBody>
+          <a:bodyPr>
+            <a:noAutofit/>
+          </a:bodyPr>
+          <a:lstStyle/>
+          <a:p>
+            <a:pPr>
+              <a:spcAft>
+                <a:spcPts val="1000"/>
+              </a:spcAft>
+            </a:pPr>
+            <a:r>
+              <a:rPr lang="pt-BR" dirty="0"/>
+              <a:t>Executando o Experimento:</a:t>
+            </a:r>
+          </a:p>
+          <a:p>
+            <a:pPr lvl="1">
+              <a:spcAft>
+                <a:spcPts val="1000"/>
+              </a:spcAft>
+            </a:pPr>
+            <a:r>
+              <a:rPr lang="pt-BR" dirty="0"/>
+              <a:t>O</a:t>
+            </a:r>
+          </a:p>
+        </p:txBody>
+      </p:sp>
+    </p:spTree>
+    <p:extLst>
+      <p:ext uri="{BB962C8B-B14F-4D97-AF65-F5344CB8AC3E}">
+        <p14:creationId xmlns:p14="http://schemas.microsoft.com/office/powerpoint/2010/main" val="3924445409"/>
+      </p:ext>
+    </p:extLst>
+  </p:cSld>
+  <p:clrMapOvr>
+    <a:masterClrMapping/>
+  </p:clrMapOvr>
+</p:sld>
+</file>
+
+<file path=ppt/slides/slide119.xml><?xml version="1.0" encoding="utf-8"?>
+<p:sld xmlns:a="http://schemas.openxmlformats.org/drawingml/2006/main" xmlns:r="http://schemas.openxmlformats.org/officeDocument/2006/relationships" xmlns:p="http://schemas.openxmlformats.org/presentationml/2006/main">
+  <p:cSld>
+    <p:spTree>
+      <p:nvGrpSpPr>
+        <p:cNvPr id="1" name=""/>
+        <p:cNvGrpSpPr/>
+        <p:nvPr/>
+      </p:nvGrpSpPr>
+      <p:grpSpPr>
+        <a:xfrm>
+          <a:off x="0" y="0"/>
+          <a:ext cx="0" cy="0"/>
+          <a:chOff x="0" y="0"/>
+          <a:chExt cx="0" cy="0"/>
+        </a:xfrm>
+      </p:grpSpPr>
+      <p:sp>
+        <p:nvSpPr>
+          <p:cNvPr id="4" name="Título 1">
+            <a:extLst>
+              <a:ext uri="{FF2B5EF4-FFF2-40B4-BE49-F238E27FC236}">
+                <a16:creationId xmlns:a16="http://schemas.microsoft.com/office/drawing/2014/main" id="{9CA53688-E304-4704-85E6-8432DC608B05}"/>
+              </a:ext>
+            </a:extLst>
+          </p:cNvPr>
+          <p:cNvSpPr>
+            <a:spLocks noGrp="1"/>
+          </p:cNvSpPr>
+          <p:nvPr>
+            <p:ph type="title"/>
+          </p:nvPr>
+        </p:nvSpPr>
+        <p:spPr>
+          <a:xfrm>
+            <a:off x="680321" y="753228"/>
+            <a:ext cx="9613861" cy="1080938"/>
+          </a:xfrm>
+        </p:spPr>
+        <p:txBody>
+          <a:bodyPr/>
+          <a:lstStyle/>
+          <a:p>
+            <a:r>
+              <a:rPr lang="pt-BR" dirty="0"/>
+              <a:t>Mergulhando no Caos: O Experimento</a:t>
+            </a:r>
+          </a:p>
+        </p:txBody>
+      </p:sp>
+      <p:sp>
+        <p:nvSpPr>
+          <p:cNvPr id="5" name="Espaço Reservado para Conteúdo 2">
+            <a:extLst>
+              <a:ext uri="{FF2B5EF4-FFF2-40B4-BE49-F238E27FC236}">
+                <a16:creationId xmlns:a16="http://schemas.microsoft.com/office/drawing/2014/main" id="{C5B8AB74-06FA-413C-BD74-462D1F01C8FF}"/>
+              </a:ext>
+            </a:extLst>
+          </p:cNvPr>
+          <p:cNvSpPr>
+            <a:spLocks noGrp="1"/>
+          </p:cNvSpPr>
+          <p:nvPr>
+            <p:ph idx="1"/>
+          </p:nvPr>
+        </p:nvSpPr>
+        <p:spPr>
+          <a:xfrm>
+            <a:off x="680321" y="2505456"/>
+            <a:ext cx="9484759" cy="3599316"/>
+          </a:xfrm>
+        </p:spPr>
+        <p:txBody>
+          <a:bodyPr>
+            <a:noAutofit/>
+          </a:bodyPr>
+          <a:lstStyle/>
+          <a:p>
+            <a:pPr>
+              <a:spcAft>
+                <a:spcPts val="1000"/>
+              </a:spcAft>
+            </a:pPr>
+            <a:r>
+              <a:rPr lang="pt-BR" dirty="0"/>
+              <a:t>Executando o Experimento:</a:t>
+            </a:r>
+          </a:p>
+          <a:p>
+            <a:pPr lvl="1">
+              <a:spcAft>
+                <a:spcPts val="1000"/>
+              </a:spcAft>
+            </a:pPr>
+            <a:r>
+              <a:rPr lang="pt-BR" dirty="0"/>
+              <a:t>O</a:t>
+            </a:r>
+          </a:p>
+        </p:txBody>
+      </p:sp>
+    </p:spTree>
+    <p:extLst>
+      <p:ext uri="{BB962C8B-B14F-4D97-AF65-F5344CB8AC3E}">
+        <p14:creationId xmlns:p14="http://schemas.microsoft.com/office/powerpoint/2010/main" val="962174859"/>
       </p:ext>
     </p:extLst>
   </p:cSld>
@@ -8700,6 +11275,1146 @@
 </p:sld>
 </file>
 
+<file path=ppt/slides/slide120.xml><?xml version="1.0" encoding="utf-8"?>
+<p:sld xmlns:a="http://schemas.openxmlformats.org/drawingml/2006/main" xmlns:r="http://schemas.openxmlformats.org/officeDocument/2006/relationships" xmlns:p="http://schemas.openxmlformats.org/presentationml/2006/main">
+  <p:cSld>
+    <p:spTree>
+      <p:nvGrpSpPr>
+        <p:cNvPr id="1" name=""/>
+        <p:cNvGrpSpPr/>
+        <p:nvPr/>
+      </p:nvGrpSpPr>
+      <p:grpSpPr>
+        <a:xfrm>
+          <a:off x="0" y="0"/>
+          <a:ext cx="0" cy="0"/>
+          <a:chOff x="0" y="0"/>
+          <a:chExt cx="0" cy="0"/>
+        </a:xfrm>
+      </p:grpSpPr>
+      <p:sp>
+        <p:nvSpPr>
+          <p:cNvPr id="4" name="Título 1">
+            <a:extLst>
+              <a:ext uri="{FF2B5EF4-FFF2-40B4-BE49-F238E27FC236}">
+                <a16:creationId xmlns:a16="http://schemas.microsoft.com/office/drawing/2014/main" id="{9CA53688-E304-4704-85E6-8432DC608B05}"/>
+              </a:ext>
+            </a:extLst>
+          </p:cNvPr>
+          <p:cNvSpPr>
+            <a:spLocks noGrp="1"/>
+          </p:cNvSpPr>
+          <p:nvPr>
+            <p:ph type="title"/>
+          </p:nvPr>
+        </p:nvSpPr>
+        <p:spPr>
+          <a:xfrm>
+            <a:off x="680321" y="753228"/>
+            <a:ext cx="9613861" cy="1080938"/>
+          </a:xfrm>
+        </p:spPr>
+        <p:txBody>
+          <a:bodyPr/>
+          <a:lstStyle/>
+          <a:p>
+            <a:r>
+              <a:rPr lang="pt-BR" dirty="0"/>
+              <a:t>Mergulhando no Caos: O Experimento</a:t>
+            </a:r>
+          </a:p>
+        </p:txBody>
+      </p:sp>
+      <p:sp>
+        <p:nvSpPr>
+          <p:cNvPr id="5" name="Espaço Reservado para Conteúdo 2">
+            <a:extLst>
+              <a:ext uri="{FF2B5EF4-FFF2-40B4-BE49-F238E27FC236}">
+                <a16:creationId xmlns:a16="http://schemas.microsoft.com/office/drawing/2014/main" id="{C5B8AB74-06FA-413C-BD74-462D1F01C8FF}"/>
+              </a:ext>
+            </a:extLst>
+          </p:cNvPr>
+          <p:cNvSpPr>
+            <a:spLocks noGrp="1"/>
+          </p:cNvSpPr>
+          <p:nvPr>
+            <p:ph idx="1"/>
+          </p:nvPr>
+        </p:nvSpPr>
+        <p:spPr>
+          <a:xfrm>
+            <a:off x="680321" y="2505456"/>
+            <a:ext cx="9484759" cy="3599316"/>
+          </a:xfrm>
+        </p:spPr>
+        <p:txBody>
+          <a:bodyPr>
+            <a:noAutofit/>
+          </a:bodyPr>
+          <a:lstStyle/>
+          <a:p>
+            <a:pPr>
+              <a:spcAft>
+                <a:spcPts val="1000"/>
+              </a:spcAft>
+            </a:pPr>
+            <a:r>
+              <a:rPr lang="pt-BR" dirty="0"/>
+              <a:t>Executando o Experimento:</a:t>
+            </a:r>
+          </a:p>
+          <a:p>
+            <a:pPr lvl="1">
+              <a:spcAft>
+                <a:spcPts val="1000"/>
+              </a:spcAft>
+            </a:pPr>
+            <a:r>
+              <a:rPr lang="pt-BR" dirty="0"/>
+              <a:t>O</a:t>
+            </a:r>
+          </a:p>
+        </p:txBody>
+      </p:sp>
+    </p:spTree>
+    <p:extLst>
+      <p:ext uri="{BB962C8B-B14F-4D97-AF65-F5344CB8AC3E}">
+        <p14:creationId xmlns:p14="http://schemas.microsoft.com/office/powerpoint/2010/main" val="2328872848"/>
+      </p:ext>
+    </p:extLst>
+  </p:cSld>
+  <p:clrMapOvr>
+    <a:masterClrMapping/>
+  </p:clrMapOvr>
+</p:sld>
+</file>
+
+<file path=ppt/slides/slide121.xml><?xml version="1.0" encoding="utf-8"?>
+<p:sld xmlns:a="http://schemas.openxmlformats.org/drawingml/2006/main" xmlns:r="http://schemas.openxmlformats.org/officeDocument/2006/relationships" xmlns:p="http://schemas.openxmlformats.org/presentationml/2006/main">
+  <p:cSld>
+    <p:spTree>
+      <p:nvGrpSpPr>
+        <p:cNvPr id="1" name=""/>
+        <p:cNvGrpSpPr/>
+        <p:nvPr/>
+      </p:nvGrpSpPr>
+      <p:grpSpPr>
+        <a:xfrm>
+          <a:off x="0" y="0"/>
+          <a:ext cx="0" cy="0"/>
+          <a:chOff x="0" y="0"/>
+          <a:chExt cx="0" cy="0"/>
+        </a:xfrm>
+      </p:grpSpPr>
+      <p:sp>
+        <p:nvSpPr>
+          <p:cNvPr id="4" name="Título 1">
+            <a:extLst>
+              <a:ext uri="{FF2B5EF4-FFF2-40B4-BE49-F238E27FC236}">
+                <a16:creationId xmlns:a16="http://schemas.microsoft.com/office/drawing/2014/main" id="{9CA53688-E304-4704-85E6-8432DC608B05}"/>
+              </a:ext>
+            </a:extLst>
+          </p:cNvPr>
+          <p:cNvSpPr>
+            <a:spLocks noGrp="1"/>
+          </p:cNvSpPr>
+          <p:nvPr>
+            <p:ph type="title"/>
+          </p:nvPr>
+        </p:nvSpPr>
+        <p:spPr>
+          <a:xfrm>
+            <a:off x="680321" y="753228"/>
+            <a:ext cx="9613861" cy="1080938"/>
+          </a:xfrm>
+        </p:spPr>
+        <p:txBody>
+          <a:bodyPr/>
+          <a:lstStyle/>
+          <a:p>
+            <a:r>
+              <a:rPr lang="pt-BR" dirty="0"/>
+              <a:t>Mergulhando no Caos: O Experimento</a:t>
+            </a:r>
+          </a:p>
+        </p:txBody>
+      </p:sp>
+      <p:sp>
+        <p:nvSpPr>
+          <p:cNvPr id="5" name="Espaço Reservado para Conteúdo 2">
+            <a:extLst>
+              <a:ext uri="{FF2B5EF4-FFF2-40B4-BE49-F238E27FC236}">
+                <a16:creationId xmlns:a16="http://schemas.microsoft.com/office/drawing/2014/main" id="{C5B8AB74-06FA-413C-BD74-462D1F01C8FF}"/>
+              </a:ext>
+            </a:extLst>
+          </p:cNvPr>
+          <p:cNvSpPr>
+            <a:spLocks noGrp="1"/>
+          </p:cNvSpPr>
+          <p:nvPr>
+            <p:ph idx="1"/>
+          </p:nvPr>
+        </p:nvSpPr>
+        <p:spPr>
+          <a:xfrm>
+            <a:off x="680321" y="2505456"/>
+            <a:ext cx="9484759" cy="3599316"/>
+          </a:xfrm>
+        </p:spPr>
+        <p:txBody>
+          <a:bodyPr>
+            <a:noAutofit/>
+          </a:bodyPr>
+          <a:lstStyle/>
+          <a:p>
+            <a:pPr>
+              <a:spcAft>
+                <a:spcPts val="1000"/>
+              </a:spcAft>
+            </a:pPr>
+            <a:r>
+              <a:rPr lang="pt-BR" dirty="0"/>
+              <a:t>Executando o Experimento:</a:t>
+            </a:r>
+          </a:p>
+          <a:p>
+            <a:pPr lvl="1">
+              <a:spcAft>
+                <a:spcPts val="1000"/>
+              </a:spcAft>
+            </a:pPr>
+            <a:r>
+              <a:rPr lang="pt-BR" dirty="0"/>
+              <a:t>O</a:t>
+            </a:r>
+          </a:p>
+        </p:txBody>
+      </p:sp>
+    </p:spTree>
+    <p:extLst>
+      <p:ext uri="{BB962C8B-B14F-4D97-AF65-F5344CB8AC3E}">
+        <p14:creationId xmlns:p14="http://schemas.microsoft.com/office/powerpoint/2010/main" val="2706659678"/>
+      </p:ext>
+    </p:extLst>
+  </p:cSld>
+  <p:clrMapOvr>
+    <a:masterClrMapping/>
+  </p:clrMapOvr>
+</p:sld>
+</file>
+
+<file path=ppt/slides/slide122.xml><?xml version="1.0" encoding="utf-8"?>
+<p:sld xmlns:a="http://schemas.openxmlformats.org/drawingml/2006/main" xmlns:r="http://schemas.openxmlformats.org/officeDocument/2006/relationships" xmlns:p="http://schemas.openxmlformats.org/presentationml/2006/main">
+  <p:cSld>
+    <p:spTree>
+      <p:nvGrpSpPr>
+        <p:cNvPr id="1" name=""/>
+        <p:cNvGrpSpPr/>
+        <p:nvPr/>
+      </p:nvGrpSpPr>
+      <p:grpSpPr>
+        <a:xfrm>
+          <a:off x="0" y="0"/>
+          <a:ext cx="0" cy="0"/>
+          <a:chOff x="0" y="0"/>
+          <a:chExt cx="0" cy="0"/>
+        </a:xfrm>
+      </p:grpSpPr>
+      <p:sp>
+        <p:nvSpPr>
+          <p:cNvPr id="4" name="Título 1">
+            <a:extLst>
+              <a:ext uri="{FF2B5EF4-FFF2-40B4-BE49-F238E27FC236}">
+                <a16:creationId xmlns:a16="http://schemas.microsoft.com/office/drawing/2014/main" id="{9CA53688-E304-4704-85E6-8432DC608B05}"/>
+              </a:ext>
+            </a:extLst>
+          </p:cNvPr>
+          <p:cNvSpPr>
+            <a:spLocks noGrp="1"/>
+          </p:cNvSpPr>
+          <p:nvPr>
+            <p:ph type="title"/>
+          </p:nvPr>
+        </p:nvSpPr>
+        <p:spPr>
+          <a:xfrm>
+            <a:off x="680321" y="753228"/>
+            <a:ext cx="9613861" cy="1080938"/>
+          </a:xfrm>
+        </p:spPr>
+        <p:txBody>
+          <a:bodyPr/>
+          <a:lstStyle/>
+          <a:p>
+            <a:r>
+              <a:rPr lang="pt-BR" dirty="0"/>
+              <a:t>Mergulhando no Caos: O Experimento</a:t>
+            </a:r>
+          </a:p>
+        </p:txBody>
+      </p:sp>
+      <p:sp>
+        <p:nvSpPr>
+          <p:cNvPr id="5" name="Espaço Reservado para Conteúdo 2">
+            <a:extLst>
+              <a:ext uri="{FF2B5EF4-FFF2-40B4-BE49-F238E27FC236}">
+                <a16:creationId xmlns:a16="http://schemas.microsoft.com/office/drawing/2014/main" id="{C5B8AB74-06FA-413C-BD74-462D1F01C8FF}"/>
+              </a:ext>
+            </a:extLst>
+          </p:cNvPr>
+          <p:cNvSpPr>
+            <a:spLocks noGrp="1"/>
+          </p:cNvSpPr>
+          <p:nvPr>
+            <p:ph idx="1"/>
+          </p:nvPr>
+        </p:nvSpPr>
+        <p:spPr>
+          <a:xfrm>
+            <a:off x="680321" y="2505456"/>
+            <a:ext cx="9484759" cy="3599316"/>
+          </a:xfrm>
+        </p:spPr>
+        <p:txBody>
+          <a:bodyPr>
+            <a:noAutofit/>
+          </a:bodyPr>
+          <a:lstStyle/>
+          <a:p>
+            <a:pPr>
+              <a:spcAft>
+                <a:spcPts val="1000"/>
+              </a:spcAft>
+            </a:pPr>
+            <a:r>
+              <a:rPr lang="pt-BR" dirty="0"/>
+              <a:t>Executando o Experimento:</a:t>
+            </a:r>
+          </a:p>
+          <a:p>
+            <a:pPr lvl="1">
+              <a:spcAft>
+                <a:spcPts val="1000"/>
+              </a:spcAft>
+            </a:pPr>
+            <a:r>
+              <a:rPr lang="pt-BR" dirty="0"/>
+              <a:t>O</a:t>
+            </a:r>
+          </a:p>
+        </p:txBody>
+      </p:sp>
+    </p:spTree>
+    <p:extLst>
+      <p:ext uri="{BB962C8B-B14F-4D97-AF65-F5344CB8AC3E}">
+        <p14:creationId xmlns:p14="http://schemas.microsoft.com/office/powerpoint/2010/main" val="4219855427"/>
+      </p:ext>
+    </p:extLst>
+  </p:cSld>
+  <p:clrMapOvr>
+    <a:masterClrMapping/>
+  </p:clrMapOvr>
+</p:sld>
+</file>
+
+<file path=ppt/slides/slide123.xml><?xml version="1.0" encoding="utf-8"?>
+<p:sld xmlns:a="http://schemas.openxmlformats.org/drawingml/2006/main" xmlns:r="http://schemas.openxmlformats.org/officeDocument/2006/relationships" xmlns:p="http://schemas.openxmlformats.org/presentationml/2006/main">
+  <p:cSld>
+    <p:spTree>
+      <p:nvGrpSpPr>
+        <p:cNvPr id="1" name=""/>
+        <p:cNvGrpSpPr/>
+        <p:nvPr/>
+      </p:nvGrpSpPr>
+      <p:grpSpPr>
+        <a:xfrm>
+          <a:off x="0" y="0"/>
+          <a:ext cx="0" cy="0"/>
+          <a:chOff x="0" y="0"/>
+          <a:chExt cx="0" cy="0"/>
+        </a:xfrm>
+      </p:grpSpPr>
+      <p:sp>
+        <p:nvSpPr>
+          <p:cNvPr id="4" name="Título 1">
+            <a:extLst>
+              <a:ext uri="{FF2B5EF4-FFF2-40B4-BE49-F238E27FC236}">
+                <a16:creationId xmlns:a16="http://schemas.microsoft.com/office/drawing/2014/main" id="{9CA53688-E304-4704-85E6-8432DC608B05}"/>
+              </a:ext>
+            </a:extLst>
+          </p:cNvPr>
+          <p:cNvSpPr>
+            <a:spLocks noGrp="1"/>
+          </p:cNvSpPr>
+          <p:nvPr>
+            <p:ph type="title"/>
+          </p:nvPr>
+        </p:nvSpPr>
+        <p:spPr>
+          <a:xfrm>
+            <a:off x="680321" y="753228"/>
+            <a:ext cx="9613861" cy="1080938"/>
+          </a:xfrm>
+        </p:spPr>
+        <p:txBody>
+          <a:bodyPr/>
+          <a:lstStyle/>
+          <a:p>
+            <a:r>
+              <a:rPr lang="pt-BR" dirty="0"/>
+              <a:t>Mergulhando no Caos: O Experimento</a:t>
+            </a:r>
+          </a:p>
+        </p:txBody>
+      </p:sp>
+      <p:sp>
+        <p:nvSpPr>
+          <p:cNvPr id="5" name="Espaço Reservado para Conteúdo 2">
+            <a:extLst>
+              <a:ext uri="{FF2B5EF4-FFF2-40B4-BE49-F238E27FC236}">
+                <a16:creationId xmlns:a16="http://schemas.microsoft.com/office/drawing/2014/main" id="{C5B8AB74-06FA-413C-BD74-462D1F01C8FF}"/>
+              </a:ext>
+            </a:extLst>
+          </p:cNvPr>
+          <p:cNvSpPr>
+            <a:spLocks noGrp="1"/>
+          </p:cNvSpPr>
+          <p:nvPr>
+            <p:ph idx="1"/>
+          </p:nvPr>
+        </p:nvSpPr>
+        <p:spPr>
+          <a:xfrm>
+            <a:off x="680321" y="2505456"/>
+            <a:ext cx="9484759" cy="3599316"/>
+          </a:xfrm>
+        </p:spPr>
+        <p:txBody>
+          <a:bodyPr>
+            <a:noAutofit/>
+          </a:bodyPr>
+          <a:lstStyle/>
+          <a:p>
+            <a:pPr>
+              <a:spcAft>
+                <a:spcPts val="1000"/>
+              </a:spcAft>
+            </a:pPr>
+            <a:r>
+              <a:rPr lang="pt-BR" dirty="0"/>
+              <a:t>Executando o Experimento:</a:t>
+            </a:r>
+          </a:p>
+          <a:p>
+            <a:pPr lvl="1">
+              <a:spcAft>
+                <a:spcPts val="1000"/>
+              </a:spcAft>
+            </a:pPr>
+            <a:r>
+              <a:rPr lang="pt-BR" dirty="0"/>
+              <a:t>O</a:t>
+            </a:r>
+          </a:p>
+        </p:txBody>
+      </p:sp>
+    </p:spTree>
+    <p:extLst>
+      <p:ext uri="{BB962C8B-B14F-4D97-AF65-F5344CB8AC3E}">
+        <p14:creationId xmlns:p14="http://schemas.microsoft.com/office/powerpoint/2010/main" val="3234258730"/>
+      </p:ext>
+    </p:extLst>
+  </p:cSld>
+  <p:clrMapOvr>
+    <a:masterClrMapping/>
+  </p:clrMapOvr>
+</p:sld>
+</file>
+
+<file path=ppt/slides/slide124.xml><?xml version="1.0" encoding="utf-8"?>
+<p:sld xmlns:a="http://schemas.openxmlformats.org/drawingml/2006/main" xmlns:r="http://schemas.openxmlformats.org/officeDocument/2006/relationships" xmlns:p="http://schemas.openxmlformats.org/presentationml/2006/main">
+  <p:cSld>
+    <p:spTree>
+      <p:nvGrpSpPr>
+        <p:cNvPr id="1" name=""/>
+        <p:cNvGrpSpPr/>
+        <p:nvPr/>
+      </p:nvGrpSpPr>
+      <p:grpSpPr>
+        <a:xfrm>
+          <a:off x="0" y="0"/>
+          <a:ext cx="0" cy="0"/>
+          <a:chOff x="0" y="0"/>
+          <a:chExt cx="0" cy="0"/>
+        </a:xfrm>
+      </p:grpSpPr>
+      <p:sp>
+        <p:nvSpPr>
+          <p:cNvPr id="4" name="Título 1">
+            <a:extLst>
+              <a:ext uri="{FF2B5EF4-FFF2-40B4-BE49-F238E27FC236}">
+                <a16:creationId xmlns:a16="http://schemas.microsoft.com/office/drawing/2014/main" id="{9CA53688-E304-4704-85E6-8432DC608B05}"/>
+              </a:ext>
+            </a:extLst>
+          </p:cNvPr>
+          <p:cNvSpPr>
+            <a:spLocks noGrp="1"/>
+          </p:cNvSpPr>
+          <p:nvPr>
+            <p:ph type="title"/>
+          </p:nvPr>
+        </p:nvSpPr>
+        <p:spPr>
+          <a:xfrm>
+            <a:off x="680321" y="753228"/>
+            <a:ext cx="9613861" cy="1080938"/>
+          </a:xfrm>
+        </p:spPr>
+        <p:txBody>
+          <a:bodyPr/>
+          <a:lstStyle/>
+          <a:p>
+            <a:r>
+              <a:rPr lang="pt-BR" dirty="0"/>
+              <a:t>Mergulhando no Caos: O Experimento</a:t>
+            </a:r>
+          </a:p>
+        </p:txBody>
+      </p:sp>
+      <p:sp>
+        <p:nvSpPr>
+          <p:cNvPr id="5" name="Espaço Reservado para Conteúdo 2">
+            <a:extLst>
+              <a:ext uri="{FF2B5EF4-FFF2-40B4-BE49-F238E27FC236}">
+                <a16:creationId xmlns:a16="http://schemas.microsoft.com/office/drawing/2014/main" id="{C5B8AB74-06FA-413C-BD74-462D1F01C8FF}"/>
+              </a:ext>
+            </a:extLst>
+          </p:cNvPr>
+          <p:cNvSpPr>
+            <a:spLocks noGrp="1"/>
+          </p:cNvSpPr>
+          <p:nvPr>
+            <p:ph idx="1"/>
+          </p:nvPr>
+        </p:nvSpPr>
+        <p:spPr>
+          <a:xfrm>
+            <a:off x="680321" y="2505456"/>
+            <a:ext cx="9484759" cy="3599316"/>
+          </a:xfrm>
+        </p:spPr>
+        <p:txBody>
+          <a:bodyPr>
+            <a:noAutofit/>
+          </a:bodyPr>
+          <a:lstStyle/>
+          <a:p>
+            <a:pPr>
+              <a:spcAft>
+                <a:spcPts val="1000"/>
+              </a:spcAft>
+            </a:pPr>
+            <a:r>
+              <a:rPr lang="pt-BR" dirty="0"/>
+              <a:t>Executando o Experimento:</a:t>
+            </a:r>
+          </a:p>
+          <a:p>
+            <a:pPr lvl="1">
+              <a:spcAft>
+                <a:spcPts val="1000"/>
+              </a:spcAft>
+            </a:pPr>
+            <a:r>
+              <a:rPr lang="pt-BR" dirty="0"/>
+              <a:t>O</a:t>
+            </a:r>
+          </a:p>
+        </p:txBody>
+      </p:sp>
+    </p:spTree>
+    <p:extLst>
+      <p:ext uri="{BB962C8B-B14F-4D97-AF65-F5344CB8AC3E}">
+        <p14:creationId xmlns:p14="http://schemas.microsoft.com/office/powerpoint/2010/main" val="4159881967"/>
+      </p:ext>
+    </p:extLst>
+  </p:cSld>
+  <p:clrMapOvr>
+    <a:masterClrMapping/>
+  </p:clrMapOvr>
+</p:sld>
+</file>
+
+<file path=ppt/slides/slide125.xml><?xml version="1.0" encoding="utf-8"?>
+<p:sld xmlns:a="http://schemas.openxmlformats.org/drawingml/2006/main" xmlns:r="http://schemas.openxmlformats.org/officeDocument/2006/relationships" xmlns:p="http://schemas.openxmlformats.org/presentationml/2006/main">
+  <p:cSld>
+    <p:spTree>
+      <p:nvGrpSpPr>
+        <p:cNvPr id="1" name=""/>
+        <p:cNvGrpSpPr/>
+        <p:nvPr/>
+      </p:nvGrpSpPr>
+      <p:grpSpPr>
+        <a:xfrm>
+          <a:off x="0" y="0"/>
+          <a:ext cx="0" cy="0"/>
+          <a:chOff x="0" y="0"/>
+          <a:chExt cx="0" cy="0"/>
+        </a:xfrm>
+      </p:grpSpPr>
+      <p:sp>
+        <p:nvSpPr>
+          <p:cNvPr id="4" name="Título 1">
+            <a:extLst>
+              <a:ext uri="{FF2B5EF4-FFF2-40B4-BE49-F238E27FC236}">
+                <a16:creationId xmlns:a16="http://schemas.microsoft.com/office/drawing/2014/main" id="{9CA53688-E304-4704-85E6-8432DC608B05}"/>
+              </a:ext>
+            </a:extLst>
+          </p:cNvPr>
+          <p:cNvSpPr>
+            <a:spLocks noGrp="1"/>
+          </p:cNvSpPr>
+          <p:nvPr>
+            <p:ph type="title"/>
+          </p:nvPr>
+        </p:nvSpPr>
+        <p:spPr>
+          <a:xfrm>
+            <a:off x="680321" y="753228"/>
+            <a:ext cx="9613861" cy="1080938"/>
+          </a:xfrm>
+        </p:spPr>
+        <p:txBody>
+          <a:bodyPr/>
+          <a:lstStyle/>
+          <a:p>
+            <a:r>
+              <a:rPr lang="pt-BR" dirty="0"/>
+              <a:t>Mergulhando no Caos: O Experimento</a:t>
+            </a:r>
+          </a:p>
+        </p:txBody>
+      </p:sp>
+      <p:sp>
+        <p:nvSpPr>
+          <p:cNvPr id="5" name="Espaço Reservado para Conteúdo 2">
+            <a:extLst>
+              <a:ext uri="{FF2B5EF4-FFF2-40B4-BE49-F238E27FC236}">
+                <a16:creationId xmlns:a16="http://schemas.microsoft.com/office/drawing/2014/main" id="{C5B8AB74-06FA-413C-BD74-462D1F01C8FF}"/>
+              </a:ext>
+            </a:extLst>
+          </p:cNvPr>
+          <p:cNvSpPr>
+            <a:spLocks noGrp="1"/>
+          </p:cNvSpPr>
+          <p:nvPr>
+            <p:ph idx="1"/>
+          </p:nvPr>
+        </p:nvSpPr>
+        <p:spPr>
+          <a:xfrm>
+            <a:off x="680321" y="2505456"/>
+            <a:ext cx="9484759" cy="3599316"/>
+          </a:xfrm>
+        </p:spPr>
+        <p:txBody>
+          <a:bodyPr>
+            <a:noAutofit/>
+          </a:bodyPr>
+          <a:lstStyle/>
+          <a:p>
+            <a:pPr>
+              <a:spcAft>
+                <a:spcPts val="1000"/>
+              </a:spcAft>
+            </a:pPr>
+            <a:r>
+              <a:rPr lang="pt-BR" dirty="0"/>
+              <a:t>Executando o Experimento:</a:t>
+            </a:r>
+          </a:p>
+          <a:p>
+            <a:pPr lvl="1">
+              <a:spcAft>
+                <a:spcPts val="1000"/>
+              </a:spcAft>
+            </a:pPr>
+            <a:r>
+              <a:rPr lang="pt-BR" dirty="0"/>
+              <a:t>O</a:t>
+            </a:r>
+          </a:p>
+        </p:txBody>
+      </p:sp>
+    </p:spTree>
+    <p:extLst>
+      <p:ext uri="{BB962C8B-B14F-4D97-AF65-F5344CB8AC3E}">
+        <p14:creationId xmlns:p14="http://schemas.microsoft.com/office/powerpoint/2010/main" val="3715282650"/>
+      </p:ext>
+    </p:extLst>
+  </p:cSld>
+  <p:clrMapOvr>
+    <a:masterClrMapping/>
+  </p:clrMapOvr>
+</p:sld>
+</file>
+
+<file path=ppt/slides/slide126.xml><?xml version="1.0" encoding="utf-8"?>
+<p:sld xmlns:a="http://schemas.openxmlformats.org/drawingml/2006/main" xmlns:r="http://schemas.openxmlformats.org/officeDocument/2006/relationships" xmlns:p="http://schemas.openxmlformats.org/presentationml/2006/main">
+  <p:cSld>
+    <p:spTree>
+      <p:nvGrpSpPr>
+        <p:cNvPr id="1" name=""/>
+        <p:cNvGrpSpPr/>
+        <p:nvPr/>
+      </p:nvGrpSpPr>
+      <p:grpSpPr>
+        <a:xfrm>
+          <a:off x="0" y="0"/>
+          <a:ext cx="0" cy="0"/>
+          <a:chOff x="0" y="0"/>
+          <a:chExt cx="0" cy="0"/>
+        </a:xfrm>
+      </p:grpSpPr>
+      <p:sp>
+        <p:nvSpPr>
+          <p:cNvPr id="4" name="Título 1">
+            <a:extLst>
+              <a:ext uri="{FF2B5EF4-FFF2-40B4-BE49-F238E27FC236}">
+                <a16:creationId xmlns:a16="http://schemas.microsoft.com/office/drawing/2014/main" id="{9CA53688-E304-4704-85E6-8432DC608B05}"/>
+              </a:ext>
+            </a:extLst>
+          </p:cNvPr>
+          <p:cNvSpPr>
+            <a:spLocks noGrp="1"/>
+          </p:cNvSpPr>
+          <p:nvPr>
+            <p:ph type="title"/>
+          </p:nvPr>
+        </p:nvSpPr>
+        <p:spPr>
+          <a:xfrm>
+            <a:off x="680321" y="753228"/>
+            <a:ext cx="9613861" cy="1080938"/>
+          </a:xfrm>
+        </p:spPr>
+        <p:txBody>
+          <a:bodyPr/>
+          <a:lstStyle/>
+          <a:p>
+            <a:r>
+              <a:rPr lang="pt-BR" dirty="0"/>
+              <a:t>Mergulhando no Caos: O Experimento</a:t>
+            </a:r>
+          </a:p>
+        </p:txBody>
+      </p:sp>
+      <p:sp>
+        <p:nvSpPr>
+          <p:cNvPr id="5" name="Espaço Reservado para Conteúdo 2">
+            <a:extLst>
+              <a:ext uri="{FF2B5EF4-FFF2-40B4-BE49-F238E27FC236}">
+                <a16:creationId xmlns:a16="http://schemas.microsoft.com/office/drawing/2014/main" id="{C5B8AB74-06FA-413C-BD74-462D1F01C8FF}"/>
+              </a:ext>
+            </a:extLst>
+          </p:cNvPr>
+          <p:cNvSpPr>
+            <a:spLocks noGrp="1"/>
+          </p:cNvSpPr>
+          <p:nvPr>
+            <p:ph idx="1"/>
+          </p:nvPr>
+        </p:nvSpPr>
+        <p:spPr>
+          <a:xfrm>
+            <a:off x="680321" y="2505456"/>
+            <a:ext cx="9484759" cy="3599316"/>
+          </a:xfrm>
+        </p:spPr>
+        <p:txBody>
+          <a:bodyPr>
+            <a:noAutofit/>
+          </a:bodyPr>
+          <a:lstStyle/>
+          <a:p>
+            <a:pPr>
+              <a:spcAft>
+                <a:spcPts val="1000"/>
+              </a:spcAft>
+            </a:pPr>
+            <a:r>
+              <a:rPr lang="pt-BR" dirty="0"/>
+              <a:t>Executando o Experimento:</a:t>
+            </a:r>
+          </a:p>
+          <a:p>
+            <a:pPr lvl="1">
+              <a:spcAft>
+                <a:spcPts val="1000"/>
+              </a:spcAft>
+            </a:pPr>
+            <a:r>
+              <a:rPr lang="pt-BR" dirty="0"/>
+              <a:t>O</a:t>
+            </a:r>
+          </a:p>
+        </p:txBody>
+      </p:sp>
+    </p:spTree>
+    <p:extLst>
+      <p:ext uri="{BB962C8B-B14F-4D97-AF65-F5344CB8AC3E}">
+        <p14:creationId xmlns:p14="http://schemas.microsoft.com/office/powerpoint/2010/main" val="3001487267"/>
+      </p:ext>
+    </p:extLst>
+  </p:cSld>
+  <p:clrMapOvr>
+    <a:masterClrMapping/>
+  </p:clrMapOvr>
+</p:sld>
+</file>
+
+<file path=ppt/slides/slide127.xml><?xml version="1.0" encoding="utf-8"?>
+<p:sld xmlns:a="http://schemas.openxmlformats.org/drawingml/2006/main" xmlns:r="http://schemas.openxmlformats.org/officeDocument/2006/relationships" xmlns:p="http://schemas.openxmlformats.org/presentationml/2006/main">
+  <p:cSld>
+    <p:spTree>
+      <p:nvGrpSpPr>
+        <p:cNvPr id="1" name=""/>
+        <p:cNvGrpSpPr/>
+        <p:nvPr/>
+      </p:nvGrpSpPr>
+      <p:grpSpPr>
+        <a:xfrm>
+          <a:off x="0" y="0"/>
+          <a:ext cx="0" cy="0"/>
+          <a:chOff x="0" y="0"/>
+          <a:chExt cx="0" cy="0"/>
+        </a:xfrm>
+      </p:grpSpPr>
+      <p:sp>
+        <p:nvSpPr>
+          <p:cNvPr id="4" name="Título 1">
+            <a:extLst>
+              <a:ext uri="{FF2B5EF4-FFF2-40B4-BE49-F238E27FC236}">
+                <a16:creationId xmlns:a16="http://schemas.microsoft.com/office/drawing/2014/main" id="{9CA53688-E304-4704-85E6-8432DC608B05}"/>
+              </a:ext>
+            </a:extLst>
+          </p:cNvPr>
+          <p:cNvSpPr>
+            <a:spLocks noGrp="1"/>
+          </p:cNvSpPr>
+          <p:nvPr>
+            <p:ph type="title"/>
+          </p:nvPr>
+        </p:nvSpPr>
+        <p:spPr>
+          <a:xfrm>
+            <a:off x="680321" y="753228"/>
+            <a:ext cx="9613861" cy="1080938"/>
+          </a:xfrm>
+        </p:spPr>
+        <p:txBody>
+          <a:bodyPr/>
+          <a:lstStyle/>
+          <a:p>
+            <a:r>
+              <a:rPr lang="pt-BR" dirty="0"/>
+              <a:t>Mergulhando no Caos: O Experimento</a:t>
+            </a:r>
+          </a:p>
+        </p:txBody>
+      </p:sp>
+      <p:sp>
+        <p:nvSpPr>
+          <p:cNvPr id="5" name="Espaço Reservado para Conteúdo 2">
+            <a:extLst>
+              <a:ext uri="{FF2B5EF4-FFF2-40B4-BE49-F238E27FC236}">
+                <a16:creationId xmlns:a16="http://schemas.microsoft.com/office/drawing/2014/main" id="{C5B8AB74-06FA-413C-BD74-462D1F01C8FF}"/>
+              </a:ext>
+            </a:extLst>
+          </p:cNvPr>
+          <p:cNvSpPr>
+            <a:spLocks noGrp="1"/>
+          </p:cNvSpPr>
+          <p:nvPr>
+            <p:ph idx="1"/>
+          </p:nvPr>
+        </p:nvSpPr>
+        <p:spPr>
+          <a:xfrm>
+            <a:off x="680321" y="2505456"/>
+            <a:ext cx="9484759" cy="3599316"/>
+          </a:xfrm>
+        </p:spPr>
+        <p:txBody>
+          <a:bodyPr>
+            <a:noAutofit/>
+          </a:bodyPr>
+          <a:lstStyle/>
+          <a:p>
+            <a:pPr>
+              <a:spcAft>
+                <a:spcPts val="1000"/>
+              </a:spcAft>
+            </a:pPr>
+            <a:r>
+              <a:rPr lang="pt-BR" dirty="0"/>
+              <a:t>Executando o Experimento:</a:t>
+            </a:r>
+          </a:p>
+          <a:p>
+            <a:pPr lvl="1">
+              <a:spcAft>
+                <a:spcPts val="1000"/>
+              </a:spcAft>
+            </a:pPr>
+            <a:r>
+              <a:rPr lang="pt-BR" dirty="0"/>
+              <a:t>O</a:t>
+            </a:r>
+          </a:p>
+        </p:txBody>
+      </p:sp>
+    </p:spTree>
+    <p:extLst>
+      <p:ext uri="{BB962C8B-B14F-4D97-AF65-F5344CB8AC3E}">
+        <p14:creationId xmlns:p14="http://schemas.microsoft.com/office/powerpoint/2010/main" val="103179965"/>
+      </p:ext>
+    </p:extLst>
+  </p:cSld>
+  <p:clrMapOvr>
+    <a:masterClrMapping/>
+  </p:clrMapOvr>
+</p:sld>
+</file>
+
+<file path=ppt/slides/slide128.xml><?xml version="1.0" encoding="utf-8"?>
+<p:sld xmlns:a="http://schemas.openxmlformats.org/drawingml/2006/main" xmlns:r="http://schemas.openxmlformats.org/officeDocument/2006/relationships" xmlns:p="http://schemas.openxmlformats.org/presentationml/2006/main">
+  <p:cSld>
+    <p:spTree>
+      <p:nvGrpSpPr>
+        <p:cNvPr id="1" name=""/>
+        <p:cNvGrpSpPr/>
+        <p:nvPr/>
+      </p:nvGrpSpPr>
+      <p:grpSpPr>
+        <a:xfrm>
+          <a:off x="0" y="0"/>
+          <a:ext cx="0" cy="0"/>
+          <a:chOff x="0" y="0"/>
+          <a:chExt cx="0" cy="0"/>
+        </a:xfrm>
+      </p:grpSpPr>
+      <p:sp>
+        <p:nvSpPr>
+          <p:cNvPr id="4" name="Título 1">
+            <a:extLst>
+              <a:ext uri="{FF2B5EF4-FFF2-40B4-BE49-F238E27FC236}">
+                <a16:creationId xmlns:a16="http://schemas.microsoft.com/office/drawing/2014/main" id="{9CA53688-E304-4704-85E6-8432DC608B05}"/>
+              </a:ext>
+            </a:extLst>
+          </p:cNvPr>
+          <p:cNvSpPr>
+            <a:spLocks noGrp="1"/>
+          </p:cNvSpPr>
+          <p:nvPr>
+            <p:ph type="title"/>
+          </p:nvPr>
+        </p:nvSpPr>
+        <p:spPr>
+          <a:xfrm>
+            <a:off x="680321" y="753228"/>
+            <a:ext cx="9613861" cy="1080938"/>
+          </a:xfrm>
+        </p:spPr>
+        <p:txBody>
+          <a:bodyPr/>
+          <a:lstStyle/>
+          <a:p>
+            <a:r>
+              <a:rPr lang="pt-BR" dirty="0"/>
+              <a:t>Mergulhando no Caos: O Experimento</a:t>
+            </a:r>
+          </a:p>
+        </p:txBody>
+      </p:sp>
+      <p:sp>
+        <p:nvSpPr>
+          <p:cNvPr id="5" name="Espaço Reservado para Conteúdo 2">
+            <a:extLst>
+              <a:ext uri="{FF2B5EF4-FFF2-40B4-BE49-F238E27FC236}">
+                <a16:creationId xmlns:a16="http://schemas.microsoft.com/office/drawing/2014/main" id="{C5B8AB74-06FA-413C-BD74-462D1F01C8FF}"/>
+              </a:ext>
+            </a:extLst>
+          </p:cNvPr>
+          <p:cNvSpPr>
+            <a:spLocks noGrp="1"/>
+          </p:cNvSpPr>
+          <p:nvPr>
+            <p:ph idx="1"/>
+          </p:nvPr>
+        </p:nvSpPr>
+        <p:spPr>
+          <a:xfrm>
+            <a:off x="680321" y="2505456"/>
+            <a:ext cx="9484759" cy="3599316"/>
+          </a:xfrm>
+        </p:spPr>
+        <p:txBody>
+          <a:bodyPr>
+            <a:noAutofit/>
+          </a:bodyPr>
+          <a:lstStyle/>
+          <a:p>
+            <a:pPr>
+              <a:spcAft>
+                <a:spcPts val="1000"/>
+              </a:spcAft>
+            </a:pPr>
+            <a:r>
+              <a:rPr lang="pt-BR" dirty="0"/>
+              <a:t>Executando o Experimento:</a:t>
+            </a:r>
+          </a:p>
+          <a:p>
+            <a:pPr lvl="1">
+              <a:spcAft>
+                <a:spcPts val="1000"/>
+              </a:spcAft>
+            </a:pPr>
+            <a:r>
+              <a:rPr lang="pt-BR" dirty="0"/>
+              <a:t>O</a:t>
+            </a:r>
+          </a:p>
+        </p:txBody>
+      </p:sp>
+    </p:spTree>
+    <p:extLst>
+      <p:ext uri="{BB962C8B-B14F-4D97-AF65-F5344CB8AC3E}">
+        <p14:creationId xmlns:p14="http://schemas.microsoft.com/office/powerpoint/2010/main" val="372466621"/>
+      </p:ext>
+    </p:extLst>
+  </p:cSld>
+  <p:clrMapOvr>
+    <a:masterClrMapping/>
+  </p:clrMapOvr>
+</p:sld>
+</file>
+
+<file path=ppt/slides/slide129.xml><?xml version="1.0" encoding="utf-8"?>
+<p:sld xmlns:a="http://schemas.openxmlformats.org/drawingml/2006/main" xmlns:r="http://schemas.openxmlformats.org/officeDocument/2006/relationships" xmlns:p="http://schemas.openxmlformats.org/presentationml/2006/main">
+  <p:cSld>
+    <p:spTree>
+      <p:nvGrpSpPr>
+        <p:cNvPr id="1" name=""/>
+        <p:cNvGrpSpPr/>
+        <p:nvPr/>
+      </p:nvGrpSpPr>
+      <p:grpSpPr>
+        <a:xfrm>
+          <a:off x="0" y="0"/>
+          <a:ext cx="0" cy="0"/>
+          <a:chOff x="0" y="0"/>
+          <a:chExt cx="0" cy="0"/>
+        </a:xfrm>
+      </p:grpSpPr>
+      <p:sp>
+        <p:nvSpPr>
+          <p:cNvPr id="4" name="Título 1">
+            <a:extLst>
+              <a:ext uri="{FF2B5EF4-FFF2-40B4-BE49-F238E27FC236}">
+                <a16:creationId xmlns:a16="http://schemas.microsoft.com/office/drawing/2014/main" id="{9CA53688-E304-4704-85E6-8432DC608B05}"/>
+              </a:ext>
+            </a:extLst>
+          </p:cNvPr>
+          <p:cNvSpPr>
+            <a:spLocks noGrp="1"/>
+          </p:cNvSpPr>
+          <p:nvPr>
+            <p:ph type="title"/>
+          </p:nvPr>
+        </p:nvSpPr>
+        <p:spPr>
+          <a:xfrm>
+            <a:off x="680321" y="753228"/>
+            <a:ext cx="9613861" cy="1080938"/>
+          </a:xfrm>
+        </p:spPr>
+        <p:txBody>
+          <a:bodyPr/>
+          <a:lstStyle/>
+          <a:p>
+            <a:r>
+              <a:rPr lang="pt-BR" dirty="0"/>
+              <a:t>Mergulhando no Caos: O Experimento</a:t>
+            </a:r>
+          </a:p>
+        </p:txBody>
+      </p:sp>
+      <p:sp>
+        <p:nvSpPr>
+          <p:cNvPr id="5" name="Espaço Reservado para Conteúdo 2">
+            <a:extLst>
+              <a:ext uri="{FF2B5EF4-FFF2-40B4-BE49-F238E27FC236}">
+                <a16:creationId xmlns:a16="http://schemas.microsoft.com/office/drawing/2014/main" id="{C5B8AB74-06FA-413C-BD74-462D1F01C8FF}"/>
+              </a:ext>
+            </a:extLst>
+          </p:cNvPr>
+          <p:cNvSpPr>
+            <a:spLocks noGrp="1"/>
+          </p:cNvSpPr>
+          <p:nvPr>
+            <p:ph idx="1"/>
+          </p:nvPr>
+        </p:nvSpPr>
+        <p:spPr>
+          <a:xfrm>
+            <a:off x="680321" y="2505456"/>
+            <a:ext cx="9484759" cy="3599316"/>
+          </a:xfrm>
+        </p:spPr>
+        <p:txBody>
+          <a:bodyPr>
+            <a:noAutofit/>
+          </a:bodyPr>
+          <a:lstStyle/>
+          <a:p>
+            <a:pPr>
+              <a:spcAft>
+                <a:spcPts val="1000"/>
+              </a:spcAft>
+            </a:pPr>
+            <a:r>
+              <a:rPr lang="pt-BR" dirty="0"/>
+              <a:t>Executando o Experimento:</a:t>
+            </a:r>
+          </a:p>
+          <a:p>
+            <a:pPr lvl="1">
+              <a:spcAft>
+                <a:spcPts val="1000"/>
+              </a:spcAft>
+            </a:pPr>
+            <a:r>
+              <a:rPr lang="pt-BR" dirty="0"/>
+              <a:t>O</a:t>
+            </a:r>
+          </a:p>
+        </p:txBody>
+      </p:sp>
+    </p:spTree>
+    <p:extLst>
+      <p:ext uri="{BB962C8B-B14F-4D97-AF65-F5344CB8AC3E}">
+        <p14:creationId xmlns:p14="http://schemas.microsoft.com/office/powerpoint/2010/main" val="2260745254"/>
+      </p:ext>
+    </p:extLst>
+  </p:cSld>
+  <p:clrMapOvr>
+    <a:masterClrMapping/>
+  </p:clrMapOvr>
+</p:sld>
+</file>
+
 <file path=ppt/slides/slide13.xml><?xml version="1.0" encoding="utf-8"?>
 <p:sld xmlns:a="http://schemas.openxmlformats.org/drawingml/2006/main" xmlns:r="http://schemas.openxmlformats.org/officeDocument/2006/relationships" xmlns:p="http://schemas.openxmlformats.org/presentationml/2006/main">
   <p:cSld>
@@ -8850,6 +12565,348 @@
     <p:extLst>
       <p:ext uri="{BB962C8B-B14F-4D97-AF65-F5344CB8AC3E}">
         <p14:creationId xmlns:p14="http://schemas.microsoft.com/office/powerpoint/2010/main" val="3589312470"/>
+      </p:ext>
+    </p:extLst>
+  </p:cSld>
+  <p:clrMapOvr>
+    <a:masterClrMapping/>
+  </p:clrMapOvr>
+</p:sld>
+</file>
+
+<file path=ppt/slides/slide130.xml><?xml version="1.0" encoding="utf-8"?>
+<p:sld xmlns:a="http://schemas.openxmlformats.org/drawingml/2006/main" xmlns:r="http://schemas.openxmlformats.org/officeDocument/2006/relationships" xmlns:p="http://schemas.openxmlformats.org/presentationml/2006/main">
+  <p:cSld>
+    <p:spTree>
+      <p:nvGrpSpPr>
+        <p:cNvPr id="1" name=""/>
+        <p:cNvGrpSpPr/>
+        <p:nvPr/>
+      </p:nvGrpSpPr>
+      <p:grpSpPr>
+        <a:xfrm>
+          <a:off x="0" y="0"/>
+          <a:ext cx="0" cy="0"/>
+          <a:chOff x="0" y="0"/>
+          <a:chExt cx="0" cy="0"/>
+        </a:xfrm>
+      </p:grpSpPr>
+      <p:sp>
+        <p:nvSpPr>
+          <p:cNvPr id="4" name="Título 1">
+            <a:extLst>
+              <a:ext uri="{FF2B5EF4-FFF2-40B4-BE49-F238E27FC236}">
+                <a16:creationId xmlns:a16="http://schemas.microsoft.com/office/drawing/2014/main" id="{9CA53688-E304-4704-85E6-8432DC608B05}"/>
+              </a:ext>
+            </a:extLst>
+          </p:cNvPr>
+          <p:cNvSpPr>
+            <a:spLocks noGrp="1"/>
+          </p:cNvSpPr>
+          <p:nvPr>
+            <p:ph type="title"/>
+          </p:nvPr>
+        </p:nvSpPr>
+        <p:spPr>
+          <a:xfrm>
+            <a:off x="680321" y="753228"/>
+            <a:ext cx="9613861" cy="1080938"/>
+          </a:xfrm>
+        </p:spPr>
+        <p:txBody>
+          <a:bodyPr/>
+          <a:lstStyle/>
+          <a:p>
+            <a:r>
+              <a:rPr lang="pt-BR" dirty="0"/>
+              <a:t>Mergulhando no Caos: O Experimento</a:t>
+            </a:r>
+          </a:p>
+        </p:txBody>
+      </p:sp>
+      <p:sp>
+        <p:nvSpPr>
+          <p:cNvPr id="5" name="Espaço Reservado para Conteúdo 2">
+            <a:extLst>
+              <a:ext uri="{FF2B5EF4-FFF2-40B4-BE49-F238E27FC236}">
+                <a16:creationId xmlns:a16="http://schemas.microsoft.com/office/drawing/2014/main" id="{C5B8AB74-06FA-413C-BD74-462D1F01C8FF}"/>
+              </a:ext>
+            </a:extLst>
+          </p:cNvPr>
+          <p:cNvSpPr>
+            <a:spLocks noGrp="1"/>
+          </p:cNvSpPr>
+          <p:nvPr>
+            <p:ph idx="1"/>
+          </p:nvPr>
+        </p:nvSpPr>
+        <p:spPr>
+          <a:xfrm>
+            <a:off x="680321" y="2505456"/>
+            <a:ext cx="9484759" cy="3599316"/>
+          </a:xfrm>
+        </p:spPr>
+        <p:txBody>
+          <a:bodyPr>
+            <a:noAutofit/>
+          </a:bodyPr>
+          <a:lstStyle/>
+          <a:p>
+            <a:pPr>
+              <a:spcAft>
+                <a:spcPts val="1000"/>
+              </a:spcAft>
+            </a:pPr>
+            <a:r>
+              <a:rPr lang="pt-BR" dirty="0"/>
+              <a:t>Executando o Experimento:</a:t>
+            </a:r>
+          </a:p>
+          <a:p>
+            <a:pPr lvl="1">
+              <a:spcAft>
+                <a:spcPts val="1000"/>
+              </a:spcAft>
+            </a:pPr>
+            <a:r>
+              <a:rPr lang="pt-BR" dirty="0"/>
+              <a:t>O</a:t>
+            </a:r>
+          </a:p>
+        </p:txBody>
+      </p:sp>
+    </p:spTree>
+    <p:extLst>
+      <p:ext uri="{BB962C8B-B14F-4D97-AF65-F5344CB8AC3E}">
+        <p14:creationId xmlns:p14="http://schemas.microsoft.com/office/powerpoint/2010/main" val="1838931530"/>
+      </p:ext>
+    </p:extLst>
+  </p:cSld>
+  <p:clrMapOvr>
+    <a:masterClrMapping/>
+  </p:clrMapOvr>
+</p:sld>
+</file>
+
+<file path=ppt/slides/slide131.xml><?xml version="1.0" encoding="utf-8"?>
+<p:sld xmlns:a="http://schemas.openxmlformats.org/drawingml/2006/main" xmlns:r="http://schemas.openxmlformats.org/officeDocument/2006/relationships" xmlns:p="http://schemas.openxmlformats.org/presentationml/2006/main">
+  <p:cSld>
+    <p:spTree>
+      <p:nvGrpSpPr>
+        <p:cNvPr id="1" name=""/>
+        <p:cNvGrpSpPr/>
+        <p:nvPr/>
+      </p:nvGrpSpPr>
+      <p:grpSpPr>
+        <a:xfrm>
+          <a:off x="0" y="0"/>
+          <a:ext cx="0" cy="0"/>
+          <a:chOff x="0" y="0"/>
+          <a:chExt cx="0" cy="0"/>
+        </a:xfrm>
+      </p:grpSpPr>
+      <p:sp>
+        <p:nvSpPr>
+          <p:cNvPr id="4" name="Título 1">
+            <a:extLst>
+              <a:ext uri="{FF2B5EF4-FFF2-40B4-BE49-F238E27FC236}">
+                <a16:creationId xmlns:a16="http://schemas.microsoft.com/office/drawing/2014/main" id="{9CA53688-E304-4704-85E6-8432DC608B05}"/>
+              </a:ext>
+            </a:extLst>
+          </p:cNvPr>
+          <p:cNvSpPr>
+            <a:spLocks noGrp="1"/>
+          </p:cNvSpPr>
+          <p:nvPr>
+            <p:ph type="title"/>
+          </p:nvPr>
+        </p:nvSpPr>
+        <p:spPr>
+          <a:xfrm>
+            <a:off x="680321" y="753228"/>
+            <a:ext cx="9613861" cy="1080938"/>
+          </a:xfrm>
+        </p:spPr>
+        <p:txBody>
+          <a:bodyPr/>
+          <a:lstStyle/>
+          <a:p>
+            <a:r>
+              <a:rPr lang="pt-BR" dirty="0"/>
+              <a:t>Mergulhando no Caos: O Experimento</a:t>
+            </a:r>
+          </a:p>
+        </p:txBody>
+      </p:sp>
+      <p:sp>
+        <p:nvSpPr>
+          <p:cNvPr id="5" name="Espaço Reservado para Conteúdo 2">
+            <a:extLst>
+              <a:ext uri="{FF2B5EF4-FFF2-40B4-BE49-F238E27FC236}">
+                <a16:creationId xmlns:a16="http://schemas.microsoft.com/office/drawing/2014/main" id="{C5B8AB74-06FA-413C-BD74-462D1F01C8FF}"/>
+              </a:ext>
+            </a:extLst>
+          </p:cNvPr>
+          <p:cNvSpPr>
+            <a:spLocks noGrp="1"/>
+          </p:cNvSpPr>
+          <p:nvPr>
+            <p:ph idx="1"/>
+          </p:nvPr>
+        </p:nvSpPr>
+        <p:spPr>
+          <a:xfrm>
+            <a:off x="680321" y="2505456"/>
+            <a:ext cx="9484759" cy="3599316"/>
+          </a:xfrm>
+        </p:spPr>
+        <p:txBody>
+          <a:bodyPr>
+            <a:noAutofit/>
+          </a:bodyPr>
+          <a:lstStyle/>
+          <a:p>
+            <a:pPr>
+              <a:spcAft>
+                <a:spcPts val="1000"/>
+              </a:spcAft>
+            </a:pPr>
+            <a:r>
+              <a:rPr lang="pt-BR" dirty="0"/>
+              <a:t>Executando o Experimento:</a:t>
+            </a:r>
+          </a:p>
+          <a:p>
+            <a:pPr lvl="1">
+              <a:spcAft>
+                <a:spcPts val="1000"/>
+              </a:spcAft>
+            </a:pPr>
+            <a:r>
+              <a:rPr lang="pt-BR" dirty="0"/>
+              <a:t>O</a:t>
+            </a:r>
+          </a:p>
+        </p:txBody>
+      </p:sp>
+    </p:spTree>
+    <p:extLst>
+      <p:ext uri="{BB962C8B-B14F-4D97-AF65-F5344CB8AC3E}">
+        <p14:creationId xmlns:p14="http://schemas.microsoft.com/office/powerpoint/2010/main" val="780957847"/>
+      </p:ext>
+    </p:extLst>
+  </p:cSld>
+  <p:clrMapOvr>
+    <a:masterClrMapping/>
+  </p:clrMapOvr>
+</p:sld>
+</file>
+
+<file path=ppt/slides/slide132.xml><?xml version="1.0" encoding="utf-8"?>
+<p:sld xmlns:a="http://schemas.openxmlformats.org/drawingml/2006/main" xmlns:r="http://schemas.openxmlformats.org/officeDocument/2006/relationships" xmlns:p="http://schemas.openxmlformats.org/presentationml/2006/main">
+  <p:cSld>
+    <p:spTree>
+      <p:nvGrpSpPr>
+        <p:cNvPr id="1" name=""/>
+        <p:cNvGrpSpPr/>
+        <p:nvPr/>
+      </p:nvGrpSpPr>
+      <p:grpSpPr>
+        <a:xfrm>
+          <a:off x="0" y="0"/>
+          <a:ext cx="0" cy="0"/>
+          <a:chOff x="0" y="0"/>
+          <a:chExt cx="0" cy="0"/>
+        </a:xfrm>
+      </p:grpSpPr>
+      <p:sp>
+        <p:nvSpPr>
+          <p:cNvPr id="4" name="Título 1">
+            <a:extLst>
+              <a:ext uri="{FF2B5EF4-FFF2-40B4-BE49-F238E27FC236}">
+                <a16:creationId xmlns:a16="http://schemas.microsoft.com/office/drawing/2014/main" id="{9CA53688-E304-4704-85E6-8432DC608B05}"/>
+              </a:ext>
+            </a:extLst>
+          </p:cNvPr>
+          <p:cNvSpPr>
+            <a:spLocks noGrp="1"/>
+          </p:cNvSpPr>
+          <p:nvPr>
+            <p:ph type="title"/>
+          </p:nvPr>
+        </p:nvSpPr>
+        <p:spPr>
+          <a:xfrm>
+            <a:off x="680321" y="753228"/>
+            <a:ext cx="9613861" cy="1080938"/>
+          </a:xfrm>
+        </p:spPr>
+        <p:txBody>
+          <a:bodyPr/>
+          <a:lstStyle/>
+          <a:p>
+            <a:r>
+              <a:rPr lang="pt-BR" dirty="0"/>
+              <a:t>Mergulhando no Caos: O Experimento</a:t>
+            </a:r>
+          </a:p>
+        </p:txBody>
+      </p:sp>
+      <p:sp>
+        <p:nvSpPr>
+          <p:cNvPr id="5" name="Espaço Reservado para Conteúdo 2">
+            <a:extLst>
+              <a:ext uri="{FF2B5EF4-FFF2-40B4-BE49-F238E27FC236}">
+                <a16:creationId xmlns:a16="http://schemas.microsoft.com/office/drawing/2014/main" id="{C5B8AB74-06FA-413C-BD74-462D1F01C8FF}"/>
+              </a:ext>
+            </a:extLst>
+          </p:cNvPr>
+          <p:cNvSpPr>
+            <a:spLocks noGrp="1"/>
+          </p:cNvSpPr>
+          <p:nvPr>
+            <p:ph idx="1"/>
+          </p:nvPr>
+        </p:nvSpPr>
+        <p:spPr>
+          <a:xfrm>
+            <a:off x="680321" y="2505456"/>
+            <a:ext cx="9484759" cy="3599316"/>
+          </a:xfrm>
+        </p:spPr>
+        <p:txBody>
+          <a:bodyPr>
+            <a:noAutofit/>
+          </a:bodyPr>
+          <a:lstStyle/>
+          <a:p>
+            <a:pPr>
+              <a:spcAft>
+                <a:spcPts val="1000"/>
+              </a:spcAft>
+            </a:pPr>
+            <a:r>
+              <a:rPr lang="pt-BR" dirty="0"/>
+              <a:t>Executando o Experimento:</a:t>
+            </a:r>
+          </a:p>
+          <a:p>
+            <a:pPr lvl="1">
+              <a:spcAft>
+                <a:spcPts val="1000"/>
+              </a:spcAft>
+            </a:pPr>
+            <a:r>
+              <a:rPr lang="pt-BR" dirty="0"/>
+              <a:t>O</a:t>
+            </a:r>
+          </a:p>
+        </p:txBody>
+      </p:sp>
+    </p:spTree>
+    <p:extLst>
+      <p:ext uri="{BB962C8B-B14F-4D97-AF65-F5344CB8AC3E}">
+        <p14:creationId xmlns:p14="http://schemas.microsoft.com/office/powerpoint/2010/main" val="764737389"/>
       </p:ext>
     </p:extLst>
   </p:cSld>
@@ -9706,8 +13763,11 @@
           <a:lstStyle/>
           <a:p>
             <a:pPr>
-              <a:spcAft>
-                <a:spcPts val="1000"/>
+              <a:spcBef>
+                <a:spcPts val="600"/>
+              </a:spcBef>
+              <a:spcAft>
+                <a:spcPts val="600"/>
               </a:spcAft>
             </a:pPr>
             <a:r>
@@ -9717,8 +13777,11 @@
           </a:p>
           <a:p>
             <a:pPr>
-              <a:spcAft>
-                <a:spcPts val="1000"/>
+              <a:spcBef>
+                <a:spcPts val="600"/>
+              </a:spcBef>
+              <a:spcAft>
+                <a:spcPts val="600"/>
               </a:spcAft>
             </a:pPr>
             <a:r>
@@ -9728,8 +13791,11 @@
           </a:p>
           <a:p>
             <a:pPr>
-              <a:spcAft>
-                <a:spcPts val="1000"/>
+              <a:spcBef>
+                <a:spcPts val="600"/>
+              </a:spcBef>
+              <a:spcAft>
+                <a:spcPts val="600"/>
               </a:spcAft>
             </a:pPr>
             <a:r>
@@ -9739,8 +13805,11 @@
           </a:p>
           <a:p>
             <a:pPr>
-              <a:spcAft>
-                <a:spcPts val="1000"/>
+              <a:spcBef>
+                <a:spcPts val="600"/>
+              </a:spcBef>
+              <a:spcAft>
+                <a:spcPts val="600"/>
               </a:spcAft>
             </a:pPr>
             <a:r>
@@ -9750,8 +13819,11 @@
           </a:p>
           <a:p>
             <a:pPr>
-              <a:spcAft>
-                <a:spcPts val="1000"/>
+              <a:spcBef>
+                <a:spcPts val="600"/>
+              </a:spcBef>
+              <a:spcAft>
+                <a:spcPts val="600"/>
               </a:spcAft>
             </a:pPr>
             <a:r>
@@ -9761,13 +13833,30 @@
           </a:p>
           <a:p>
             <a:pPr>
-              <a:spcAft>
-                <a:spcPts val="1000"/>
+              <a:spcBef>
+                <a:spcPts val="600"/>
+              </a:spcBef>
+              <a:spcAft>
+                <a:spcPts val="600"/>
               </a:spcAft>
             </a:pPr>
             <a:r>
               <a:rPr lang="pt-BR" sz="2800" dirty="0"/>
               <a:t>Engenharia do Caos: Do começo ao fim</a:t>
+            </a:r>
+          </a:p>
+          <a:p>
+            <a:pPr>
+              <a:spcBef>
+                <a:spcPts val="600"/>
+              </a:spcBef>
+              <a:spcAft>
+                <a:spcPts val="600"/>
+              </a:spcAft>
+            </a:pPr>
+            <a:r>
+              <a:rPr lang="pt-BR" sz="2800" dirty="0"/>
+              <a:t>Caos Colaborativo</a:t>
             </a:r>
           </a:p>
           <a:p>

</xml_diff>

<commit_message>
Adiciona Criando Drives Customizados
Adiciona o subtópico: Criando Drives Customizados
</commit_message>
<xml_diff>
--- a/docs/Chaos Engineering - Das Hipoteses aos Testes.pptx
+++ b/docs/Chaos Engineering - Das Hipoteses aos Testes.pptx
@@ -139,6 +139,23 @@
     <p:sldId id="385" r:id="rId133"/>
     <p:sldId id="386" r:id="rId134"/>
     <p:sldId id="387" r:id="rId135"/>
+    <p:sldId id="391" r:id="rId136"/>
+    <p:sldId id="392" r:id="rId137"/>
+    <p:sldId id="393" r:id="rId138"/>
+    <p:sldId id="394" r:id="rId139"/>
+    <p:sldId id="395" r:id="rId140"/>
+    <p:sldId id="396" r:id="rId141"/>
+    <p:sldId id="397" r:id="rId142"/>
+    <p:sldId id="398" r:id="rId143"/>
+    <p:sldId id="399" r:id="rId144"/>
+    <p:sldId id="400" r:id="rId145"/>
+    <p:sldId id="401" r:id="rId146"/>
+    <p:sldId id="402" r:id="rId147"/>
+    <p:sldId id="403" r:id="rId148"/>
+    <p:sldId id="404" r:id="rId149"/>
+    <p:sldId id="405" r:id="rId150"/>
+    <p:sldId id="406" r:id="rId151"/>
+    <p:sldId id="407" r:id="rId152"/>
   </p:sldIdLst>
   <p:sldSz cx="12192000" cy="6858000"/>
   <p:notesSz cx="6858000" cy="9144000"/>
@@ -519,7 +536,7 @@
           <a:p>
             <a:fld id="{4AAD347D-5ACD-4C99-B74B-A9C85AD731AF}" type="datetimeFigureOut">
               <a:rPr lang="en-US" smtClean="0"/>
-              <a:t>10/14/2019</a:t>
+              <a:t>10/21/2019</a:t>
             </a:fld>
             <a:endParaRPr lang="en-US" dirty="0"/>
           </a:p>
@@ -934,7 +951,7 @@
           <a:p>
             <a:fld id="{4509A250-FF31-4206-8172-F9D3106AACB1}" type="datetimeFigureOut">
               <a:rPr lang="en-US" smtClean="0"/>
-              <a:t>10/14/2019</a:t>
+              <a:t>10/21/2019</a:t>
             </a:fld>
             <a:endParaRPr lang="en-US" dirty="0"/>
           </a:p>
@@ -1270,7 +1287,7 @@
           <a:p>
             <a:fld id="{4509A250-FF31-4206-8172-F9D3106AACB1}" type="datetimeFigureOut">
               <a:rPr lang="en-US" smtClean="0"/>
-              <a:t>10/14/2019</a:t>
+              <a:t>10/21/2019</a:t>
             </a:fld>
             <a:endParaRPr lang="en-US" dirty="0"/>
           </a:p>
@@ -1675,7 +1692,7 @@
           <a:p>
             <a:fld id="{4AAD347D-5ACD-4C99-B74B-A9C85AD731AF}" type="datetimeFigureOut">
               <a:rPr lang="en-US" smtClean="0"/>
-              <a:t>10/14/2019</a:t>
+              <a:t>10/21/2019</a:t>
             </a:fld>
             <a:endParaRPr lang="en-US" dirty="0"/>
           </a:p>
@@ -2244,7 +2261,7 @@
           <a:p>
             <a:fld id="{4AAD347D-5ACD-4C99-B74B-A9C85AD731AF}" type="datetimeFigureOut">
               <a:rPr lang="en-US" smtClean="0"/>
-              <a:t>10/14/2019</a:t>
+              <a:t>10/21/2019</a:t>
             </a:fld>
             <a:endParaRPr lang="en-US" dirty="0"/>
           </a:p>
@@ -2926,7 +2943,7 @@
           <a:p>
             <a:fld id="{4509A250-FF31-4206-8172-F9D3106AACB1}" type="datetimeFigureOut">
               <a:rPr lang="en-US" smtClean="0"/>
-              <a:t>10/14/2019</a:t>
+              <a:t>10/21/2019</a:t>
             </a:fld>
             <a:endParaRPr lang="en-US" dirty="0"/>
           </a:p>
@@ -3839,7 +3856,7 @@
           <a:p>
             <a:fld id="{4509A250-FF31-4206-8172-F9D3106AACB1}" type="datetimeFigureOut">
               <a:rPr lang="en-US" smtClean="0"/>
-              <a:t>10/14/2019</a:t>
+              <a:t>10/21/2019</a:t>
             </a:fld>
             <a:endParaRPr lang="en-US" dirty="0"/>
           </a:p>
@@ -4152,7 +4169,7 @@
           <a:p>
             <a:fld id="{4AAD347D-5ACD-4C99-B74B-A9C85AD731AF}" type="datetimeFigureOut">
               <a:rPr lang="en-US" smtClean="0"/>
-              <a:t>10/14/2019</a:t>
+              <a:t>10/21/2019</a:t>
             </a:fld>
             <a:endParaRPr lang="en-US" dirty="0"/>
           </a:p>
@@ -4417,7 +4434,7 @@
           <a:p>
             <a:fld id="{4AAD347D-5ACD-4C99-B74B-A9C85AD731AF}" type="datetimeFigureOut">
               <a:rPr lang="en-US" smtClean="0"/>
-              <a:t>10/14/2019</a:t>
+              <a:t>10/21/2019</a:t>
             </a:fld>
             <a:endParaRPr lang="en-US" dirty="0"/>
           </a:p>
@@ -4741,7 +4758,7 @@
           <a:p>
             <a:fld id="{4AAD347D-5ACD-4C99-B74B-A9C85AD731AF}" type="datetimeFigureOut">
               <a:rPr lang="en-US" smtClean="0"/>
-              <a:t>10/14/2019</a:t>
+              <a:t>10/21/2019</a:t>
             </a:fld>
             <a:endParaRPr lang="en-US" dirty="0"/>
           </a:p>
@@ -5131,7 +5148,7 @@
           <a:p>
             <a:fld id="{9796027F-7875-4030-9381-8BD8C4F21935}" type="datetimeFigureOut">
               <a:rPr lang="en-US" smtClean="0"/>
-              <a:t>10/14/2019</a:t>
+              <a:t>10/21/2019</a:t>
             </a:fld>
             <a:endParaRPr lang="en-US" dirty="0"/>
           </a:p>
@@ -5507,7 +5524,7 @@
           <a:p>
             <a:fld id="{9796027F-7875-4030-9381-8BD8C4F21935}" type="datetimeFigureOut">
               <a:rPr lang="en-US" smtClean="0"/>
-              <a:t>10/14/2019</a:t>
+              <a:t>10/21/2019</a:t>
             </a:fld>
             <a:endParaRPr lang="en-US" dirty="0"/>
           </a:p>
@@ -6013,7 +6030,7 @@
           <a:p>
             <a:fld id="{9796027F-7875-4030-9381-8BD8C4F21935}" type="datetimeFigureOut">
               <a:rPr lang="en-US" smtClean="0"/>
-              <a:t>10/14/2019</a:t>
+              <a:t>10/21/2019</a:t>
             </a:fld>
             <a:endParaRPr lang="en-US" dirty="0"/>
           </a:p>
@@ -6270,7 +6287,7 @@
           <a:p>
             <a:fld id="{4AAD347D-5ACD-4C99-B74B-A9C85AD731AF}" type="datetimeFigureOut">
               <a:rPr lang="en-US" smtClean="0"/>
-              <a:t>10/14/2019</a:t>
+              <a:t>10/21/2019</a:t>
             </a:fld>
             <a:endParaRPr lang="en-US" dirty="0"/>
           </a:p>
@@ -6434,7 +6451,7 @@
           <a:p>
             <a:fld id="{4509A250-FF31-4206-8172-F9D3106AACB1}" type="datetimeFigureOut">
               <a:rPr lang="en-US" smtClean="0"/>
-              <a:t>10/14/2019</a:t>
+              <a:t>10/21/2019</a:t>
             </a:fld>
             <a:endParaRPr lang="en-US" dirty="0"/>
           </a:p>
@@ -6824,7 +6841,7 @@
           <a:p>
             <a:fld id="{4509A250-FF31-4206-8172-F9D3106AACB1}" type="datetimeFigureOut">
               <a:rPr lang="en-US" smtClean="0"/>
-              <a:t>10/14/2019</a:t>
+              <a:t>10/21/2019</a:t>
             </a:fld>
             <a:endParaRPr lang="en-US" dirty="0"/>
           </a:p>
@@ -7233,7 +7250,7 @@
           <a:p>
             <a:fld id="{4509A250-FF31-4206-8172-F9D3106AACB1}" type="datetimeFigureOut">
               <a:rPr lang="en-US" smtClean="0"/>
-              <a:t>10/14/2019</a:t>
+              <a:t>10/21/2019</a:t>
             </a:fld>
             <a:endParaRPr lang="en-US" dirty="0"/>
           </a:p>
@@ -7477,7 +7494,7 @@
           <a:p>
             <a:fld id="{4AAD347D-5ACD-4C99-B74B-A9C85AD731AF}" type="datetimeFigureOut">
               <a:rPr lang="en-US" smtClean="0"/>
-              <a:t>10/14/2019</a:t>
+              <a:t>10/21/2019</a:t>
             </a:fld>
             <a:endParaRPr lang="en-US" dirty="0"/>
           </a:p>
@@ -13109,7 +13126,7 @@
           <a:p>
             <a:r>
               <a:rPr lang="pt-BR" dirty="0"/>
-              <a:t>Compartilhando Relatórios</a:t>
+              <a:t>Criando Drives Customizados</a:t>
             </a:r>
           </a:p>
         </p:txBody>
@@ -13149,18 +13166,40 @@
             </a:pPr>
             <a:r>
               <a:rPr lang="pt-BR" dirty="0"/>
-              <a:t>Executando o Experimento:</a:t>
-            </a:r>
-          </a:p>
-          <a:p>
-            <a:pPr lvl="1">
-              <a:spcAft>
-                <a:spcPts val="1000"/>
-              </a:spcAft>
-            </a:pPr>
-            <a:r>
-              <a:rPr lang="pt-BR" dirty="0"/>
-              <a:t>O</a:t>
+              <a:t>Existem inúmeros fatores que tornam os sistemas únicos entre si, desde a infraestrutura até o nível da aplicação.</a:t>
+            </a:r>
+          </a:p>
+          <a:p>
+            <a:pPr>
+              <a:spcAft>
+                <a:spcPts val="1000"/>
+              </a:spcAft>
+            </a:pPr>
+            <a:r>
+              <a:rPr lang="pt-BR" dirty="0"/>
+              <a:t>Eles podem usar a mesma linguagem, a mesma plataforma e ainda serem implementados de formas distintas.</a:t>
+            </a:r>
+          </a:p>
+          <a:p>
+            <a:pPr>
+              <a:spcAft>
+                <a:spcPts val="1000"/>
+              </a:spcAft>
+            </a:pPr>
+            <a:r>
+              <a:rPr lang="pt-BR" dirty="0"/>
+              <a:t>Cada ambiente é único e o Chaos Toolkit nos oferece a possibilidade de customização de acordo com as nossas necessidades.</a:t>
+            </a:r>
+          </a:p>
+          <a:p>
+            <a:pPr>
+              <a:spcAft>
+                <a:spcPts val="1000"/>
+              </a:spcAft>
+            </a:pPr>
+            <a:r>
+              <a:rPr lang="pt-BR" dirty="0"/>
+              <a:t>Podemos criar nossos próprios drives customizados.</a:t>
             </a:r>
           </a:p>
         </p:txBody>
@@ -13223,7 +13262,7 @@
           <a:p>
             <a:r>
               <a:rPr lang="pt-BR" dirty="0"/>
-              <a:t>Compartilhando Relatórios</a:t>
+              <a:t>Criando Drives Customizados - HTTP</a:t>
             </a:r>
           </a:p>
         </p:txBody>
@@ -13263,7 +13302,7 @@
             </a:pPr>
             <a:r>
               <a:rPr lang="pt-BR" dirty="0"/>
-              <a:t>Executando o Experimento:</a:t>
+              <a:t>Podemos integrar os experimentos com os nossos sistemas sem código adicional de duas formas:</a:t>
             </a:r>
           </a:p>
           <a:p>
@@ -13274,7 +13313,83 @@
             </a:pPr>
             <a:r>
               <a:rPr lang="pt-BR" dirty="0"/>
-              <a:t>O</a:t>
+              <a:t>Utilizando chamadas de um endpoint HTTP.</a:t>
+            </a:r>
+          </a:p>
+          <a:p>
+            <a:pPr lvl="1">
+              <a:spcAft>
+                <a:spcPts val="1000"/>
+              </a:spcAft>
+            </a:pPr>
+            <a:r>
+              <a:rPr lang="pt-BR" dirty="0"/>
+              <a:t>Utilizando chamadas a um processo local.</a:t>
+            </a:r>
+          </a:p>
+          <a:p>
+            <a:pPr>
+              <a:spcAft>
+                <a:spcPts val="1000"/>
+              </a:spcAft>
+            </a:pPr>
+            <a:r>
+              <a:rPr lang="pt-BR" dirty="0"/>
+              <a:t>Implementando </a:t>
+            </a:r>
+            <a:r>
+              <a:rPr lang="pt-BR" dirty="0" err="1"/>
+              <a:t>Probes</a:t>
+            </a:r>
+            <a:r>
+              <a:rPr lang="pt-BR" dirty="0"/>
+              <a:t> e </a:t>
+            </a:r>
+            <a:r>
+              <a:rPr lang="pt-BR" dirty="0" err="1"/>
+              <a:t>Actions</a:t>
+            </a:r>
+            <a:r>
+              <a:rPr lang="pt-BR" dirty="0"/>
+              <a:t> com chamadas HTTP</a:t>
+            </a:r>
+          </a:p>
+          <a:p>
+            <a:pPr lvl="1">
+              <a:spcAft>
+                <a:spcPts val="1000"/>
+              </a:spcAft>
+            </a:pPr>
+            <a:r>
+              <a:rPr lang="pt-BR" dirty="0"/>
+              <a:t>Já vimos como realizar uma chamada de um endpoint HTTP para uma </a:t>
+            </a:r>
+            <a:r>
+              <a:rPr lang="pt-BR" dirty="0" err="1"/>
+              <a:t>probe</a:t>
+            </a:r>
+            <a:r>
+              <a:rPr lang="pt-BR" dirty="0"/>
+              <a:t> de um experimento.</a:t>
+            </a:r>
+          </a:p>
+          <a:p>
+            <a:pPr lvl="1">
+              <a:spcAft>
+                <a:spcPts val="1000"/>
+              </a:spcAft>
+            </a:pPr>
+            <a:r>
+              <a:rPr lang="pt-BR" dirty="0"/>
+              <a:t>Em um caso básico teremos uma requisição GET aonde especificamos que o tipo da </a:t>
+            </a:r>
+            <a:r>
+              <a:rPr lang="pt-BR" dirty="0" err="1"/>
+              <a:t>probe</a:t>
+            </a:r>
+            <a:r>
+              <a:rPr lang="pt-BR" dirty="0"/>
+              <a:t> é HTTP</a:t>
             </a:r>
           </a:p>
         </p:txBody>
@@ -13516,7 +13631,7 @@
           <a:p>
             <a:r>
               <a:rPr lang="pt-BR" dirty="0"/>
-              <a:t>Compartilhando Relatórios</a:t>
+              <a:t>Criando Drives Customizados - HTTP</a:t>
             </a:r>
           </a:p>
         </p:txBody>
@@ -13539,8 +13654,8 @@
         </p:nvSpPr>
         <p:spPr>
           <a:xfrm>
-            <a:off x="680321" y="2505456"/>
-            <a:ext cx="9484759" cy="3599316"/>
+            <a:off x="680322" y="2505456"/>
+            <a:ext cx="7198758" cy="3599316"/>
           </a:xfrm>
         </p:spPr>
         <p:txBody>
@@ -13556,7 +13671,35 @@
             </a:pPr>
             <a:r>
               <a:rPr lang="pt-BR" dirty="0"/>
-              <a:t>Executando o Experimento:</a:t>
+              <a:t>Também podemos utilizar os outros métodos HTTP através do </a:t>
+            </a:r>
+            <a:r>
+              <a:rPr lang="pt-BR" i="1" dirty="0"/>
+              <a:t>http </a:t>
+            </a:r>
+            <a:r>
+              <a:rPr lang="pt-BR" i="1" dirty="0" err="1"/>
+              <a:t>provider</a:t>
+            </a:r>
+            <a:endParaRPr lang="pt-BR" i="1" dirty="0"/>
+          </a:p>
+          <a:p>
+            <a:pPr>
+              <a:spcAft>
+                <a:spcPts val="1000"/>
+              </a:spcAft>
+            </a:pPr>
+            <a:r>
+              <a:rPr lang="pt-BR" dirty="0"/>
+              <a:t>Com o http </a:t>
+            </a:r>
+            <a:r>
+              <a:rPr lang="pt-BR" dirty="0" err="1"/>
+              <a:t>provider</a:t>
+            </a:r>
+            <a:r>
+              <a:rPr lang="pt-BR" dirty="0"/>
+              <a:t> temos as seguintes especificações:</a:t>
             </a:r>
           </a:p>
           <a:p>
@@ -13567,7 +13710,163 @@
             </a:pPr>
             <a:r>
               <a:rPr lang="pt-BR" dirty="0"/>
-              <a:t>O</a:t>
+              <a:t>O método HTTP usado (POST, DELETE, </a:t>
+            </a:r>
+            <a:r>
+              <a:rPr lang="pt-BR" dirty="0" err="1"/>
+              <a:t>etc</a:t>
+            </a:r>
+            <a:r>
+              <a:rPr lang="pt-BR" dirty="0"/>
+              <a:t>)</a:t>
+            </a:r>
+          </a:p>
+          <a:p>
+            <a:pPr lvl="1">
+              <a:spcAft>
+                <a:spcPts val="1000"/>
+              </a:spcAft>
+            </a:pPr>
+            <a:r>
+              <a:rPr lang="pt-BR" dirty="0"/>
+              <a:t>Uma lista de chaves e valores são passados como cabeçalhos nas requisições https.</a:t>
+            </a:r>
+          </a:p>
+          <a:p>
+            <a:pPr lvl="1">
+              <a:spcAft>
+                <a:spcPts val="1000"/>
+              </a:spcAft>
+            </a:pPr>
+            <a:r>
+              <a:rPr lang="pt-BR" dirty="0"/>
+              <a:t>Uma lista de chaves e valores passados para o </a:t>
+            </a:r>
+            <a:br>
+              <a:rPr lang="pt-BR" dirty="0"/>
+            </a:br>
+            <a:r>
+              <a:rPr lang="pt-BR" dirty="0" err="1"/>
+              <a:t>payload</a:t>
+            </a:r>
+            <a:r>
+              <a:rPr lang="pt-BR" dirty="0"/>
+              <a:t> da requisição.</a:t>
+            </a:r>
+          </a:p>
+          <a:p>
+            <a:pPr lvl="1">
+              <a:spcAft>
+                <a:spcPts val="1000"/>
+              </a:spcAft>
+            </a:pPr>
+            <a:r>
+              <a:rPr lang="pt-BR" dirty="0"/>
+              <a:t>Definição do intervalo/timeout da requisição HTTP</a:t>
+            </a:r>
+          </a:p>
+          <a:p>
+            <a:pPr>
+              <a:spcAft>
+                <a:spcPts val="1000"/>
+              </a:spcAft>
+            </a:pPr>
+            <a:endParaRPr lang="pt-BR" dirty="0"/>
+          </a:p>
+        </p:txBody>
+      </p:sp>
+      <p:pic>
+        <p:nvPicPr>
+          <p:cNvPr id="3" name="Imagem 2" descr="Tela de celular com texto preto sobre fundo branco&#10;&#10;Descrição gerada automaticamente">
+            <a:extLst>
+              <a:ext uri="{FF2B5EF4-FFF2-40B4-BE49-F238E27FC236}">
+                <a16:creationId xmlns:a16="http://schemas.microsoft.com/office/drawing/2014/main" id="{5F9AA961-53C8-4D25-84B9-E6755B78D99D}"/>
+              </a:ext>
+            </a:extLst>
+          </p:cNvPr>
+          <p:cNvPicPr>
+            <a:picLocks noChangeAspect="1"/>
+          </p:cNvPicPr>
+          <p:nvPr/>
+        </p:nvPicPr>
+        <p:blipFill>
+          <a:blip r:embed="rId2"/>
+          <a:stretch>
+            <a:fillRect/>
+          </a:stretch>
+        </p:blipFill>
+        <p:spPr>
+          <a:xfrm>
+            <a:off x="8227443" y="2695164"/>
+            <a:ext cx="3600953" cy="1609950"/>
+          </a:xfrm>
+          <a:prstGeom prst="rect">
+            <a:avLst/>
+          </a:prstGeom>
+        </p:spPr>
+      </p:pic>
+      <p:pic>
+        <p:nvPicPr>
+          <p:cNvPr id="7" name="Imagem 6" descr="Uma imagem contendo pássaro&#10;&#10;Descrição gerada automaticamente">
+            <a:extLst>
+              <a:ext uri="{FF2B5EF4-FFF2-40B4-BE49-F238E27FC236}">
+                <a16:creationId xmlns:a16="http://schemas.microsoft.com/office/drawing/2014/main" id="{85589AF7-E3F7-4A14-8883-6E8860D04CD9}"/>
+              </a:ext>
+            </a:extLst>
+          </p:cNvPr>
+          <p:cNvPicPr>
+            <a:picLocks noChangeAspect="1"/>
+          </p:cNvPicPr>
+          <p:nvPr/>
+        </p:nvPicPr>
+        <p:blipFill>
+          <a:blip r:embed="rId3"/>
+          <a:stretch>
+            <a:fillRect/>
+          </a:stretch>
+        </p:blipFill>
+        <p:spPr>
+          <a:xfrm>
+            <a:off x="8803786" y="4712016"/>
+            <a:ext cx="2448267" cy="1438476"/>
+          </a:xfrm>
+          <a:prstGeom prst="rect">
+            <a:avLst/>
+          </a:prstGeom>
+        </p:spPr>
+      </p:pic>
+      <p:sp>
+        <p:nvSpPr>
+          <p:cNvPr id="8" name="CaixaDeTexto 7">
+            <a:extLst>
+              <a:ext uri="{FF2B5EF4-FFF2-40B4-BE49-F238E27FC236}">
+                <a16:creationId xmlns:a16="http://schemas.microsoft.com/office/drawing/2014/main" id="{4AD1EF94-C362-41C1-9E5D-674859C441C4}"/>
+              </a:ext>
+            </a:extLst>
+          </p:cNvPr>
+          <p:cNvSpPr txBox="1"/>
+          <p:nvPr/>
+        </p:nvSpPr>
+        <p:spPr>
+          <a:xfrm>
+            <a:off x="8803786" y="6150492"/>
+            <a:ext cx="2448267" cy="347562"/>
+          </a:xfrm>
+          <a:prstGeom prst="rect">
+            <a:avLst/>
+          </a:prstGeom>
+          <a:noFill/>
+        </p:spPr>
+        <p:txBody>
+          <a:bodyPr wrap="square" rtlCol="0">
+            <a:noAutofit/>
+          </a:bodyPr>
+          <a:lstStyle/>
+          <a:p>
+            <a:pPr algn="ctr"/>
+            <a:r>
+              <a:rPr lang="pt-BR" sz="1600" dirty="0"/>
+              <a:t>URL que será chamada</a:t>
             </a:r>
           </a:p>
         </p:txBody>
@@ -13630,7 +13929,7 @@
           <a:p>
             <a:r>
               <a:rPr lang="pt-BR" dirty="0"/>
-              <a:t>Compartilhando Relatórios</a:t>
+              <a:t>Criando Drives Customizados - HTTP</a:t>
             </a:r>
           </a:p>
         </p:txBody>
@@ -13654,7 +13953,7 @@
         <p:spPr>
           <a:xfrm>
             <a:off x="680321" y="2505456"/>
-            <a:ext cx="9484759" cy="3599316"/>
+            <a:ext cx="5415679" cy="3599316"/>
           </a:xfrm>
         </p:spPr>
         <p:txBody>
@@ -13670,22 +13969,100 @@
             </a:pPr>
             <a:r>
               <a:rPr lang="pt-BR" dirty="0"/>
-              <a:t>Executando o Experimento:</a:t>
-            </a:r>
-          </a:p>
-          <a:p>
-            <a:pPr lvl="1">
-              <a:spcAft>
-                <a:spcPts val="1000"/>
-              </a:spcAft>
-            </a:pPr>
-            <a:r>
-              <a:rPr lang="pt-BR" dirty="0"/>
-              <a:t>O</a:t>
-            </a:r>
-          </a:p>
-        </p:txBody>
-      </p:sp>
+              <a:t>O valor retornado de uma </a:t>
+            </a:r>
+            <a:r>
+              <a:rPr lang="pt-BR" dirty="0" err="1"/>
+              <a:t>probe</a:t>
+            </a:r>
+            <a:r>
+              <a:rPr lang="pt-BR" dirty="0"/>
+              <a:t> HTTP é uma coleção de status HTTP, os cabeçalhos da resposta e o conteúdo da mesma.</a:t>
+            </a:r>
+          </a:p>
+          <a:p>
+            <a:pPr>
+              <a:spcAft>
+                <a:spcPts val="1000"/>
+              </a:spcAft>
+            </a:pPr>
+            <a:r>
+              <a:rPr lang="pt-BR" dirty="0"/>
+              <a:t>Se a </a:t>
+            </a:r>
+            <a:r>
+              <a:rPr lang="pt-BR" dirty="0" err="1"/>
+              <a:t>probe</a:t>
+            </a:r>
+            <a:r>
+              <a:rPr lang="pt-BR" dirty="0"/>
+              <a:t> for declarada dentro do bloco de código da </a:t>
+            </a:r>
+            <a:r>
+              <a:rPr lang="pt-BR" dirty="0" err="1"/>
+              <a:t>steady-state</a:t>
+            </a:r>
+            <a:r>
+              <a:rPr lang="pt-BR" dirty="0"/>
+              <a:t> </a:t>
+            </a:r>
+            <a:r>
+              <a:rPr lang="pt-BR" dirty="0" err="1"/>
+              <a:t>hypothesis</a:t>
+            </a:r>
+            <a:r>
+              <a:rPr lang="pt-BR" dirty="0"/>
+              <a:t>, então podemos examinar o status </a:t>
+            </a:r>
+            <a:r>
+              <a:rPr lang="pt-BR" dirty="0" err="1"/>
+              <a:t>code</a:t>
+            </a:r>
+            <a:r>
+              <a:rPr lang="pt-BR" dirty="0"/>
+              <a:t> para saber se o mesmo está dentro da tolerância da </a:t>
+            </a:r>
+            <a:r>
+              <a:rPr lang="pt-BR" dirty="0" err="1"/>
+              <a:t>probe</a:t>
+            </a:r>
+            <a:r>
+              <a:rPr lang="pt-BR" dirty="0"/>
+              <a:t>.</a:t>
+            </a:r>
+          </a:p>
+        </p:txBody>
+      </p:sp>
+      <p:pic>
+        <p:nvPicPr>
+          <p:cNvPr id="3" name="Imagem 2" descr="Tela de celular com texto preto sobre fundo branco&#10;&#10;Descrição gerada automaticamente">
+            <a:extLst>
+              <a:ext uri="{FF2B5EF4-FFF2-40B4-BE49-F238E27FC236}">
+                <a16:creationId xmlns:a16="http://schemas.microsoft.com/office/drawing/2014/main" id="{4B95C705-E651-41EB-B902-F49D28888B55}"/>
+              </a:ext>
+            </a:extLst>
+          </p:cNvPr>
+          <p:cNvPicPr>
+            <a:picLocks noChangeAspect="1"/>
+          </p:cNvPicPr>
+          <p:nvPr/>
+        </p:nvPicPr>
+        <p:blipFill>
+          <a:blip r:embed="rId2"/>
+          <a:stretch>
+            <a:fillRect/>
+          </a:stretch>
+        </p:blipFill>
+        <p:spPr>
+          <a:xfrm>
+            <a:off x="6324600" y="3276789"/>
+            <a:ext cx="5391902" cy="2305372"/>
+          </a:xfrm>
+          <a:prstGeom prst="rect">
+            <a:avLst/>
+          </a:prstGeom>
+        </p:spPr>
+      </p:pic>
     </p:spTree>
     <p:extLst>
       <p:ext uri="{BB962C8B-B14F-4D97-AF65-F5344CB8AC3E}">
@@ -13744,7 +14121,7 @@
           <a:p>
             <a:r>
               <a:rPr lang="pt-BR" dirty="0"/>
-              <a:t>Compartilhando Relatórios</a:t>
+              <a:t>Criando Drives Customizados - HTTP</a:t>
             </a:r>
           </a:p>
         </p:txBody>
@@ -13768,7 +14145,7 @@
         <p:spPr>
           <a:xfrm>
             <a:off x="680321" y="2505456"/>
-            <a:ext cx="9484759" cy="3599316"/>
+            <a:ext cx="9103759" cy="3599316"/>
           </a:xfrm>
         </p:spPr>
         <p:txBody>
@@ -13784,19 +14161,113 @@
             </a:pPr>
             <a:r>
               <a:rPr lang="pt-BR" dirty="0"/>
-              <a:t>Executando o Experimento:</a:t>
-            </a:r>
-          </a:p>
-          <a:p>
-            <a:pPr lvl="1">
-              <a:spcAft>
-                <a:spcPts val="1000"/>
-              </a:spcAft>
-            </a:pPr>
-            <a:r>
-              <a:rPr lang="pt-BR" dirty="0"/>
-              <a:t>O</a:t>
-            </a:r>
+              <a:t>O </a:t>
+            </a:r>
+            <a:r>
+              <a:rPr lang="pt-BR" i="1" dirty="0"/>
+              <a:t>http </a:t>
+            </a:r>
+            <a:r>
+              <a:rPr lang="pt-BR" i="1" dirty="0" err="1"/>
+              <a:t>provider</a:t>
+            </a:r>
+            <a:r>
+              <a:rPr lang="pt-BR" i="1" dirty="0"/>
+              <a:t> </a:t>
+            </a:r>
+            <a:r>
+              <a:rPr lang="pt-BR" dirty="0"/>
+              <a:t>nos permite examinar os status </a:t>
+            </a:r>
+            <a:r>
+              <a:rPr lang="pt-BR" dirty="0" err="1"/>
+              <a:t>codes</a:t>
+            </a:r>
+            <a:r>
+              <a:rPr lang="pt-BR" dirty="0"/>
+              <a:t> das respostas HTTP.</a:t>
+            </a:r>
+          </a:p>
+          <a:p>
+            <a:pPr>
+              <a:spcAft>
+                <a:spcPts val="1000"/>
+              </a:spcAft>
+            </a:pPr>
+            <a:r>
+              <a:rPr lang="pt-BR" dirty="0"/>
+              <a:t>Porém se quisermos examinar o cabeçalho e o corpo da resposta precisaremos usar outros métodos.</a:t>
+            </a:r>
+          </a:p>
+          <a:p>
+            <a:pPr>
+              <a:spcAft>
+                <a:spcPts val="1000"/>
+              </a:spcAft>
+            </a:pPr>
+            <a:r>
+              <a:rPr lang="pt-BR" dirty="0"/>
+              <a:t>Podemos usar um script </a:t>
+            </a:r>
+            <a:r>
+              <a:rPr lang="pt-BR" dirty="0" err="1"/>
+              <a:t>bash</a:t>
+            </a:r>
+            <a:r>
+              <a:rPr lang="pt-BR" dirty="0"/>
+              <a:t> ou implementar um driver totalmente customizado em Python.</a:t>
+            </a:r>
+          </a:p>
+          <a:p>
+            <a:pPr>
+              <a:spcAft>
+                <a:spcPts val="1000"/>
+              </a:spcAft>
+            </a:pPr>
+            <a:r>
+              <a:rPr lang="pt-BR" dirty="0"/>
+              <a:t>Uma outra forma de customização similar ao </a:t>
+            </a:r>
+            <a:r>
+              <a:rPr lang="pt-BR" i="1" dirty="0"/>
+              <a:t>http </a:t>
+            </a:r>
+            <a:r>
+              <a:rPr lang="pt-BR" i="1" dirty="0" err="1"/>
+              <a:t>provider</a:t>
+            </a:r>
+            <a:r>
+              <a:rPr lang="pt-BR" i="1" dirty="0"/>
+              <a:t> </a:t>
+            </a:r>
+            <a:r>
+              <a:rPr lang="pt-BR" dirty="0"/>
+              <a:t>é o </a:t>
+            </a:r>
+            <a:r>
+              <a:rPr lang="pt-BR" i="1" dirty="0" err="1"/>
+              <a:t>process</a:t>
+            </a:r>
+            <a:r>
+              <a:rPr lang="pt-BR" i="1" dirty="0"/>
+              <a:t> </a:t>
+            </a:r>
+            <a:r>
+              <a:rPr lang="pt-BR" i="1" dirty="0" err="1"/>
+              <a:t>provider</a:t>
+            </a:r>
+            <a:r>
+              <a:rPr lang="pt-BR" i="1" dirty="0"/>
+              <a:t>.</a:t>
+            </a:r>
+          </a:p>
+          <a:p>
+            <a:pPr>
+              <a:spcAft>
+                <a:spcPts val="1000"/>
+              </a:spcAft>
+            </a:pPr>
+            <a:endParaRPr lang="pt-BR" dirty="0"/>
           </a:p>
         </p:txBody>
       </p:sp>
@@ -13858,8 +14329,13 @@
           <a:p>
             <a:r>
               <a:rPr lang="pt-BR" dirty="0"/>
-              <a:t>Mergulhando no Caos: O Experimento</a:t>
-            </a:r>
+              <a:t>Criando Drives Customizados - </a:t>
+            </a:r>
+            <a:r>
+              <a:rPr lang="pt-BR" dirty="0" err="1"/>
+              <a:t>Process</a:t>
+            </a:r>
+            <a:endParaRPr lang="pt-BR" dirty="0"/>
           </a:p>
         </p:txBody>
       </p:sp>
@@ -13882,7 +14358,7 @@
         <p:spPr>
           <a:xfrm>
             <a:off x="680321" y="2505456"/>
-            <a:ext cx="9484759" cy="3599316"/>
+            <a:ext cx="7183519" cy="3599316"/>
           </a:xfrm>
         </p:spPr>
         <p:txBody>
@@ -13898,22 +14374,174 @@
             </a:pPr>
             <a:r>
               <a:rPr lang="pt-BR" dirty="0"/>
-              <a:t>Executando o Experimento:</a:t>
-            </a:r>
-          </a:p>
-          <a:p>
-            <a:pPr lvl="1">
-              <a:spcAft>
-                <a:spcPts val="1000"/>
-              </a:spcAft>
-            </a:pPr>
-            <a:r>
-              <a:rPr lang="pt-BR" dirty="0"/>
-              <a:t>O</a:t>
-            </a:r>
-          </a:p>
-        </p:txBody>
-      </p:sp>
+              <a:t>O </a:t>
+            </a:r>
+            <a:r>
+              <a:rPr lang="pt-BR" i="1" dirty="0" err="1"/>
+              <a:t>process</a:t>
+            </a:r>
+            <a:r>
+              <a:rPr lang="pt-BR" i="1" dirty="0"/>
+              <a:t> </a:t>
+            </a:r>
+            <a:r>
+              <a:rPr lang="pt-BR" i="1" dirty="0" err="1"/>
+              <a:t>provider</a:t>
+            </a:r>
+            <a:r>
+              <a:rPr lang="pt-BR" dirty="0"/>
+              <a:t> nos </a:t>
+            </a:r>
+            <a:r>
+              <a:rPr lang="pt-BR" dirty="0" err="1"/>
+              <a:t>permiter</a:t>
+            </a:r>
+            <a:r>
+              <a:rPr lang="pt-BR" dirty="0"/>
+              <a:t> chamar qualquer processo local como parte da execução do experimento.</a:t>
+            </a:r>
+          </a:p>
+          <a:p>
+            <a:pPr>
+              <a:spcAft>
+                <a:spcPts val="1000"/>
+              </a:spcAft>
+            </a:pPr>
+            <a:r>
+              <a:rPr lang="pt-BR" dirty="0"/>
+              <a:t>Para isso criamos uma </a:t>
+            </a:r>
+            <a:r>
+              <a:rPr lang="pt-BR" dirty="0" err="1"/>
+              <a:t>action</a:t>
+            </a:r>
+            <a:r>
+              <a:rPr lang="pt-BR" dirty="0"/>
+              <a:t> </a:t>
+            </a:r>
+            <a:r>
+              <a:rPr lang="pt-BR" dirty="0" err="1"/>
+              <a:t>activity</a:t>
+            </a:r>
+            <a:endParaRPr lang="pt-BR" dirty="0"/>
+          </a:p>
+          <a:p>
+            <a:pPr>
+              <a:spcAft>
+                <a:spcPts val="1000"/>
+              </a:spcAft>
+            </a:pPr>
+            <a:r>
+              <a:rPr lang="pt-BR" dirty="0"/>
+              <a:t>Podemos especificar o processo local usando </a:t>
+            </a:r>
+            <a:r>
+              <a:rPr lang="pt-BR" i="1" dirty="0"/>
+              <a:t>path</a:t>
+            </a:r>
+            <a:r>
+              <a:rPr lang="pt-BR" dirty="0"/>
+              <a:t>, bem como especificar os argumentos que serão passados ao processo usando </a:t>
+            </a:r>
+            <a:r>
+              <a:rPr lang="pt-BR" i="1" dirty="0" err="1"/>
+              <a:t>arguments</a:t>
+            </a:r>
+            <a:endParaRPr lang="pt-BR" i="1" dirty="0"/>
+          </a:p>
+          <a:p>
+            <a:pPr>
+              <a:spcAft>
+                <a:spcPts val="1000"/>
+              </a:spcAft>
+            </a:pPr>
+            <a:r>
+              <a:rPr lang="pt-BR" dirty="0"/>
+              <a:t>O </a:t>
+            </a:r>
+            <a:r>
+              <a:rPr lang="pt-BR" i="1" dirty="0" err="1"/>
+              <a:t>process</a:t>
+            </a:r>
+            <a:r>
+              <a:rPr lang="pt-BR" i="1" dirty="0"/>
+              <a:t> </a:t>
+            </a:r>
+            <a:r>
+              <a:rPr lang="pt-BR" i="1" dirty="0" err="1"/>
+              <a:t>provider</a:t>
+            </a:r>
+            <a:r>
+              <a:rPr lang="pt-BR" i="1" dirty="0"/>
+              <a:t> </a:t>
+            </a:r>
+            <a:r>
+              <a:rPr lang="pt-BR" dirty="0"/>
+              <a:t>é muito útil por atuar num alto nível de abstração.</a:t>
+            </a:r>
+          </a:p>
+        </p:txBody>
+      </p:sp>
+      <p:pic>
+        <p:nvPicPr>
+          <p:cNvPr id="3" name="Imagem 2" descr="Tela de celular com texto preto sobre fundo branco&#10;&#10;Descrição gerada automaticamente">
+            <a:extLst>
+              <a:ext uri="{FF2B5EF4-FFF2-40B4-BE49-F238E27FC236}">
+                <a16:creationId xmlns:a16="http://schemas.microsoft.com/office/drawing/2014/main" id="{7671D7B5-7B99-4AC8-A480-AB0FD05F700F}"/>
+              </a:ext>
+            </a:extLst>
+          </p:cNvPr>
+          <p:cNvPicPr>
+            <a:picLocks noChangeAspect="1"/>
+          </p:cNvPicPr>
+          <p:nvPr/>
+        </p:nvPicPr>
+        <p:blipFill>
+          <a:blip r:embed="rId2"/>
+          <a:stretch>
+            <a:fillRect/>
+          </a:stretch>
+        </p:blipFill>
+        <p:spPr>
+          <a:xfrm>
+            <a:off x="8245186" y="3042649"/>
+            <a:ext cx="3367678" cy="1412938"/>
+          </a:xfrm>
+          <a:prstGeom prst="rect">
+            <a:avLst/>
+          </a:prstGeom>
+        </p:spPr>
+      </p:pic>
+      <p:pic>
+        <p:nvPicPr>
+          <p:cNvPr id="7" name="Imagem 6" descr="Tela de celular com texto preto sobre fundo branco&#10;&#10;Descrição gerada automaticamente">
+            <a:extLst>
+              <a:ext uri="{FF2B5EF4-FFF2-40B4-BE49-F238E27FC236}">
+                <a16:creationId xmlns:a16="http://schemas.microsoft.com/office/drawing/2014/main" id="{9B5AFF1E-E354-48AE-84F6-3F380A35680C}"/>
+              </a:ext>
+            </a:extLst>
+          </p:cNvPr>
+          <p:cNvPicPr>
+            <a:picLocks noChangeAspect="1"/>
+          </p:cNvPicPr>
+          <p:nvPr/>
+        </p:nvPicPr>
+        <p:blipFill>
+          <a:blip r:embed="rId3"/>
+          <a:stretch>
+            <a:fillRect/>
+          </a:stretch>
+        </p:blipFill>
+        <p:spPr>
+          <a:xfrm>
+            <a:off x="8245186" y="4722369"/>
+            <a:ext cx="3352106" cy="1601324"/>
+          </a:xfrm>
+          <a:prstGeom prst="rect">
+            <a:avLst/>
+          </a:prstGeom>
+        </p:spPr>
+      </p:pic>
     </p:spTree>
     <p:extLst>
       <p:ext uri="{BB962C8B-B14F-4D97-AF65-F5344CB8AC3E}">
@@ -13972,7 +14600,7 @@
           <a:p>
             <a:r>
               <a:rPr lang="pt-BR" dirty="0"/>
-              <a:t>Mergulhando no Caos: O Experimento</a:t>
+              <a:t>Criando Drives Customizados - Python</a:t>
             </a:r>
           </a:p>
         </p:txBody>
@@ -14012,18 +14640,93 @@
             </a:pPr>
             <a:r>
               <a:rPr lang="pt-BR" dirty="0"/>
-              <a:t>Executando o Experimento:</a:t>
-            </a:r>
-          </a:p>
-          <a:p>
-            <a:pPr lvl="1">
-              <a:spcAft>
-                <a:spcPts val="1000"/>
-              </a:spcAft>
-            </a:pPr>
-            <a:r>
-              <a:rPr lang="pt-BR" dirty="0"/>
-              <a:t>O</a:t>
+              <a:t>Quando precisamos de uma customização mais personalizada podemos utilizar a linguagem Python para criar nossas próprias </a:t>
+            </a:r>
+            <a:r>
+              <a:rPr lang="pt-BR" dirty="0" err="1"/>
+              <a:t>probes</a:t>
+            </a:r>
+            <a:r>
+              <a:rPr lang="pt-BR" dirty="0"/>
+              <a:t> e </a:t>
+            </a:r>
+            <a:r>
+              <a:rPr lang="pt-BR" dirty="0" err="1"/>
+              <a:t>actions</a:t>
+            </a:r>
+            <a:r>
+              <a:rPr lang="pt-BR" dirty="0"/>
+              <a:t> customizadas.</a:t>
+            </a:r>
+          </a:p>
+          <a:p>
+            <a:pPr>
+              <a:spcAft>
+                <a:spcPts val="1000"/>
+              </a:spcAft>
+            </a:pPr>
+            <a:r>
+              <a:rPr lang="pt-BR" dirty="0"/>
+              <a:t>Primeiro precisamos estar na mesma instância do ambiente virtual em que o Chaos Toolkit está instalado.</a:t>
+            </a:r>
+          </a:p>
+          <a:p>
+            <a:pPr>
+              <a:spcAft>
+                <a:spcPts val="1000"/>
+              </a:spcAft>
+            </a:pPr>
+            <a:r>
+              <a:rPr lang="pt-BR" dirty="0"/>
+              <a:t>Para isso podemos usar o comando utilizado anteriormente quando criamos o nosso ambiente virtual:</a:t>
+            </a:r>
+          </a:p>
+          <a:p>
+            <a:pPr marL="0" indent="0" algn="ctr">
+              <a:spcAft>
+                <a:spcPts val="1000"/>
+              </a:spcAft>
+              <a:buNone/>
+            </a:pPr>
+            <a:r>
+              <a:rPr lang="pt-BR" dirty="0">
+                <a:highlight>
+                  <a:srgbClr val="000000"/>
+                </a:highlight>
+              </a:rPr>
+              <a:t>(</a:t>
+            </a:r>
+            <a:r>
+              <a:rPr lang="pt-BR" dirty="0" err="1">
+                <a:highlight>
+                  <a:srgbClr val="000000"/>
+                </a:highlight>
+              </a:rPr>
+              <a:t>chaostk</a:t>
+            </a:r>
+            <a:r>
+              <a:rPr lang="pt-BR" dirty="0">
+                <a:highlight>
+                  <a:srgbClr val="000000"/>
+                </a:highlight>
+              </a:rPr>
+              <a:t>) $ </a:t>
+            </a:r>
+            <a:r>
+              <a:rPr lang="pt-BR" dirty="0" err="1">
+                <a:highlight>
+                  <a:srgbClr val="000000"/>
+                </a:highlight>
+              </a:rPr>
+              <a:t>chaos</a:t>
+            </a:r>
+            <a:r>
+              <a:rPr lang="pt-BR" dirty="0">
+                <a:highlight>
+                  <a:srgbClr val="000000"/>
+                </a:highlight>
+              </a:rPr>
+              <a:t> --help</a:t>
             </a:r>
           </a:p>
         </p:txBody>
@@ -14032,6 +14735,1236 @@
     <p:extLst>
       <p:ext uri="{BB962C8B-B14F-4D97-AF65-F5344CB8AC3E}">
         <p14:creationId xmlns:p14="http://schemas.microsoft.com/office/powerpoint/2010/main" val="764737389"/>
+      </p:ext>
+    </p:extLst>
+  </p:cSld>
+  <p:clrMapOvr>
+    <a:masterClrMapping/>
+  </p:clrMapOvr>
+</p:sld>
+</file>
+
+<file path=ppt/slides/slide135.xml><?xml version="1.0" encoding="utf-8"?>
+<p:sld xmlns:a="http://schemas.openxmlformats.org/drawingml/2006/main" xmlns:r="http://schemas.openxmlformats.org/officeDocument/2006/relationships" xmlns:p="http://schemas.openxmlformats.org/presentationml/2006/main">
+  <p:cSld>
+    <p:spTree>
+      <p:nvGrpSpPr>
+        <p:cNvPr id="1" name=""/>
+        <p:cNvGrpSpPr/>
+        <p:nvPr/>
+      </p:nvGrpSpPr>
+      <p:grpSpPr>
+        <a:xfrm>
+          <a:off x="0" y="0"/>
+          <a:ext cx="0" cy="0"/>
+          <a:chOff x="0" y="0"/>
+          <a:chExt cx="0" cy="0"/>
+        </a:xfrm>
+      </p:grpSpPr>
+      <p:sp>
+        <p:nvSpPr>
+          <p:cNvPr id="4" name="Título 1">
+            <a:extLst>
+              <a:ext uri="{FF2B5EF4-FFF2-40B4-BE49-F238E27FC236}">
+                <a16:creationId xmlns:a16="http://schemas.microsoft.com/office/drawing/2014/main" id="{9CA53688-E304-4704-85E6-8432DC608B05}"/>
+              </a:ext>
+            </a:extLst>
+          </p:cNvPr>
+          <p:cNvSpPr>
+            <a:spLocks noGrp="1"/>
+          </p:cNvSpPr>
+          <p:nvPr>
+            <p:ph type="title"/>
+          </p:nvPr>
+        </p:nvSpPr>
+        <p:spPr>
+          <a:xfrm>
+            <a:off x="680321" y="753228"/>
+            <a:ext cx="9613861" cy="1080938"/>
+          </a:xfrm>
+        </p:spPr>
+        <p:txBody>
+          <a:bodyPr/>
+          <a:lstStyle/>
+          <a:p>
+            <a:r>
+              <a:rPr lang="pt-BR" dirty="0"/>
+              <a:t>Criando Drives Customizados - Python</a:t>
+            </a:r>
+          </a:p>
+        </p:txBody>
+      </p:sp>
+      <p:sp>
+        <p:nvSpPr>
+          <p:cNvPr id="5" name="Espaço Reservado para Conteúdo 2">
+            <a:extLst>
+              <a:ext uri="{FF2B5EF4-FFF2-40B4-BE49-F238E27FC236}">
+                <a16:creationId xmlns:a16="http://schemas.microsoft.com/office/drawing/2014/main" id="{C5B8AB74-06FA-413C-BD74-462D1F01C8FF}"/>
+              </a:ext>
+            </a:extLst>
+          </p:cNvPr>
+          <p:cNvSpPr>
+            <a:spLocks noGrp="1"/>
+          </p:cNvSpPr>
+          <p:nvPr>
+            <p:ph idx="1"/>
+          </p:nvPr>
+        </p:nvSpPr>
+        <p:spPr>
+          <a:xfrm>
+            <a:off x="680321" y="2505456"/>
+            <a:ext cx="9484759" cy="3599316"/>
+          </a:xfrm>
+        </p:spPr>
+        <p:txBody>
+          <a:bodyPr>
+            <a:noAutofit/>
+          </a:bodyPr>
+          <a:lstStyle/>
+          <a:p>
+            <a:pPr>
+              <a:spcAft>
+                <a:spcPts val="1000"/>
+              </a:spcAft>
+            </a:pPr>
+            <a:r>
+              <a:rPr lang="pt-BR" dirty="0"/>
+              <a:t>Iremos utilizar um driver customizado em Python que irá se integrar com o Chaos </a:t>
+            </a:r>
+            <a:r>
+              <a:rPr lang="pt-BR" dirty="0" err="1"/>
+              <a:t>Monkey</a:t>
+            </a:r>
+            <a:r>
+              <a:rPr lang="pt-BR" dirty="0"/>
+              <a:t> for Spring Boot.</a:t>
+            </a:r>
+          </a:p>
+          <a:p>
+            <a:pPr>
+              <a:spcAft>
+                <a:spcPts val="1000"/>
+              </a:spcAft>
+            </a:pPr>
+            <a:r>
+              <a:rPr lang="pt-BR" dirty="0"/>
+              <a:t>O Chaos </a:t>
+            </a:r>
+            <a:r>
+              <a:rPr lang="pt-BR" dirty="0" err="1"/>
+              <a:t>Monkey</a:t>
+            </a:r>
+            <a:r>
+              <a:rPr lang="pt-BR" dirty="0"/>
+              <a:t> for Spring Boot é uma ferramenta de Chaos </a:t>
+            </a:r>
+            <a:r>
+              <a:rPr lang="pt-BR" dirty="0" err="1"/>
+              <a:t>Engineering</a:t>
+            </a:r>
+            <a:r>
+              <a:rPr lang="pt-BR" dirty="0"/>
+              <a:t> que nos permite injetar condições turbulentas em aplicações em Spring Boot.</a:t>
+            </a:r>
+          </a:p>
+          <a:p>
+            <a:pPr>
+              <a:spcAft>
+                <a:spcPts val="1000"/>
+              </a:spcAft>
+            </a:pPr>
+            <a:r>
+              <a:rPr lang="pt-BR" dirty="0"/>
+              <a:t>Iremos criar um driver que seja capaz de prover uma </a:t>
+            </a:r>
+            <a:r>
+              <a:rPr lang="pt-BR" dirty="0" err="1"/>
+              <a:t>probe</a:t>
+            </a:r>
+            <a:r>
+              <a:rPr lang="pt-BR" dirty="0"/>
+              <a:t> que responda independente da aplicação Spring Boot usada.</a:t>
+            </a:r>
+          </a:p>
+          <a:p>
+            <a:pPr>
+              <a:spcAft>
+                <a:spcPts val="1000"/>
+              </a:spcAft>
+            </a:pPr>
+            <a:r>
+              <a:rPr lang="pt-BR" dirty="0"/>
+              <a:t>Apesar de usarmos uma </a:t>
+            </a:r>
+            <a:r>
+              <a:rPr lang="pt-BR" dirty="0" err="1"/>
+              <a:t>probe</a:t>
+            </a:r>
+            <a:r>
+              <a:rPr lang="pt-BR" dirty="0"/>
+              <a:t>, o processo é bem parecido para a implementação de uma </a:t>
+            </a:r>
+            <a:r>
+              <a:rPr lang="pt-BR" dirty="0" err="1"/>
+              <a:t>action</a:t>
+            </a:r>
+            <a:r>
+              <a:rPr lang="pt-BR" dirty="0"/>
+              <a:t>.</a:t>
+            </a:r>
+          </a:p>
+        </p:txBody>
+      </p:sp>
+    </p:spTree>
+    <p:extLst>
+      <p:ext uri="{BB962C8B-B14F-4D97-AF65-F5344CB8AC3E}">
+        <p14:creationId xmlns:p14="http://schemas.microsoft.com/office/powerpoint/2010/main" val="1548184176"/>
+      </p:ext>
+    </p:extLst>
+  </p:cSld>
+  <p:clrMapOvr>
+    <a:masterClrMapping/>
+  </p:clrMapOvr>
+</p:sld>
+</file>
+
+<file path=ppt/slides/slide136.xml><?xml version="1.0" encoding="utf-8"?>
+<p:sld xmlns:a="http://schemas.openxmlformats.org/drawingml/2006/main" xmlns:r="http://schemas.openxmlformats.org/officeDocument/2006/relationships" xmlns:p="http://schemas.openxmlformats.org/presentationml/2006/main">
+  <p:cSld>
+    <p:spTree>
+      <p:nvGrpSpPr>
+        <p:cNvPr id="1" name=""/>
+        <p:cNvGrpSpPr/>
+        <p:nvPr/>
+      </p:nvGrpSpPr>
+      <p:grpSpPr>
+        <a:xfrm>
+          <a:off x="0" y="0"/>
+          <a:ext cx="0" cy="0"/>
+          <a:chOff x="0" y="0"/>
+          <a:chExt cx="0" cy="0"/>
+        </a:xfrm>
+      </p:grpSpPr>
+      <p:sp>
+        <p:nvSpPr>
+          <p:cNvPr id="4" name="Título 1">
+            <a:extLst>
+              <a:ext uri="{FF2B5EF4-FFF2-40B4-BE49-F238E27FC236}">
+                <a16:creationId xmlns:a16="http://schemas.microsoft.com/office/drawing/2014/main" id="{9CA53688-E304-4704-85E6-8432DC608B05}"/>
+              </a:ext>
+            </a:extLst>
+          </p:cNvPr>
+          <p:cNvSpPr>
+            <a:spLocks noGrp="1"/>
+          </p:cNvSpPr>
+          <p:nvPr>
+            <p:ph type="title"/>
+          </p:nvPr>
+        </p:nvSpPr>
+        <p:spPr>
+          <a:xfrm>
+            <a:off x="680321" y="753228"/>
+            <a:ext cx="9613861" cy="1080938"/>
+          </a:xfrm>
+        </p:spPr>
+        <p:txBody>
+          <a:bodyPr/>
+          <a:lstStyle/>
+          <a:p>
+            <a:r>
+              <a:rPr lang="pt-BR" dirty="0"/>
+              <a:t>Criando Drives Customizados - Python</a:t>
+            </a:r>
+          </a:p>
+        </p:txBody>
+      </p:sp>
+      <p:sp>
+        <p:nvSpPr>
+          <p:cNvPr id="5" name="Espaço Reservado para Conteúdo 2">
+            <a:extLst>
+              <a:ext uri="{FF2B5EF4-FFF2-40B4-BE49-F238E27FC236}">
+                <a16:creationId xmlns:a16="http://schemas.microsoft.com/office/drawing/2014/main" id="{C5B8AB74-06FA-413C-BD74-462D1F01C8FF}"/>
+              </a:ext>
+            </a:extLst>
+          </p:cNvPr>
+          <p:cNvSpPr>
+            <a:spLocks noGrp="1"/>
+          </p:cNvSpPr>
+          <p:nvPr>
+            <p:ph idx="1"/>
+          </p:nvPr>
+        </p:nvSpPr>
+        <p:spPr>
+          <a:xfrm>
+            <a:off x="680321" y="2505456"/>
+            <a:ext cx="9484759" cy="3599316"/>
+          </a:xfrm>
+        </p:spPr>
+        <p:txBody>
+          <a:bodyPr>
+            <a:noAutofit/>
+          </a:bodyPr>
+          <a:lstStyle/>
+          <a:p>
+            <a:pPr>
+              <a:spcAft>
+                <a:spcPts val="1000"/>
+              </a:spcAft>
+            </a:pPr>
+            <a:r>
+              <a:rPr lang="pt-BR" dirty="0"/>
+              <a:t>Uma </a:t>
+            </a:r>
+            <a:r>
+              <a:rPr lang="pt-BR" dirty="0" err="1"/>
+              <a:t>probe</a:t>
+            </a:r>
+            <a:r>
+              <a:rPr lang="pt-BR" dirty="0"/>
+              <a:t> é chamada para inspecionar uma certa propriedade do sistema e uma </a:t>
+            </a:r>
+            <a:r>
+              <a:rPr lang="pt-BR" dirty="0" err="1"/>
+              <a:t>action</a:t>
+            </a:r>
+            <a:r>
+              <a:rPr lang="pt-BR" dirty="0"/>
+              <a:t> é chamada para injetar uma condição turbulenta no mesmo.</a:t>
+            </a:r>
+          </a:p>
+          <a:p>
+            <a:pPr>
+              <a:spcAft>
+                <a:spcPts val="1000"/>
+              </a:spcAft>
+            </a:pPr>
+            <a:r>
+              <a:rPr lang="pt-BR" dirty="0"/>
+              <a:t>Criação do Driver Python Customizado:</a:t>
+            </a:r>
+          </a:p>
+          <a:p>
+            <a:pPr lvl="1">
+              <a:spcAft>
+                <a:spcPts val="1000"/>
+              </a:spcAft>
+            </a:pPr>
+            <a:r>
+              <a:rPr lang="pt-BR" dirty="0"/>
+              <a:t>Primeiro, iremos criar um módulo para a nossa extensão Python</a:t>
+            </a:r>
+          </a:p>
+          <a:p>
+            <a:pPr lvl="1">
+              <a:spcAft>
+                <a:spcPts val="1000"/>
+              </a:spcAft>
+            </a:pPr>
+            <a:r>
+              <a:rPr lang="pt-BR" dirty="0"/>
+              <a:t>Podemos realizar este passo manualmente, mas iremos utilizar um </a:t>
+            </a:r>
+            <a:r>
+              <a:rPr lang="pt-BR" dirty="0" err="1"/>
+              <a:t>template</a:t>
+            </a:r>
+            <a:r>
+              <a:rPr lang="pt-BR" dirty="0"/>
+              <a:t> para isto.</a:t>
+            </a:r>
+          </a:p>
+          <a:p>
+            <a:pPr lvl="1">
+              <a:spcAft>
+                <a:spcPts val="1000"/>
+              </a:spcAft>
+            </a:pPr>
+            <a:r>
+              <a:rPr lang="pt-BR" dirty="0"/>
+              <a:t>Com o seguinte comando instalaremos o Python </a:t>
+            </a:r>
+            <a:r>
+              <a:rPr lang="pt-BR" dirty="0" err="1"/>
+              <a:t>Cookiecutter</a:t>
+            </a:r>
+            <a:r>
+              <a:rPr lang="pt-BR" dirty="0"/>
+              <a:t>:</a:t>
+            </a:r>
+            <a:br>
+              <a:rPr lang="pt-BR" dirty="0"/>
+            </a:br>
+            <a:r>
+              <a:rPr lang="pt-BR" dirty="0">
+                <a:highlight>
+                  <a:srgbClr val="000000"/>
+                </a:highlight>
+              </a:rPr>
+              <a:t>(</a:t>
+            </a:r>
+            <a:r>
+              <a:rPr lang="pt-BR" dirty="0" err="1">
+                <a:highlight>
+                  <a:srgbClr val="000000"/>
+                </a:highlight>
+              </a:rPr>
+              <a:t>chaostk</a:t>
+            </a:r>
+            <a:r>
+              <a:rPr lang="pt-BR" dirty="0">
+                <a:highlight>
+                  <a:srgbClr val="000000"/>
+                </a:highlight>
+              </a:rPr>
+              <a:t>) $ </a:t>
+            </a:r>
+            <a:r>
+              <a:rPr lang="pt-BR" dirty="0" err="1">
+                <a:highlight>
+                  <a:srgbClr val="000000"/>
+                </a:highlight>
+              </a:rPr>
+              <a:t>pip</a:t>
+            </a:r>
+            <a:r>
+              <a:rPr lang="pt-BR" dirty="0">
+                <a:highlight>
+                  <a:srgbClr val="000000"/>
+                </a:highlight>
+              </a:rPr>
+              <a:t> </a:t>
+            </a:r>
+            <a:r>
+              <a:rPr lang="pt-BR" dirty="0" err="1">
+                <a:highlight>
+                  <a:srgbClr val="000000"/>
+                </a:highlight>
+              </a:rPr>
+              <a:t>install</a:t>
+            </a:r>
+            <a:r>
+              <a:rPr lang="pt-BR" dirty="0">
+                <a:highlight>
+                  <a:srgbClr val="000000"/>
+                </a:highlight>
+              </a:rPr>
+              <a:t> </a:t>
+            </a:r>
+            <a:r>
+              <a:rPr lang="pt-BR" dirty="0" err="1">
+                <a:highlight>
+                  <a:srgbClr val="000000"/>
+                </a:highlight>
+              </a:rPr>
+              <a:t>cookiecutter</a:t>
+            </a:r>
+            <a:endParaRPr lang="pt-BR" dirty="0">
+              <a:highlight>
+                <a:srgbClr val="000000"/>
+              </a:highlight>
+            </a:endParaRPr>
+          </a:p>
+          <a:p>
+            <a:pPr lvl="1">
+              <a:spcAft>
+                <a:spcPts val="1000"/>
+              </a:spcAft>
+            </a:pPr>
+            <a:endParaRPr lang="pt-BR" dirty="0"/>
+          </a:p>
+        </p:txBody>
+      </p:sp>
+    </p:spTree>
+    <p:extLst>
+      <p:ext uri="{BB962C8B-B14F-4D97-AF65-F5344CB8AC3E}">
+        <p14:creationId xmlns:p14="http://schemas.microsoft.com/office/powerpoint/2010/main" val="1005985490"/>
+      </p:ext>
+    </p:extLst>
+  </p:cSld>
+  <p:clrMapOvr>
+    <a:masterClrMapping/>
+  </p:clrMapOvr>
+</p:sld>
+</file>
+
+<file path=ppt/slides/slide137.xml><?xml version="1.0" encoding="utf-8"?>
+<p:sld xmlns:a="http://schemas.openxmlformats.org/drawingml/2006/main" xmlns:r="http://schemas.openxmlformats.org/officeDocument/2006/relationships" xmlns:p="http://schemas.openxmlformats.org/presentationml/2006/main">
+  <p:cSld>
+    <p:spTree>
+      <p:nvGrpSpPr>
+        <p:cNvPr id="1" name=""/>
+        <p:cNvGrpSpPr/>
+        <p:nvPr/>
+      </p:nvGrpSpPr>
+      <p:grpSpPr>
+        <a:xfrm>
+          <a:off x="0" y="0"/>
+          <a:ext cx="0" cy="0"/>
+          <a:chOff x="0" y="0"/>
+          <a:chExt cx="0" cy="0"/>
+        </a:xfrm>
+      </p:grpSpPr>
+      <p:sp>
+        <p:nvSpPr>
+          <p:cNvPr id="4" name="Título 1">
+            <a:extLst>
+              <a:ext uri="{FF2B5EF4-FFF2-40B4-BE49-F238E27FC236}">
+                <a16:creationId xmlns:a16="http://schemas.microsoft.com/office/drawing/2014/main" id="{9CA53688-E304-4704-85E6-8432DC608B05}"/>
+              </a:ext>
+            </a:extLst>
+          </p:cNvPr>
+          <p:cNvSpPr>
+            <a:spLocks noGrp="1"/>
+          </p:cNvSpPr>
+          <p:nvPr>
+            <p:ph type="title"/>
+          </p:nvPr>
+        </p:nvSpPr>
+        <p:spPr>
+          <a:xfrm>
+            <a:off x="680321" y="753228"/>
+            <a:ext cx="9613861" cy="1080938"/>
+          </a:xfrm>
+        </p:spPr>
+        <p:txBody>
+          <a:bodyPr/>
+          <a:lstStyle/>
+          <a:p>
+            <a:r>
+              <a:rPr lang="pt-BR" dirty="0"/>
+              <a:t>Criando Drives Customizados - Python</a:t>
+            </a:r>
+          </a:p>
+        </p:txBody>
+      </p:sp>
+      <p:sp>
+        <p:nvSpPr>
+          <p:cNvPr id="5" name="Espaço Reservado para Conteúdo 2">
+            <a:extLst>
+              <a:ext uri="{FF2B5EF4-FFF2-40B4-BE49-F238E27FC236}">
+                <a16:creationId xmlns:a16="http://schemas.microsoft.com/office/drawing/2014/main" id="{C5B8AB74-06FA-413C-BD74-462D1F01C8FF}"/>
+              </a:ext>
+            </a:extLst>
+          </p:cNvPr>
+          <p:cNvSpPr>
+            <a:spLocks noGrp="1"/>
+          </p:cNvSpPr>
+          <p:nvPr>
+            <p:ph idx="1"/>
+          </p:nvPr>
+        </p:nvSpPr>
+        <p:spPr>
+          <a:xfrm>
+            <a:off x="680321" y="2505456"/>
+            <a:ext cx="9484759" cy="3599316"/>
+          </a:xfrm>
+        </p:spPr>
+        <p:txBody>
+          <a:bodyPr>
+            <a:noAutofit/>
+          </a:bodyPr>
+          <a:lstStyle/>
+          <a:p>
+            <a:pPr>
+              <a:spcAft>
+                <a:spcPts val="1000"/>
+              </a:spcAft>
+            </a:pPr>
+            <a:r>
+              <a:rPr lang="pt-BR" dirty="0"/>
+              <a:t>Criação do Driver Python Customizado:</a:t>
+            </a:r>
+          </a:p>
+          <a:p>
+            <a:pPr lvl="1">
+              <a:spcAft>
+                <a:spcPts val="1000"/>
+              </a:spcAft>
+            </a:pPr>
+            <a:r>
+              <a:rPr lang="pt-BR" dirty="0"/>
+              <a:t>Agora criaremos um novo módulo chamado </a:t>
+            </a:r>
+            <a:r>
+              <a:rPr lang="pt-BR" dirty="0" err="1"/>
+              <a:t>chaosmonkeylite</a:t>
+            </a:r>
+            <a:endParaRPr lang="pt-BR" dirty="0"/>
+          </a:p>
+          <a:p>
+            <a:pPr lvl="1">
+              <a:spcAft>
+                <a:spcPts val="1000"/>
+              </a:spcAft>
+            </a:pPr>
+            <a:endParaRPr lang="pt-BR" dirty="0"/>
+          </a:p>
+          <a:p>
+            <a:pPr lvl="1">
+              <a:spcAft>
+                <a:spcPts val="1000"/>
+              </a:spcAft>
+            </a:pPr>
+            <a:endParaRPr lang="pt-BR" dirty="0"/>
+          </a:p>
+          <a:p>
+            <a:pPr lvl="1">
+              <a:spcAft>
+                <a:spcPts val="1000"/>
+              </a:spcAft>
+            </a:pPr>
+            <a:endParaRPr lang="pt-BR" dirty="0"/>
+          </a:p>
+          <a:p>
+            <a:pPr lvl="1">
+              <a:spcAft>
+                <a:spcPts val="1000"/>
+              </a:spcAft>
+            </a:pPr>
+            <a:endParaRPr lang="pt-BR" dirty="0"/>
+          </a:p>
+          <a:p>
+            <a:pPr lvl="1">
+              <a:spcAft>
+                <a:spcPts val="1000"/>
+              </a:spcAft>
+            </a:pPr>
+            <a:r>
+              <a:rPr lang="pt-BR" dirty="0"/>
+              <a:t>Se tudo ocorreu bem, poderemos listar o conteúdo do diretório atual do nosso projeto.</a:t>
+            </a:r>
+          </a:p>
+        </p:txBody>
+      </p:sp>
+      <p:pic>
+        <p:nvPicPr>
+          <p:cNvPr id="3" name="Imagem 2" descr="Foto em preto e branco&#10;&#10;Descrição gerada automaticamente">
+            <a:extLst>
+              <a:ext uri="{FF2B5EF4-FFF2-40B4-BE49-F238E27FC236}">
+                <a16:creationId xmlns:a16="http://schemas.microsoft.com/office/drawing/2014/main" id="{F43FD92B-042C-4D9A-8AFD-EA308E33DC34}"/>
+              </a:ext>
+            </a:extLst>
+          </p:cNvPr>
+          <p:cNvPicPr>
+            <a:picLocks noChangeAspect="1"/>
+          </p:cNvPicPr>
+          <p:nvPr/>
+        </p:nvPicPr>
+        <p:blipFill>
+          <a:blip r:embed="rId2"/>
+          <a:stretch>
+            <a:fillRect/>
+          </a:stretch>
+        </p:blipFill>
+        <p:spPr>
+          <a:xfrm>
+            <a:off x="2785299" y="3429000"/>
+            <a:ext cx="6621401" cy="1840525"/>
+          </a:xfrm>
+          <a:prstGeom prst="rect">
+            <a:avLst/>
+          </a:prstGeom>
+        </p:spPr>
+      </p:pic>
+    </p:spTree>
+    <p:extLst>
+      <p:ext uri="{BB962C8B-B14F-4D97-AF65-F5344CB8AC3E}">
+        <p14:creationId xmlns:p14="http://schemas.microsoft.com/office/powerpoint/2010/main" val="2896286038"/>
+      </p:ext>
+    </p:extLst>
+  </p:cSld>
+  <p:clrMapOvr>
+    <a:masterClrMapping/>
+  </p:clrMapOvr>
+</p:sld>
+</file>
+
+<file path=ppt/slides/slide138.xml><?xml version="1.0" encoding="utf-8"?>
+<p:sld xmlns:a="http://schemas.openxmlformats.org/drawingml/2006/main" xmlns:r="http://schemas.openxmlformats.org/officeDocument/2006/relationships" xmlns:p="http://schemas.openxmlformats.org/presentationml/2006/main">
+  <p:cSld>
+    <p:spTree>
+      <p:nvGrpSpPr>
+        <p:cNvPr id="1" name=""/>
+        <p:cNvGrpSpPr/>
+        <p:nvPr/>
+      </p:nvGrpSpPr>
+      <p:grpSpPr>
+        <a:xfrm>
+          <a:off x="0" y="0"/>
+          <a:ext cx="0" cy="0"/>
+          <a:chOff x="0" y="0"/>
+          <a:chExt cx="0" cy="0"/>
+        </a:xfrm>
+      </p:grpSpPr>
+      <p:sp>
+        <p:nvSpPr>
+          <p:cNvPr id="4" name="Título 1">
+            <a:extLst>
+              <a:ext uri="{FF2B5EF4-FFF2-40B4-BE49-F238E27FC236}">
+                <a16:creationId xmlns:a16="http://schemas.microsoft.com/office/drawing/2014/main" id="{9CA53688-E304-4704-85E6-8432DC608B05}"/>
+              </a:ext>
+            </a:extLst>
+          </p:cNvPr>
+          <p:cNvSpPr>
+            <a:spLocks noGrp="1"/>
+          </p:cNvSpPr>
+          <p:nvPr>
+            <p:ph type="title"/>
+          </p:nvPr>
+        </p:nvSpPr>
+        <p:spPr>
+          <a:xfrm>
+            <a:off x="680321" y="753228"/>
+            <a:ext cx="9613861" cy="1080938"/>
+          </a:xfrm>
+        </p:spPr>
+        <p:txBody>
+          <a:bodyPr/>
+          <a:lstStyle/>
+          <a:p>
+            <a:r>
+              <a:rPr lang="pt-BR" dirty="0"/>
+              <a:t>Criando Drives Customizados - Python</a:t>
+            </a:r>
+          </a:p>
+        </p:txBody>
+      </p:sp>
+      <p:sp>
+        <p:nvSpPr>
+          <p:cNvPr id="5" name="Espaço Reservado para Conteúdo 2">
+            <a:extLst>
+              <a:ext uri="{FF2B5EF4-FFF2-40B4-BE49-F238E27FC236}">
+                <a16:creationId xmlns:a16="http://schemas.microsoft.com/office/drawing/2014/main" id="{C5B8AB74-06FA-413C-BD74-462D1F01C8FF}"/>
+              </a:ext>
+            </a:extLst>
+          </p:cNvPr>
+          <p:cNvSpPr>
+            <a:spLocks noGrp="1"/>
+          </p:cNvSpPr>
+          <p:nvPr>
+            <p:ph idx="1"/>
+          </p:nvPr>
+        </p:nvSpPr>
+        <p:spPr>
+          <a:xfrm>
+            <a:off x="680321" y="2505456"/>
+            <a:ext cx="9484759" cy="3599316"/>
+          </a:xfrm>
+        </p:spPr>
+        <p:txBody>
+          <a:bodyPr>
+            <a:noAutofit/>
+          </a:bodyPr>
+          <a:lstStyle/>
+          <a:p>
+            <a:pPr>
+              <a:spcAft>
+                <a:spcPts val="1000"/>
+              </a:spcAft>
+            </a:pPr>
+            <a:r>
+              <a:rPr lang="pt-BR" dirty="0"/>
+              <a:t>Criação do Driver Python Customizado:</a:t>
+            </a:r>
+          </a:p>
+          <a:p>
+            <a:pPr lvl="1">
+              <a:spcBef>
+                <a:spcPts val="1000"/>
+              </a:spcBef>
+              <a:spcAft>
+                <a:spcPts val="1000"/>
+              </a:spcAft>
+            </a:pPr>
+            <a:r>
+              <a:rPr lang="pt-BR" dirty="0"/>
+              <a:t>Agora iremos entrar no diretório </a:t>
+            </a:r>
+            <a:r>
+              <a:rPr lang="pt-BR" dirty="0" err="1"/>
+              <a:t>chaostoolkit</a:t>
+            </a:r>
+            <a:r>
+              <a:rPr lang="pt-BR" dirty="0"/>
+              <a:t>-</a:t>
+            </a:r>
+            <a:br>
+              <a:rPr lang="pt-BR" dirty="0"/>
+            </a:br>
+            <a:r>
+              <a:rPr lang="pt-BR" dirty="0" err="1"/>
+              <a:t>chaosmonkeylite</a:t>
+            </a:r>
+            <a:r>
+              <a:rPr lang="pt-BR" dirty="0"/>
+              <a:t> e instalar o módulo vazio da nossa </a:t>
+            </a:r>
+            <a:br>
+              <a:rPr lang="pt-BR" dirty="0"/>
+            </a:br>
+            <a:r>
+              <a:rPr lang="pt-BR" dirty="0"/>
+              <a:t>extensão.</a:t>
+            </a:r>
+          </a:p>
+          <a:p>
+            <a:pPr lvl="1">
+              <a:spcBef>
+                <a:spcPts val="1000"/>
+              </a:spcBef>
+              <a:spcAft>
+                <a:spcPts val="1000"/>
+              </a:spcAft>
+            </a:pPr>
+            <a:r>
+              <a:rPr lang="pt-BR" dirty="0"/>
+              <a:t>Após a instalação o módulo estará pronto para o </a:t>
+            </a:r>
+            <a:br>
+              <a:rPr lang="pt-BR" dirty="0"/>
+            </a:br>
+            <a:r>
+              <a:rPr lang="pt-BR" dirty="0"/>
+              <a:t>desenvolvimento e teste.</a:t>
+            </a:r>
+          </a:p>
+          <a:p>
+            <a:pPr lvl="1">
+              <a:spcAft>
+                <a:spcPts val="1000"/>
+              </a:spcAft>
+            </a:pPr>
+            <a:r>
+              <a:rPr lang="pt-BR" dirty="0"/>
+              <a:t>Comandos:</a:t>
+            </a:r>
+            <a:br>
+              <a:rPr lang="pt-BR" dirty="0"/>
+            </a:br>
+            <a:r>
+              <a:rPr lang="pt-BR" dirty="0">
+                <a:highlight>
+                  <a:srgbClr val="000000"/>
+                </a:highlight>
+              </a:rPr>
+              <a:t>(</a:t>
+            </a:r>
+            <a:r>
+              <a:rPr lang="pt-BR" dirty="0" err="1">
+                <a:highlight>
+                  <a:srgbClr val="000000"/>
+                </a:highlight>
+              </a:rPr>
+              <a:t>chaostk</a:t>
+            </a:r>
+            <a:r>
+              <a:rPr lang="pt-BR" dirty="0">
+                <a:highlight>
+                  <a:srgbClr val="000000"/>
+                </a:highlight>
+              </a:rPr>
+              <a:t>) $ </a:t>
+            </a:r>
+            <a:r>
+              <a:rPr lang="pt-BR" dirty="0" err="1">
+                <a:highlight>
+                  <a:srgbClr val="000000"/>
+                </a:highlight>
+              </a:rPr>
+              <a:t>cd</a:t>
+            </a:r>
+            <a:r>
+              <a:rPr lang="pt-BR" dirty="0">
+                <a:highlight>
+                  <a:srgbClr val="000000"/>
+                </a:highlight>
+              </a:rPr>
+              <a:t> </a:t>
+            </a:r>
+            <a:r>
+              <a:rPr lang="pt-BR" dirty="0" err="1">
+                <a:highlight>
+                  <a:srgbClr val="000000"/>
+                </a:highlight>
+              </a:rPr>
+              <a:t>chaostoolkit-chaosmonkey</a:t>
+            </a:r>
+            <a:br>
+              <a:rPr lang="pt-BR" dirty="0">
+                <a:highlight>
+                  <a:srgbClr val="000000"/>
+                </a:highlight>
+              </a:rPr>
+            </a:br>
+            <a:r>
+              <a:rPr lang="pt-BR" dirty="0">
+                <a:highlight>
+                  <a:srgbClr val="000000"/>
+                </a:highlight>
+              </a:rPr>
+              <a:t>(</a:t>
+            </a:r>
+            <a:r>
+              <a:rPr lang="pt-BR" dirty="0" err="1">
+                <a:highlight>
+                  <a:srgbClr val="000000"/>
+                </a:highlight>
+              </a:rPr>
+              <a:t>chaostk</a:t>
+            </a:r>
+            <a:r>
+              <a:rPr lang="pt-BR" dirty="0">
+                <a:highlight>
+                  <a:srgbClr val="000000"/>
+                </a:highlight>
+              </a:rPr>
+              <a:t>) $ </a:t>
+            </a:r>
+            <a:r>
+              <a:rPr lang="pt-BR" dirty="0" err="1">
+                <a:highlight>
+                  <a:srgbClr val="000000"/>
+                </a:highlight>
+              </a:rPr>
+              <a:t>pip</a:t>
+            </a:r>
+            <a:r>
+              <a:rPr lang="pt-BR" dirty="0">
+                <a:highlight>
+                  <a:srgbClr val="000000"/>
+                </a:highlight>
+              </a:rPr>
+              <a:t> </a:t>
+            </a:r>
+            <a:r>
+              <a:rPr lang="pt-BR" dirty="0" err="1">
+                <a:highlight>
+                  <a:srgbClr val="000000"/>
+                </a:highlight>
+              </a:rPr>
+              <a:t>install</a:t>
+            </a:r>
+            <a:r>
+              <a:rPr lang="pt-BR" dirty="0">
+                <a:highlight>
+                  <a:srgbClr val="000000"/>
+                </a:highlight>
+              </a:rPr>
+              <a:t> -r requirements-dev.txt -r requirements.txt</a:t>
+            </a:r>
+          </a:p>
+          <a:p>
+            <a:pPr lvl="1">
+              <a:spcAft>
+                <a:spcPts val="1000"/>
+              </a:spcAft>
+            </a:pPr>
+            <a:endParaRPr lang="pt-BR" dirty="0"/>
+          </a:p>
+          <a:p>
+            <a:pPr lvl="1">
+              <a:spcAft>
+                <a:spcPts val="1000"/>
+              </a:spcAft>
+            </a:pPr>
+            <a:endParaRPr lang="pt-BR" dirty="0"/>
+          </a:p>
+          <a:p>
+            <a:pPr lvl="1">
+              <a:spcAft>
+                <a:spcPts val="1000"/>
+              </a:spcAft>
+            </a:pPr>
+            <a:endParaRPr lang="pt-BR" dirty="0"/>
+          </a:p>
+        </p:txBody>
+      </p:sp>
+      <p:pic>
+        <p:nvPicPr>
+          <p:cNvPr id="3" name="Imagem 2" descr="Tela de celular com texto preto sobre fundo branco&#10;&#10;Descrição gerada automaticamente">
+            <a:extLst>
+              <a:ext uri="{FF2B5EF4-FFF2-40B4-BE49-F238E27FC236}">
+                <a16:creationId xmlns:a16="http://schemas.microsoft.com/office/drawing/2014/main" id="{A0BBF474-390D-4B51-B81D-C057DF9909F3}"/>
+              </a:ext>
+            </a:extLst>
+          </p:cNvPr>
+          <p:cNvPicPr>
+            <a:picLocks noChangeAspect="1"/>
+          </p:cNvPicPr>
+          <p:nvPr/>
+        </p:nvPicPr>
+        <p:blipFill>
+          <a:blip r:embed="rId2"/>
+          <a:stretch>
+            <a:fillRect/>
+          </a:stretch>
+        </p:blipFill>
+        <p:spPr>
+          <a:xfrm>
+            <a:off x="8368422" y="2712720"/>
+            <a:ext cx="3180919" cy="2497957"/>
+          </a:xfrm>
+          <a:prstGeom prst="rect">
+            <a:avLst/>
+          </a:prstGeom>
+        </p:spPr>
+      </p:pic>
+    </p:spTree>
+    <p:extLst>
+      <p:ext uri="{BB962C8B-B14F-4D97-AF65-F5344CB8AC3E}">
+        <p14:creationId xmlns:p14="http://schemas.microsoft.com/office/powerpoint/2010/main" val="1702437384"/>
+      </p:ext>
+    </p:extLst>
+  </p:cSld>
+  <p:clrMapOvr>
+    <a:masterClrMapping/>
+  </p:clrMapOvr>
+</p:sld>
+</file>
+
+<file path=ppt/slides/slide139.xml><?xml version="1.0" encoding="utf-8"?>
+<p:sld xmlns:a="http://schemas.openxmlformats.org/drawingml/2006/main" xmlns:r="http://schemas.openxmlformats.org/officeDocument/2006/relationships" xmlns:p="http://schemas.openxmlformats.org/presentationml/2006/main">
+  <p:cSld>
+    <p:spTree>
+      <p:nvGrpSpPr>
+        <p:cNvPr id="1" name=""/>
+        <p:cNvGrpSpPr/>
+        <p:nvPr/>
+      </p:nvGrpSpPr>
+      <p:grpSpPr>
+        <a:xfrm>
+          <a:off x="0" y="0"/>
+          <a:ext cx="0" cy="0"/>
+          <a:chOff x="0" y="0"/>
+          <a:chExt cx="0" cy="0"/>
+        </a:xfrm>
+      </p:grpSpPr>
+      <p:sp>
+        <p:nvSpPr>
+          <p:cNvPr id="4" name="Título 1">
+            <a:extLst>
+              <a:ext uri="{FF2B5EF4-FFF2-40B4-BE49-F238E27FC236}">
+                <a16:creationId xmlns:a16="http://schemas.microsoft.com/office/drawing/2014/main" id="{9CA53688-E304-4704-85E6-8432DC608B05}"/>
+              </a:ext>
+            </a:extLst>
+          </p:cNvPr>
+          <p:cNvSpPr>
+            <a:spLocks noGrp="1"/>
+          </p:cNvSpPr>
+          <p:nvPr>
+            <p:ph type="title"/>
+          </p:nvPr>
+        </p:nvSpPr>
+        <p:spPr>
+          <a:xfrm>
+            <a:off x="680321" y="753228"/>
+            <a:ext cx="9613861" cy="1080938"/>
+          </a:xfrm>
+        </p:spPr>
+        <p:txBody>
+          <a:bodyPr/>
+          <a:lstStyle/>
+          <a:p>
+            <a:r>
+              <a:rPr lang="pt-BR" dirty="0"/>
+              <a:t>Criando Drives Customizados - Python</a:t>
+            </a:r>
+          </a:p>
+        </p:txBody>
+      </p:sp>
+      <p:sp>
+        <p:nvSpPr>
+          <p:cNvPr id="5" name="Espaço Reservado para Conteúdo 2">
+            <a:extLst>
+              <a:ext uri="{FF2B5EF4-FFF2-40B4-BE49-F238E27FC236}">
+                <a16:creationId xmlns:a16="http://schemas.microsoft.com/office/drawing/2014/main" id="{C5B8AB74-06FA-413C-BD74-462D1F01C8FF}"/>
+              </a:ext>
+            </a:extLst>
+          </p:cNvPr>
+          <p:cNvSpPr>
+            <a:spLocks noGrp="1"/>
+          </p:cNvSpPr>
+          <p:nvPr>
+            <p:ph idx="1"/>
+          </p:nvPr>
+        </p:nvSpPr>
+        <p:spPr>
+          <a:xfrm>
+            <a:off x="680321" y="2505456"/>
+            <a:ext cx="9484759" cy="3599316"/>
+          </a:xfrm>
+        </p:spPr>
+        <p:txBody>
+          <a:bodyPr>
+            <a:noAutofit/>
+          </a:bodyPr>
+          <a:lstStyle/>
+          <a:p>
+            <a:pPr>
+              <a:spcAft>
+                <a:spcPts val="1000"/>
+              </a:spcAft>
+            </a:pPr>
+            <a:r>
+              <a:rPr lang="pt-BR" dirty="0"/>
+              <a:t>Criação do Driver Python Customizado:</a:t>
+            </a:r>
+          </a:p>
+          <a:p>
+            <a:pPr lvl="1">
+              <a:spcBef>
+                <a:spcPts val="1000"/>
+              </a:spcBef>
+              <a:spcAft>
+                <a:spcPts val="1000"/>
+              </a:spcAft>
+            </a:pPr>
+            <a:r>
+              <a:rPr lang="pt-BR" dirty="0"/>
+              <a:t>Comandos:</a:t>
+            </a:r>
+            <a:br>
+              <a:rPr lang="pt-BR" dirty="0"/>
+            </a:br>
+            <a:r>
+              <a:rPr lang="pt-BR" dirty="0">
+                <a:highlight>
+                  <a:srgbClr val="000000"/>
+                </a:highlight>
+              </a:rPr>
+              <a:t>(</a:t>
+            </a:r>
+            <a:r>
+              <a:rPr lang="pt-BR" dirty="0" err="1">
+                <a:highlight>
+                  <a:srgbClr val="000000"/>
+                </a:highlight>
+              </a:rPr>
+              <a:t>chaostk</a:t>
+            </a:r>
+            <a:r>
+              <a:rPr lang="pt-BR" dirty="0">
+                <a:highlight>
+                  <a:srgbClr val="000000"/>
+                </a:highlight>
+              </a:rPr>
+              <a:t>) $ </a:t>
+            </a:r>
+            <a:r>
+              <a:rPr lang="pt-BR" dirty="0" err="1">
+                <a:highlight>
+                  <a:srgbClr val="000000"/>
+                </a:highlight>
+              </a:rPr>
+              <a:t>pip</a:t>
+            </a:r>
+            <a:r>
+              <a:rPr lang="pt-BR" dirty="0">
+                <a:highlight>
+                  <a:srgbClr val="000000"/>
+                </a:highlight>
+              </a:rPr>
+              <a:t> </a:t>
+            </a:r>
+            <a:r>
+              <a:rPr lang="pt-BR" dirty="0" err="1">
+                <a:highlight>
+                  <a:srgbClr val="000000"/>
+                </a:highlight>
+              </a:rPr>
+              <a:t>install</a:t>
+            </a:r>
+            <a:r>
+              <a:rPr lang="pt-BR" dirty="0">
+                <a:highlight>
+                  <a:srgbClr val="000000"/>
+                </a:highlight>
+              </a:rPr>
+              <a:t> -e .</a:t>
+            </a:r>
+          </a:p>
+          <a:p>
+            <a:pPr marL="457200" lvl="1" indent="0">
+              <a:spcBef>
+                <a:spcPts val="1000"/>
+              </a:spcBef>
+              <a:spcAft>
+                <a:spcPts val="1000"/>
+              </a:spcAft>
+              <a:buNone/>
+            </a:pPr>
+            <a:endParaRPr lang="pt-BR" dirty="0">
+              <a:highlight>
+                <a:srgbClr val="000000"/>
+              </a:highlight>
+            </a:endParaRPr>
+          </a:p>
+        </p:txBody>
+      </p:sp>
+      <p:pic>
+        <p:nvPicPr>
+          <p:cNvPr id="3" name="Imagem 2" descr="Uma imagem contendo screenshot, pássaro&#10;&#10;Descrição gerada automaticamente">
+            <a:extLst>
+              <a:ext uri="{FF2B5EF4-FFF2-40B4-BE49-F238E27FC236}">
+                <a16:creationId xmlns:a16="http://schemas.microsoft.com/office/drawing/2014/main" id="{5A0B9004-EBEE-489A-B228-2C9382031C5F}"/>
+              </a:ext>
+            </a:extLst>
+          </p:cNvPr>
+          <p:cNvPicPr>
+            <a:picLocks noChangeAspect="1"/>
+          </p:cNvPicPr>
+          <p:nvPr/>
+        </p:nvPicPr>
+        <p:blipFill>
+          <a:blip r:embed="rId2"/>
+          <a:stretch>
+            <a:fillRect/>
+          </a:stretch>
+        </p:blipFill>
+        <p:spPr>
+          <a:xfrm>
+            <a:off x="1451230" y="3813557"/>
+            <a:ext cx="6885050" cy="1203680"/>
+          </a:xfrm>
+          <a:prstGeom prst="rect">
+            <a:avLst/>
+          </a:prstGeom>
+        </p:spPr>
+      </p:pic>
+      <p:pic>
+        <p:nvPicPr>
+          <p:cNvPr id="9" name="Imagem 8" descr="Uma imagem contendo pássaro&#10;&#10;Descrição gerada automaticamente">
+            <a:extLst>
+              <a:ext uri="{FF2B5EF4-FFF2-40B4-BE49-F238E27FC236}">
+                <a16:creationId xmlns:a16="http://schemas.microsoft.com/office/drawing/2014/main" id="{30F96587-50EE-42B1-B6FE-F58C5FEB910F}"/>
+              </a:ext>
+            </a:extLst>
+          </p:cNvPr>
+          <p:cNvPicPr>
+            <a:picLocks noChangeAspect="1"/>
+          </p:cNvPicPr>
+          <p:nvPr/>
+        </p:nvPicPr>
+        <p:blipFill>
+          <a:blip r:embed="rId3"/>
+          <a:stretch>
+            <a:fillRect/>
+          </a:stretch>
+        </p:blipFill>
+        <p:spPr>
+          <a:xfrm>
+            <a:off x="1451230" y="5113267"/>
+            <a:ext cx="6885050" cy="1161930"/>
+          </a:xfrm>
+          <a:prstGeom prst="rect">
+            <a:avLst/>
+          </a:prstGeom>
+        </p:spPr>
+      </p:pic>
+    </p:spTree>
+    <p:extLst>
+      <p:ext uri="{BB962C8B-B14F-4D97-AF65-F5344CB8AC3E}">
+        <p14:creationId xmlns:p14="http://schemas.microsoft.com/office/powerpoint/2010/main" val="2398262787"/>
       </p:ext>
     </p:extLst>
   </p:cSld>
@@ -14200,6 +16133,2079 @@
 </p:sld>
 </file>
 
+<file path=ppt/slides/slide140.xml><?xml version="1.0" encoding="utf-8"?>
+<p:sld xmlns:a="http://schemas.openxmlformats.org/drawingml/2006/main" xmlns:r="http://schemas.openxmlformats.org/officeDocument/2006/relationships" xmlns:p="http://schemas.openxmlformats.org/presentationml/2006/main">
+  <p:cSld>
+    <p:spTree>
+      <p:nvGrpSpPr>
+        <p:cNvPr id="1" name=""/>
+        <p:cNvGrpSpPr/>
+        <p:nvPr/>
+      </p:nvGrpSpPr>
+      <p:grpSpPr>
+        <a:xfrm>
+          <a:off x="0" y="0"/>
+          <a:ext cx="0" cy="0"/>
+          <a:chOff x="0" y="0"/>
+          <a:chExt cx="0" cy="0"/>
+        </a:xfrm>
+      </p:grpSpPr>
+      <p:sp>
+        <p:nvSpPr>
+          <p:cNvPr id="4" name="Título 1">
+            <a:extLst>
+              <a:ext uri="{FF2B5EF4-FFF2-40B4-BE49-F238E27FC236}">
+                <a16:creationId xmlns:a16="http://schemas.microsoft.com/office/drawing/2014/main" id="{9CA53688-E304-4704-85E6-8432DC608B05}"/>
+              </a:ext>
+            </a:extLst>
+          </p:cNvPr>
+          <p:cNvSpPr>
+            <a:spLocks noGrp="1"/>
+          </p:cNvSpPr>
+          <p:nvPr>
+            <p:ph type="title"/>
+          </p:nvPr>
+        </p:nvSpPr>
+        <p:spPr>
+          <a:xfrm>
+            <a:off x="680321" y="753228"/>
+            <a:ext cx="9613861" cy="1080938"/>
+          </a:xfrm>
+        </p:spPr>
+        <p:txBody>
+          <a:bodyPr/>
+          <a:lstStyle/>
+          <a:p>
+            <a:r>
+              <a:rPr lang="pt-BR" dirty="0"/>
+              <a:t>Criando Drives Customizados - Python</a:t>
+            </a:r>
+          </a:p>
+        </p:txBody>
+      </p:sp>
+      <p:sp>
+        <p:nvSpPr>
+          <p:cNvPr id="5" name="Espaço Reservado para Conteúdo 2">
+            <a:extLst>
+              <a:ext uri="{FF2B5EF4-FFF2-40B4-BE49-F238E27FC236}">
+                <a16:creationId xmlns:a16="http://schemas.microsoft.com/office/drawing/2014/main" id="{C5B8AB74-06FA-413C-BD74-462D1F01C8FF}"/>
+              </a:ext>
+            </a:extLst>
+          </p:cNvPr>
+          <p:cNvSpPr>
+            <a:spLocks noGrp="1"/>
+          </p:cNvSpPr>
+          <p:nvPr>
+            <p:ph idx="1"/>
+          </p:nvPr>
+        </p:nvSpPr>
+        <p:spPr>
+          <a:xfrm>
+            <a:off x="680321" y="2505456"/>
+            <a:ext cx="9484759" cy="3599316"/>
+          </a:xfrm>
+        </p:spPr>
+        <p:txBody>
+          <a:bodyPr>
+            <a:noAutofit/>
+          </a:bodyPr>
+          <a:lstStyle/>
+          <a:p>
+            <a:pPr>
+              <a:spcAft>
+                <a:spcPts val="1000"/>
+              </a:spcAft>
+            </a:pPr>
+            <a:r>
+              <a:rPr lang="pt-BR" dirty="0"/>
+              <a:t>Criação do Driver Python Customizado:</a:t>
+            </a:r>
+          </a:p>
+          <a:p>
+            <a:pPr lvl="1">
+              <a:spcBef>
+                <a:spcPts val="1000"/>
+              </a:spcBef>
+              <a:spcAft>
+                <a:spcPts val="1000"/>
+              </a:spcAft>
+            </a:pPr>
+            <a:r>
+              <a:rPr lang="pt-BR" dirty="0"/>
+              <a:t>Comandos:</a:t>
+            </a:r>
+          </a:p>
+          <a:p>
+            <a:pPr lvl="1">
+              <a:spcBef>
+                <a:spcPts val="1000"/>
+              </a:spcBef>
+              <a:spcAft>
+                <a:spcPts val="1000"/>
+              </a:spcAft>
+            </a:pPr>
+            <a:endParaRPr lang="pt-BR" dirty="0"/>
+          </a:p>
+          <a:p>
+            <a:pPr lvl="1">
+              <a:spcBef>
+                <a:spcPts val="1000"/>
+              </a:spcBef>
+              <a:spcAft>
+                <a:spcPts val="1000"/>
+              </a:spcAft>
+            </a:pPr>
+            <a:endParaRPr lang="pt-BR" dirty="0"/>
+          </a:p>
+          <a:p>
+            <a:pPr lvl="1">
+              <a:spcBef>
+                <a:spcPts val="1000"/>
+              </a:spcBef>
+              <a:spcAft>
+                <a:spcPts val="1000"/>
+              </a:spcAft>
+            </a:pPr>
+            <a:endParaRPr lang="pt-BR" dirty="0"/>
+          </a:p>
+          <a:p>
+            <a:pPr lvl="1">
+              <a:spcBef>
+                <a:spcPts val="1000"/>
+              </a:spcBef>
+              <a:spcAft>
+                <a:spcPts val="1000"/>
+              </a:spcAft>
+            </a:pPr>
+            <a:r>
+              <a:rPr lang="pt-BR" dirty="0"/>
+              <a:t>Agora que temos o módulo configurado e pronto para a instalação</a:t>
+            </a:r>
+            <a:br>
+              <a:rPr lang="pt-BR" dirty="0"/>
+            </a:br>
+            <a:r>
+              <a:rPr lang="pt-BR" dirty="0"/>
+              <a:t>do Chaos Toolkit, iremos adicionar algumas Features.</a:t>
+            </a:r>
+            <a:br>
+              <a:rPr lang="pt-BR" dirty="0"/>
+            </a:br>
+            <a:endParaRPr lang="pt-BR" dirty="0"/>
+          </a:p>
+        </p:txBody>
+      </p:sp>
+      <p:pic>
+        <p:nvPicPr>
+          <p:cNvPr id="6" name="Imagem 5" descr="Tela de computador com texto preto sobre fundo branco&#10;&#10;Descrição gerada automaticamente">
+            <a:extLst>
+              <a:ext uri="{FF2B5EF4-FFF2-40B4-BE49-F238E27FC236}">
+                <a16:creationId xmlns:a16="http://schemas.microsoft.com/office/drawing/2014/main" id="{39BF0C0C-37D7-4ABF-8E67-5C69B3AE70B0}"/>
+              </a:ext>
+            </a:extLst>
+          </p:cNvPr>
+          <p:cNvPicPr>
+            <a:picLocks noChangeAspect="1"/>
+          </p:cNvPicPr>
+          <p:nvPr/>
+        </p:nvPicPr>
+        <p:blipFill>
+          <a:blip r:embed="rId2"/>
+          <a:stretch>
+            <a:fillRect/>
+          </a:stretch>
+        </p:blipFill>
+        <p:spPr>
+          <a:xfrm>
+            <a:off x="1466470" y="3539237"/>
+            <a:ext cx="6046850" cy="1579808"/>
+          </a:xfrm>
+          <a:prstGeom prst="rect">
+            <a:avLst/>
+          </a:prstGeom>
+        </p:spPr>
+      </p:pic>
+    </p:spTree>
+    <p:extLst>
+      <p:ext uri="{BB962C8B-B14F-4D97-AF65-F5344CB8AC3E}">
+        <p14:creationId xmlns:p14="http://schemas.microsoft.com/office/powerpoint/2010/main" val="3259485587"/>
+      </p:ext>
+    </p:extLst>
+  </p:cSld>
+  <p:clrMapOvr>
+    <a:masterClrMapping/>
+  </p:clrMapOvr>
+</p:sld>
+</file>
+
+<file path=ppt/slides/slide141.xml><?xml version="1.0" encoding="utf-8"?>
+<p:sld xmlns:a="http://schemas.openxmlformats.org/drawingml/2006/main" xmlns:r="http://schemas.openxmlformats.org/officeDocument/2006/relationships" xmlns:p="http://schemas.openxmlformats.org/presentationml/2006/main">
+  <p:cSld>
+    <p:spTree>
+      <p:nvGrpSpPr>
+        <p:cNvPr id="1" name=""/>
+        <p:cNvGrpSpPr/>
+        <p:nvPr/>
+      </p:nvGrpSpPr>
+      <p:grpSpPr>
+        <a:xfrm>
+          <a:off x="0" y="0"/>
+          <a:ext cx="0" cy="0"/>
+          <a:chOff x="0" y="0"/>
+          <a:chExt cx="0" cy="0"/>
+        </a:xfrm>
+      </p:grpSpPr>
+      <p:sp>
+        <p:nvSpPr>
+          <p:cNvPr id="4" name="Título 1">
+            <a:extLst>
+              <a:ext uri="{FF2B5EF4-FFF2-40B4-BE49-F238E27FC236}">
+                <a16:creationId xmlns:a16="http://schemas.microsoft.com/office/drawing/2014/main" id="{9CA53688-E304-4704-85E6-8432DC608B05}"/>
+              </a:ext>
+            </a:extLst>
+          </p:cNvPr>
+          <p:cNvSpPr>
+            <a:spLocks noGrp="1"/>
+          </p:cNvSpPr>
+          <p:nvPr>
+            <p:ph type="title"/>
+          </p:nvPr>
+        </p:nvSpPr>
+        <p:spPr>
+          <a:xfrm>
+            <a:off x="680321" y="753228"/>
+            <a:ext cx="9613861" cy="1080938"/>
+          </a:xfrm>
+        </p:spPr>
+        <p:txBody>
+          <a:bodyPr/>
+          <a:lstStyle/>
+          <a:p>
+            <a:r>
+              <a:rPr lang="pt-BR" dirty="0"/>
+              <a:t>Criando Drives Customizados - Python</a:t>
+            </a:r>
+          </a:p>
+        </p:txBody>
+      </p:sp>
+      <p:sp>
+        <p:nvSpPr>
+          <p:cNvPr id="5" name="Espaço Reservado para Conteúdo 2">
+            <a:extLst>
+              <a:ext uri="{FF2B5EF4-FFF2-40B4-BE49-F238E27FC236}">
+                <a16:creationId xmlns:a16="http://schemas.microsoft.com/office/drawing/2014/main" id="{C5B8AB74-06FA-413C-BD74-462D1F01C8FF}"/>
+              </a:ext>
+            </a:extLst>
+          </p:cNvPr>
+          <p:cNvSpPr>
+            <a:spLocks noGrp="1"/>
+          </p:cNvSpPr>
+          <p:nvPr>
+            <p:ph idx="1"/>
+          </p:nvPr>
+        </p:nvSpPr>
+        <p:spPr>
+          <a:xfrm>
+            <a:off x="680321" y="2505456"/>
+            <a:ext cx="9484759" cy="3599316"/>
+          </a:xfrm>
+        </p:spPr>
+        <p:txBody>
+          <a:bodyPr>
+            <a:noAutofit/>
+          </a:bodyPr>
+          <a:lstStyle/>
+          <a:p>
+            <a:pPr>
+              <a:spcAft>
+                <a:spcPts val="1000"/>
+              </a:spcAft>
+            </a:pPr>
+            <a:r>
+              <a:rPr lang="pt-BR" dirty="0"/>
+              <a:t>Criação do Driver Python Customizado:</a:t>
+            </a:r>
+          </a:p>
+          <a:p>
+            <a:pPr lvl="1">
+              <a:spcAft>
+                <a:spcPts val="1000"/>
+              </a:spcAft>
+            </a:pPr>
+            <a:r>
+              <a:rPr lang="pt-BR" dirty="0"/>
+              <a:t>A primeira </a:t>
+            </a:r>
+            <a:r>
+              <a:rPr lang="pt-BR" dirty="0" err="1"/>
+              <a:t>feature</a:t>
+            </a:r>
+            <a:r>
+              <a:rPr lang="pt-BR" dirty="0"/>
+              <a:t> requerida é a uma </a:t>
+            </a:r>
+            <a:r>
+              <a:rPr lang="pt-BR" dirty="0" err="1"/>
+              <a:t>probe</a:t>
+            </a:r>
+            <a:endParaRPr lang="pt-BR" dirty="0"/>
+          </a:p>
+          <a:p>
+            <a:pPr lvl="1">
+              <a:spcAft>
+                <a:spcPts val="1000"/>
+              </a:spcAft>
+            </a:pPr>
+            <a:r>
+              <a:rPr lang="pt-BR" dirty="0"/>
+              <a:t>Praticando TDD (Test-</a:t>
+            </a:r>
+            <a:r>
+              <a:rPr lang="pt-BR" dirty="0" err="1"/>
+              <a:t>Driven</a:t>
+            </a:r>
+            <a:r>
+              <a:rPr lang="pt-BR" dirty="0"/>
+              <a:t> </a:t>
+            </a:r>
+            <a:r>
+              <a:rPr lang="pt-BR" dirty="0" err="1"/>
+              <a:t>Development</a:t>
+            </a:r>
+            <a:r>
+              <a:rPr lang="pt-BR" dirty="0"/>
+              <a:t>) podemos criar o seguinte</a:t>
+            </a:r>
+            <a:br>
+              <a:rPr lang="pt-BR" dirty="0"/>
+            </a:br>
+            <a:r>
+              <a:rPr lang="pt-BR" dirty="0"/>
+              <a:t>teste para a nova </a:t>
+            </a:r>
+            <a:r>
+              <a:rPr lang="pt-BR" dirty="0" err="1"/>
+              <a:t>probe</a:t>
+            </a:r>
+            <a:r>
+              <a:rPr lang="pt-BR" dirty="0"/>
+              <a:t>, no arquivo chamado test_probes.py</a:t>
+            </a:r>
+          </a:p>
+        </p:txBody>
+      </p:sp>
+      <p:pic>
+        <p:nvPicPr>
+          <p:cNvPr id="3" name="Imagem 2" descr="Tela de celular com texto preto sobre fundo branco&#10;&#10;Descrição gerada automaticamente">
+            <a:extLst>
+              <a:ext uri="{FF2B5EF4-FFF2-40B4-BE49-F238E27FC236}">
+                <a16:creationId xmlns:a16="http://schemas.microsoft.com/office/drawing/2014/main" id="{1C88CC45-E6C5-40B7-8998-A6E27A88CF3D}"/>
+              </a:ext>
+            </a:extLst>
+          </p:cNvPr>
+          <p:cNvPicPr>
+            <a:picLocks noChangeAspect="1"/>
+          </p:cNvPicPr>
+          <p:nvPr/>
+        </p:nvPicPr>
+        <p:blipFill>
+          <a:blip r:embed="rId2"/>
+          <a:stretch>
+            <a:fillRect/>
+          </a:stretch>
+        </p:blipFill>
+        <p:spPr>
+          <a:xfrm>
+            <a:off x="3901787" y="4258553"/>
+            <a:ext cx="4388425" cy="2324619"/>
+          </a:xfrm>
+          <a:prstGeom prst="rect">
+            <a:avLst/>
+          </a:prstGeom>
+        </p:spPr>
+      </p:pic>
+    </p:spTree>
+    <p:extLst>
+      <p:ext uri="{BB962C8B-B14F-4D97-AF65-F5344CB8AC3E}">
+        <p14:creationId xmlns:p14="http://schemas.microsoft.com/office/powerpoint/2010/main" val="853371829"/>
+      </p:ext>
+    </p:extLst>
+  </p:cSld>
+  <p:clrMapOvr>
+    <a:masterClrMapping/>
+  </p:clrMapOvr>
+</p:sld>
+</file>
+
+<file path=ppt/slides/slide142.xml><?xml version="1.0" encoding="utf-8"?>
+<p:sld xmlns:a="http://schemas.openxmlformats.org/drawingml/2006/main" xmlns:r="http://schemas.openxmlformats.org/officeDocument/2006/relationships" xmlns:p="http://schemas.openxmlformats.org/presentationml/2006/main">
+  <p:cSld>
+    <p:spTree>
+      <p:nvGrpSpPr>
+        <p:cNvPr id="1" name=""/>
+        <p:cNvGrpSpPr/>
+        <p:nvPr/>
+      </p:nvGrpSpPr>
+      <p:grpSpPr>
+        <a:xfrm>
+          <a:off x="0" y="0"/>
+          <a:ext cx="0" cy="0"/>
+          <a:chOff x="0" y="0"/>
+          <a:chExt cx="0" cy="0"/>
+        </a:xfrm>
+      </p:grpSpPr>
+      <p:sp>
+        <p:nvSpPr>
+          <p:cNvPr id="4" name="Título 1">
+            <a:extLst>
+              <a:ext uri="{FF2B5EF4-FFF2-40B4-BE49-F238E27FC236}">
+                <a16:creationId xmlns:a16="http://schemas.microsoft.com/office/drawing/2014/main" id="{9CA53688-E304-4704-85E6-8432DC608B05}"/>
+              </a:ext>
+            </a:extLst>
+          </p:cNvPr>
+          <p:cNvSpPr>
+            <a:spLocks noGrp="1"/>
+          </p:cNvSpPr>
+          <p:nvPr>
+            <p:ph type="title"/>
+          </p:nvPr>
+        </p:nvSpPr>
+        <p:spPr>
+          <a:xfrm>
+            <a:off x="680321" y="753228"/>
+            <a:ext cx="9613861" cy="1080938"/>
+          </a:xfrm>
+        </p:spPr>
+        <p:txBody>
+          <a:bodyPr/>
+          <a:lstStyle/>
+          <a:p>
+            <a:r>
+              <a:rPr lang="pt-BR" dirty="0"/>
+              <a:t>Criando Drives Customizados - Python</a:t>
+            </a:r>
+          </a:p>
+        </p:txBody>
+      </p:sp>
+      <p:sp>
+        <p:nvSpPr>
+          <p:cNvPr id="5" name="Espaço Reservado para Conteúdo 2">
+            <a:extLst>
+              <a:ext uri="{FF2B5EF4-FFF2-40B4-BE49-F238E27FC236}">
+                <a16:creationId xmlns:a16="http://schemas.microsoft.com/office/drawing/2014/main" id="{C5B8AB74-06FA-413C-BD74-462D1F01C8FF}"/>
+              </a:ext>
+            </a:extLst>
+          </p:cNvPr>
+          <p:cNvSpPr>
+            <a:spLocks noGrp="1"/>
+          </p:cNvSpPr>
+          <p:nvPr>
+            <p:ph idx="1"/>
+          </p:nvPr>
+        </p:nvSpPr>
+        <p:spPr>
+          <a:xfrm>
+            <a:off x="680321" y="2505456"/>
+            <a:ext cx="9484759" cy="3599316"/>
+          </a:xfrm>
+        </p:spPr>
+        <p:txBody>
+          <a:bodyPr>
+            <a:noAutofit/>
+          </a:bodyPr>
+          <a:lstStyle/>
+          <a:p>
+            <a:pPr>
+              <a:spcAft>
+                <a:spcPts val="1000"/>
+              </a:spcAft>
+            </a:pPr>
+            <a:r>
+              <a:rPr lang="pt-BR" dirty="0"/>
+              <a:t>Criação do Driver Python Customizado:</a:t>
+            </a:r>
+          </a:p>
+          <a:p>
+            <a:pPr lvl="1">
+              <a:spcAft>
+                <a:spcPts val="1000"/>
+              </a:spcAft>
+            </a:pPr>
+            <a:r>
+              <a:rPr lang="pt-BR" dirty="0"/>
+              <a:t>1. Importa a </a:t>
+            </a:r>
+            <a:r>
+              <a:rPr lang="pt-BR" dirty="0" err="1"/>
+              <a:t>function</a:t>
+            </a:r>
+            <a:r>
+              <a:rPr lang="en-US" dirty="0"/>
+              <a:t> </a:t>
+            </a:r>
+            <a:r>
+              <a:rPr lang="en-US" dirty="0" err="1"/>
+              <a:t>chaosmonkey_enabled</a:t>
+            </a:r>
+            <a:r>
+              <a:rPr lang="en-US" dirty="0"/>
+              <a:t> para o </a:t>
+            </a:r>
+            <a:r>
+              <a:rPr lang="en-US" dirty="0" err="1"/>
+              <a:t>módulo</a:t>
+            </a:r>
+            <a:r>
+              <a:rPr lang="en-US" dirty="0"/>
+              <a:t> </a:t>
+            </a:r>
+            <a:r>
+              <a:rPr lang="en-US" dirty="0" err="1"/>
+              <a:t>chaosmlite</a:t>
+            </a:r>
+            <a:r>
+              <a:rPr lang="en-US" dirty="0"/>
+              <a:t>.</a:t>
+            </a:r>
+          </a:p>
+          <a:p>
+            <a:pPr lvl="1">
+              <a:spcAft>
+                <a:spcPts val="1000"/>
+              </a:spcAft>
+            </a:pPr>
+            <a:r>
+              <a:rPr lang="en-US" dirty="0"/>
+              <a:t>2. </a:t>
+            </a:r>
+            <a:r>
+              <a:rPr lang="en-US" dirty="0" err="1"/>
+              <a:t>Realiza</a:t>
+            </a:r>
+            <a:r>
+              <a:rPr lang="en-US" dirty="0"/>
+              <a:t> um Mock da </a:t>
+            </a:r>
+            <a:r>
+              <a:rPr lang="en-US" dirty="0" err="1"/>
+              <a:t>resposta</a:t>
+            </a:r>
+            <a:r>
+              <a:rPr lang="en-US" dirty="0"/>
+              <a:t> </a:t>
+            </a:r>
+            <a:r>
+              <a:rPr lang="en-US" dirty="0" err="1"/>
+              <a:t>esperada</a:t>
+            </a:r>
+            <a:r>
+              <a:rPr lang="en-US" dirty="0"/>
+              <a:t> para a API do Chaos Monkey for Spring Boot</a:t>
+            </a:r>
+          </a:p>
+        </p:txBody>
+      </p:sp>
+      <p:pic>
+        <p:nvPicPr>
+          <p:cNvPr id="3" name="Imagem 2" descr="Tela de celular com texto preto sobre fundo branco&#10;&#10;Descrição gerada automaticamente">
+            <a:extLst>
+              <a:ext uri="{FF2B5EF4-FFF2-40B4-BE49-F238E27FC236}">
+                <a16:creationId xmlns:a16="http://schemas.microsoft.com/office/drawing/2014/main" id="{5D119EBE-E605-4844-A268-2E3DC6FFCCC3}"/>
+              </a:ext>
+            </a:extLst>
+          </p:cNvPr>
+          <p:cNvPicPr>
+            <a:picLocks noChangeAspect="1"/>
+          </p:cNvPicPr>
+          <p:nvPr/>
+        </p:nvPicPr>
+        <p:blipFill>
+          <a:blip r:embed="rId2"/>
+          <a:stretch>
+            <a:fillRect/>
+          </a:stretch>
+        </p:blipFill>
+        <p:spPr>
+          <a:xfrm>
+            <a:off x="3427481" y="4103682"/>
+            <a:ext cx="5337038" cy="2501122"/>
+          </a:xfrm>
+          <a:prstGeom prst="rect">
+            <a:avLst/>
+          </a:prstGeom>
+        </p:spPr>
+      </p:pic>
+    </p:spTree>
+    <p:extLst>
+      <p:ext uri="{BB962C8B-B14F-4D97-AF65-F5344CB8AC3E}">
+        <p14:creationId xmlns:p14="http://schemas.microsoft.com/office/powerpoint/2010/main" val="796466388"/>
+      </p:ext>
+    </p:extLst>
+  </p:cSld>
+  <p:clrMapOvr>
+    <a:masterClrMapping/>
+  </p:clrMapOvr>
+</p:sld>
+</file>
+
+<file path=ppt/slides/slide143.xml><?xml version="1.0" encoding="utf-8"?>
+<p:sld xmlns:a="http://schemas.openxmlformats.org/drawingml/2006/main" xmlns:r="http://schemas.openxmlformats.org/officeDocument/2006/relationships" xmlns:p="http://schemas.openxmlformats.org/presentationml/2006/main">
+  <p:cSld>
+    <p:spTree>
+      <p:nvGrpSpPr>
+        <p:cNvPr id="1" name=""/>
+        <p:cNvGrpSpPr/>
+        <p:nvPr/>
+      </p:nvGrpSpPr>
+      <p:grpSpPr>
+        <a:xfrm>
+          <a:off x="0" y="0"/>
+          <a:ext cx="0" cy="0"/>
+          <a:chOff x="0" y="0"/>
+          <a:chExt cx="0" cy="0"/>
+        </a:xfrm>
+      </p:grpSpPr>
+      <p:sp>
+        <p:nvSpPr>
+          <p:cNvPr id="4" name="Título 1">
+            <a:extLst>
+              <a:ext uri="{FF2B5EF4-FFF2-40B4-BE49-F238E27FC236}">
+                <a16:creationId xmlns:a16="http://schemas.microsoft.com/office/drawing/2014/main" id="{9CA53688-E304-4704-85E6-8432DC608B05}"/>
+              </a:ext>
+            </a:extLst>
+          </p:cNvPr>
+          <p:cNvSpPr>
+            <a:spLocks noGrp="1"/>
+          </p:cNvSpPr>
+          <p:nvPr>
+            <p:ph type="title"/>
+          </p:nvPr>
+        </p:nvSpPr>
+        <p:spPr>
+          <a:xfrm>
+            <a:off x="680321" y="753228"/>
+            <a:ext cx="9613861" cy="1080938"/>
+          </a:xfrm>
+        </p:spPr>
+        <p:txBody>
+          <a:bodyPr/>
+          <a:lstStyle/>
+          <a:p>
+            <a:r>
+              <a:rPr lang="pt-BR" dirty="0"/>
+              <a:t>Criando Drives Customizados - Python</a:t>
+            </a:r>
+          </a:p>
+        </p:txBody>
+      </p:sp>
+      <p:sp>
+        <p:nvSpPr>
+          <p:cNvPr id="5" name="Espaço Reservado para Conteúdo 2">
+            <a:extLst>
+              <a:ext uri="{FF2B5EF4-FFF2-40B4-BE49-F238E27FC236}">
+                <a16:creationId xmlns:a16="http://schemas.microsoft.com/office/drawing/2014/main" id="{C5B8AB74-06FA-413C-BD74-462D1F01C8FF}"/>
+              </a:ext>
+            </a:extLst>
+          </p:cNvPr>
+          <p:cNvSpPr>
+            <a:spLocks noGrp="1"/>
+          </p:cNvSpPr>
+          <p:nvPr>
+            <p:ph idx="1"/>
+          </p:nvPr>
+        </p:nvSpPr>
+        <p:spPr>
+          <a:xfrm>
+            <a:off x="680321" y="2505456"/>
+            <a:ext cx="9484759" cy="3599316"/>
+          </a:xfrm>
+        </p:spPr>
+        <p:txBody>
+          <a:bodyPr>
+            <a:noAutofit/>
+          </a:bodyPr>
+          <a:lstStyle/>
+          <a:p>
+            <a:pPr>
+              <a:spcAft>
+                <a:spcPts val="1000"/>
+              </a:spcAft>
+            </a:pPr>
+            <a:r>
+              <a:rPr lang="pt-BR" dirty="0"/>
+              <a:t>Criação do Driver Python Customizado:</a:t>
+            </a:r>
+          </a:p>
+          <a:p>
+            <a:pPr lvl="1">
+              <a:spcAft>
+                <a:spcPts val="1000"/>
+              </a:spcAft>
+            </a:pPr>
+            <a:r>
+              <a:rPr lang="pt-BR" dirty="0"/>
+              <a:t>3. Enquanto realiza o </a:t>
+            </a:r>
+            <a:r>
+              <a:rPr lang="pt-BR" dirty="0" err="1"/>
+              <a:t>Mock</a:t>
+            </a:r>
+            <a:r>
+              <a:rPr lang="pt-BR" dirty="0"/>
+              <a:t> da </a:t>
+            </a:r>
+            <a:r>
+              <a:rPr lang="pt-BR" dirty="0" err="1"/>
+              <a:t>chamda</a:t>
+            </a:r>
+            <a:r>
+              <a:rPr lang="pt-BR" dirty="0"/>
+              <a:t> para o </a:t>
+            </a:r>
+            <a:r>
+              <a:rPr lang="en-US" dirty="0" err="1"/>
+              <a:t>chaosmlite.api.call_api</a:t>
+            </a:r>
+            <a:r>
+              <a:rPr lang="en-US" dirty="0"/>
+              <a:t>, </a:t>
+            </a:r>
+            <a:r>
+              <a:rPr lang="en-US" dirty="0" err="1"/>
+              <a:t>retornando</a:t>
+            </a:r>
+            <a:r>
+              <a:rPr lang="en-US" dirty="0"/>
+              <a:t> </a:t>
+            </a:r>
+            <a:r>
+              <a:rPr lang="en-US" dirty="0" err="1"/>
+              <a:t>uma</a:t>
+            </a:r>
+            <a:r>
+              <a:rPr lang="en-US" dirty="0"/>
+              <a:t> </a:t>
+            </a:r>
+            <a:r>
+              <a:rPr lang="en-US" dirty="0" err="1"/>
+              <a:t>resposta</a:t>
+            </a:r>
+            <a:r>
+              <a:rPr lang="en-US" dirty="0"/>
+              <a:t> </a:t>
+            </a:r>
+            <a:r>
+              <a:rPr lang="en-US" dirty="0" err="1"/>
+              <a:t>esperada</a:t>
+            </a:r>
+            <a:r>
+              <a:rPr lang="en-US" dirty="0"/>
+              <a:t> para o Chaos Monkey for Spring Boot ser </a:t>
+            </a:r>
+            <a:r>
+              <a:rPr lang="en-US" dirty="0" err="1"/>
+              <a:t>ativado</a:t>
+            </a:r>
+            <a:r>
+              <a:rPr lang="en-US" dirty="0"/>
+              <a:t>, </a:t>
+            </a:r>
+            <a:r>
+              <a:rPr lang="en-US" dirty="0" err="1"/>
+              <a:t>também</a:t>
+            </a:r>
+            <a:r>
+              <a:rPr lang="en-US" dirty="0"/>
+              <a:t> </a:t>
+            </a:r>
+            <a:r>
+              <a:rPr lang="en-US" dirty="0" err="1"/>
+              <a:t>chama</a:t>
+            </a:r>
+            <a:r>
+              <a:rPr lang="en-US" dirty="0"/>
+              <a:t> a function </a:t>
+            </a:r>
+            <a:r>
+              <a:rPr lang="en-US" dirty="0" err="1"/>
+              <a:t>chaosmonkey_enabled</a:t>
+            </a:r>
+            <a:r>
+              <a:rPr lang="en-US" dirty="0"/>
+              <a:t> probe.</a:t>
+            </a:r>
+          </a:p>
+          <a:p>
+            <a:pPr lvl="1">
+              <a:spcAft>
+                <a:spcPts val="1000"/>
+              </a:spcAft>
+            </a:pPr>
+            <a:r>
+              <a:rPr lang="en-US" dirty="0"/>
+              <a:t>4. </a:t>
+            </a:r>
+            <a:r>
+              <a:rPr lang="en-US" dirty="0" err="1"/>
+              <a:t>Certifica</a:t>
+            </a:r>
+            <a:r>
+              <a:rPr lang="en-US" dirty="0"/>
+              <a:t> que a </a:t>
+            </a:r>
+            <a:r>
+              <a:rPr lang="en-US" dirty="0" err="1"/>
+              <a:t>resposta</a:t>
+            </a:r>
+            <a:r>
+              <a:rPr lang="en-US" dirty="0"/>
+              <a:t> </a:t>
+            </a:r>
+            <a:r>
+              <a:rPr lang="en-US" dirty="0" err="1"/>
+              <a:t>identifique</a:t>
+            </a:r>
+            <a:r>
+              <a:rPr lang="en-US" dirty="0"/>
+              <a:t> </a:t>
+            </a:r>
+            <a:r>
+              <a:rPr lang="en-US" dirty="0" err="1"/>
+              <a:t>corretamente</a:t>
+            </a:r>
+            <a:r>
+              <a:rPr lang="en-US" dirty="0"/>
+              <a:t> que o Chaos Monkey for Spring Boot </a:t>
+            </a:r>
+            <a:r>
+              <a:rPr lang="en-US" dirty="0" err="1"/>
+              <a:t>está</a:t>
+            </a:r>
+            <a:r>
+              <a:rPr lang="en-US" dirty="0"/>
+              <a:t> </a:t>
+            </a:r>
+            <a:r>
+              <a:rPr lang="en-US" dirty="0" err="1"/>
+              <a:t>ativado</a:t>
+            </a:r>
+            <a:r>
+              <a:rPr lang="en-US" dirty="0"/>
+              <a:t>.</a:t>
+            </a:r>
+          </a:p>
+          <a:p>
+            <a:pPr>
+              <a:spcAft>
+                <a:spcPts val="1000"/>
+              </a:spcAft>
+            </a:pPr>
+            <a:r>
+              <a:rPr lang="en-US" dirty="0"/>
+              <a:t>Se </a:t>
+            </a:r>
+            <a:r>
+              <a:rPr lang="en-US" dirty="0" err="1"/>
+              <a:t>tentarmos</a:t>
+            </a:r>
+            <a:r>
+              <a:rPr lang="en-US" dirty="0"/>
+              <a:t> </a:t>
+            </a:r>
+            <a:r>
+              <a:rPr lang="en-US" dirty="0" err="1"/>
+              <a:t>executar</a:t>
+            </a:r>
+            <a:r>
+              <a:rPr lang="en-US" dirty="0"/>
+              <a:t> o teste com o </a:t>
+            </a:r>
+            <a:r>
+              <a:rPr lang="en-US" dirty="0" err="1"/>
+              <a:t>comando</a:t>
+            </a:r>
+            <a:r>
+              <a:rPr lang="en-US" dirty="0"/>
+              <a:t> </a:t>
+            </a:r>
+            <a:r>
+              <a:rPr lang="pt-BR" i="1" dirty="0">
+                <a:highlight>
+                  <a:srgbClr val="000000"/>
+                </a:highlight>
+              </a:rPr>
+              <a:t>(</a:t>
+            </a:r>
+            <a:r>
+              <a:rPr lang="pt-BR" i="1" dirty="0" err="1">
+                <a:highlight>
+                  <a:srgbClr val="000000"/>
+                </a:highlight>
+              </a:rPr>
+              <a:t>chaostk</a:t>
+            </a:r>
+            <a:r>
+              <a:rPr lang="pt-BR" i="1" dirty="0">
+                <a:highlight>
+                  <a:srgbClr val="000000"/>
+                </a:highlight>
+              </a:rPr>
+              <a:t>) $ </a:t>
+            </a:r>
+            <a:r>
+              <a:rPr lang="pt-BR" b="1" i="1" dirty="0" err="1">
+                <a:highlight>
+                  <a:srgbClr val="000000"/>
+                </a:highlight>
+              </a:rPr>
+              <a:t>pytest</a:t>
+            </a:r>
+            <a:br>
+              <a:rPr lang="en-US" b="1" i="1" dirty="0">
+                <a:highlight>
+                  <a:srgbClr val="000000"/>
+                </a:highlight>
+              </a:rPr>
+            </a:br>
+            <a:r>
+              <a:rPr lang="en-US" dirty="0" err="1"/>
+              <a:t>receberemos</a:t>
+            </a:r>
+            <a:r>
+              <a:rPr lang="en-US" dirty="0"/>
+              <a:t> </a:t>
+            </a:r>
+            <a:r>
+              <a:rPr lang="en-US" dirty="0" err="1"/>
+              <a:t>uma</a:t>
+            </a:r>
+            <a:r>
+              <a:rPr lang="en-US" dirty="0"/>
+              <a:t> </a:t>
+            </a:r>
+            <a:r>
+              <a:rPr lang="en-US" dirty="0" err="1"/>
+              <a:t>mensagem</a:t>
+            </a:r>
+            <a:r>
+              <a:rPr lang="en-US" dirty="0"/>
+              <a:t> de </a:t>
+            </a:r>
+            <a:r>
+              <a:rPr lang="en-US" dirty="0" err="1"/>
+              <a:t>erro</a:t>
+            </a:r>
+            <a:r>
+              <a:rPr lang="en-US" dirty="0"/>
+              <a:t>, </a:t>
+            </a:r>
+            <a:r>
+              <a:rPr lang="en-US" dirty="0" err="1"/>
+              <a:t>afinal</a:t>
+            </a:r>
+            <a:r>
+              <a:rPr lang="en-US" dirty="0"/>
+              <a:t> a probe </a:t>
+            </a:r>
+            <a:r>
+              <a:rPr lang="en-US" dirty="0" err="1"/>
+              <a:t>não</a:t>
+            </a:r>
+            <a:r>
+              <a:rPr lang="en-US" dirty="0"/>
+              <a:t> </a:t>
+            </a:r>
+            <a:r>
+              <a:rPr lang="en-US" dirty="0" err="1"/>
+              <a:t>está</a:t>
+            </a:r>
+            <a:r>
+              <a:rPr lang="en-US" dirty="0"/>
+              <a:t> </a:t>
+            </a:r>
+            <a:r>
+              <a:rPr lang="en-US" dirty="0" err="1"/>
+              <a:t>escrita</a:t>
+            </a:r>
+            <a:r>
+              <a:rPr lang="en-US" dirty="0"/>
+              <a:t> </a:t>
+            </a:r>
+            <a:r>
+              <a:rPr lang="en-US" dirty="0" err="1"/>
+              <a:t>ainda</a:t>
+            </a:r>
+            <a:r>
+              <a:rPr lang="en-US" dirty="0"/>
+              <a:t>.</a:t>
+            </a:r>
+            <a:endParaRPr lang="pt-BR" dirty="0"/>
+          </a:p>
+        </p:txBody>
+      </p:sp>
+    </p:spTree>
+    <p:extLst>
+      <p:ext uri="{BB962C8B-B14F-4D97-AF65-F5344CB8AC3E}">
+        <p14:creationId xmlns:p14="http://schemas.microsoft.com/office/powerpoint/2010/main" val="54194986"/>
+      </p:ext>
+    </p:extLst>
+  </p:cSld>
+  <p:clrMapOvr>
+    <a:masterClrMapping/>
+  </p:clrMapOvr>
+</p:sld>
+</file>
+
+<file path=ppt/slides/slide144.xml><?xml version="1.0" encoding="utf-8"?>
+<p:sld xmlns:a="http://schemas.openxmlformats.org/drawingml/2006/main" xmlns:r="http://schemas.openxmlformats.org/officeDocument/2006/relationships" xmlns:p="http://schemas.openxmlformats.org/presentationml/2006/main">
+  <p:cSld>
+    <p:spTree>
+      <p:nvGrpSpPr>
+        <p:cNvPr id="1" name=""/>
+        <p:cNvGrpSpPr/>
+        <p:nvPr/>
+      </p:nvGrpSpPr>
+      <p:grpSpPr>
+        <a:xfrm>
+          <a:off x="0" y="0"/>
+          <a:ext cx="0" cy="0"/>
+          <a:chOff x="0" y="0"/>
+          <a:chExt cx="0" cy="0"/>
+        </a:xfrm>
+      </p:grpSpPr>
+      <p:sp>
+        <p:nvSpPr>
+          <p:cNvPr id="4" name="Título 1">
+            <a:extLst>
+              <a:ext uri="{FF2B5EF4-FFF2-40B4-BE49-F238E27FC236}">
+                <a16:creationId xmlns:a16="http://schemas.microsoft.com/office/drawing/2014/main" id="{9CA53688-E304-4704-85E6-8432DC608B05}"/>
+              </a:ext>
+            </a:extLst>
+          </p:cNvPr>
+          <p:cNvSpPr>
+            <a:spLocks noGrp="1"/>
+          </p:cNvSpPr>
+          <p:nvPr>
+            <p:ph type="title"/>
+          </p:nvPr>
+        </p:nvSpPr>
+        <p:spPr>
+          <a:xfrm>
+            <a:off x="680321" y="753228"/>
+            <a:ext cx="9613861" cy="1080938"/>
+          </a:xfrm>
+        </p:spPr>
+        <p:txBody>
+          <a:bodyPr/>
+          <a:lstStyle/>
+          <a:p>
+            <a:r>
+              <a:rPr lang="pt-BR" dirty="0"/>
+              <a:t>Criando Drives Customizados - Python</a:t>
+            </a:r>
+          </a:p>
+        </p:txBody>
+      </p:sp>
+      <p:sp>
+        <p:nvSpPr>
+          <p:cNvPr id="5" name="Espaço Reservado para Conteúdo 2">
+            <a:extLst>
+              <a:ext uri="{FF2B5EF4-FFF2-40B4-BE49-F238E27FC236}">
+                <a16:creationId xmlns:a16="http://schemas.microsoft.com/office/drawing/2014/main" id="{C5B8AB74-06FA-413C-BD74-462D1F01C8FF}"/>
+              </a:ext>
+            </a:extLst>
+          </p:cNvPr>
+          <p:cNvSpPr>
+            <a:spLocks noGrp="1"/>
+          </p:cNvSpPr>
+          <p:nvPr>
+            <p:ph idx="1"/>
+          </p:nvPr>
+        </p:nvSpPr>
+        <p:spPr>
+          <a:xfrm>
+            <a:off x="680321" y="2505456"/>
+            <a:ext cx="9484759" cy="3599316"/>
+          </a:xfrm>
+        </p:spPr>
+        <p:txBody>
+          <a:bodyPr>
+            <a:noAutofit/>
+          </a:bodyPr>
+          <a:lstStyle/>
+          <a:p>
+            <a:pPr>
+              <a:spcAft>
+                <a:spcPts val="1000"/>
+              </a:spcAft>
+            </a:pPr>
+            <a:r>
+              <a:rPr lang="pt-BR" dirty="0"/>
+              <a:t>Para criarmos a </a:t>
+            </a:r>
+            <a:r>
+              <a:rPr lang="pt-BR" dirty="0" err="1"/>
+              <a:t>probe</a:t>
+            </a:r>
+            <a:r>
+              <a:rPr lang="pt-BR" dirty="0"/>
+              <a:t>, iremos adicionar o seguinte código ao arquivo </a:t>
+            </a:r>
+            <a:r>
+              <a:rPr lang="pt-BR" i="1" dirty="0"/>
+              <a:t>probes.py </a:t>
+            </a:r>
+            <a:r>
+              <a:rPr lang="pt-BR" dirty="0"/>
+              <a:t>no diretório do módulo </a:t>
+            </a:r>
+            <a:r>
+              <a:rPr lang="pt-BR" i="1" dirty="0" err="1"/>
+              <a:t>chaosmlite</a:t>
+            </a:r>
+            <a:r>
+              <a:rPr lang="pt-BR" i="1" dirty="0"/>
+              <a:t>.</a:t>
+            </a:r>
+          </a:p>
+          <a:p>
+            <a:pPr>
+              <a:spcAft>
+                <a:spcPts val="1000"/>
+              </a:spcAft>
+            </a:pPr>
+            <a:endParaRPr lang="pt-BR" dirty="0"/>
+          </a:p>
+        </p:txBody>
+      </p:sp>
+      <p:pic>
+        <p:nvPicPr>
+          <p:cNvPr id="9" name="Imagem 8" descr="Uma imagem contendo screenshot, pássaro&#10;&#10;Descrição gerada automaticamente">
+            <a:extLst>
+              <a:ext uri="{FF2B5EF4-FFF2-40B4-BE49-F238E27FC236}">
+                <a16:creationId xmlns:a16="http://schemas.microsoft.com/office/drawing/2014/main" id="{4067EA0B-28FF-4035-A6F9-E2A88323885C}"/>
+              </a:ext>
+            </a:extLst>
+          </p:cNvPr>
+          <p:cNvPicPr>
+            <a:picLocks noChangeAspect="1"/>
+          </p:cNvPicPr>
+          <p:nvPr/>
+        </p:nvPicPr>
+        <p:blipFill>
+          <a:blip r:embed="rId2"/>
+          <a:stretch>
+            <a:fillRect/>
+          </a:stretch>
+        </p:blipFill>
+        <p:spPr>
+          <a:xfrm>
+            <a:off x="1040170" y="4125784"/>
+            <a:ext cx="4291983" cy="1796102"/>
+          </a:xfrm>
+          <a:prstGeom prst="rect">
+            <a:avLst/>
+          </a:prstGeom>
+        </p:spPr>
+      </p:pic>
+      <p:pic>
+        <p:nvPicPr>
+          <p:cNvPr id="11" name="Imagem 10" descr="Tela de celular com texto preto sobre fundo branco&#10;&#10;Descrição gerada automaticamente">
+            <a:extLst>
+              <a:ext uri="{FF2B5EF4-FFF2-40B4-BE49-F238E27FC236}">
+                <a16:creationId xmlns:a16="http://schemas.microsoft.com/office/drawing/2014/main" id="{72C3EB11-200A-4CE4-8182-01CC95D5BA4D}"/>
+              </a:ext>
+            </a:extLst>
+          </p:cNvPr>
+          <p:cNvPicPr>
+            <a:picLocks noChangeAspect="1"/>
+          </p:cNvPicPr>
+          <p:nvPr/>
+        </p:nvPicPr>
+        <p:blipFill>
+          <a:blip r:embed="rId3"/>
+          <a:stretch>
+            <a:fillRect/>
+          </a:stretch>
+        </p:blipFill>
+        <p:spPr>
+          <a:xfrm>
+            <a:off x="5762568" y="3814306"/>
+            <a:ext cx="5347391" cy="2419058"/>
+          </a:xfrm>
+          <a:prstGeom prst="rect">
+            <a:avLst/>
+          </a:prstGeom>
+        </p:spPr>
+      </p:pic>
+    </p:spTree>
+    <p:extLst>
+      <p:ext uri="{BB962C8B-B14F-4D97-AF65-F5344CB8AC3E}">
+        <p14:creationId xmlns:p14="http://schemas.microsoft.com/office/powerpoint/2010/main" val="77136189"/>
+      </p:ext>
+    </p:extLst>
+  </p:cSld>
+  <p:clrMapOvr>
+    <a:masterClrMapping/>
+  </p:clrMapOvr>
+</p:sld>
+</file>
+
+<file path=ppt/slides/slide145.xml><?xml version="1.0" encoding="utf-8"?>
+<p:sld xmlns:a="http://schemas.openxmlformats.org/drawingml/2006/main" xmlns:r="http://schemas.openxmlformats.org/officeDocument/2006/relationships" xmlns:p="http://schemas.openxmlformats.org/presentationml/2006/main">
+  <p:cSld>
+    <p:spTree>
+      <p:nvGrpSpPr>
+        <p:cNvPr id="1" name=""/>
+        <p:cNvGrpSpPr/>
+        <p:nvPr/>
+      </p:nvGrpSpPr>
+      <p:grpSpPr>
+        <a:xfrm>
+          <a:off x="0" y="0"/>
+          <a:ext cx="0" cy="0"/>
+          <a:chOff x="0" y="0"/>
+          <a:chExt cx="0" cy="0"/>
+        </a:xfrm>
+      </p:grpSpPr>
+      <p:sp>
+        <p:nvSpPr>
+          <p:cNvPr id="4" name="Título 1">
+            <a:extLst>
+              <a:ext uri="{FF2B5EF4-FFF2-40B4-BE49-F238E27FC236}">
+                <a16:creationId xmlns:a16="http://schemas.microsoft.com/office/drawing/2014/main" id="{9CA53688-E304-4704-85E6-8432DC608B05}"/>
+              </a:ext>
+            </a:extLst>
+          </p:cNvPr>
+          <p:cNvSpPr>
+            <a:spLocks noGrp="1"/>
+          </p:cNvSpPr>
+          <p:nvPr>
+            <p:ph type="title"/>
+          </p:nvPr>
+        </p:nvSpPr>
+        <p:spPr>
+          <a:xfrm>
+            <a:off x="680321" y="753228"/>
+            <a:ext cx="9613861" cy="1080938"/>
+          </a:xfrm>
+        </p:spPr>
+        <p:txBody>
+          <a:bodyPr/>
+          <a:lstStyle/>
+          <a:p>
+            <a:r>
+              <a:rPr lang="pt-BR" dirty="0"/>
+              <a:t>Criando Drives Customizados - Python</a:t>
+            </a:r>
+          </a:p>
+        </p:txBody>
+      </p:sp>
+      <p:sp>
+        <p:nvSpPr>
+          <p:cNvPr id="5" name="Espaço Reservado para Conteúdo 2">
+            <a:extLst>
+              <a:ext uri="{FF2B5EF4-FFF2-40B4-BE49-F238E27FC236}">
+                <a16:creationId xmlns:a16="http://schemas.microsoft.com/office/drawing/2014/main" id="{C5B8AB74-06FA-413C-BD74-462D1F01C8FF}"/>
+              </a:ext>
+            </a:extLst>
+          </p:cNvPr>
+          <p:cNvSpPr>
+            <a:spLocks noGrp="1"/>
+          </p:cNvSpPr>
+          <p:nvPr>
+            <p:ph idx="1"/>
+          </p:nvPr>
+        </p:nvSpPr>
+        <p:spPr>
+          <a:xfrm>
+            <a:off x="680321" y="2505456"/>
+            <a:ext cx="5570903" cy="3599316"/>
+          </a:xfrm>
+        </p:spPr>
+        <p:txBody>
+          <a:bodyPr>
+            <a:noAutofit/>
+          </a:bodyPr>
+          <a:lstStyle/>
+          <a:p>
+            <a:pPr>
+              <a:spcAft>
+                <a:spcPts val="1000"/>
+              </a:spcAft>
+            </a:pPr>
+            <a:r>
+              <a:rPr lang="pt-BR" dirty="0"/>
+              <a:t>Criando a </a:t>
+            </a:r>
+            <a:r>
+              <a:rPr lang="pt-BR" dirty="0" err="1"/>
+              <a:t>Probe</a:t>
+            </a:r>
+            <a:r>
+              <a:rPr lang="pt-BR" dirty="0"/>
+              <a:t>:</a:t>
+            </a:r>
+          </a:p>
+          <a:p>
+            <a:pPr lvl="1">
+              <a:lnSpc>
+                <a:spcPct val="100000"/>
+              </a:lnSpc>
+              <a:spcAft>
+                <a:spcPts val="1000"/>
+              </a:spcAft>
+            </a:pPr>
+            <a:r>
+              <a:rPr lang="pt-BR" dirty="0"/>
+              <a:t>1. Declara a new </a:t>
+            </a:r>
+            <a:r>
+              <a:rPr lang="pt-BR" dirty="0" err="1"/>
+              <a:t>probe</a:t>
+            </a:r>
+            <a:r>
+              <a:rPr lang="pt-BR" dirty="0"/>
+              <a:t> </a:t>
+            </a:r>
+            <a:r>
+              <a:rPr lang="pt-BR" dirty="0" err="1"/>
+              <a:t>function</a:t>
+            </a:r>
+            <a:r>
+              <a:rPr lang="pt-BR" dirty="0"/>
+              <a:t>, a </a:t>
+            </a:r>
+            <a:r>
+              <a:rPr lang="pt-BR" dirty="0" err="1"/>
+              <a:t>probe</a:t>
+            </a:r>
+            <a:r>
+              <a:rPr lang="pt-BR" dirty="0"/>
+              <a:t> retorna um booleano. Também Podemos configurar os segredos e as configurações da </a:t>
+            </a:r>
+            <a:r>
+              <a:rPr lang="pt-BR" dirty="0" err="1"/>
+              <a:t>probe</a:t>
+            </a:r>
+            <a:r>
+              <a:rPr lang="pt-BR" dirty="0"/>
+              <a:t> aqui.</a:t>
+            </a:r>
+          </a:p>
+          <a:p>
+            <a:pPr lvl="1">
+              <a:lnSpc>
+                <a:spcPct val="100000"/>
+              </a:lnSpc>
+              <a:spcAft>
+                <a:spcPts val="1000"/>
+              </a:spcAft>
+            </a:pPr>
+            <a:r>
+              <a:rPr lang="pt-BR" dirty="0"/>
+              <a:t>2. Chama uma </a:t>
+            </a:r>
+            <a:r>
+              <a:rPr lang="pt-BR" dirty="0" err="1"/>
+              <a:t>function</a:t>
+            </a:r>
+            <a:r>
+              <a:rPr lang="pt-BR" dirty="0"/>
+              <a:t> subjacente que é responsável por construir e chamar o Chaos </a:t>
+            </a:r>
+            <a:r>
+              <a:rPr lang="pt-BR" dirty="0" err="1"/>
+              <a:t>Monkey</a:t>
+            </a:r>
+            <a:r>
+              <a:rPr lang="pt-BR" dirty="0"/>
+              <a:t> for Spring Boot.</a:t>
+            </a:r>
+          </a:p>
+          <a:p>
+            <a:pPr lvl="1">
+              <a:lnSpc>
+                <a:spcPct val="100000"/>
+              </a:lnSpc>
+              <a:spcAft>
+                <a:spcPts val="1000"/>
+              </a:spcAft>
+            </a:pPr>
+            <a:r>
+              <a:rPr lang="pt-BR" dirty="0"/>
+              <a:t>3. Retorna </a:t>
+            </a:r>
+            <a:r>
+              <a:rPr lang="pt-BR" dirty="0" err="1"/>
+              <a:t>true</a:t>
+            </a:r>
+            <a:r>
+              <a:rPr lang="pt-BR" dirty="0"/>
+              <a:t> se a chamada responder com um status </a:t>
+            </a:r>
+            <a:r>
+              <a:rPr lang="pt-BR" dirty="0" err="1"/>
+              <a:t>code</a:t>
+            </a:r>
+            <a:r>
+              <a:rPr lang="pt-BR" dirty="0"/>
+              <a:t> Ok</a:t>
+            </a:r>
+            <a:br>
+              <a:rPr lang="pt-BR" dirty="0"/>
+            </a:br>
+            <a:r>
+              <a:rPr lang="pt-BR" dirty="0"/>
+              <a:t> </a:t>
+            </a:r>
+          </a:p>
+        </p:txBody>
+      </p:sp>
+      <p:pic>
+        <p:nvPicPr>
+          <p:cNvPr id="7" name="Imagem 6" descr="Tela de celular com texto preto sobre fundo branco&#10;&#10;Descrição gerada automaticamente">
+            <a:extLst>
+              <a:ext uri="{FF2B5EF4-FFF2-40B4-BE49-F238E27FC236}">
+                <a16:creationId xmlns:a16="http://schemas.microsoft.com/office/drawing/2014/main" id="{826CC26A-E625-450F-96FF-76854474BEA6}"/>
+              </a:ext>
+            </a:extLst>
+          </p:cNvPr>
+          <p:cNvPicPr>
+            <a:picLocks noChangeAspect="1"/>
+          </p:cNvPicPr>
+          <p:nvPr/>
+        </p:nvPicPr>
+        <p:blipFill>
+          <a:blip r:embed="rId2"/>
+          <a:stretch>
+            <a:fillRect/>
+          </a:stretch>
+        </p:blipFill>
+        <p:spPr>
+          <a:xfrm>
+            <a:off x="6683765" y="3352800"/>
+            <a:ext cx="4558128" cy="1174984"/>
+          </a:xfrm>
+          <a:prstGeom prst="rect">
+            <a:avLst/>
+          </a:prstGeom>
+        </p:spPr>
+      </p:pic>
+      <p:pic>
+        <p:nvPicPr>
+          <p:cNvPr id="9" name="Imagem 8" descr="Tela de celular com texto preto sobre fundo branco&#10;&#10;Descrição gerada automaticamente">
+            <a:extLst>
+              <a:ext uri="{FF2B5EF4-FFF2-40B4-BE49-F238E27FC236}">
+                <a16:creationId xmlns:a16="http://schemas.microsoft.com/office/drawing/2014/main" id="{1B4C5956-6496-444A-923A-C685C9B95E20}"/>
+              </a:ext>
+            </a:extLst>
+          </p:cNvPr>
+          <p:cNvPicPr>
+            <a:picLocks noChangeAspect="1"/>
+          </p:cNvPicPr>
+          <p:nvPr/>
+        </p:nvPicPr>
+        <p:blipFill>
+          <a:blip r:embed="rId3"/>
+          <a:stretch>
+            <a:fillRect/>
+          </a:stretch>
+        </p:blipFill>
+        <p:spPr>
+          <a:xfrm>
+            <a:off x="6233160" y="4809112"/>
+            <a:ext cx="5570903" cy="1340591"/>
+          </a:xfrm>
+          <a:prstGeom prst="rect">
+            <a:avLst/>
+          </a:prstGeom>
+        </p:spPr>
+      </p:pic>
+    </p:spTree>
+    <p:extLst>
+      <p:ext uri="{BB962C8B-B14F-4D97-AF65-F5344CB8AC3E}">
+        <p14:creationId xmlns:p14="http://schemas.microsoft.com/office/powerpoint/2010/main" val="755967744"/>
+      </p:ext>
+    </p:extLst>
+  </p:cSld>
+  <p:clrMapOvr>
+    <a:masterClrMapping/>
+  </p:clrMapOvr>
+</p:sld>
+</file>
+
+<file path=ppt/slides/slide146.xml><?xml version="1.0" encoding="utf-8"?>
+<p:sld xmlns:a="http://schemas.openxmlformats.org/drawingml/2006/main" xmlns:r="http://schemas.openxmlformats.org/officeDocument/2006/relationships" xmlns:p="http://schemas.openxmlformats.org/presentationml/2006/main">
+  <p:cSld>
+    <p:spTree>
+      <p:nvGrpSpPr>
+        <p:cNvPr id="1" name=""/>
+        <p:cNvGrpSpPr/>
+        <p:nvPr/>
+      </p:nvGrpSpPr>
+      <p:grpSpPr>
+        <a:xfrm>
+          <a:off x="0" y="0"/>
+          <a:ext cx="0" cy="0"/>
+          <a:chOff x="0" y="0"/>
+          <a:chExt cx="0" cy="0"/>
+        </a:xfrm>
+      </p:grpSpPr>
+      <p:sp>
+        <p:nvSpPr>
+          <p:cNvPr id="4" name="Título 1">
+            <a:extLst>
+              <a:ext uri="{FF2B5EF4-FFF2-40B4-BE49-F238E27FC236}">
+                <a16:creationId xmlns:a16="http://schemas.microsoft.com/office/drawing/2014/main" id="{9CA53688-E304-4704-85E6-8432DC608B05}"/>
+              </a:ext>
+            </a:extLst>
+          </p:cNvPr>
+          <p:cNvSpPr>
+            <a:spLocks noGrp="1"/>
+          </p:cNvSpPr>
+          <p:nvPr>
+            <p:ph type="title"/>
+          </p:nvPr>
+        </p:nvSpPr>
+        <p:spPr>
+          <a:xfrm>
+            <a:off x="680321" y="753228"/>
+            <a:ext cx="9613861" cy="1080938"/>
+          </a:xfrm>
+        </p:spPr>
+        <p:txBody>
+          <a:bodyPr/>
+          <a:lstStyle/>
+          <a:p>
+            <a:r>
+              <a:rPr lang="pt-BR" dirty="0"/>
+              <a:t>Criando Drives Customizados - Python</a:t>
+            </a:r>
+          </a:p>
+        </p:txBody>
+      </p:sp>
+      <p:sp>
+        <p:nvSpPr>
+          <p:cNvPr id="5" name="Espaço Reservado para Conteúdo 2">
+            <a:extLst>
+              <a:ext uri="{FF2B5EF4-FFF2-40B4-BE49-F238E27FC236}">
+                <a16:creationId xmlns:a16="http://schemas.microsoft.com/office/drawing/2014/main" id="{C5B8AB74-06FA-413C-BD74-462D1F01C8FF}"/>
+              </a:ext>
+            </a:extLst>
+          </p:cNvPr>
+          <p:cNvSpPr>
+            <a:spLocks noGrp="1"/>
+          </p:cNvSpPr>
+          <p:nvPr>
+            <p:ph idx="1"/>
+          </p:nvPr>
+        </p:nvSpPr>
+        <p:spPr>
+          <a:xfrm>
+            <a:off x="680321" y="2505456"/>
+            <a:ext cx="9484759" cy="3599316"/>
+          </a:xfrm>
+        </p:spPr>
+        <p:txBody>
+          <a:bodyPr>
+            <a:noAutofit/>
+          </a:bodyPr>
+          <a:lstStyle/>
+          <a:p>
+            <a:pPr>
+              <a:spcAft>
+                <a:spcPts val="1000"/>
+              </a:spcAft>
+            </a:pPr>
+            <a:r>
+              <a:rPr lang="pt-BR" dirty="0"/>
+              <a:t>Criando a </a:t>
+            </a:r>
+            <a:r>
+              <a:rPr lang="pt-BR" dirty="0" err="1"/>
+              <a:t>Probe</a:t>
+            </a:r>
+            <a:r>
+              <a:rPr lang="pt-BR" dirty="0"/>
+              <a:t>:</a:t>
+            </a:r>
+          </a:p>
+          <a:p>
+            <a:pPr lvl="1">
+              <a:spcAft>
+                <a:spcPts val="1000"/>
+              </a:spcAft>
+            </a:pPr>
+            <a:r>
+              <a:rPr lang="pt-BR" dirty="0"/>
+              <a:t>4. Retorna false se a chamada responder </a:t>
+            </a:r>
+            <a:r>
+              <a:rPr lang="pt-BR" dirty="0" err="1"/>
+              <a:t>service_unavailable</a:t>
+            </a:r>
+            <a:r>
+              <a:rPr lang="pt-BR" dirty="0"/>
+              <a:t> como status </a:t>
+            </a:r>
+            <a:r>
+              <a:rPr lang="pt-BR" dirty="0" err="1"/>
+              <a:t>code</a:t>
+            </a:r>
+            <a:r>
+              <a:rPr lang="pt-BR" dirty="0"/>
+              <a:t>.</a:t>
+            </a:r>
+          </a:p>
+          <a:p>
+            <a:pPr lvl="1">
+              <a:spcAft>
+                <a:spcPts val="1000"/>
+              </a:spcAft>
+            </a:pPr>
+            <a:r>
+              <a:rPr lang="pt-BR" dirty="0"/>
+              <a:t>5. Retorna a exceção </a:t>
+            </a:r>
+            <a:r>
+              <a:rPr lang="pt-BR" dirty="0" err="1"/>
+              <a:t>FailedActivity</a:t>
+            </a:r>
+            <a:r>
+              <a:rPr lang="pt-BR" dirty="0"/>
+              <a:t> se existir um código de resposta inesperado. Esta exceção não aborta o experimento, apenas adiciona uma nota ao </a:t>
+            </a:r>
+            <a:r>
+              <a:rPr lang="pt-BR" i="1" dirty="0" err="1"/>
+              <a:t>experiment’s</a:t>
+            </a:r>
+            <a:r>
+              <a:rPr lang="pt-BR" i="1" dirty="0"/>
+              <a:t> </a:t>
+            </a:r>
+            <a:r>
+              <a:rPr lang="pt-BR" i="1" dirty="0" err="1"/>
+              <a:t>findings</a:t>
+            </a:r>
+            <a:r>
+              <a:rPr lang="pt-BR" i="1" dirty="0"/>
+              <a:t> </a:t>
+            </a:r>
+            <a:r>
+              <a:rPr lang="pt-BR" dirty="0"/>
+              <a:t>no arquivo </a:t>
+            </a:r>
+            <a:r>
+              <a:rPr lang="pt-BR" i="1" dirty="0" err="1"/>
+              <a:t>jornal.json</a:t>
+            </a:r>
+            <a:endParaRPr lang="pt-BR" i="1" dirty="0"/>
+          </a:p>
+          <a:p>
+            <a:pPr>
+              <a:spcAft>
+                <a:spcPts val="1000"/>
+              </a:spcAft>
+            </a:pPr>
+            <a:r>
+              <a:rPr lang="pt-BR" dirty="0"/>
+              <a:t>Agora vamos dar uma olhada no módulo da API que é responsável por chamar o Chaos </a:t>
+            </a:r>
+            <a:r>
+              <a:rPr lang="pt-BR" dirty="0" err="1"/>
+              <a:t>Monkey</a:t>
+            </a:r>
+            <a:r>
+              <a:rPr lang="pt-BR" dirty="0"/>
+              <a:t> for Spring Boot</a:t>
+            </a:r>
+          </a:p>
+          <a:p>
+            <a:pPr>
+              <a:spcAft>
+                <a:spcPts val="1000"/>
+              </a:spcAft>
+            </a:pPr>
+            <a:r>
+              <a:rPr lang="pt-BR" dirty="0"/>
+              <a:t>O código a seguir deve ser adicionado ao arquivo </a:t>
+            </a:r>
+            <a:r>
+              <a:rPr lang="pt-BR" i="1" dirty="0"/>
+              <a:t>api.py no </a:t>
+            </a:r>
+            <a:r>
+              <a:rPr lang="pt-BR" dirty="0"/>
+              <a:t>módulo</a:t>
+            </a:r>
+            <a:r>
+              <a:rPr lang="pt-BR" i="1" dirty="0"/>
+              <a:t> </a:t>
+            </a:r>
+            <a:r>
+              <a:rPr lang="pt-BR" dirty="0" err="1"/>
+              <a:t>chaosmlite</a:t>
+            </a:r>
+            <a:endParaRPr lang="pt-BR" dirty="0"/>
+          </a:p>
+        </p:txBody>
+      </p:sp>
+    </p:spTree>
+    <p:extLst>
+      <p:ext uri="{BB962C8B-B14F-4D97-AF65-F5344CB8AC3E}">
+        <p14:creationId xmlns:p14="http://schemas.microsoft.com/office/powerpoint/2010/main" val="2063951909"/>
+      </p:ext>
+    </p:extLst>
+  </p:cSld>
+  <p:clrMapOvr>
+    <a:masterClrMapping/>
+  </p:clrMapOvr>
+</p:sld>
+</file>
+
+<file path=ppt/slides/slide147.xml><?xml version="1.0" encoding="utf-8"?>
+<p:sld xmlns:a="http://schemas.openxmlformats.org/drawingml/2006/main" xmlns:r="http://schemas.openxmlformats.org/officeDocument/2006/relationships" xmlns:p="http://schemas.openxmlformats.org/presentationml/2006/main">
+  <p:cSld>
+    <p:spTree>
+      <p:nvGrpSpPr>
+        <p:cNvPr id="1" name=""/>
+        <p:cNvGrpSpPr/>
+        <p:nvPr/>
+      </p:nvGrpSpPr>
+      <p:grpSpPr>
+        <a:xfrm>
+          <a:off x="0" y="0"/>
+          <a:ext cx="0" cy="0"/>
+          <a:chOff x="0" y="0"/>
+          <a:chExt cx="0" cy="0"/>
+        </a:xfrm>
+      </p:grpSpPr>
+      <p:sp>
+        <p:nvSpPr>
+          <p:cNvPr id="4" name="Título 1">
+            <a:extLst>
+              <a:ext uri="{FF2B5EF4-FFF2-40B4-BE49-F238E27FC236}">
+                <a16:creationId xmlns:a16="http://schemas.microsoft.com/office/drawing/2014/main" id="{9CA53688-E304-4704-85E6-8432DC608B05}"/>
+              </a:ext>
+            </a:extLst>
+          </p:cNvPr>
+          <p:cNvSpPr>
+            <a:spLocks noGrp="1"/>
+          </p:cNvSpPr>
+          <p:nvPr>
+            <p:ph type="title"/>
+          </p:nvPr>
+        </p:nvSpPr>
+        <p:spPr>
+          <a:xfrm>
+            <a:off x="680321" y="753228"/>
+            <a:ext cx="9613861" cy="1080938"/>
+          </a:xfrm>
+        </p:spPr>
+        <p:txBody>
+          <a:bodyPr/>
+          <a:lstStyle/>
+          <a:p>
+            <a:r>
+              <a:rPr lang="pt-BR" dirty="0"/>
+              <a:t>Criando Drives Customizados - Python</a:t>
+            </a:r>
+          </a:p>
+        </p:txBody>
+      </p:sp>
+      <p:sp>
+        <p:nvSpPr>
+          <p:cNvPr id="5" name="Espaço Reservado para Conteúdo 2">
+            <a:extLst>
+              <a:ext uri="{FF2B5EF4-FFF2-40B4-BE49-F238E27FC236}">
+                <a16:creationId xmlns:a16="http://schemas.microsoft.com/office/drawing/2014/main" id="{C5B8AB74-06FA-413C-BD74-462D1F01C8FF}"/>
+              </a:ext>
+            </a:extLst>
+          </p:cNvPr>
+          <p:cNvSpPr>
+            <a:spLocks noGrp="1"/>
+          </p:cNvSpPr>
+          <p:nvPr>
+            <p:ph idx="1"/>
+          </p:nvPr>
+        </p:nvSpPr>
+        <p:spPr>
+          <a:xfrm>
+            <a:off x="680321" y="2505456"/>
+            <a:ext cx="9484759" cy="3599316"/>
+          </a:xfrm>
+        </p:spPr>
+        <p:txBody>
+          <a:bodyPr>
+            <a:noAutofit/>
+          </a:bodyPr>
+          <a:lstStyle/>
+          <a:p>
+            <a:pPr>
+              <a:spcAft>
+                <a:spcPts val="1000"/>
+              </a:spcAft>
+            </a:pPr>
+            <a:r>
+              <a:rPr lang="pt-BR" dirty="0"/>
+              <a:t>Executando o Experimento:</a:t>
+            </a:r>
+          </a:p>
+          <a:p>
+            <a:pPr lvl="1">
+              <a:spcAft>
+                <a:spcPts val="1000"/>
+              </a:spcAft>
+            </a:pPr>
+            <a:r>
+              <a:rPr lang="pt-BR" dirty="0"/>
+              <a:t>O</a:t>
+            </a:r>
+          </a:p>
+        </p:txBody>
+      </p:sp>
+    </p:spTree>
+    <p:extLst>
+      <p:ext uri="{BB962C8B-B14F-4D97-AF65-F5344CB8AC3E}">
+        <p14:creationId xmlns:p14="http://schemas.microsoft.com/office/powerpoint/2010/main" val="3878086839"/>
+      </p:ext>
+    </p:extLst>
+  </p:cSld>
+  <p:clrMapOvr>
+    <a:masterClrMapping/>
+  </p:clrMapOvr>
+</p:sld>
+</file>
+
+<file path=ppt/slides/slide148.xml><?xml version="1.0" encoding="utf-8"?>
+<p:sld xmlns:a="http://schemas.openxmlformats.org/drawingml/2006/main" xmlns:r="http://schemas.openxmlformats.org/officeDocument/2006/relationships" xmlns:p="http://schemas.openxmlformats.org/presentationml/2006/main">
+  <p:cSld>
+    <p:spTree>
+      <p:nvGrpSpPr>
+        <p:cNvPr id="1" name=""/>
+        <p:cNvGrpSpPr/>
+        <p:nvPr/>
+      </p:nvGrpSpPr>
+      <p:grpSpPr>
+        <a:xfrm>
+          <a:off x="0" y="0"/>
+          <a:ext cx="0" cy="0"/>
+          <a:chOff x="0" y="0"/>
+          <a:chExt cx="0" cy="0"/>
+        </a:xfrm>
+      </p:grpSpPr>
+      <p:sp>
+        <p:nvSpPr>
+          <p:cNvPr id="4" name="Título 1">
+            <a:extLst>
+              <a:ext uri="{FF2B5EF4-FFF2-40B4-BE49-F238E27FC236}">
+                <a16:creationId xmlns:a16="http://schemas.microsoft.com/office/drawing/2014/main" id="{9CA53688-E304-4704-85E6-8432DC608B05}"/>
+              </a:ext>
+            </a:extLst>
+          </p:cNvPr>
+          <p:cNvSpPr>
+            <a:spLocks noGrp="1"/>
+          </p:cNvSpPr>
+          <p:nvPr>
+            <p:ph type="title"/>
+          </p:nvPr>
+        </p:nvSpPr>
+        <p:spPr>
+          <a:xfrm>
+            <a:off x="680321" y="753228"/>
+            <a:ext cx="9613861" cy="1080938"/>
+          </a:xfrm>
+        </p:spPr>
+        <p:txBody>
+          <a:bodyPr/>
+          <a:lstStyle/>
+          <a:p>
+            <a:r>
+              <a:rPr lang="pt-BR" dirty="0"/>
+              <a:t>Criando Drives Customizados - Python</a:t>
+            </a:r>
+          </a:p>
+        </p:txBody>
+      </p:sp>
+      <p:sp>
+        <p:nvSpPr>
+          <p:cNvPr id="5" name="Espaço Reservado para Conteúdo 2">
+            <a:extLst>
+              <a:ext uri="{FF2B5EF4-FFF2-40B4-BE49-F238E27FC236}">
+                <a16:creationId xmlns:a16="http://schemas.microsoft.com/office/drawing/2014/main" id="{C5B8AB74-06FA-413C-BD74-462D1F01C8FF}"/>
+              </a:ext>
+            </a:extLst>
+          </p:cNvPr>
+          <p:cNvSpPr>
+            <a:spLocks noGrp="1"/>
+          </p:cNvSpPr>
+          <p:nvPr>
+            <p:ph idx="1"/>
+          </p:nvPr>
+        </p:nvSpPr>
+        <p:spPr>
+          <a:xfrm>
+            <a:off x="680321" y="2505456"/>
+            <a:ext cx="9484759" cy="3599316"/>
+          </a:xfrm>
+        </p:spPr>
+        <p:txBody>
+          <a:bodyPr>
+            <a:noAutofit/>
+          </a:bodyPr>
+          <a:lstStyle/>
+          <a:p>
+            <a:pPr>
+              <a:spcAft>
+                <a:spcPts val="1000"/>
+              </a:spcAft>
+            </a:pPr>
+            <a:r>
+              <a:rPr lang="pt-BR" dirty="0"/>
+              <a:t>Executando o Experimento:</a:t>
+            </a:r>
+          </a:p>
+          <a:p>
+            <a:pPr lvl="1">
+              <a:spcAft>
+                <a:spcPts val="1000"/>
+              </a:spcAft>
+            </a:pPr>
+            <a:r>
+              <a:rPr lang="pt-BR" dirty="0"/>
+              <a:t>O</a:t>
+            </a:r>
+          </a:p>
+        </p:txBody>
+      </p:sp>
+    </p:spTree>
+    <p:extLst>
+      <p:ext uri="{BB962C8B-B14F-4D97-AF65-F5344CB8AC3E}">
+        <p14:creationId xmlns:p14="http://schemas.microsoft.com/office/powerpoint/2010/main" val="1654327808"/>
+      </p:ext>
+    </p:extLst>
+  </p:cSld>
+  <p:clrMapOvr>
+    <a:masterClrMapping/>
+  </p:clrMapOvr>
+</p:sld>
+</file>
+
+<file path=ppt/slides/slide149.xml><?xml version="1.0" encoding="utf-8"?>
+<p:sld xmlns:a="http://schemas.openxmlformats.org/drawingml/2006/main" xmlns:r="http://schemas.openxmlformats.org/officeDocument/2006/relationships" xmlns:p="http://schemas.openxmlformats.org/presentationml/2006/main">
+  <p:cSld>
+    <p:spTree>
+      <p:nvGrpSpPr>
+        <p:cNvPr id="1" name=""/>
+        <p:cNvGrpSpPr/>
+        <p:nvPr/>
+      </p:nvGrpSpPr>
+      <p:grpSpPr>
+        <a:xfrm>
+          <a:off x="0" y="0"/>
+          <a:ext cx="0" cy="0"/>
+          <a:chOff x="0" y="0"/>
+          <a:chExt cx="0" cy="0"/>
+        </a:xfrm>
+      </p:grpSpPr>
+      <p:sp>
+        <p:nvSpPr>
+          <p:cNvPr id="4" name="Título 1">
+            <a:extLst>
+              <a:ext uri="{FF2B5EF4-FFF2-40B4-BE49-F238E27FC236}">
+                <a16:creationId xmlns:a16="http://schemas.microsoft.com/office/drawing/2014/main" id="{9CA53688-E304-4704-85E6-8432DC608B05}"/>
+              </a:ext>
+            </a:extLst>
+          </p:cNvPr>
+          <p:cNvSpPr>
+            <a:spLocks noGrp="1"/>
+          </p:cNvSpPr>
+          <p:nvPr>
+            <p:ph type="title"/>
+          </p:nvPr>
+        </p:nvSpPr>
+        <p:spPr>
+          <a:xfrm>
+            <a:off x="680321" y="753228"/>
+            <a:ext cx="9613861" cy="1080938"/>
+          </a:xfrm>
+        </p:spPr>
+        <p:txBody>
+          <a:bodyPr/>
+          <a:lstStyle/>
+          <a:p>
+            <a:r>
+              <a:rPr lang="pt-BR" dirty="0"/>
+              <a:t>Criando Drives Customizados - Python</a:t>
+            </a:r>
+          </a:p>
+        </p:txBody>
+      </p:sp>
+      <p:sp>
+        <p:nvSpPr>
+          <p:cNvPr id="5" name="Espaço Reservado para Conteúdo 2">
+            <a:extLst>
+              <a:ext uri="{FF2B5EF4-FFF2-40B4-BE49-F238E27FC236}">
+                <a16:creationId xmlns:a16="http://schemas.microsoft.com/office/drawing/2014/main" id="{C5B8AB74-06FA-413C-BD74-462D1F01C8FF}"/>
+              </a:ext>
+            </a:extLst>
+          </p:cNvPr>
+          <p:cNvSpPr>
+            <a:spLocks noGrp="1"/>
+          </p:cNvSpPr>
+          <p:nvPr>
+            <p:ph idx="1"/>
+          </p:nvPr>
+        </p:nvSpPr>
+        <p:spPr>
+          <a:xfrm>
+            <a:off x="680321" y="2505456"/>
+            <a:ext cx="9484759" cy="3599316"/>
+          </a:xfrm>
+        </p:spPr>
+        <p:txBody>
+          <a:bodyPr>
+            <a:noAutofit/>
+          </a:bodyPr>
+          <a:lstStyle/>
+          <a:p>
+            <a:pPr>
+              <a:spcAft>
+                <a:spcPts val="1000"/>
+              </a:spcAft>
+            </a:pPr>
+            <a:r>
+              <a:rPr lang="pt-BR" dirty="0"/>
+              <a:t>Executando o Experimento:</a:t>
+            </a:r>
+          </a:p>
+          <a:p>
+            <a:pPr lvl="1">
+              <a:spcAft>
+                <a:spcPts val="1000"/>
+              </a:spcAft>
+            </a:pPr>
+            <a:r>
+              <a:rPr lang="pt-BR" dirty="0"/>
+              <a:t>O</a:t>
+            </a:r>
+          </a:p>
+        </p:txBody>
+      </p:sp>
+    </p:spTree>
+    <p:extLst>
+      <p:ext uri="{BB962C8B-B14F-4D97-AF65-F5344CB8AC3E}">
+        <p14:creationId xmlns:p14="http://schemas.microsoft.com/office/powerpoint/2010/main" val="2308588375"/>
+      </p:ext>
+    </p:extLst>
+  </p:cSld>
+  <p:clrMapOvr>
+    <a:masterClrMapping/>
+  </p:clrMapOvr>
+</p:sld>
+</file>
+
 <file path=ppt/slides/slide15.xml><?xml version="1.0" encoding="utf-8"?>
 <p:sld xmlns:a="http://schemas.openxmlformats.org/drawingml/2006/main" xmlns:r="http://schemas.openxmlformats.org/officeDocument/2006/relationships" xmlns:p="http://schemas.openxmlformats.org/presentationml/2006/main">
   <p:cSld>
@@ -14284,6 +18290,234 @@
     <p:extLst>
       <p:ext uri="{BB962C8B-B14F-4D97-AF65-F5344CB8AC3E}">
         <p14:creationId xmlns:p14="http://schemas.microsoft.com/office/powerpoint/2010/main" val="1336397876"/>
+      </p:ext>
+    </p:extLst>
+  </p:cSld>
+  <p:clrMapOvr>
+    <a:masterClrMapping/>
+  </p:clrMapOvr>
+</p:sld>
+</file>
+
+<file path=ppt/slides/slide150.xml><?xml version="1.0" encoding="utf-8"?>
+<p:sld xmlns:a="http://schemas.openxmlformats.org/drawingml/2006/main" xmlns:r="http://schemas.openxmlformats.org/officeDocument/2006/relationships" xmlns:p="http://schemas.openxmlformats.org/presentationml/2006/main">
+  <p:cSld>
+    <p:spTree>
+      <p:nvGrpSpPr>
+        <p:cNvPr id="1" name=""/>
+        <p:cNvGrpSpPr/>
+        <p:nvPr/>
+      </p:nvGrpSpPr>
+      <p:grpSpPr>
+        <a:xfrm>
+          <a:off x="0" y="0"/>
+          <a:ext cx="0" cy="0"/>
+          <a:chOff x="0" y="0"/>
+          <a:chExt cx="0" cy="0"/>
+        </a:xfrm>
+      </p:grpSpPr>
+      <p:sp>
+        <p:nvSpPr>
+          <p:cNvPr id="4" name="Título 1">
+            <a:extLst>
+              <a:ext uri="{FF2B5EF4-FFF2-40B4-BE49-F238E27FC236}">
+                <a16:creationId xmlns:a16="http://schemas.microsoft.com/office/drawing/2014/main" id="{9CA53688-E304-4704-85E6-8432DC608B05}"/>
+              </a:ext>
+            </a:extLst>
+          </p:cNvPr>
+          <p:cNvSpPr>
+            <a:spLocks noGrp="1"/>
+          </p:cNvSpPr>
+          <p:nvPr>
+            <p:ph type="title"/>
+          </p:nvPr>
+        </p:nvSpPr>
+        <p:spPr>
+          <a:xfrm>
+            <a:off x="680321" y="753228"/>
+            <a:ext cx="9613861" cy="1080938"/>
+          </a:xfrm>
+        </p:spPr>
+        <p:txBody>
+          <a:bodyPr/>
+          <a:lstStyle/>
+          <a:p>
+            <a:r>
+              <a:rPr lang="pt-BR" dirty="0"/>
+              <a:t>Criando Drives Customizados - Python</a:t>
+            </a:r>
+          </a:p>
+        </p:txBody>
+      </p:sp>
+      <p:sp>
+        <p:nvSpPr>
+          <p:cNvPr id="5" name="Espaço Reservado para Conteúdo 2">
+            <a:extLst>
+              <a:ext uri="{FF2B5EF4-FFF2-40B4-BE49-F238E27FC236}">
+                <a16:creationId xmlns:a16="http://schemas.microsoft.com/office/drawing/2014/main" id="{C5B8AB74-06FA-413C-BD74-462D1F01C8FF}"/>
+              </a:ext>
+            </a:extLst>
+          </p:cNvPr>
+          <p:cNvSpPr>
+            <a:spLocks noGrp="1"/>
+          </p:cNvSpPr>
+          <p:nvPr>
+            <p:ph idx="1"/>
+          </p:nvPr>
+        </p:nvSpPr>
+        <p:spPr>
+          <a:xfrm>
+            <a:off x="680321" y="2505456"/>
+            <a:ext cx="9484759" cy="3599316"/>
+          </a:xfrm>
+        </p:spPr>
+        <p:txBody>
+          <a:bodyPr>
+            <a:noAutofit/>
+          </a:bodyPr>
+          <a:lstStyle/>
+          <a:p>
+            <a:pPr>
+              <a:spcAft>
+                <a:spcPts val="1000"/>
+              </a:spcAft>
+            </a:pPr>
+            <a:r>
+              <a:rPr lang="pt-BR" dirty="0"/>
+              <a:t>Executando o Experimento:</a:t>
+            </a:r>
+          </a:p>
+          <a:p>
+            <a:pPr lvl="1">
+              <a:spcAft>
+                <a:spcPts val="1000"/>
+              </a:spcAft>
+            </a:pPr>
+            <a:r>
+              <a:rPr lang="pt-BR" dirty="0"/>
+              <a:t>O</a:t>
+            </a:r>
+          </a:p>
+        </p:txBody>
+      </p:sp>
+    </p:spTree>
+    <p:extLst>
+      <p:ext uri="{BB962C8B-B14F-4D97-AF65-F5344CB8AC3E}">
+        <p14:creationId xmlns:p14="http://schemas.microsoft.com/office/powerpoint/2010/main" val="730558519"/>
+      </p:ext>
+    </p:extLst>
+  </p:cSld>
+  <p:clrMapOvr>
+    <a:masterClrMapping/>
+  </p:clrMapOvr>
+</p:sld>
+</file>
+
+<file path=ppt/slides/slide151.xml><?xml version="1.0" encoding="utf-8"?>
+<p:sld xmlns:a="http://schemas.openxmlformats.org/drawingml/2006/main" xmlns:r="http://schemas.openxmlformats.org/officeDocument/2006/relationships" xmlns:p="http://schemas.openxmlformats.org/presentationml/2006/main">
+  <p:cSld>
+    <p:spTree>
+      <p:nvGrpSpPr>
+        <p:cNvPr id="1" name=""/>
+        <p:cNvGrpSpPr/>
+        <p:nvPr/>
+      </p:nvGrpSpPr>
+      <p:grpSpPr>
+        <a:xfrm>
+          <a:off x="0" y="0"/>
+          <a:ext cx="0" cy="0"/>
+          <a:chOff x="0" y="0"/>
+          <a:chExt cx="0" cy="0"/>
+        </a:xfrm>
+      </p:grpSpPr>
+      <p:sp>
+        <p:nvSpPr>
+          <p:cNvPr id="4" name="Título 1">
+            <a:extLst>
+              <a:ext uri="{FF2B5EF4-FFF2-40B4-BE49-F238E27FC236}">
+                <a16:creationId xmlns:a16="http://schemas.microsoft.com/office/drawing/2014/main" id="{9CA53688-E304-4704-85E6-8432DC608B05}"/>
+              </a:ext>
+            </a:extLst>
+          </p:cNvPr>
+          <p:cNvSpPr>
+            <a:spLocks noGrp="1"/>
+          </p:cNvSpPr>
+          <p:nvPr>
+            <p:ph type="title"/>
+          </p:nvPr>
+        </p:nvSpPr>
+        <p:spPr>
+          <a:xfrm>
+            <a:off x="680321" y="753228"/>
+            <a:ext cx="9613861" cy="1080938"/>
+          </a:xfrm>
+        </p:spPr>
+        <p:txBody>
+          <a:bodyPr/>
+          <a:lstStyle/>
+          <a:p>
+            <a:r>
+              <a:rPr lang="pt-BR" dirty="0"/>
+              <a:t>Criando Drives Customizados - Python</a:t>
+            </a:r>
+          </a:p>
+        </p:txBody>
+      </p:sp>
+      <p:sp>
+        <p:nvSpPr>
+          <p:cNvPr id="5" name="Espaço Reservado para Conteúdo 2">
+            <a:extLst>
+              <a:ext uri="{FF2B5EF4-FFF2-40B4-BE49-F238E27FC236}">
+                <a16:creationId xmlns:a16="http://schemas.microsoft.com/office/drawing/2014/main" id="{C5B8AB74-06FA-413C-BD74-462D1F01C8FF}"/>
+              </a:ext>
+            </a:extLst>
+          </p:cNvPr>
+          <p:cNvSpPr>
+            <a:spLocks noGrp="1"/>
+          </p:cNvSpPr>
+          <p:nvPr>
+            <p:ph idx="1"/>
+          </p:nvPr>
+        </p:nvSpPr>
+        <p:spPr>
+          <a:xfrm>
+            <a:off x="680321" y="2505456"/>
+            <a:ext cx="9484759" cy="3599316"/>
+          </a:xfrm>
+        </p:spPr>
+        <p:txBody>
+          <a:bodyPr>
+            <a:noAutofit/>
+          </a:bodyPr>
+          <a:lstStyle/>
+          <a:p>
+            <a:pPr>
+              <a:spcAft>
+                <a:spcPts val="1000"/>
+              </a:spcAft>
+            </a:pPr>
+            <a:r>
+              <a:rPr lang="pt-BR" dirty="0"/>
+              <a:t>Executando o Experimento:</a:t>
+            </a:r>
+          </a:p>
+          <a:p>
+            <a:pPr lvl="1">
+              <a:spcAft>
+                <a:spcPts val="1000"/>
+              </a:spcAft>
+            </a:pPr>
+            <a:r>
+              <a:rPr lang="pt-BR" dirty="0"/>
+              <a:t>O</a:t>
+            </a:r>
+          </a:p>
+        </p:txBody>
+      </p:sp>
+    </p:spTree>
+    <p:extLst>
+      <p:ext uri="{BB962C8B-B14F-4D97-AF65-F5344CB8AC3E}">
+        <p14:creationId xmlns:p14="http://schemas.microsoft.com/office/powerpoint/2010/main" val="974657080"/>
       </p:ext>
     </p:extLst>
   </p:cSld>

</xml_diff>

<commit_message>
Inclui inicio de nova seção
</commit_message>
<xml_diff>
--- a/docs/Chaos Engineering - Das Hipoteses aos Testes.pptx
+++ b/docs/Chaos Engineering - Das Hipoteses aos Testes.pptx
@@ -155,7 +155,8 @@
     <p:sldId id="404" r:id="rId149"/>
     <p:sldId id="405" r:id="rId150"/>
     <p:sldId id="406" r:id="rId151"/>
-    <p:sldId id="407" r:id="rId152"/>
+    <p:sldId id="408" r:id="rId152"/>
+    <p:sldId id="407" r:id="rId153"/>
   </p:sldIdLst>
   <p:sldSz cx="12192000" cy="6858000"/>
   <p:notesSz cx="6858000" cy="9144000"/>
@@ -536,7 +537,7 @@
           <a:p>
             <a:fld id="{4AAD347D-5ACD-4C99-B74B-A9C85AD731AF}" type="datetimeFigureOut">
               <a:rPr lang="en-US" smtClean="0"/>
-              <a:t>10/21/2019</a:t>
+              <a:t>10/22/2019</a:t>
             </a:fld>
             <a:endParaRPr lang="en-US" dirty="0"/>
           </a:p>
@@ -951,7 +952,7 @@
           <a:p>
             <a:fld id="{4509A250-FF31-4206-8172-F9D3106AACB1}" type="datetimeFigureOut">
               <a:rPr lang="en-US" smtClean="0"/>
-              <a:t>10/21/2019</a:t>
+              <a:t>10/22/2019</a:t>
             </a:fld>
             <a:endParaRPr lang="en-US" dirty="0"/>
           </a:p>
@@ -1287,7 +1288,7 @@
           <a:p>
             <a:fld id="{4509A250-FF31-4206-8172-F9D3106AACB1}" type="datetimeFigureOut">
               <a:rPr lang="en-US" smtClean="0"/>
-              <a:t>10/21/2019</a:t>
+              <a:t>10/22/2019</a:t>
             </a:fld>
             <a:endParaRPr lang="en-US" dirty="0"/>
           </a:p>
@@ -1692,7 +1693,7 @@
           <a:p>
             <a:fld id="{4AAD347D-5ACD-4C99-B74B-A9C85AD731AF}" type="datetimeFigureOut">
               <a:rPr lang="en-US" smtClean="0"/>
-              <a:t>10/21/2019</a:t>
+              <a:t>10/22/2019</a:t>
             </a:fld>
             <a:endParaRPr lang="en-US" dirty="0"/>
           </a:p>
@@ -2261,7 +2262,7 @@
           <a:p>
             <a:fld id="{4AAD347D-5ACD-4C99-B74B-A9C85AD731AF}" type="datetimeFigureOut">
               <a:rPr lang="en-US" smtClean="0"/>
-              <a:t>10/21/2019</a:t>
+              <a:t>10/22/2019</a:t>
             </a:fld>
             <a:endParaRPr lang="en-US" dirty="0"/>
           </a:p>
@@ -2943,7 +2944,7 @@
           <a:p>
             <a:fld id="{4509A250-FF31-4206-8172-F9D3106AACB1}" type="datetimeFigureOut">
               <a:rPr lang="en-US" smtClean="0"/>
-              <a:t>10/21/2019</a:t>
+              <a:t>10/22/2019</a:t>
             </a:fld>
             <a:endParaRPr lang="en-US" dirty="0"/>
           </a:p>
@@ -3856,7 +3857,7 @@
           <a:p>
             <a:fld id="{4509A250-FF31-4206-8172-F9D3106AACB1}" type="datetimeFigureOut">
               <a:rPr lang="en-US" smtClean="0"/>
-              <a:t>10/21/2019</a:t>
+              <a:t>10/22/2019</a:t>
             </a:fld>
             <a:endParaRPr lang="en-US" dirty="0"/>
           </a:p>
@@ -4169,7 +4170,7 @@
           <a:p>
             <a:fld id="{4AAD347D-5ACD-4C99-B74B-A9C85AD731AF}" type="datetimeFigureOut">
               <a:rPr lang="en-US" smtClean="0"/>
-              <a:t>10/21/2019</a:t>
+              <a:t>10/22/2019</a:t>
             </a:fld>
             <a:endParaRPr lang="en-US" dirty="0"/>
           </a:p>
@@ -4434,7 +4435,7 @@
           <a:p>
             <a:fld id="{4AAD347D-5ACD-4C99-B74B-A9C85AD731AF}" type="datetimeFigureOut">
               <a:rPr lang="en-US" smtClean="0"/>
-              <a:t>10/21/2019</a:t>
+              <a:t>10/22/2019</a:t>
             </a:fld>
             <a:endParaRPr lang="en-US" dirty="0"/>
           </a:p>
@@ -4758,7 +4759,7 @@
           <a:p>
             <a:fld id="{4AAD347D-5ACD-4C99-B74B-A9C85AD731AF}" type="datetimeFigureOut">
               <a:rPr lang="en-US" smtClean="0"/>
-              <a:t>10/21/2019</a:t>
+              <a:t>10/22/2019</a:t>
             </a:fld>
             <a:endParaRPr lang="en-US" dirty="0"/>
           </a:p>
@@ -5148,7 +5149,7 @@
           <a:p>
             <a:fld id="{9796027F-7875-4030-9381-8BD8C4F21935}" type="datetimeFigureOut">
               <a:rPr lang="en-US" smtClean="0"/>
-              <a:t>10/21/2019</a:t>
+              <a:t>10/22/2019</a:t>
             </a:fld>
             <a:endParaRPr lang="en-US" dirty="0"/>
           </a:p>
@@ -5524,7 +5525,7 @@
           <a:p>
             <a:fld id="{9796027F-7875-4030-9381-8BD8C4F21935}" type="datetimeFigureOut">
               <a:rPr lang="en-US" smtClean="0"/>
-              <a:t>10/21/2019</a:t>
+              <a:t>10/22/2019</a:t>
             </a:fld>
             <a:endParaRPr lang="en-US" dirty="0"/>
           </a:p>
@@ -6030,7 +6031,7 @@
           <a:p>
             <a:fld id="{9796027F-7875-4030-9381-8BD8C4F21935}" type="datetimeFigureOut">
               <a:rPr lang="en-US" smtClean="0"/>
-              <a:t>10/21/2019</a:t>
+              <a:t>10/22/2019</a:t>
             </a:fld>
             <a:endParaRPr lang="en-US" dirty="0"/>
           </a:p>
@@ -6287,7 +6288,7 @@
           <a:p>
             <a:fld id="{4AAD347D-5ACD-4C99-B74B-A9C85AD731AF}" type="datetimeFigureOut">
               <a:rPr lang="en-US" smtClean="0"/>
-              <a:t>10/21/2019</a:t>
+              <a:t>10/22/2019</a:t>
             </a:fld>
             <a:endParaRPr lang="en-US" dirty="0"/>
           </a:p>
@@ -6451,7 +6452,7 @@
           <a:p>
             <a:fld id="{4509A250-FF31-4206-8172-F9D3106AACB1}" type="datetimeFigureOut">
               <a:rPr lang="en-US" smtClean="0"/>
-              <a:t>10/21/2019</a:t>
+              <a:t>10/22/2019</a:t>
             </a:fld>
             <a:endParaRPr lang="en-US" dirty="0"/>
           </a:p>
@@ -6841,7 +6842,7 @@
           <a:p>
             <a:fld id="{4509A250-FF31-4206-8172-F9D3106AACB1}" type="datetimeFigureOut">
               <a:rPr lang="en-US" smtClean="0"/>
-              <a:t>10/21/2019</a:t>
+              <a:t>10/22/2019</a:t>
             </a:fld>
             <a:endParaRPr lang="en-US" dirty="0"/>
           </a:p>
@@ -7250,7 +7251,7 @@
           <a:p>
             <a:fld id="{4509A250-FF31-4206-8172-F9D3106AACB1}" type="datetimeFigureOut">
               <a:rPr lang="en-US" smtClean="0"/>
-              <a:t>10/21/2019</a:t>
+              <a:t>10/22/2019</a:t>
             </a:fld>
             <a:endParaRPr lang="en-US" dirty="0"/>
           </a:p>
@@ -7494,7 +7495,7 @@
           <a:p>
             <a:fld id="{4AAD347D-5ACD-4C99-B74B-A9C85AD731AF}" type="datetimeFigureOut">
               <a:rPr lang="en-US" smtClean="0"/>
-              <a:t>10/21/2019</a:t>
+              <a:t>10/22/2019</a:t>
             </a:fld>
             <a:endParaRPr lang="en-US" dirty="0"/>
           </a:p>
@@ -18865,6 +18866,70 @@
       </p:grpSpPr>
       <p:sp>
         <p:nvSpPr>
+          <p:cNvPr id="8" name="Título 1">
+            <a:extLst>
+              <a:ext uri="{FF2B5EF4-FFF2-40B4-BE49-F238E27FC236}">
+                <a16:creationId xmlns:a16="http://schemas.microsoft.com/office/drawing/2014/main" id="{5BCED719-060C-4357-99A7-1C2583E4F254}"/>
+              </a:ext>
+            </a:extLst>
+          </p:cNvPr>
+          <p:cNvSpPr>
+            <a:spLocks noGrp="1"/>
+          </p:cNvSpPr>
+          <p:nvPr>
+            <p:ph type="ctrTitle"/>
+          </p:nvPr>
+        </p:nvSpPr>
+        <p:spPr>
+          <a:xfrm>
+            <a:off x="1143000" y="2733709"/>
+            <a:ext cx="7681456" cy="1373070"/>
+          </a:xfrm>
+        </p:spPr>
+        <p:txBody>
+          <a:bodyPr/>
+          <a:lstStyle/>
+          <a:p>
+            <a:pPr algn="l"/>
+            <a:r>
+              <a:rPr lang="pt-BR" sz="6000" dirty="0"/>
+              <a:t>.</a:t>
+            </a:r>
+          </a:p>
+        </p:txBody>
+      </p:sp>
+    </p:spTree>
+    <p:extLst>
+      <p:ext uri="{BB962C8B-B14F-4D97-AF65-F5344CB8AC3E}">
+        <p14:creationId xmlns:p14="http://schemas.microsoft.com/office/powerpoint/2010/main" val="1082618850"/>
+      </p:ext>
+    </p:extLst>
+  </p:cSld>
+  <p:clrMapOvr>
+    <a:masterClrMapping/>
+  </p:clrMapOvr>
+</p:sld>
+</file>
+
+<file path=ppt/slides/slide152.xml><?xml version="1.0" encoding="utf-8"?>
+<p:sld xmlns:a="http://schemas.openxmlformats.org/drawingml/2006/main" xmlns:r="http://schemas.openxmlformats.org/officeDocument/2006/relationships" xmlns:p="http://schemas.openxmlformats.org/presentationml/2006/main">
+  <p:cSld>
+    <p:spTree>
+      <p:nvGrpSpPr>
+        <p:cNvPr id="1" name=""/>
+        <p:cNvGrpSpPr/>
+        <p:nvPr/>
+      </p:nvGrpSpPr>
+      <p:grpSpPr>
+        <a:xfrm>
+          <a:off x="0" y="0"/>
+          <a:ext cx="0" cy="0"/>
+          <a:chOff x="0" y="0"/>
+          <a:chExt cx="0" cy="0"/>
+        </a:xfrm>
+      </p:grpSpPr>
+      <p:sp>
+        <p:nvSpPr>
           <p:cNvPr id="4" name="Título 1">
             <a:extLst>
               <a:ext uri="{FF2B5EF4-FFF2-40B4-BE49-F238E27FC236}">
@@ -18931,18 +18996,7 @@
             </a:pPr>
             <a:r>
               <a:rPr lang="pt-BR" dirty="0"/>
-              <a:t>Executando o Experimento:</a:t>
-            </a:r>
-          </a:p>
-          <a:p>
-            <a:pPr lvl="1">
-              <a:spcAft>
-                <a:spcPts val="1000"/>
-              </a:spcAft>
-            </a:pPr>
-            <a:r>
-              <a:rPr lang="pt-BR" dirty="0"/>
-              <a:t>O</a:t>
+              <a:t>.</a:t>
             </a:r>
           </a:p>
         </p:txBody>

</xml_diff>